<commit_message>
Voice Clone: Fix slide
</commit_message>
<xml_diff>
--- a/Voice_Cloning/Slide.pptx
+++ b/Voice_Cloning/Slide.pptx
@@ -117,6 +117,11 @@
       </a:defRPr>
     </a:lvl9pPr>
   </p:defaultTextStyle>
+  <p:extLst>
+    <p:ext uri="{EFAFB233-063F-42B5-8137-9DF3F51BA10A}">
+      <p15:sldGuideLst xmlns:p15="http://schemas.microsoft.com/office/powerpoint/2012/main"/>
+    </p:ext>
+  </p:extLst>
 </p:presentation>
 </file>
 
@@ -202,7 +207,7 @@
           <a:p>
             <a:fld id="{27B9B13B-C1A0-FC4E-9BC2-CBAAD45B1A60}" type="datetimeFigureOut">
               <a:rPr lang="en-VN" smtClean="0"/>
-              <a:t>6/27/21</a:t>
+              <a:t>06/27/2021</a:t>
             </a:fld>
             <a:endParaRPr lang="en-VN"/>
           </a:p>
@@ -1427,6 +1432,90 @@
 </p:notes>
 </file>
 
+<file path=ppt/notesSlides/notesSlide5.xml><?xml version="1.0" encoding="utf-8"?>
+<p:notes xmlns:a="http://schemas.openxmlformats.org/drawingml/2006/main" xmlns:r="http://schemas.openxmlformats.org/officeDocument/2006/relationships" xmlns:p="http://schemas.openxmlformats.org/presentationml/2006/main">
+  <p:cSld>
+    <p:spTree>
+      <p:nvGrpSpPr>
+        <p:cNvPr id="1" name=""/>
+        <p:cNvGrpSpPr/>
+        <p:nvPr/>
+      </p:nvGrpSpPr>
+      <p:grpSpPr>
+        <a:xfrm>
+          <a:off x="0" y="0"/>
+          <a:ext cx="0" cy="0"/>
+          <a:chOff x="0" y="0"/>
+          <a:chExt cx="0" cy="0"/>
+        </a:xfrm>
+      </p:grpSpPr>
+      <p:sp>
+        <p:nvSpPr>
+          <p:cNvPr id="2" name="Slide Image Placeholder 1"/>
+          <p:cNvSpPr>
+            <a:spLocks noGrp="1" noRot="1" noChangeAspect="1"/>
+          </p:cNvSpPr>
+          <p:nvPr>
+            <p:ph type="sldImg"/>
+          </p:nvPr>
+        </p:nvSpPr>
+        <p:spPr/>
+      </p:sp>
+      <p:sp>
+        <p:nvSpPr>
+          <p:cNvPr id="3" name="Notes Placeholder 2"/>
+          <p:cNvSpPr>
+            <a:spLocks noGrp="1"/>
+          </p:cNvSpPr>
+          <p:nvPr>
+            <p:ph type="body" idx="1"/>
+          </p:nvPr>
+        </p:nvSpPr>
+        <p:spPr/>
+        <p:txBody>
+          <a:bodyPr/>
+          <a:lstStyle/>
+          <a:p>
+            <a:endParaRPr lang="en-US" dirty="0"/>
+          </a:p>
+        </p:txBody>
+      </p:sp>
+      <p:sp>
+        <p:nvSpPr>
+          <p:cNvPr id="4" name="Slide Number Placeholder 3"/>
+          <p:cNvSpPr>
+            <a:spLocks noGrp="1"/>
+          </p:cNvSpPr>
+          <p:nvPr>
+            <p:ph type="sldNum" sz="quarter" idx="5"/>
+          </p:nvPr>
+        </p:nvSpPr>
+        <p:spPr/>
+        <p:txBody>
+          <a:bodyPr/>
+          <a:lstStyle/>
+          <a:p>
+            <a:fld id="{AE01A4AD-3912-D14D-ABF4-A3E15A5DC8AA}" type="slidenum">
+              <a:rPr lang="en-VN" smtClean="0"/>
+              <a:t>9</a:t>
+            </a:fld>
+            <a:endParaRPr lang="en-VN"/>
+          </a:p>
+        </p:txBody>
+      </p:sp>
+    </p:spTree>
+    <p:extLst>
+      <p:ext uri="{BB962C8B-B14F-4D97-AF65-F5344CB8AC3E}">
+        <p14:creationId xmlns:p14="http://schemas.microsoft.com/office/powerpoint/2010/main" val="2642693956"/>
+      </p:ext>
+    </p:extLst>
+  </p:cSld>
+  <p:clrMapOvr>
+    <a:masterClrMapping/>
+  </p:clrMapOvr>
+</p:notes>
+</file>
+
 <file path=ppt/slideLayouts/slideLayout1.xml><?xml version="1.0" encoding="utf-8"?>
 <p:sldLayout xmlns:a="http://schemas.openxmlformats.org/drawingml/2006/main" xmlns:r="http://schemas.openxmlformats.org/officeDocument/2006/relationships" xmlns:p="http://schemas.openxmlformats.org/presentationml/2006/main" type="title" preserve="1">
   <p:cSld name="Title Slide">
@@ -1583,7 +1672,7 @@
           <a:p>
             <a:fld id="{02AC24A9-CCB6-4F8D-B8DB-C2F3692CFA5A}" type="datetimeFigureOut">
               <a:rPr lang="en-US" smtClean="0"/>
-              <a:t>6/27/21</a:t>
+              <a:t>6/27/2021</a:t>
             </a:fld>
             <a:endParaRPr lang="en-US" dirty="0"/>
           </a:p>
@@ -1953,7 +2042,7 @@
           <a:p>
             <a:fld id="{02AC24A9-CCB6-4F8D-B8DB-C2F3692CFA5A}" type="datetimeFigureOut">
               <a:rPr lang="en-US" smtClean="0"/>
-              <a:t>6/27/21</a:t>
+              <a:t>6/27/2021</a:t>
             </a:fld>
             <a:endParaRPr lang="en-US"/>
           </a:p>
@@ -2162,7 +2251,7 @@
           <a:p>
             <a:fld id="{02AC24A9-CCB6-4F8D-B8DB-C2F3692CFA5A}" type="datetimeFigureOut">
               <a:rPr lang="en-US" smtClean="0"/>
-              <a:t>6/27/21</a:t>
+              <a:t>6/27/2021</a:t>
             </a:fld>
             <a:endParaRPr lang="en-US"/>
           </a:p>
@@ -2632,7 +2721,7 @@
           <a:p>
             <a:fld id="{02AC24A9-CCB6-4F8D-B8DB-C2F3692CFA5A}" type="datetimeFigureOut">
               <a:rPr lang="en-US" smtClean="0"/>
-              <a:t>6/27/21</a:t>
+              <a:t>6/27/2021</a:t>
             </a:fld>
             <a:endParaRPr lang="en-US"/>
           </a:p>
@@ -3086,7 +3175,7 @@
           <a:p>
             <a:fld id="{02AC24A9-CCB6-4F8D-B8DB-C2F3692CFA5A}" type="datetimeFigureOut">
               <a:rPr lang="en-US" smtClean="0"/>
-              <a:t>6/27/21</a:t>
+              <a:t>6/27/2021</a:t>
             </a:fld>
             <a:endParaRPr lang="en-US"/>
           </a:p>
@@ -3618,7 +3707,7 @@
           <a:p>
             <a:fld id="{02AC24A9-CCB6-4F8D-B8DB-C2F3692CFA5A}" type="datetimeFigureOut">
               <a:rPr lang="en-US" smtClean="0"/>
-              <a:t>6/27/21</a:t>
+              <a:t>6/27/2021</a:t>
             </a:fld>
             <a:endParaRPr lang="en-US"/>
           </a:p>
@@ -4317,7 +4406,7 @@
           <a:p>
             <a:fld id="{02AC24A9-CCB6-4F8D-B8DB-C2F3692CFA5A}" type="datetimeFigureOut">
               <a:rPr lang="en-US" smtClean="0"/>
-              <a:t>6/27/21</a:t>
+              <a:t>6/27/2021</a:t>
             </a:fld>
             <a:endParaRPr lang="en-US"/>
           </a:p>
@@ -4646,7 +4735,7 @@
           <a:p>
             <a:fld id="{02AC24A9-CCB6-4F8D-B8DB-C2F3692CFA5A}" type="datetimeFigureOut">
               <a:rPr lang="en-US" smtClean="0"/>
-              <a:t>6/27/21</a:t>
+              <a:t>6/27/2021</a:t>
             </a:fld>
             <a:endParaRPr lang="en-US"/>
           </a:p>
@@ -4759,7 +4848,7 @@
           <a:p>
             <a:fld id="{02AC24A9-CCB6-4F8D-B8DB-C2F3692CFA5A}" type="datetimeFigureOut">
               <a:rPr lang="en-US" smtClean="0"/>
-              <a:t>6/27/21</a:t>
+              <a:t>6/27/2021</a:t>
             </a:fld>
             <a:endParaRPr lang="en-US"/>
           </a:p>
@@ -5254,7 +5343,7 @@
           <a:p>
             <a:fld id="{02AC24A9-CCB6-4F8D-B8DB-C2F3692CFA5A}" type="datetimeFigureOut">
               <a:rPr lang="en-US" smtClean="0"/>
-              <a:t>6/27/21</a:t>
+              <a:t>6/27/2021</a:t>
             </a:fld>
             <a:endParaRPr lang="en-US" dirty="0"/>
           </a:p>
@@ -5731,7 +5820,7 @@
           <a:p>
             <a:fld id="{02AC24A9-CCB6-4F8D-B8DB-C2F3692CFA5A}" type="datetimeFigureOut">
               <a:rPr lang="en-US" smtClean="0"/>
-              <a:t>6/27/21</a:t>
+              <a:t>6/27/2021</a:t>
             </a:fld>
             <a:endParaRPr lang="en-US"/>
           </a:p>
@@ -5974,7 +6063,7 @@
           <a:p>
             <a:fld id="{02AC24A9-CCB6-4F8D-B8DB-C2F3692CFA5A}" type="datetimeFigureOut">
               <a:rPr lang="en-US" smtClean="0"/>
-              <a:t>6/27/21</a:t>
+              <a:t>6/27/2021</a:t>
             </a:fld>
             <a:endParaRPr lang="en-US"/>
           </a:p>
@@ -6850,8 +6939,33 @@
                     <a:latin typeface="Calibri" panose="020F0502020204030204" pitchFamily="34" charset="0"/>
                     <a:cs typeface="Calibri" panose="020F0502020204030204" pitchFamily="34" charset="0"/>
                   </a:rPr>
-                  <a:t>Độ lỗi: Sử dụng độ lỗi GE2E</a:t>
+                  <a:t>Độ lỗi: Sử dụng độ lỗi</a:t>
                 </a:r>
+                <a:r>
+                  <a:rPr lang="en-US" dirty="0">
+                    <a:latin typeface="Calibri" panose="020F0502020204030204" pitchFamily="34" charset="0"/>
+                    <a:cs typeface="Calibri" panose="020F0502020204030204" pitchFamily="34" charset="0"/>
+                  </a:rPr>
+                  <a:t> Generalized End-to-End loss (</a:t>
+                </a:r>
+                <a:r>
+                  <a:rPr lang="en-VN" dirty="0">
+                    <a:latin typeface="Calibri" panose="020F0502020204030204" pitchFamily="34" charset="0"/>
+                    <a:cs typeface="Calibri" panose="020F0502020204030204" pitchFamily="34" charset="0"/>
+                  </a:rPr>
+                  <a:t>GE2E</a:t>
+                </a:r>
+                <a:r>
+                  <a:rPr lang="en-US" dirty="0">
+                    <a:latin typeface="Calibri" panose="020F0502020204030204" pitchFamily="34" charset="0"/>
+                    <a:cs typeface="Calibri" panose="020F0502020204030204" pitchFamily="34" charset="0"/>
+                  </a:rPr>
+                  <a:t>)</a:t>
+                </a:r>
+                <a:endParaRPr lang="en-VN" dirty="0">
+                  <a:latin typeface="Calibri" panose="020F0502020204030204" pitchFamily="34" charset="0"/>
+                  <a:cs typeface="Calibri" panose="020F0502020204030204" pitchFamily="34" charset="0"/>
+                </a:endParaRPr>
               </a:p>
               <a:p>
                 <a:pPr lvl="1">
@@ -6863,7 +6977,7 @@
                     <a:latin typeface="Calibri" panose="020F0502020204030204" pitchFamily="34" charset="0"/>
                     <a:cs typeface="Calibri" panose="020F0502020204030204" pitchFamily="34" charset="0"/>
                   </a:rPr>
-                  <a:t>Với N (= 64) người nói, mỗi người nói M (= 10) mẫu, ta có M*N đặc trưng </a:t>
+                  <a:t>Với N người nói, mỗi người nói M mẫu, ta có M*N đặc trưng </a:t>
                 </a:r>
                 <a14:m>
                   <m:oMath xmlns:m="http://schemas.openxmlformats.org/officeDocument/2006/math">
@@ -7780,7 +7894,7 @@
               <a:blipFill>
                 <a:blip r:embed="rId2"/>
                 <a:stretch>
-                  <a:fillRect l="-748" t="-22054" b="-34743"/>
+                  <a:fillRect l="-779" t="-728"/>
                 </a:stretch>
               </a:blipFill>
             </p:spPr>
@@ -7789,7 +7903,7 @@
               <a:lstStyle/>
               <a:p>
                 <a:r>
-                  <a:rPr lang="en-VN">
+                  <a:rPr lang="en-US">
                     <a:noFill/>
                   </a:rPr>
                   <a:t> </a:t>
@@ -10001,7 +10115,47 @@
                     <a:ea typeface="Cambria Math" panose="02040503050406030204" pitchFamily="18" charset="0"/>
                     <a:cs typeface="Calibri" panose="020F0502020204030204" pitchFamily="34" charset="0"/>
                   </a:rPr>
-                  <a:t> là bộ tham số được sử dụng trong hàm </a:t>
+                  <a:t> là bộ tham số được sử dụng trong hàm</a:t>
+                </a:r>
+                <a:r>
+                  <a:rPr lang="en-US" dirty="0">
+                    <a:latin typeface="Calibri" panose="020F0502020204030204" pitchFamily="34" charset="0"/>
+                    <a:ea typeface="Cambria Math" panose="02040503050406030204" pitchFamily="18" charset="0"/>
+                    <a:cs typeface="Calibri" panose="020F0502020204030204" pitchFamily="34" charset="0"/>
+                  </a:rPr>
+                  <a:t> </a:t>
+                </a:r>
+                <a:r>
+                  <a:rPr lang="en-US" dirty="0" err="1">
+                    <a:latin typeface="Calibri" panose="020F0502020204030204" pitchFamily="34" charset="0"/>
+                    <a:ea typeface="Cambria Math" panose="02040503050406030204" pitchFamily="18" charset="0"/>
+                    <a:cs typeface="Calibri" panose="020F0502020204030204" pitchFamily="34" charset="0"/>
+                  </a:rPr>
+                  <a:t>mục</a:t>
+                </a:r>
+                <a:r>
+                  <a:rPr lang="en-US" dirty="0">
+                    <a:latin typeface="Calibri" panose="020F0502020204030204" pitchFamily="34" charset="0"/>
+                    <a:ea typeface="Cambria Math" panose="02040503050406030204" pitchFamily="18" charset="0"/>
+                    <a:cs typeface="Calibri" panose="020F0502020204030204" pitchFamily="34" charset="0"/>
+                  </a:rPr>
+                  <a:t> </a:t>
+                </a:r>
+                <a:r>
+                  <a:rPr lang="en-US" dirty="0" err="1">
+                    <a:latin typeface="Calibri" panose="020F0502020204030204" pitchFamily="34" charset="0"/>
+                    <a:ea typeface="Cambria Math" panose="02040503050406030204" pitchFamily="18" charset="0"/>
+                    <a:cs typeface="Calibri" panose="020F0502020204030204" pitchFamily="34" charset="0"/>
+                  </a:rPr>
+                  <a:t>tiêu</a:t>
+                </a:r>
+                <a:r>
+                  <a:rPr lang="en-VN" dirty="0">
+                    <a:latin typeface="Calibri" panose="020F0502020204030204" pitchFamily="34" charset="0"/>
+                    <a:ea typeface="Cambria Math" panose="02040503050406030204" pitchFamily="18" charset="0"/>
+                    <a:cs typeface="Calibri" panose="020F0502020204030204" pitchFamily="34" charset="0"/>
+                  </a:rPr>
+                  <a:t> </a:t>
                 </a:r>
                 <a14:m>
                   <m:oMath xmlns:m="http://schemas.openxmlformats.org/officeDocument/2006/math">
@@ -10432,7 +10586,7 @@
               <a:blipFill>
                 <a:blip r:embed="rId3"/>
                 <a:stretch>
-                  <a:fillRect l="-748" t="-604" b="-29607"/>
+                  <a:fillRect l="-779" t="-728"/>
                 </a:stretch>
               </a:blipFill>
             </p:spPr>
@@ -10441,7 +10595,7 @@
               <a:lstStyle/>
               <a:p>
                 <a:r>
-                  <a:rPr lang="en-VN">
+                  <a:rPr lang="en-US">
                     <a:noFill/>
                   </a:rPr>
                   <a:t> </a:t>
@@ -10514,8 +10668,8 @@
           </a:p>
         </p:txBody>
       </p:sp>
-      <mc:AlternateContent xmlns:mc="http://schemas.openxmlformats.org/markup-compatibility/2006">
-        <mc:Choice xmlns:a14="http://schemas.microsoft.com/office/drawing/2010/main" Requires="a14">
+      <mc:AlternateContent xmlns:mc="http://schemas.openxmlformats.org/markup-compatibility/2006" xmlns:a14="http://schemas.microsoft.com/office/drawing/2010/main">
+        <mc:Choice Requires="a14">
           <p:sp>
             <p:nvSpPr>
               <p:cNvPr id="3" name="Content Placeholder 2">
@@ -11343,7 +11497,7 @@
             </p:txBody>
           </p:sp>
         </mc:Choice>
-        <mc:Fallback>
+        <mc:Fallback xmlns="">
           <p:sp>
             <p:nvSpPr>
               <p:cNvPr id="3" name="Content Placeholder 2">
@@ -11450,8 +11604,8 @@
           </a:p>
         </p:txBody>
       </p:sp>
-      <mc:AlternateContent xmlns:mc="http://schemas.openxmlformats.org/markup-compatibility/2006">
-        <mc:Choice xmlns:a14="http://schemas.microsoft.com/office/drawing/2010/main" Requires="a14">
+      <mc:AlternateContent xmlns:mc="http://schemas.openxmlformats.org/markup-compatibility/2006" xmlns:a14="http://schemas.microsoft.com/office/drawing/2010/main">
+        <mc:Choice Requires="a14">
           <p:sp>
             <p:nvSpPr>
               <p:cNvPr id="3" name="Content Placeholder 2">
@@ -12630,7 +12784,7 @@
             </p:txBody>
           </p:sp>
         </mc:Choice>
-        <mc:Fallback>
+        <mc:Fallback xmlns="">
           <p:sp>
             <p:nvSpPr>
               <p:cNvPr id="3" name="Content Placeholder 2">
@@ -13315,7 +13469,203 @@
                 <a:latin typeface="Calibri" panose="020F0502020204030204" pitchFamily="34" charset="0"/>
                 <a:cs typeface="Calibri" panose="020F0502020204030204" pitchFamily="34" charset="0"/>
               </a:rPr>
-              <a:t>3 – layer LSTM với 768 trạng thái ẩn. Mỗi lớp bao gồm 256 trạng thái ẩn</a:t>
+              <a:t>3 – layer LSTM với 768 </a:t>
+            </a:r>
+            <a:r>
+              <a:rPr lang="en-US" dirty="0" err="1">
+                <a:latin typeface="Calibri" panose="020F0502020204030204" pitchFamily="34" charset="0"/>
+                <a:cs typeface="Calibri" panose="020F0502020204030204" pitchFamily="34" charset="0"/>
+              </a:rPr>
+              <a:t>nút</a:t>
+            </a:r>
+            <a:r>
+              <a:rPr lang="en-US" dirty="0">
+                <a:latin typeface="Calibri" panose="020F0502020204030204" pitchFamily="34" charset="0"/>
+                <a:cs typeface="Calibri" panose="020F0502020204030204" pitchFamily="34" charset="0"/>
+              </a:rPr>
+              <a:t> </a:t>
+            </a:r>
+            <a:r>
+              <a:rPr lang="en-US" dirty="0" err="1">
+                <a:latin typeface="Calibri" panose="020F0502020204030204" pitchFamily="34" charset="0"/>
+                <a:cs typeface="Calibri" panose="020F0502020204030204" pitchFamily="34" charset="0"/>
+              </a:rPr>
+              <a:t>mạng</a:t>
+            </a:r>
+            <a:r>
+              <a:rPr lang="en-VN" dirty="0">
+                <a:latin typeface="Calibri" panose="020F0502020204030204" pitchFamily="34" charset="0"/>
+                <a:cs typeface="Calibri" panose="020F0502020204030204" pitchFamily="34" charset="0"/>
+              </a:rPr>
+              <a:t>. Mỗi lớp bao gồm 256 </a:t>
+            </a:r>
+            <a:r>
+              <a:rPr lang="en-US" dirty="0" err="1">
+                <a:latin typeface="Calibri" panose="020F0502020204030204" pitchFamily="34" charset="0"/>
+                <a:cs typeface="Calibri" panose="020F0502020204030204" pitchFamily="34" charset="0"/>
+              </a:rPr>
+              <a:t>nút</a:t>
+            </a:r>
+            <a:r>
+              <a:rPr lang="en-US" dirty="0">
+                <a:latin typeface="Calibri" panose="020F0502020204030204" pitchFamily="34" charset="0"/>
+                <a:cs typeface="Calibri" panose="020F0502020204030204" pitchFamily="34" charset="0"/>
+              </a:rPr>
+              <a:t> LSTM, </a:t>
+            </a:r>
+            <a:r>
+              <a:rPr lang="en-US" dirty="0" err="1">
+                <a:latin typeface="Calibri" panose="020F0502020204030204" pitchFamily="34" charset="0"/>
+                <a:cs typeface="Calibri" panose="020F0502020204030204" pitchFamily="34" charset="0"/>
+              </a:rPr>
+              <a:t>ouput</a:t>
+            </a:r>
+            <a:r>
+              <a:rPr lang="en-US" dirty="0">
+                <a:latin typeface="Calibri" panose="020F0502020204030204" pitchFamily="34" charset="0"/>
+                <a:cs typeface="Calibri" panose="020F0502020204030204" pitchFamily="34" charset="0"/>
+              </a:rPr>
+              <a:t> </a:t>
+            </a:r>
+            <a:r>
+              <a:rPr lang="en-US" dirty="0" err="1">
+                <a:latin typeface="Calibri" panose="020F0502020204030204" pitchFamily="34" charset="0"/>
+                <a:cs typeface="Calibri" panose="020F0502020204030204" pitchFamily="34" charset="0"/>
+              </a:rPr>
+              <a:t>của</a:t>
+            </a:r>
+            <a:r>
+              <a:rPr lang="en-US" dirty="0">
+                <a:latin typeface="Calibri" panose="020F0502020204030204" pitchFamily="34" charset="0"/>
+                <a:cs typeface="Calibri" panose="020F0502020204030204" pitchFamily="34" charset="0"/>
+              </a:rPr>
+              <a:t> </a:t>
+            </a:r>
+            <a:r>
+              <a:rPr lang="en-US" dirty="0" err="1">
+                <a:latin typeface="Calibri" panose="020F0502020204030204" pitchFamily="34" charset="0"/>
+                <a:cs typeface="Calibri" panose="020F0502020204030204" pitchFamily="34" charset="0"/>
+              </a:rPr>
+              <a:t>mỗi</a:t>
+            </a:r>
+            <a:r>
+              <a:rPr lang="en-US" dirty="0">
+                <a:latin typeface="Calibri" panose="020F0502020204030204" pitchFamily="34" charset="0"/>
+                <a:cs typeface="Calibri" panose="020F0502020204030204" pitchFamily="34" charset="0"/>
+              </a:rPr>
+              <a:t> </a:t>
+            </a:r>
+            <a:r>
+              <a:rPr lang="en-US" dirty="0" err="1">
+                <a:latin typeface="Calibri" panose="020F0502020204030204" pitchFamily="34" charset="0"/>
+                <a:cs typeface="Calibri" panose="020F0502020204030204" pitchFamily="34" charset="0"/>
+              </a:rPr>
+              <a:t>nút</a:t>
+            </a:r>
+            <a:r>
+              <a:rPr lang="en-US" dirty="0">
+                <a:latin typeface="Calibri" panose="020F0502020204030204" pitchFamily="34" charset="0"/>
+                <a:cs typeface="Calibri" panose="020F0502020204030204" pitchFamily="34" charset="0"/>
+              </a:rPr>
+              <a:t> LSTM </a:t>
+            </a:r>
+            <a:r>
+              <a:rPr lang="en-US" dirty="0" err="1">
+                <a:latin typeface="Calibri" panose="020F0502020204030204" pitchFamily="34" charset="0"/>
+                <a:cs typeface="Calibri" panose="020F0502020204030204" pitchFamily="34" charset="0"/>
+              </a:rPr>
+              <a:t>được</a:t>
+            </a:r>
+            <a:r>
+              <a:rPr lang="en-US" dirty="0">
+                <a:latin typeface="Calibri" panose="020F0502020204030204" pitchFamily="34" charset="0"/>
+                <a:cs typeface="Calibri" panose="020F0502020204030204" pitchFamily="34" charset="0"/>
+              </a:rPr>
+              <a:t> </a:t>
+            </a:r>
+            <a:r>
+              <a:rPr lang="en-US" dirty="0" err="1">
+                <a:latin typeface="Calibri" panose="020F0502020204030204" pitchFamily="34" charset="0"/>
+                <a:cs typeface="Calibri" panose="020F0502020204030204" pitchFamily="34" charset="0"/>
+              </a:rPr>
+              <a:t>đưa</a:t>
+            </a:r>
+            <a:r>
+              <a:rPr lang="en-US" dirty="0">
+                <a:latin typeface="Calibri" panose="020F0502020204030204" pitchFamily="34" charset="0"/>
+                <a:cs typeface="Calibri" panose="020F0502020204030204" pitchFamily="34" charset="0"/>
+              </a:rPr>
+              <a:t> qua 1 </a:t>
+            </a:r>
+            <a:r>
+              <a:rPr lang="en-US" dirty="0" err="1">
+                <a:latin typeface="Calibri" panose="020F0502020204030204" pitchFamily="34" charset="0"/>
+                <a:cs typeface="Calibri" panose="020F0502020204030204" pitchFamily="34" charset="0"/>
+              </a:rPr>
+              <a:t>lớp</a:t>
+            </a:r>
+            <a:r>
+              <a:rPr lang="en-US" dirty="0">
+                <a:latin typeface="Calibri" panose="020F0502020204030204" pitchFamily="34" charset="0"/>
+                <a:cs typeface="Calibri" panose="020F0502020204030204" pitchFamily="34" charset="0"/>
+              </a:rPr>
+              <a:t> Fully-Connected </a:t>
+            </a:r>
+            <a:r>
+              <a:rPr lang="en-US" dirty="0" err="1">
+                <a:latin typeface="Calibri" panose="020F0502020204030204" pitchFamily="34" charset="0"/>
+                <a:cs typeface="Calibri" panose="020F0502020204030204" pitchFamily="34" charset="0"/>
+              </a:rPr>
+              <a:t>để</a:t>
+            </a:r>
+            <a:r>
+              <a:rPr lang="en-US" dirty="0">
+                <a:latin typeface="Calibri" panose="020F0502020204030204" pitchFamily="34" charset="0"/>
+                <a:cs typeface="Calibri" panose="020F0502020204030204" pitchFamily="34" charset="0"/>
+              </a:rPr>
+              <a:t> </a:t>
+            </a:r>
+            <a:r>
+              <a:rPr lang="en-US" dirty="0" err="1">
+                <a:latin typeface="Calibri" panose="020F0502020204030204" pitchFamily="34" charset="0"/>
+                <a:cs typeface="Calibri" panose="020F0502020204030204" pitchFamily="34" charset="0"/>
+              </a:rPr>
+              <a:t>chiếu</a:t>
+            </a:r>
+            <a:r>
+              <a:rPr lang="en-US" dirty="0">
+                <a:latin typeface="Calibri" panose="020F0502020204030204" pitchFamily="34" charset="0"/>
+                <a:cs typeface="Calibri" panose="020F0502020204030204" pitchFamily="34" charset="0"/>
+              </a:rPr>
+              <a:t> </a:t>
+            </a:r>
+            <a:r>
+              <a:rPr lang="en-US" dirty="0" err="1">
+                <a:latin typeface="Calibri" panose="020F0502020204030204" pitchFamily="34" charset="0"/>
+                <a:cs typeface="Calibri" panose="020F0502020204030204" pitchFamily="34" charset="0"/>
+              </a:rPr>
+              <a:t>về</a:t>
+            </a:r>
+            <a:r>
+              <a:rPr lang="en-US" dirty="0">
+                <a:latin typeface="Calibri" panose="020F0502020204030204" pitchFamily="34" charset="0"/>
+                <a:cs typeface="Calibri" panose="020F0502020204030204" pitchFamily="34" charset="0"/>
+              </a:rPr>
+              <a:t> 256 </a:t>
+            </a:r>
+            <a:r>
+              <a:rPr lang="en-US" dirty="0" err="1">
+                <a:latin typeface="Calibri" panose="020F0502020204030204" pitchFamily="34" charset="0"/>
+                <a:cs typeface="Calibri" panose="020F0502020204030204" pitchFamily="34" charset="0"/>
+              </a:rPr>
+              <a:t>chiều</a:t>
+            </a:r>
+            <a:r>
+              <a:rPr lang="en-US">
+                <a:latin typeface="Calibri" panose="020F0502020204030204" pitchFamily="34" charset="0"/>
+                <a:cs typeface="Calibri" panose="020F0502020204030204" pitchFamily="34" charset="0"/>
+              </a:rPr>
+              <a:t>.</a:t>
             </a:r>
           </a:p>
           <a:p>
@@ -13330,6 +13680,185 @@
               </a:rPr>
               <a:t>Input: </a:t>
             </a:r>
+            <a:r>
+              <a:rPr lang="en-US" dirty="0">
+                <a:latin typeface="Calibri" panose="020F0502020204030204" pitchFamily="34" charset="0"/>
+                <a:cs typeface="Calibri" panose="020F0502020204030204" pitchFamily="34" charset="0"/>
+              </a:rPr>
+              <a:t>40 – channels log-</a:t>
+            </a:r>
+            <a:r>
+              <a:rPr lang="en-US" dirty="0" err="1">
+                <a:latin typeface="Calibri" panose="020F0502020204030204" pitchFamily="34" charset="0"/>
+                <a:cs typeface="Calibri" panose="020F0502020204030204" pitchFamily="34" charset="0"/>
+              </a:rPr>
+              <a:t>mel</a:t>
+            </a:r>
+            <a:r>
+              <a:rPr lang="en-US" dirty="0">
+                <a:latin typeface="Calibri" panose="020F0502020204030204" pitchFamily="34" charset="0"/>
+                <a:cs typeface="Calibri" panose="020F0502020204030204" pitchFamily="34" charset="0"/>
+              </a:rPr>
+              <a:t> spectrogram </a:t>
+            </a:r>
+            <a:r>
+              <a:rPr lang="en-US" dirty="0" err="1">
+                <a:latin typeface="Calibri" panose="020F0502020204030204" pitchFamily="34" charset="0"/>
+                <a:cs typeface="Calibri" panose="020F0502020204030204" pitchFamily="34" charset="0"/>
+              </a:rPr>
+              <a:t>với</a:t>
+            </a:r>
+            <a:r>
+              <a:rPr lang="en-US" dirty="0">
+                <a:latin typeface="Calibri" panose="020F0502020204030204" pitchFamily="34" charset="0"/>
+                <a:cs typeface="Calibri" panose="020F0502020204030204" pitchFamily="34" charset="0"/>
+              </a:rPr>
+              <a:t> </a:t>
+            </a:r>
+            <a:r>
+              <a:rPr lang="en-US" dirty="0" err="1">
+                <a:latin typeface="Calibri" panose="020F0502020204030204" pitchFamily="34" charset="0"/>
+                <a:cs typeface="Calibri" panose="020F0502020204030204" pitchFamily="34" charset="0"/>
+              </a:rPr>
+              <a:t>kích</a:t>
+            </a:r>
+            <a:r>
+              <a:rPr lang="en-US" dirty="0">
+                <a:latin typeface="Calibri" panose="020F0502020204030204" pitchFamily="34" charset="0"/>
+                <a:cs typeface="Calibri" panose="020F0502020204030204" pitchFamily="34" charset="0"/>
+              </a:rPr>
+              <a:t> </a:t>
+            </a:r>
+            <a:r>
+              <a:rPr lang="en-US" dirty="0" err="1">
+                <a:latin typeface="Calibri" panose="020F0502020204030204" pitchFamily="34" charset="0"/>
+                <a:cs typeface="Calibri" panose="020F0502020204030204" pitchFamily="34" charset="0"/>
+              </a:rPr>
+              <a:t>thước</a:t>
+            </a:r>
+            <a:r>
+              <a:rPr lang="en-US" dirty="0">
+                <a:latin typeface="Calibri" panose="020F0502020204030204" pitchFamily="34" charset="0"/>
+                <a:cs typeface="Calibri" panose="020F0502020204030204" pitchFamily="34" charset="0"/>
+              </a:rPr>
+              <a:t> </a:t>
+            </a:r>
+            <a:r>
+              <a:rPr lang="en-US" dirty="0" err="1">
+                <a:latin typeface="Calibri" panose="020F0502020204030204" pitchFamily="34" charset="0"/>
+                <a:cs typeface="Calibri" panose="020F0502020204030204" pitchFamily="34" charset="0"/>
+              </a:rPr>
+              <a:t>cửa</a:t>
+            </a:r>
+            <a:r>
+              <a:rPr lang="en-US" dirty="0">
+                <a:latin typeface="Calibri" panose="020F0502020204030204" pitchFamily="34" charset="0"/>
+                <a:cs typeface="Calibri" panose="020F0502020204030204" pitchFamily="34" charset="0"/>
+              </a:rPr>
+              <a:t> </a:t>
+            </a:r>
+            <a:r>
+              <a:rPr lang="en-US" dirty="0" err="1">
+                <a:latin typeface="Calibri" panose="020F0502020204030204" pitchFamily="34" charset="0"/>
+                <a:cs typeface="Calibri" panose="020F0502020204030204" pitchFamily="34" charset="0"/>
+              </a:rPr>
+              <a:t>số</a:t>
+            </a:r>
+            <a:r>
+              <a:rPr lang="en-US" dirty="0">
+                <a:latin typeface="Calibri" panose="020F0502020204030204" pitchFamily="34" charset="0"/>
+                <a:cs typeface="Calibri" panose="020F0502020204030204" pitchFamily="34" charset="0"/>
+              </a:rPr>
+              <a:t> </a:t>
+            </a:r>
+            <a:r>
+              <a:rPr lang="en-US" dirty="0" err="1">
+                <a:latin typeface="Calibri" panose="020F0502020204030204" pitchFamily="34" charset="0"/>
+                <a:cs typeface="Calibri" panose="020F0502020204030204" pitchFamily="34" charset="0"/>
+              </a:rPr>
+              <a:t>là</a:t>
+            </a:r>
+            <a:r>
+              <a:rPr lang="en-US" dirty="0">
+                <a:latin typeface="Calibri" panose="020F0502020204030204" pitchFamily="34" charset="0"/>
+                <a:cs typeface="Calibri" panose="020F0502020204030204" pitchFamily="34" charset="0"/>
+              </a:rPr>
+              <a:t> 25ms, </a:t>
+            </a:r>
+            <a:r>
+              <a:rPr lang="en-US" dirty="0" err="1">
+                <a:latin typeface="Calibri" panose="020F0502020204030204" pitchFamily="34" charset="0"/>
+                <a:cs typeface="Calibri" panose="020F0502020204030204" pitchFamily="34" charset="0"/>
+              </a:rPr>
+              <a:t>khoảng</a:t>
+            </a:r>
+            <a:r>
+              <a:rPr lang="en-US" dirty="0">
+                <a:latin typeface="Calibri" panose="020F0502020204030204" pitchFamily="34" charset="0"/>
+                <a:cs typeface="Calibri" panose="020F0502020204030204" pitchFamily="34" charset="0"/>
+              </a:rPr>
+              <a:t> </a:t>
+            </a:r>
+            <a:r>
+              <a:rPr lang="en-US" dirty="0" err="1">
+                <a:latin typeface="Calibri" panose="020F0502020204030204" pitchFamily="34" charset="0"/>
+                <a:cs typeface="Calibri" panose="020F0502020204030204" pitchFamily="34" charset="0"/>
+              </a:rPr>
+              <a:t>cách</a:t>
+            </a:r>
+            <a:r>
+              <a:rPr lang="en-US" dirty="0">
+                <a:latin typeface="Calibri" panose="020F0502020204030204" pitchFamily="34" charset="0"/>
+                <a:cs typeface="Calibri" panose="020F0502020204030204" pitchFamily="34" charset="0"/>
+              </a:rPr>
+              <a:t> </a:t>
+            </a:r>
+            <a:r>
+              <a:rPr lang="en-US" dirty="0" err="1">
+                <a:latin typeface="Calibri" panose="020F0502020204030204" pitchFamily="34" charset="0"/>
+                <a:cs typeface="Calibri" panose="020F0502020204030204" pitchFamily="34" charset="0"/>
+              </a:rPr>
+              <a:t>các</a:t>
+            </a:r>
+            <a:r>
+              <a:rPr lang="en-US" dirty="0">
+                <a:latin typeface="Calibri" panose="020F0502020204030204" pitchFamily="34" charset="0"/>
+                <a:cs typeface="Calibri" panose="020F0502020204030204" pitchFamily="34" charset="0"/>
+              </a:rPr>
+              <a:t> </a:t>
+            </a:r>
+            <a:r>
+              <a:rPr lang="en-US" dirty="0" err="1">
+                <a:latin typeface="Calibri" panose="020F0502020204030204" pitchFamily="34" charset="0"/>
+                <a:cs typeface="Calibri" panose="020F0502020204030204" pitchFamily="34" charset="0"/>
+              </a:rPr>
+              <a:t>bước</a:t>
+            </a:r>
+            <a:r>
+              <a:rPr lang="en-US" dirty="0">
+                <a:latin typeface="Calibri" panose="020F0502020204030204" pitchFamily="34" charset="0"/>
+                <a:cs typeface="Calibri" panose="020F0502020204030204" pitchFamily="34" charset="0"/>
+              </a:rPr>
+              <a:t> </a:t>
+            </a:r>
+            <a:r>
+              <a:rPr lang="en-US" dirty="0" err="1">
+                <a:latin typeface="Calibri" panose="020F0502020204030204" pitchFamily="34" charset="0"/>
+                <a:cs typeface="Calibri" panose="020F0502020204030204" pitchFamily="34" charset="0"/>
+              </a:rPr>
+              <a:t>là</a:t>
+            </a:r>
+            <a:r>
+              <a:rPr lang="en-US" dirty="0">
+                <a:latin typeface="Calibri" panose="020F0502020204030204" pitchFamily="34" charset="0"/>
+                <a:cs typeface="Calibri" panose="020F0502020204030204" pitchFamily="34" charset="0"/>
+              </a:rPr>
+              <a:t> 10ms.</a:t>
+            </a:r>
+            <a:endParaRPr lang="en-VN" dirty="0">
+              <a:latin typeface="Calibri" panose="020F0502020204030204" pitchFamily="34" charset="0"/>
+              <a:cs typeface="Calibri" panose="020F0502020204030204" pitchFamily="34" charset="0"/>
+            </a:endParaRPr>
           </a:p>
           <a:p>
             <a:pPr lvl="1">

</xml_diff>

<commit_message>
Voice Clone: Upload slide
</commit_message>
<xml_diff>
--- a/Voice_Cloning/Slide.pptx
+++ b/Voice_Cloning/Slide.pptx
@@ -208,7 +208,7 @@
           <a:p>
             <a:fld id="{27B9B13B-C1A0-FC4E-9BC2-CBAAD45B1A60}" type="datetimeFigureOut">
               <a:rPr lang="en-VN" smtClean="0"/>
-              <a:t>6/27/21</a:t>
+              <a:t>06/27/2021</a:t>
             </a:fld>
             <a:endParaRPr lang="en-VN"/>
           </a:p>
@@ -1498,6 +1498,90 @@
           <a:p>
             <a:fld id="{AE01A4AD-3912-D14D-ABF4-A3E15A5DC8AA}" type="slidenum">
               <a:rPr lang="en-VN" smtClean="0"/>
+              <a:t>8</a:t>
+            </a:fld>
+            <a:endParaRPr lang="en-VN"/>
+          </a:p>
+        </p:txBody>
+      </p:sp>
+    </p:spTree>
+    <p:extLst>
+      <p:ext uri="{BB962C8B-B14F-4D97-AF65-F5344CB8AC3E}">
+        <p14:creationId xmlns:p14="http://schemas.microsoft.com/office/powerpoint/2010/main" val="3299495680"/>
+      </p:ext>
+    </p:extLst>
+  </p:cSld>
+  <p:clrMapOvr>
+    <a:masterClrMapping/>
+  </p:clrMapOvr>
+</p:notes>
+</file>
+
+<file path=ppt/notesSlides/notesSlide6.xml><?xml version="1.0" encoding="utf-8"?>
+<p:notes xmlns:a="http://schemas.openxmlformats.org/drawingml/2006/main" xmlns:r="http://schemas.openxmlformats.org/officeDocument/2006/relationships" xmlns:p="http://schemas.openxmlformats.org/presentationml/2006/main">
+  <p:cSld>
+    <p:spTree>
+      <p:nvGrpSpPr>
+        <p:cNvPr id="1" name=""/>
+        <p:cNvGrpSpPr/>
+        <p:nvPr/>
+      </p:nvGrpSpPr>
+      <p:grpSpPr>
+        <a:xfrm>
+          <a:off x="0" y="0"/>
+          <a:ext cx="0" cy="0"/>
+          <a:chOff x="0" y="0"/>
+          <a:chExt cx="0" cy="0"/>
+        </a:xfrm>
+      </p:grpSpPr>
+      <p:sp>
+        <p:nvSpPr>
+          <p:cNvPr id="2" name="Slide Image Placeholder 1"/>
+          <p:cNvSpPr>
+            <a:spLocks noGrp="1" noRot="1" noChangeAspect="1"/>
+          </p:cNvSpPr>
+          <p:nvPr>
+            <p:ph type="sldImg"/>
+          </p:nvPr>
+        </p:nvSpPr>
+        <p:spPr/>
+      </p:sp>
+      <p:sp>
+        <p:nvSpPr>
+          <p:cNvPr id="3" name="Notes Placeholder 2"/>
+          <p:cNvSpPr>
+            <a:spLocks noGrp="1"/>
+          </p:cNvSpPr>
+          <p:nvPr>
+            <p:ph type="body" idx="1"/>
+          </p:nvPr>
+        </p:nvSpPr>
+        <p:spPr/>
+        <p:txBody>
+          <a:bodyPr/>
+          <a:lstStyle/>
+          <a:p>
+            <a:endParaRPr lang="en-US" dirty="0"/>
+          </a:p>
+        </p:txBody>
+      </p:sp>
+      <p:sp>
+        <p:nvSpPr>
+          <p:cNvPr id="4" name="Slide Number Placeholder 3"/>
+          <p:cNvSpPr>
+            <a:spLocks noGrp="1"/>
+          </p:cNvSpPr>
+          <p:nvPr>
+            <p:ph type="sldNum" sz="quarter" idx="5"/>
+          </p:nvPr>
+        </p:nvSpPr>
+        <p:spPr/>
+        <p:txBody>
+          <a:bodyPr/>
+          <a:lstStyle/>
+          <a:p>
+            <a:fld id="{AE01A4AD-3912-D14D-ABF4-A3E15A5DC8AA}" type="slidenum">
+              <a:rPr lang="en-VN" smtClean="0"/>
               <a:t>9</a:t>
             </a:fld>
             <a:endParaRPr lang="en-VN"/>
@@ -1517,7 +1601,91 @@
 </p:notes>
 </file>
 
-<file path=ppt/notesSlides/notesSlide6.xml><?xml version="1.0" encoding="utf-8"?>
+<file path=ppt/notesSlides/notesSlide7.xml><?xml version="1.0" encoding="utf-8"?>
+<p:notes xmlns:a="http://schemas.openxmlformats.org/drawingml/2006/main" xmlns:r="http://schemas.openxmlformats.org/officeDocument/2006/relationships" xmlns:p="http://schemas.openxmlformats.org/presentationml/2006/main">
+  <p:cSld>
+    <p:spTree>
+      <p:nvGrpSpPr>
+        <p:cNvPr id="1" name=""/>
+        <p:cNvGrpSpPr/>
+        <p:nvPr/>
+      </p:nvGrpSpPr>
+      <p:grpSpPr>
+        <a:xfrm>
+          <a:off x="0" y="0"/>
+          <a:ext cx="0" cy="0"/>
+          <a:chOff x="0" y="0"/>
+          <a:chExt cx="0" cy="0"/>
+        </a:xfrm>
+      </p:grpSpPr>
+      <p:sp>
+        <p:nvSpPr>
+          <p:cNvPr id="2" name="Slide Image Placeholder 1"/>
+          <p:cNvSpPr>
+            <a:spLocks noGrp="1" noRot="1" noChangeAspect="1"/>
+          </p:cNvSpPr>
+          <p:nvPr>
+            <p:ph type="sldImg"/>
+          </p:nvPr>
+        </p:nvSpPr>
+        <p:spPr/>
+      </p:sp>
+      <p:sp>
+        <p:nvSpPr>
+          <p:cNvPr id="3" name="Notes Placeholder 2"/>
+          <p:cNvSpPr>
+            <a:spLocks noGrp="1"/>
+          </p:cNvSpPr>
+          <p:nvPr>
+            <p:ph type="body" idx="1"/>
+          </p:nvPr>
+        </p:nvSpPr>
+        <p:spPr/>
+        <p:txBody>
+          <a:bodyPr/>
+          <a:lstStyle/>
+          <a:p>
+            <a:endParaRPr lang="en-US" dirty="0"/>
+          </a:p>
+        </p:txBody>
+      </p:sp>
+      <p:sp>
+        <p:nvSpPr>
+          <p:cNvPr id="4" name="Slide Number Placeholder 3"/>
+          <p:cNvSpPr>
+            <a:spLocks noGrp="1"/>
+          </p:cNvSpPr>
+          <p:nvPr>
+            <p:ph type="sldNum" sz="quarter" idx="5"/>
+          </p:nvPr>
+        </p:nvSpPr>
+        <p:spPr/>
+        <p:txBody>
+          <a:bodyPr/>
+          <a:lstStyle/>
+          <a:p>
+            <a:fld id="{AE01A4AD-3912-D14D-ABF4-A3E15A5DC8AA}" type="slidenum">
+              <a:rPr lang="en-VN" smtClean="0"/>
+              <a:t>10</a:t>
+            </a:fld>
+            <a:endParaRPr lang="en-VN"/>
+          </a:p>
+        </p:txBody>
+      </p:sp>
+    </p:spTree>
+    <p:extLst>
+      <p:ext uri="{BB962C8B-B14F-4D97-AF65-F5344CB8AC3E}">
+        <p14:creationId xmlns:p14="http://schemas.microsoft.com/office/powerpoint/2010/main" val="1912215153"/>
+      </p:ext>
+    </p:extLst>
+  </p:cSld>
+  <p:clrMapOvr>
+    <a:masterClrMapping/>
+  </p:clrMapOvr>
+</p:notes>
+</file>
+
+<file path=ppt/notesSlides/notesSlide8.xml><?xml version="1.0" encoding="utf-8"?>
 <p:notes xmlns:a="http://schemas.openxmlformats.org/drawingml/2006/main" xmlns:r="http://schemas.openxmlformats.org/officeDocument/2006/relationships" xmlns:p="http://schemas.openxmlformats.org/presentationml/2006/main">
   <p:cSld>
     <p:spTree>
@@ -1757,7 +1925,7 @@
           <a:p>
             <a:fld id="{02AC24A9-CCB6-4F8D-B8DB-C2F3692CFA5A}" type="datetimeFigureOut">
               <a:rPr lang="en-US" smtClean="0"/>
-              <a:t>6/27/21</a:t>
+              <a:t>6/27/2021</a:t>
             </a:fld>
             <a:endParaRPr lang="en-US" dirty="0"/>
           </a:p>
@@ -2127,7 +2295,7 @@
           <a:p>
             <a:fld id="{02AC24A9-CCB6-4F8D-B8DB-C2F3692CFA5A}" type="datetimeFigureOut">
               <a:rPr lang="en-US" smtClean="0"/>
-              <a:t>6/27/21</a:t>
+              <a:t>6/27/2021</a:t>
             </a:fld>
             <a:endParaRPr lang="en-US"/>
           </a:p>
@@ -2336,7 +2504,7 @@
           <a:p>
             <a:fld id="{02AC24A9-CCB6-4F8D-B8DB-C2F3692CFA5A}" type="datetimeFigureOut">
               <a:rPr lang="en-US" smtClean="0"/>
-              <a:t>6/27/21</a:t>
+              <a:t>6/27/2021</a:t>
             </a:fld>
             <a:endParaRPr lang="en-US"/>
           </a:p>
@@ -2806,7 +2974,7 @@
           <a:p>
             <a:fld id="{02AC24A9-CCB6-4F8D-B8DB-C2F3692CFA5A}" type="datetimeFigureOut">
               <a:rPr lang="en-US" smtClean="0"/>
-              <a:t>6/27/21</a:t>
+              <a:t>6/27/2021</a:t>
             </a:fld>
             <a:endParaRPr lang="en-US"/>
           </a:p>
@@ -3260,7 +3428,7 @@
           <a:p>
             <a:fld id="{02AC24A9-CCB6-4F8D-B8DB-C2F3692CFA5A}" type="datetimeFigureOut">
               <a:rPr lang="en-US" smtClean="0"/>
-              <a:t>6/27/21</a:t>
+              <a:t>6/27/2021</a:t>
             </a:fld>
             <a:endParaRPr lang="en-US"/>
           </a:p>
@@ -3792,7 +3960,7 @@
           <a:p>
             <a:fld id="{02AC24A9-CCB6-4F8D-B8DB-C2F3692CFA5A}" type="datetimeFigureOut">
               <a:rPr lang="en-US" smtClean="0"/>
-              <a:t>6/27/21</a:t>
+              <a:t>6/27/2021</a:t>
             </a:fld>
             <a:endParaRPr lang="en-US"/>
           </a:p>
@@ -4491,7 +4659,7 @@
           <a:p>
             <a:fld id="{02AC24A9-CCB6-4F8D-B8DB-C2F3692CFA5A}" type="datetimeFigureOut">
               <a:rPr lang="en-US" smtClean="0"/>
-              <a:t>6/27/21</a:t>
+              <a:t>6/27/2021</a:t>
             </a:fld>
             <a:endParaRPr lang="en-US"/>
           </a:p>
@@ -4820,7 +4988,7 @@
           <a:p>
             <a:fld id="{02AC24A9-CCB6-4F8D-B8DB-C2F3692CFA5A}" type="datetimeFigureOut">
               <a:rPr lang="en-US" smtClean="0"/>
-              <a:t>6/27/21</a:t>
+              <a:t>6/27/2021</a:t>
             </a:fld>
             <a:endParaRPr lang="en-US"/>
           </a:p>
@@ -4933,7 +5101,7 @@
           <a:p>
             <a:fld id="{02AC24A9-CCB6-4F8D-B8DB-C2F3692CFA5A}" type="datetimeFigureOut">
               <a:rPr lang="en-US" smtClean="0"/>
-              <a:t>6/27/21</a:t>
+              <a:t>6/27/2021</a:t>
             </a:fld>
             <a:endParaRPr lang="en-US"/>
           </a:p>
@@ -5428,7 +5596,7 @@
           <a:p>
             <a:fld id="{02AC24A9-CCB6-4F8D-B8DB-C2F3692CFA5A}" type="datetimeFigureOut">
               <a:rPr lang="en-US" smtClean="0"/>
-              <a:t>6/27/21</a:t>
+              <a:t>6/27/2021</a:t>
             </a:fld>
             <a:endParaRPr lang="en-US" dirty="0"/>
           </a:p>
@@ -5905,7 +6073,7 @@
           <a:p>
             <a:fld id="{02AC24A9-CCB6-4F8D-B8DB-C2F3692CFA5A}" type="datetimeFigureOut">
               <a:rPr lang="en-US" smtClean="0"/>
-              <a:t>6/27/21</a:t>
+              <a:t>6/27/2021</a:t>
             </a:fld>
             <a:endParaRPr lang="en-US"/>
           </a:p>
@@ -6148,7 +6316,7 @@
           <a:p>
             <a:fld id="{02AC24A9-CCB6-4F8D-B8DB-C2F3692CFA5A}" type="datetimeFigureOut">
               <a:rPr lang="en-US" smtClean="0"/>
-              <a:t>6/27/21</a:t>
+              <a:t>6/27/2021</a:t>
             </a:fld>
             <a:endParaRPr lang="en-US"/>
           </a:p>
@@ -7977,7 +8145,7 @@
                 <a:ext cx="10168128" cy="4190062"/>
               </a:xfrm>
               <a:blipFill>
-                <a:blip r:embed="rId2"/>
+                <a:blip r:embed="rId3"/>
                 <a:stretch>
                   <a:fillRect l="-779" t="-728"/>
                 </a:stretch>
@@ -8217,7 +8385,7 @@
         <p:spPr>
           <a:xfrm>
             <a:off x="1046746" y="586822"/>
-            <a:ext cx="3537285" cy="1645920"/>
+            <a:ext cx="3561356" cy="1645920"/>
           </a:xfrm>
         </p:spPr>
         <p:txBody>
@@ -9459,7 +9627,7 @@
               <a:t>các</a:t>
             </a:r>
             <a:r>
-              <a:rPr lang="en-US" sz="1700">
+              <a:rPr lang="en-US" sz="1700" dirty="0">
                 <a:latin typeface="Calibri" panose="020F0502020204030204" pitchFamily="34" charset="0"/>
                 <a:cs typeface="Calibri" panose="020F0502020204030204" pitchFamily="34" charset="0"/>
               </a:rPr>
@@ -9568,7 +9736,7 @@
                 <a:latin typeface="Calibri" panose="020F0502020204030204" pitchFamily="34" charset="0"/>
                 <a:cs typeface="Calibri" panose="020F0502020204030204" pitchFamily="34" charset="0"/>
               </a:rPr>
-              <a:t>cần</a:t>
+              <a:t>của</a:t>
             </a:r>
             <a:r>
               <a:rPr lang="en-US" sz="1700" dirty="0">
@@ -9582,12 +9750,29 @@
                 <a:latin typeface="Calibri" panose="020F0502020204030204" pitchFamily="34" charset="0"/>
                 <a:cs typeface="Calibri" panose="020F0502020204030204" pitchFamily="34" charset="0"/>
               </a:rPr>
-              <a:t>tìm</a:t>
-            </a:r>
-            <a:endParaRPr lang="en-US" sz="1700" dirty="0">
-              <a:latin typeface="Calibri" panose="020F0502020204030204" pitchFamily="34" charset="0"/>
-              <a:cs typeface="Calibri" panose="020F0502020204030204" pitchFamily="34" charset="0"/>
-            </a:endParaRPr>
+              <a:t>giọng</a:t>
+            </a:r>
+            <a:r>
+              <a:rPr lang="en-US" sz="1700" dirty="0">
+                <a:latin typeface="Calibri" panose="020F0502020204030204" pitchFamily="34" charset="0"/>
+                <a:cs typeface="Calibri" panose="020F0502020204030204" pitchFamily="34" charset="0"/>
+              </a:rPr>
+              <a:t> </a:t>
+            </a:r>
+            <a:r>
+              <a:rPr lang="en-US" sz="1700" dirty="0" err="1">
+                <a:latin typeface="Calibri" panose="020F0502020204030204" pitchFamily="34" charset="0"/>
+                <a:cs typeface="Calibri" panose="020F0502020204030204" pitchFamily="34" charset="0"/>
+              </a:rPr>
+              <a:t>nói</a:t>
+            </a:r>
+            <a:r>
+              <a:rPr lang="en-US" sz="1700" dirty="0">
+                <a:latin typeface="Calibri" panose="020F0502020204030204" pitchFamily="34" charset="0"/>
+                <a:cs typeface="Calibri" panose="020F0502020204030204" pitchFamily="34" charset="0"/>
+              </a:rPr>
+              <a:t>.</a:t>
+            </a:r>
           </a:p>
         </p:txBody>
       </p:sp>
@@ -10501,8 +10686,8 @@
           </a:p>
         </p:txBody>
       </p:sp>
-      <mc:AlternateContent xmlns:mc="http://schemas.openxmlformats.org/markup-compatibility/2006" xmlns:a14="http://schemas.microsoft.com/office/drawing/2010/main">
-        <mc:Choice Requires="a14">
+      <mc:AlternateContent xmlns:mc="http://schemas.openxmlformats.org/markup-compatibility/2006">
+        <mc:Choice xmlns:a14="http://schemas.microsoft.com/office/drawing/2010/main" Requires="a14">
           <p:sp>
             <p:nvSpPr>
               <p:cNvPr id="3" name="Content Placeholder 2">
@@ -10521,7 +10706,7 @@
             </p:nvSpPr>
             <p:spPr>
               <a:xfrm>
-                <a:off x="1115568" y="2478024"/>
+                <a:off x="1115568" y="2244108"/>
                 <a:ext cx="10168128" cy="4190062"/>
               </a:xfrm>
             </p:spPr>
@@ -11423,7 +11608,7 @@
             </p:txBody>
           </p:sp>
         </mc:Choice>
-        <mc:Fallback xmlns="">
+        <mc:Fallback>
           <p:sp>
             <p:nvSpPr>
               <p:cNvPr id="3" name="Content Placeholder 2">
@@ -11442,7 +11627,7 @@
             </p:nvSpPr>
             <p:spPr>
               <a:xfrm>
-                <a:off x="1115568" y="2478024"/>
+                <a:off x="1115568" y="2244108"/>
                 <a:ext cx="10168128" cy="4190062"/>
               </a:xfrm>
               <a:blipFill>
@@ -14205,21 +14390,75 @@
           <p:nvPr/>
         </p:nvPicPr>
         <p:blipFill>
-          <a:blip r:embed="rId2"/>
+          <a:blip r:embed="rId3"/>
           <a:stretch>
             <a:fillRect/>
           </a:stretch>
         </p:blipFill>
         <p:spPr>
           <a:xfrm>
-            <a:off x="2457229" y="2454439"/>
-            <a:ext cx="7277542" cy="3911678"/>
+            <a:off x="2536419" y="2539567"/>
+            <a:ext cx="7119162" cy="3826549"/>
           </a:xfrm>
           <a:prstGeom prst="rect">
             <a:avLst/>
           </a:prstGeom>
         </p:spPr>
       </p:pic>
+      <p:sp>
+        <p:nvSpPr>
+          <p:cNvPr id="3" name="Rectangle 2">
+            <a:extLst>
+              <a:ext uri="{FF2B5EF4-FFF2-40B4-BE49-F238E27FC236}">
+                <a16:creationId xmlns:a16="http://schemas.microsoft.com/office/drawing/2014/main" id="{813ECFDA-E8BB-4DE8-9158-D38CDD00113C}"/>
+              </a:ext>
+            </a:extLst>
+          </p:cNvPr>
+          <p:cNvSpPr/>
+          <p:nvPr/>
+        </p:nvSpPr>
+        <p:spPr>
+          <a:xfrm>
+            <a:off x="4199860" y="2658140"/>
+            <a:ext cx="5592726" cy="3707976"/>
+          </a:xfrm>
+          <a:prstGeom prst="rect">
+            <a:avLst/>
+          </a:prstGeom>
+          <a:solidFill>
+            <a:srgbClr val="FFFFFF">
+              <a:alpha val="69804"/>
+            </a:srgbClr>
+          </a:solidFill>
+          <a:ln>
+            <a:noFill/>
+          </a:ln>
+        </p:spPr>
+        <p:style>
+          <a:lnRef idx="2">
+            <a:schemeClr val="accent1">
+              <a:shade val="50000"/>
+            </a:schemeClr>
+          </a:lnRef>
+          <a:fillRef idx="1">
+            <a:schemeClr val="accent1"/>
+          </a:fillRef>
+          <a:effectRef idx="0">
+            <a:schemeClr val="accent1"/>
+          </a:effectRef>
+          <a:fontRef idx="minor">
+            <a:schemeClr val="lt1"/>
+          </a:fontRef>
+        </p:style>
+        <p:txBody>
+          <a:bodyPr rtlCol="0" anchor="ctr"/>
+          <a:lstStyle/>
+          <a:p>
+            <a:pPr algn="ctr"/>
+            <a:endParaRPr lang="en-US"/>
+          </a:p>
+        </p:txBody>
+      </p:sp>
     </p:spTree>
     <p:extLst>
       <p:ext uri="{BB962C8B-B14F-4D97-AF65-F5344CB8AC3E}">
@@ -14523,7 +14762,7 @@
               <a:t>chiều</a:t>
             </a:r>
             <a:r>
-              <a:rPr lang="en-US">
+              <a:rPr lang="en-US" dirty="0">
                 <a:latin typeface="Calibri" panose="020F0502020204030204" pitchFamily="34" charset="0"/>
                 <a:cs typeface="Calibri" panose="020F0502020204030204" pitchFamily="34" charset="0"/>
               </a:rPr>

</xml_diff>

<commit_message>
add inferance process of speaker encoder
</commit_message>
<xml_diff>
--- a/Voice_Cloning/Slide.pptx
+++ b/Voice_Cloning/Slide.pptx
@@ -5,7 +5,7 @@
     <p:sldMasterId id="2147483725" r:id="rId1"/>
   </p:sldMasterIdLst>
   <p:notesMasterIdLst>
-    <p:notesMasterId r:id="rId13"/>
+    <p:notesMasterId r:id="rId14"/>
   </p:notesMasterIdLst>
   <p:sldIdLst>
     <p:sldId id="256" r:id="rId2"/>
@@ -19,6 +19,7 @@
     <p:sldId id="266" r:id="rId10"/>
     <p:sldId id="267" r:id="rId11"/>
     <p:sldId id="268" r:id="rId12"/>
+    <p:sldId id="270" r:id="rId13"/>
   </p:sldIdLst>
   <p:sldSz cx="12192000" cy="6858000"/>
   <p:notesSz cx="6858000" cy="9144000"/>
@@ -207,7 +208,7 @@
           <a:p>
             <a:fld id="{27B9B13B-C1A0-FC4E-9BC2-CBAAD45B1A60}" type="datetimeFigureOut">
               <a:rPr lang="en-VN" smtClean="0"/>
-              <a:t>06/27/2021</a:t>
+              <a:t>6/27/21</a:t>
             </a:fld>
             <a:endParaRPr lang="en-VN"/>
           </a:p>
@@ -1516,6 +1517,90 @@
 </p:notes>
 </file>
 
+<file path=ppt/notesSlides/notesSlide6.xml><?xml version="1.0" encoding="utf-8"?>
+<p:notes xmlns:a="http://schemas.openxmlformats.org/drawingml/2006/main" xmlns:r="http://schemas.openxmlformats.org/officeDocument/2006/relationships" xmlns:p="http://schemas.openxmlformats.org/presentationml/2006/main">
+  <p:cSld>
+    <p:spTree>
+      <p:nvGrpSpPr>
+        <p:cNvPr id="1" name=""/>
+        <p:cNvGrpSpPr/>
+        <p:nvPr/>
+      </p:nvGrpSpPr>
+      <p:grpSpPr>
+        <a:xfrm>
+          <a:off x="0" y="0"/>
+          <a:ext cx="0" cy="0"/>
+          <a:chOff x="0" y="0"/>
+          <a:chExt cx="0" cy="0"/>
+        </a:xfrm>
+      </p:grpSpPr>
+      <p:sp>
+        <p:nvSpPr>
+          <p:cNvPr id="2" name="Slide Image Placeholder 1"/>
+          <p:cNvSpPr>
+            <a:spLocks noGrp="1" noRot="1" noChangeAspect="1"/>
+          </p:cNvSpPr>
+          <p:nvPr>
+            <p:ph type="sldImg"/>
+          </p:nvPr>
+        </p:nvSpPr>
+        <p:spPr/>
+      </p:sp>
+      <p:sp>
+        <p:nvSpPr>
+          <p:cNvPr id="3" name="Notes Placeholder 2"/>
+          <p:cNvSpPr>
+            <a:spLocks noGrp="1"/>
+          </p:cNvSpPr>
+          <p:nvPr>
+            <p:ph type="body" idx="1"/>
+          </p:nvPr>
+        </p:nvSpPr>
+        <p:spPr/>
+        <p:txBody>
+          <a:bodyPr/>
+          <a:lstStyle/>
+          <a:p>
+            <a:endParaRPr lang="en-VN" dirty="0"/>
+          </a:p>
+        </p:txBody>
+      </p:sp>
+      <p:sp>
+        <p:nvSpPr>
+          <p:cNvPr id="4" name="Slide Number Placeholder 3"/>
+          <p:cNvSpPr>
+            <a:spLocks noGrp="1"/>
+          </p:cNvSpPr>
+          <p:nvPr>
+            <p:ph type="sldNum" sz="quarter" idx="5"/>
+          </p:nvPr>
+        </p:nvSpPr>
+        <p:spPr/>
+        <p:txBody>
+          <a:bodyPr/>
+          <a:lstStyle/>
+          <a:p>
+            <a:fld id="{AE01A4AD-3912-D14D-ABF4-A3E15A5DC8AA}" type="slidenum">
+              <a:rPr lang="en-VN" smtClean="0"/>
+              <a:t>12</a:t>
+            </a:fld>
+            <a:endParaRPr lang="en-VN"/>
+          </a:p>
+        </p:txBody>
+      </p:sp>
+    </p:spTree>
+    <p:extLst>
+      <p:ext uri="{BB962C8B-B14F-4D97-AF65-F5344CB8AC3E}">
+        <p14:creationId xmlns:p14="http://schemas.microsoft.com/office/powerpoint/2010/main" val="1256462813"/>
+      </p:ext>
+    </p:extLst>
+  </p:cSld>
+  <p:clrMapOvr>
+    <a:masterClrMapping/>
+  </p:clrMapOvr>
+</p:notes>
+</file>
+
 <file path=ppt/slideLayouts/slideLayout1.xml><?xml version="1.0" encoding="utf-8"?>
 <p:sldLayout xmlns:a="http://schemas.openxmlformats.org/drawingml/2006/main" xmlns:r="http://schemas.openxmlformats.org/officeDocument/2006/relationships" xmlns:p="http://schemas.openxmlformats.org/presentationml/2006/main" type="title" preserve="1">
   <p:cSld name="Title Slide">
@@ -1672,7 +1757,7 @@
           <a:p>
             <a:fld id="{02AC24A9-CCB6-4F8D-B8DB-C2F3692CFA5A}" type="datetimeFigureOut">
               <a:rPr lang="en-US" smtClean="0"/>
-              <a:t>6/27/2021</a:t>
+              <a:t>6/27/21</a:t>
             </a:fld>
             <a:endParaRPr lang="en-US" dirty="0"/>
           </a:p>
@@ -2042,7 +2127,7 @@
           <a:p>
             <a:fld id="{02AC24A9-CCB6-4F8D-B8DB-C2F3692CFA5A}" type="datetimeFigureOut">
               <a:rPr lang="en-US" smtClean="0"/>
-              <a:t>6/27/2021</a:t>
+              <a:t>6/27/21</a:t>
             </a:fld>
             <a:endParaRPr lang="en-US"/>
           </a:p>
@@ -2251,7 +2336,7 @@
           <a:p>
             <a:fld id="{02AC24A9-CCB6-4F8D-B8DB-C2F3692CFA5A}" type="datetimeFigureOut">
               <a:rPr lang="en-US" smtClean="0"/>
-              <a:t>6/27/2021</a:t>
+              <a:t>6/27/21</a:t>
             </a:fld>
             <a:endParaRPr lang="en-US"/>
           </a:p>
@@ -2721,7 +2806,7 @@
           <a:p>
             <a:fld id="{02AC24A9-CCB6-4F8D-B8DB-C2F3692CFA5A}" type="datetimeFigureOut">
               <a:rPr lang="en-US" smtClean="0"/>
-              <a:t>6/27/2021</a:t>
+              <a:t>6/27/21</a:t>
             </a:fld>
             <a:endParaRPr lang="en-US"/>
           </a:p>
@@ -3175,7 +3260,7 @@
           <a:p>
             <a:fld id="{02AC24A9-CCB6-4F8D-B8DB-C2F3692CFA5A}" type="datetimeFigureOut">
               <a:rPr lang="en-US" smtClean="0"/>
-              <a:t>6/27/2021</a:t>
+              <a:t>6/27/21</a:t>
             </a:fld>
             <a:endParaRPr lang="en-US"/>
           </a:p>
@@ -3707,7 +3792,7 @@
           <a:p>
             <a:fld id="{02AC24A9-CCB6-4F8D-B8DB-C2F3692CFA5A}" type="datetimeFigureOut">
               <a:rPr lang="en-US" smtClean="0"/>
-              <a:t>6/27/2021</a:t>
+              <a:t>6/27/21</a:t>
             </a:fld>
             <a:endParaRPr lang="en-US"/>
           </a:p>
@@ -4406,7 +4491,7 @@
           <a:p>
             <a:fld id="{02AC24A9-CCB6-4F8D-B8DB-C2F3692CFA5A}" type="datetimeFigureOut">
               <a:rPr lang="en-US" smtClean="0"/>
-              <a:t>6/27/2021</a:t>
+              <a:t>6/27/21</a:t>
             </a:fld>
             <a:endParaRPr lang="en-US"/>
           </a:p>
@@ -4735,7 +4820,7 @@
           <a:p>
             <a:fld id="{02AC24A9-CCB6-4F8D-B8DB-C2F3692CFA5A}" type="datetimeFigureOut">
               <a:rPr lang="en-US" smtClean="0"/>
-              <a:t>6/27/2021</a:t>
+              <a:t>6/27/21</a:t>
             </a:fld>
             <a:endParaRPr lang="en-US"/>
           </a:p>
@@ -4848,7 +4933,7 @@
           <a:p>
             <a:fld id="{02AC24A9-CCB6-4F8D-B8DB-C2F3692CFA5A}" type="datetimeFigureOut">
               <a:rPr lang="en-US" smtClean="0"/>
-              <a:t>6/27/2021</a:t>
+              <a:t>6/27/21</a:t>
             </a:fld>
             <a:endParaRPr lang="en-US"/>
           </a:p>
@@ -5343,7 +5428,7 @@
           <a:p>
             <a:fld id="{02AC24A9-CCB6-4F8D-B8DB-C2F3692CFA5A}" type="datetimeFigureOut">
               <a:rPr lang="en-US" smtClean="0"/>
-              <a:t>6/27/2021</a:t>
+              <a:t>6/27/21</a:t>
             </a:fld>
             <a:endParaRPr lang="en-US" dirty="0"/>
           </a:p>
@@ -5820,7 +5905,7 @@
           <a:p>
             <a:fld id="{02AC24A9-CCB6-4F8D-B8DB-C2F3692CFA5A}" type="datetimeFigureOut">
               <a:rPr lang="en-US" smtClean="0"/>
-              <a:t>6/27/2021</a:t>
+              <a:t>6/27/21</a:t>
             </a:fld>
             <a:endParaRPr lang="en-US"/>
           </a:p>
@@ -6063,7 +6148,7 @@
           <a:p>
             <a:fld id="{02AC24A9-CCB6-4F8D-B8DB-C2F3692CFA5A}" type="datetimeFigureOut">
               <a:rPr lang="en-US" smtClean="0"/>
-              <a:t>6/27/2021</a:t>
+              <a:t>6/27/21</a:t>
             </a:fld>
             <a:endParaRPr lang="en-US"/>
           </a:p>
@@ -6902,8 +6987,8 @@
           </a:p>
         </p:txBody>
       </p:sp>
-      <mc:AlternateContent xmlns:mc="http://schemas.openxmlformats.org/markup-compatibility/2006">
-        <mc:Choice xmlns:a14="http://schemas.microsoft.com/office/drawing/2010/main" Requires="a14">
+      <mc:AlternateContent xmlns:mc="http://schemas.openxmlformats.org/markup-compatibility/2006" xmlns:a14="http://schemas.microsoft.com/office/drawing/2010/main">
+        <mc:Choice Requires="a14">
           <p:sp>
             <p:nvSpPr>
               <p:cNvPr id="3" name="Content Placeholder 2">
@@ -7869,7 +7954,7 @@
             </p:txBody>
           </p:sp>
         </mc:Choice>
-        <mc:Fallback>
+        <mc:Fallback xmlns="">
           <p:sp>
             <p:nvSpPr>
               <p:cNvPr id="3" name="Content Placeholder 2">
@@ -8742,6 +8827,783 @@
 </p:sld>
 </file>
 
+<file path=ppt/slides/slide12.xml><?xml version="1.0" encoding="utf-8"?>
+<p:sld xmlns:a="http://schemas.openxmlformats.org/drawingml/2006/main" xmlns:r="http://schemas.openxmlformats.org/officeDocument/2006/relationships" xmlns:p="http://schemas.openxmlformats.org/presentationml/2006/main">
+  <p:cSld>
+    <p:bg>
+      <p:bgPr>
+        <a:solidFill>
+          <a:schemeClr val="bg1"/>
+        </a:solidFill>
+        <a:effectLst/>
+      </p:bgPr>
+    </p:bg>
+    <p:spTree>
+      <p:nvGrpSpPr>
+        <p:cNvPr id="1" name=""/>
+        <p:cNvGrpSpPr/>
+        <p:nvPr/>
+      </p:nvGrpSpPr>
+      <p:grpSpPr>
+        <a:xfrm>
+          <a:off x="0" y="0"/>
+          <a:ext cx="0" cy="0"/>
+          <a:chOff x="0" y="0"/>
+          <a:chExt cx="0" cy="0"/>
+        </a:xfrm>
+      </p:grpSpPr>
+      <p:sp useBgFill="1">
+        <p:nvSpPr>
+          <p:cNvPr id="15" name="Rectangle 14">
+            <a:extLst>
+              <a:ext uri="{FF2B5EF4-FFF2-40B4-BE49-F238E27FC236}">
+                <a16:creationId xmlns:a16="http://schemas.microsoft.com/office/drawing/2014/main" id="{92468898-5A6E-4D55-85EC-308E785EE06C}"/>
+              </a:ext>
+              <a:ext uri="{C183D7F6-B498-43B3-948B-1728B52AA6E4}">
+                <adec:decorative xmlns:adec="http://schemas.microsoft.com/office/drawing/2017/decorative" val="1"/>
+              </a:ext>
+            </a:extLst>
+          </p:cNvPr>
+          <p:cNvSpPr>
+            <a:spLocks noGrp="1" noRot="1" noChangeAspect="1" noMove="1" noResize="1" noEditPoints="1" noAdjustHandles="1" noChangeArrowheads="1" noChangeShapeType="1" noTextEdit="1"/>
+          </p:cNvSpPr>
+          <p:nvPr>
+            <p:extLst>
+              <p:ext uri="{386F3935-93C4-4BCD-93E2-E3B085C9AB24}">
+                <p16:designElem xmlns:p16="http://schemas.microsoft.com/office/powerpoint/2015/main" val="1"/>
+              </p:ext>
+            </p:extLst>
+          </p:nvPr>
+        </p:nvSpPr>
+        <p:spPr>
+          <a:xfrm>
+            <a:off x="0" y="0"/>
+            <a:ext cx="12192000" cy="6858000"/>
+          </a:xfrm>
+          <a:prstGeom prst="rect">
+            <a:avLst/>
+          </a:prstGeom>
+          <a:ln>
+            <a:noFill/>
+          </a:ln>
+        </p:spPr>
+        <p:style>
+          <a:lnRef idx="2">
+            <a:schemeClr val="accent1">
+              <a:shade val="50000"/>
+            </a:schemeClr>
+          </a:lnRef>
+          <a:fillRef idx="1">
+            <a:schemeClr val="accent1"/>
+          </a:fillRef>
+          <a:effectRef idx="0">
+            <a:schemeClr val="accent1"/>
+          </a:effectRef>
+          <a:fontRef idx="minor">
+            <a:schemeClr val="lt1"/>
+          </a:fontRef>
+        </p:style>
+        <p:txBody>
+          <a:bodyPr rtlCol="0" anchor="ctr"/>
+          <a:lstStyle/>
+          <a:p>
+            <a:pPr algn="ctr"/>
+            <a:endParaRPr lang="en-US"/>
+          </a:p>
+        </p:txBody>
+      </p:sp>
+      <p:sp>
+        <p:nvSpPr>
+          <p:cNvPr id="2" name="Title 1">
+            <a:extLst>
+              <a:ext uri="{FF2B5EF4-FFF2-40B4-BE49-F238E27FC236}">
+                <a16:creationId xmlns:a16="http://schemas.microsoft.com/office/drawing/2014/main" id="{57742997-3E17-1948-8896-642465234691}"/>
+              </a:ext>
+            </a:extLst>
+          </p:cNvPr>
+          <p:cNvSpPr>
+            <a:spLocks noGrp="1"/>
+          </p:cNvSpPr>
+          <p:nvPr>
+            <p:ph type="title"/>
+          </p:nvPr>
+        </p:nvSpPr>
+        <p:spPr>
+          <a:xfrm>
+            <a:off x="429768" y="411480"/>
+            <a:ext cx="11201400" cy="1106424"/>
+          </a:xfrm>
+        </p:spPr>
+        <p:txBody>
+          <a:bodyPr>
+            <a:normAutofit/>
+          </a:bodyPr>
+          <a:lstStyle/>
+          <a:p>
+            <a:r>
+              <a:rPr lang="en-US" sz="3600"/>
+              <a:t>Chi tiết SV2TTS – Speaker Encoder (3)</a:t>
+            </a:r>
+            <a:endParaRPr lang="en-VN" sz="3600">
+              <a:latin typeface="Calibri" panose="020F0502020204030204" pitchFamily="34" charset="0"/>
+              <a:cs typeface="Calibri" panose="020F0502020204030204" pitchFamily="34" charset="0"/>
+            </a:endParaRPr>
+          </a:p>
+        </p:txBody>
+      </p:sp>
+      <p:sp>
+        <p:nvSpPr>
+          <p:cNvPr id="17" name="Rectangle 16">
+            <a:extLst>
+              <a:ext uri="{FF2B5EF4-FFF2-40B4-BE49-F238E27FC236}">
+                <a16:creationId xmlns:a16="http://schemas.microsoft.com/office/drawing/2014/main" id="{3E23A947-2D45-4208-AE2B-64948C87A3EB}"/>
+              </a:ext>
+              <a:ext uri="{C183D7F6-B498-43B3-948B-1728B52AA6E4}">
+                <adec:decorative xmlns:adec="http://schemas.microsoft.com/office/drawing/2017/decorative" val="1"/>
+              </a:ext>
+            </a:extLst>
+          </p:cNvPr>
+          <p:cNvSpPr>
+            <a:spLocks noGrp="1" noRot="1" noChangeAspect="1" noMove="1" noResize="1" noEditPoints="1" noAdjustHandles="1" noChangeArrowheads="1" noChangeShapeType="1" noTextEdit="1"/>
+          </p:cNvSpPr>
+          <p:nvPr>
+            <p:extLst>
+              <p:ext uri="{386F3935-93C4-4BCD-93E2-E3B085C9AB24}">
+                <p16:designElem xmlns:p16="http://schemas.microsoft.com/office/powerpoint/2015/main" val="1"/>
+              </p:ext>
+            </p:extLst>
+          </p:nvPr>
+        </p:nvSpPr>
+        <p:spPr>
+          <a:xfrm>
+            <a:off x="0" y="598458"/>
+            <a:ext cx="128016" cy="704088"/>
+          </a:xfrm>
+          <a:prstGeom prst="rect">
+            <a:avLst/>
+          </a:prstGeom>
+          <a:solidFill>
+            <a:schemeClr val="accent1"/>
+          </a:solidFill>
+          <a:ln>
+            <a:noFill/>
+          </a:ln>
+        </p:spPr>
+        <p:style>
+          <a:lnRef idx="2">
+            <a:schemeClr val="accent1">
+              <a:shade val="50000"/>
+            </a:schemeClr>
+          </a:lnRef>
+          <a:fillRef idx="1">
+            <a:schemeClr val="accent1"/>
+          </a:fillRef>
+          <a:effectRef idx="0">
+            <a:schemeClr val="accent1"/>
+          </a:effectRef>
+          <a:fontRef idx="minor">
+            <a:schemeClr val="lt1"/>
+          </a:fontRef>
+        </p:style>
+        <p:txBody>
+          <a:bodyPr rtlCol="0" anchor="ctr"/>
+          <a:lstStyle/>
+          <a:p>
+            <a:pPr marL="0" marR="0" lvl="0" indent="0" algn="ctr" defTabSz="914400" rtl="0" eaLnBrk="1" fontAlgn="auto" latinLnBrk="0" hangingPunct="1">
+              <a:lnSpc>
+                <a:spcPct val="100000"/>
+              </a:lnSpc>
+              <a:spcBef>
+                <a:spcPts val="0"/>
+              </a:spcBef>
+              <a:spcAft>
+                <a:spcPts val="0"/>
+              </a:spcAft>
+              <a:buClrTx/>
+              <a:buSzTx/>
+              <a:buFontTx/>
+              <a:buNone/>
+              <a:tabLst/>
+              <a:defRPr/>
+            </a:pPr>
+            <a:endParaRPr kumimoji="0" lang="en-US" sz="1800" b="0" i="0" u="none" strike="noStrike" kern="1200" cap="none" spc="0" normalizeH="0" baseline="0" noProof="0">
+              <a:ln>
+                <a:noFill/>
+              </a:ln>
+              <a:solidFill>
+                <a:prstClr val="white"/>
+              </a:solidFill>
+              <a:effectLst/>
+              <a:uLnTx/>
+              <a:uFillTx/>
+              <a:latin typeface="Calibri" panose="020F0502020204030204"/>
+              <a:ea typeface="+mn-ea"/>
+              <a:cs typeface="+mn-cs"/>
+            </a:endParaRPr>
+          </a:p>
+        </p:txBody>
+      </p:sp>
+      <p:pic>
+        <p:nvPicPr>
+          <p:cNvPr id="10" name="Content Placeholder 4" descr="Diagram&#10;&#10;Description automatically generated">
+            <a:extLst>
+              <a:ext uri="{FF2B5EF4-FFF2-40B4-BE49-F238E27FC236}">
+                <a16:creationId xmlns:a16="http://schemas.microsoft.com/office/drawing/2014/main" id="{4BF3A328-3C60-2940-8572-5558BE350292}"/>
+              </a:ext>
+            </a:extLst>
+          </p:cNvPr>
+          <p:cNvPicPr>
+            <a:picLocks noChangeAspect="1"/>
+          </p:cNvPicPr>
+          <p:nvPr/>
+        </p:nvPicPr>
+        <p:blipFill>
+          <a:blip r:embed="rId3"/>
+          <a:stretch>
+            <a:fillRect/>
+          </a:stretch>
+        </p:blipFill>
+        <p:spPr>
+          <a:xfrm>
+            <a:off x="429768" y="2109304"/>
+            <a:ext cx="6702552" cy="3736672"/>
+          </a:xfrm>
+          <a:prstGeom prst="rect">
+            <a:avLst/>
+          </a:prstGeom>
+        </p:spPr>
+      </p:pic>
+      <p:sp useBgFill="1">
+        <p:nvSpPr>
+          <p:cNvPr id="19" name="Rectangle 18">
+            <a:extLst>
+              <a:ext uri="{FF2B5EF4-FFF2-40B4-BE49-F238E27FC236}">
+                <a16:creationId xmlns:a16="http://schemas.microsoft.com/office/drawing/2014/main" id="{E5BBB0F9-6A59-4D02-A9C7-A2D6516684CE}"/>
+              </a:ext>
+              <a:ext uri="{C183D7F6-B498-43B3-948B-1728B52AA6E4}">
+                <adec:decorative xmlns:adec="http://schemas.microsoft.com/office/drawing/2017/decorative" val="1"/>
+              </a:ext>
+            </a:extLst>
+          </p:cNvPr>
+          <p:cNvSpPr>
+            <a:spLocks noGrp="1" noRot="1" noChangeAspect="1" noMove="1" noResize="1" noEditPoints="1" noAdjustHandles="1" noChangeArrowheads="1" noChangeShapeType="1" noTextEdit="1"/>
+          </p:cNvSpPr>
+          <p:nvPr>
+            <p:extLst>
+              <p:ext uri="{386F3935-93C4-4BCD-93E2-E3B085C9AB24}">
+                <p16:designElem xmlns:p16="http://schemas.microsoft.com/office/powerpoint/2015/main" val="1"/>
+              </p:ext>
+            </p:extLst>
+          </p:nvPr>
+        </p:nvSpPr>
+        <p:spPr>
+          <a:xfrm>
+            <a:off x="7543801" y="1721922"/>
+            <a:ext cx="4218432" cy="4520560"/>
+          </a:xfrm>
+          <a:prstGeom prst="rect">
+            <a:avLst/>
+          </a:prstGeom>
+          <a:ln w="9525">
+            <a:solidFill>
+              <a:schemeClr val="tx2">
+                <a:lumMod val="10000"/>
+                <a:lumOff val="90000"/>
+              </a:schemeClr>
+            </a:solidFill>
+          </a:ln>
+          <a:effectLst>
+            <a:outerShdw blurRad="50800" dist="38100" dir="2700000" algn="tl" rotWithShape="0">
+              <a:schemeClr val="bg1">
+                <a:lumMod val="85000"/>
+                <a:alpha val="30000"/>
+              </a:schemeClr>
+            </a:outerShdw>
+          </a:effectLst>
+        </p:spPr>
+        <p:style>
+          <a:lnRef idx="2">
+            <a:schemeClr val="accent1">
+              <a:shade val="50000"/>
+            </a:schemeClr>
+          </a:lnRef>
+          <a:fillRef idx="1">
+            <a:schemeClr val="accent1"/>
+          </a:fillRef>
+          <a:effectRef idx="0">
+            <a:schemeClr val="accent1"/>
+          </a:effectRef>
+          <a:fontRef idx="minor">
+            <a:schemeClr val="lt1"/>
+          </a:fontRef>
+        </p:style>
+        <p:txBody>
+          <a:bodyPr rtlCol="0" anchor="ctr"/>
+          <a:lstStyle/>
+          <a:p>
+            <a:pPr marL="0" marR="0" lvl="0" indent="0" algn="ctr" defTabSz="914400" rtl="0" eaLnBrk="1" fontAlgn="auto" latinLnBrk="0" hangingPunct="1">
+              <a:lnSpc>
+                <a:spcPct val="100000"/>
+              </a:lnSpc>
+              <a:spcBef>
+                <a:spcPts val="0"/>
+              </a:spcBef>
+              <a:spcAft>
+                <a:spcPts val="0"/>
+              </a:spcAft>
+              <a:buClrTx/>
+              <a:buSzTx/>
+              <a:buFontTx/>
+              <a:buNone/>
+              <a:tabLst/>
+              <a:defRPr/>
+            </a:pPr>
+            <a:endParaRPr kumimoji="0" lang="en-US" sz="1800" b="0" i="0" u="none" strike="noStrike" kern="1200" cap="none" spc="0" normalizeH="0" baseline="0" noProof="0">
+              <a:ln>
+                <a:noFill/>
+              </a:ln>
+              <a:solidFill>
+                <a:prstClr val="white"/>
+              </a:solidFill>
+              <a:effectLst/>
+              <a:uLnTx/>
+              <a:uFillTx/>
+              <a:latin typeface="Calibri" panose="020F0502020204030204"/>
+              <a:ea typeface="+mn-ea"/>
+              <a:cs typeface="+mn-cs"/>
+            </a:endParaRPr>
+          </a:p>
+        </p:txBody>
+      </p:sp>
+      <p:sp>
+        <p:nvSpPr>
+          <p:cNvPr id="9" name="Content Placeholder 8">
+            <a:extLst>
+              <a:ext uri="{FF2B5EF4-FFF2-40B4-BE49-F238E27FC236}">
+                <a16:creationId xmlns:a16="http://schemas.microsoft.com/office/drawing/2014/main" id="{03F3149E-2C84-4215-87A4-F4E681406AB2}"/>
+              </a:ext>
+            </a:extLst>
+          </p:cNvPr>
+          <p:cNvSpPr>
+            <a:spLocks noGrp="1"/>
+          </p:cNvSpPr>
+          <p:nvPr>
+            <p:ph idx="1"/>
+          </p:nvPr>
+        </p:nvSpPr>
+        <p:spPr>
+          <a:xfrm>
+            <a:off x="7938752" y="2020824"/>
+            <a:ext cx="3455097" cy="3959352"/>
+          </a:xfrm>
+        </p:spPr>
+        <p:txBody>
+          <a:bodyPr anchor="ctr">
+            <a:normAutofit/>
+          </a:bodyPr>
+          <a:lstStyle/>
+          <a:p>
+            <a:pPr>
+              <a:buFont typeface="Wingdings" pitchFamily="2" charset="2"/>
+              <a:buChar char="§"/>
+            </a:pPr>
+            <a:r>
+              <a:rPr lang="en-US" sz="1700" dirty="0" err="1">
+                <a:latin typeface="Calibri" panose="020F0502020204030204" pitchFamily="34" charset="0"/>
+                <a:cs typeface="Calibri" panose="020F0502020204030204" pitchFamily="34" charset="0"/>
+              </a:rPr>
+              <a:t>Trong</a:t>
+            </a:r>
+            <a:r>
+              <a:rPr lang="en-US" sz="1700" dirty="0">
+                <a:latin typeface="Calibri" panose="020F0502020204030204" pitchFamily="34" charset="0"/>
+                <a:cs typeface="Calibri" panose="020F0502020204030204" pitchFamily="34" charset="0"/>
+              </a:rPr>
+              <a:t> </a:t>
+            </a:r>
+            <a:r>
+              <a:rPr lang="en-US" sz="1700" dirty="0" err="1">
+                <a:latin typeface="Calibri" panose="020F0502020204030204" pitchFamily="34" charset="0"/>
+                <a:cs typeface="Calibri" panose="020F0502020204030204" pitchFamily="34" charset="0"/>
+              </a:rPr>
+              <a:t>quá</a:t>
+            </a:r>
+            <a:r>
+              <a:rPr lang="en-US" sz="1700" dirty="0">
+                <a:latin typeface="Calibri" panose="020F0502020204030204" pitchFamily="34" charset="0"/>
+                <a:cs typeface="Calibri" panose="020F0502020204030204" pitchFamily="34" charset="0"/>
+              </a:rPr>
+              <a:t> </a:t>
+            </a:r>
+            <a:r>
+              <a:rPr lang="en-US" sz="1700" dirty="0" err="1">
+                <a:latin typeface="Calibri" panose="020F0502020204030204" pitchFamily="34" charset="0"/>
+                <a:cs typeface="Calibri" panose="020F0502020204030204" pitchFamily="34" charset="0"/>
+              </a:rPr>
+              <a:t>trình</a:t>
+            </a:r>
+            <a:r>
+              <a:rPr lang="en-US" sz="1700" dirty="0">
+                <a:latin typeface="Calibri" panose="020F0502020204030204" pitchFamily="34" charset="0"/>
+                <a:cs typeface="Calibri" panose="020F0502020204030204" pitchFamily="34" charset="0"/>
+              </a:rPr>
+              <a:t> </a:t>
+            </a:r>
+            <a:r>
+              <a:rPr lang="en-US" sz="1700" dirty="0" err="1">
+                <a:latin typeface="Calibri" panose="020F0502020204030204" pitchFamily="34" charset="0"/>
+                <a:cs typeface="Calibri" panose="020F0502020204030204" pitchFamily="34" charset="0"/>
+              </a:rPr>
+              <a:t>chạy</a:t>
+            </a:r>
+            <a:r>
+              <a:rPr lang="en-US" sz="1700" dirty="0">
+                <a:latin typeface="Calibri" panose="020F0502020204030204" pitchFamily="34" charset="0"/>
+                <a:cs typeface="Calibri" panose="020F0502020204030204" pitchFamily="34" charset="0"/>
+              </a:rPr>
+              <a:t> </a:t>
+            </a:r>
+            <a:r>
+              <a:rPr lang="en-US" sz="1700" dirty="0" err="1">
+                <a:latin typeface="Calibri" panose="020F0502020204030204" pitchFamily="34" charset="0"/>
+                <a:cs typeface="Calibri" panose="020F0502020204030204" pitchFamily="34" charset="0"/>
+              </a:rPr>
+              <a:t>thực</a:t>
+            </a:r>
+            <a:r>
+              <a:rPr lang="en-US" sz="1700" dirty="0">
+                <a:latin typeface="Calibri" panose="020F0502020204030204" pitchFamily="34" charset="0"/>
+                <a:cs typeface="Calibri" panose="020F0502020204030204" pitchFamily="34" charset="0"/>
+              </a:rPr>
+              <a:t> </a:t>
+            </a:r>
+            <a:r>
+              <a:rPr lang="en-US" sz="1700" dirty="0" err="1">
+                <a:latin typeface="Calibri" panose="020F0502020204030204" pitchFamily="34" charset="0"/>
+                <a:cs typeface="Calibri" panose="020F0502020204030204" pitchFamily="34" charset="0"/>
+              </a:rPr>
+              <a:t>tế</a:t>
+            </a:r>
+            <a:r>
+              <a:rPr lang="en-US" sz="1700" dirty="0">
+                <a:latin typeface="Calibri" panose="020F0502020204030204" pitchFamily="34" charset="0"/>
+                <a:cs typeface="Calibri" panose="020F0502020204030204" pitchFamily="34" charset="0"/>
+              </a:rPr>
+              <a:t>, file </a:t>
+            </a:r>
+            <a:r>
+              <a:rPr lang="en-US" sz="1700" dirty="0" err="1">
+                <a:latin typeface="Calibri" panose="020F0502020204030204" pitchFamily="34" charset="0"/>
+                <a:cs typeface="Calibri" panose="020F0502020204030204" pitchFamily="34" charset="0"/>
+              </a:rPr>
+              <a:t>âm</a:t>
+            </a:r>
+            <a:r>
+              <a:rPr lang="en-US" sz="1700" dirty="0">
+                <a:latin typeface="Calibri" panose="020F0502020204030204" pitchFamily="34" charset="0"/>
+                <a:cs typeface="Calibri" panose="020F0502020204030204" pitchFamily="34" charset="0"/>
+              </a:rPr>
+              <a:t> </a:t>
+            </a:r>
+            <a:r>
+              <a:rPr lang="en-US" sz="1700" dirty="0" err="1">
+                <a:latin typeface="Calibri" panose="020F0502020204030204" pitchFamily="34" charset="0"/>
+                <a:cs typeface="Calibri" panose="020F0502020204030204" pitchFamily="34" charset="0"/>
+              </a:rPr>
+              <a:t>thanh</a:t>
+            </a:r>
+            <a:r>
+              <a:rPr lang="en-US" sz="1700" dirty="0">
+                <a:latin typeface="Calibri" panose="020F0502020204030204" pitchFamily="34" charset="0"/>
+                <a:cs typeface="Calibri" panose="020F0502020204030204" pitchFamily="34" charset="0"/>
+              </a:rPr>
+              <a:t> input </a:t>
+            </a:r>
+            <a:r>
+              <a:rPr lang="en-US" sz="1700" dirty="0" err="1">
+                <a:latin typeface="Calibri" panose="020F0502020204030204" pitchFamily="34" charset="0"/>
+                <a:cs typeface="Calibri" panose="020F0502020204030204" pitchFamily="34" charset="0"/>
+              </a:rPr>
+              <a:t>được</a:t>
+            </a:r>
+            <a:r>
+              <a:rPr lang="en-US" sz="1700" dirty="0">
+                <a:latin typeface="Calibri" panose="020F0502020204030204" pitchFamily="34" charset="0"/>
+                <a:cs typeface="Calibri" panose="020F0502020204030204" pitchFamily="34" charset="0"/>
+              </a:rPr>
+              <a:t> </a:t>
+            </a:r>
+            <a:r>
+              <a:rPr lang="en-US" sz="1700" dirty="0" err="1">
+                <a:latin typeface="Calibri" panose="020F0502020204030204" pitchFamily="34" charset="0"/>
+                <a:cs typeface="Calibri" panose="020F0502020204030204" pitchFamily="34" charset="0"/>
+              </a:rPr>
+              <a:t>cắt</a:t>
+            </a:r>
+            <a:r>
+              <a:rPr lang="en-US" sz="1700" dirty="0">
+                <a:latin typeface="Calibri" panose="020F0502020204030204" pitchFamily="34" charset="0"/>
+                <a:cs typeface="Calibri" panose="020F0502020204030204" pitchFamily="34" charset="0"/>
+              </a:rPr>
+              <a:t> </a:t>
+            </a:r>
+            <a:r>
+              <a:rPr lang="en-US" sz="1700" dirty="0" err="1">
+                <a:latin typeface="Calibri" panose="020F0502020204030204" pitchFamily="34" charset="0"/>
+                <a:cs typeface="Calibri" panose="020F0502020204030204" pitchFamily="34" charset="0"/>
+              </a:rPr>
+              <a:t>thành</a:t>
+            </a:r>
+            <a:r>
+              <a:rPr lang="en-US" sz="1700" dirty="0">
+                <a:latin typeface="Calibri" panose="020F0502020204030204" pitchFamily="34" charset="0"/>
+                <a:cs typeface="Calibri" panose="020F0502020204030204" pitchFamily="34" charset="0"/>
+              </a:rPr>
+              <a:t> </a:t>
+            </a:r>
+            <a:r>
+              <a:rPr lang="en-US" sz="1700" dirty="0" err="1">
+                <a:latin typeface="Calibri" panose="020F0502020204030204" pitchFamily="34" charset="0"/>
+                <a:cs typeface="Calibri" panose="020F0502020204030204" pitchFamily="34" charset="0"/>
+              </a:rPr>
+              <a:t>các</a:t>
+            </a:r>
+            <a:r>
+              <a:rPr lang="en-US" sz="1700" dirty="0">
+                <a:latin typeface="Calibri" panose="020F0502020204030204" pitchFamily="34" charset="0"/>
+                <a:cs typeface="Calibri" panose="020F0502020204030204" pitchFamily="34" charset="0"/>
+              </a:rPr>
+              <a:t> segment 1.6s, stride = 50% </a:t>
+            </a:r>
+            <a:r>
+              <a:rPr lang="en-US" sz="1700" dirty="0" err="1">
+                <a:latin typeface="Calibri" panose="020F0502020204030204" pitchFamily="34" charset="0"/>
+                <a:cs typeface="Calibri" panose="020F0502020204030204" pitchFamily="34" charset="0"/>
+              </a:rPr>
+              <a:t>để</a:t>
+            </a:r>
+            <a:r>
+              <a:rPr lang="en-US" sz="1700" dirty="0">
+                <a:latin typeface="Calibri" panose="020F0502020204030204" pitchFamily="34" charset="0"/>
+                <a:cs typeface="Calibri" panose="020F0502020204030204" pitchFamily="34" charset="0"/>
+              </a:rPr>
+              <a:t> </a:t>
+            </a:r>
+            <a:r>
+              <a:rPr lang="en-US" sz="1700" dirty="0" err="1">
+                <a:latin typeface="Calibri" panose="020F0502020204030204" pitchFamily="34" charset="0"/>
+                <a:cs typeface="Calibri" panose="020F0502020204030204" pitchFamily="34" charset="0"/>
+              </a:rPr>
+              <a:t>đưa</a:t>
+            </a:r>
+            <a:r>
+              <a:rPr lang="en-US" sz="1700" dirty="0">
+                <a:latin typeface="Calibri" panose="020F0502020204030204" pitchFamily="34" charset="0"/>
+                <a:cs typeface="Calibri" panose="020F0502020204030204" pitchFamily="34" charset="0"/>
+              </a:rPr>
+              <a:t> </a:t>
+            </a:r>
+            <a:r>
+              <a:rPr lang="en-US" sz="1700" dirty="0" err="1">
+                <a:latin typeface="Calibri" panose="020F0502020204030204" pitchFamily="34" charset="0"/>
+                <a:cs typeface="Calibri" panose="020F0502020204030204" pitchFamily="34" charset="0"/>
+              </a:rPr>
+              <a:t>vào</a:t>
+            </a:r>
+            <a:r>
+              <a:rPr lang="en-US" sz="1700" dirty="0">
+                <a:latin typeface="Calibri" panose="020F0502020204030204" pitchFamily="34" charset="0"/>
+                <a:cs typeface="Calibri" panose="020F0502020204030204" pitchFamily="34" charset="0"/>
+              </a:rPr>
+              <a:t> model LSTM</a:t>
+            </a:r>
+          </a:p>
+          <a:p>
+            <a:pPr>
+              <a:buFont typeface="Wingdings" pitchFamily="2" charset="2"/>
+              <a:buChar char="§"/>
+            </a:pPr>
+            <a:r>
+              <a:rPr lang="en-US" sz="1700" dirty="0" err="1">
+                <a:latin typeface="Calibri" panose="020F0502020204030204" pitchFamily="34" charset="0"/>
+                <a:cs typeface="Calibri" panose="020F0502020204030204" pitchFamily="34" charset="0"/>
+              </a:rPr>
+              <a:t>Chuẩn</a:t>
+            </a:r>
+            <a:r>
+              <a:rPr lang="en-US" sz="1700" dirty="0">
+                <a:latin typeface="Calibri" panose="020F0502020204030204" pitchFamily="34" charset="0"/>
+                <a:cs typeface="Calibri" panose="020F0502020204030204" pitchFamily="34" charset="0"/>
+              </a:rPr>
+              <a:t> </a:t>
+            </a:r>
+            <a:r>
+              <a:rPr lang="en-US" sz="1700" dirty="0" err="1">
+                <a:latin typeface="Calibri" panose="020F0502020204030204" pitchFamily="34" charset="0"/>
+                <a:cs typeface="Calibri" panose="020F0502020204030204" pitchFamily="34" charset="0"/>
+              </a:rPr>
+              <a:t>hóa</a:t>
+            </a:r>
+            <a:r>
+              <a:rPr lang="en-US" sz="1700" dirty="0">
+                <a:latin typeface="Calibri" panose="020F0502020204030204" pitchFamily="34" charset="0"/>
+                <a:cs typeface="Calibri" panose="020F0502020204030204" pitchFamily="34" charset="0"/>
+              </a:rPr>
+              <a:t> </a:t>
+            </a:r>
+            <a:r>
+              <a:rPr lang="en-US" sz="1700" dirty="0" err="1">
+                <a:latin typeface="Calibri" panose="020F0502020204030204" pitchFamily="34" charset="0"/>
+                <a:cs typeface="Calibri" panose="020F0502020204030204" pitchFamily="34" charset="0"/>
+              </a:rPr>
+              <a:t>các</a:t>
+            </a:r>
+            <a:r>
+              <a:rPr lang="en-US" sz="1700">
+                <a:latin typeface="Calibri" panose="020F0502020204030204" pitchFamily="34" charset="0"/>
+                <a:cs typeface="Calibri" panose="020F0502020204030204" pitchFamily="34" charset="0"/>
+              </a:rPr>
+              <a:t> output </a:t>
+            </a:r>
+            <a:r>
+              <a:rPr lang="en-US" sz="1700" dirty="0" err="1">
+                <a:latin typeface="Calibri" panose="020F0502020204030204" pitchFamily="34" charset="0"/>
+                <a:cs typeface="Calibri" panose="020F0502020204030204" pitchFamily="34" charset="0"/>
+              </a:rPr>
+              <a:t>rồi</a:t>
+            </a:r>
+            <a:r>
+              <a:rPr lang="en-US" sz="1700" dirty="0">
+                <a:latin typeface="Calibri" panose="020F0502020204030204" pitchFamily="34" charset="0"/>
+                <a:cs typeface="Calibri" panose="020F0502020204030204" pitchFamily="34" charset="0"/>
+              </a:rPr>
+              <a:t> </a:t>
+            </a:r>
+            <a:r>
+              <a:rPr lang="en-US" sz="1700" dirty="0" err="1">
+                <a:latin typeface="Calibri" panose="020F0502020204030204" pitchFamily="34" charset="0"/>
+                <a:cs typeface="Calibri" panose="020F0502020204030204" pitchFamily="34" charset="0"/>
+              </a:rPr>
+              <a:t>lấy</a:t>
+            </a:r>
+            <a:r>
+              <a:rPr lang="en-US" sz="1700" dirty="0">
+                <a:latin typeface="Calibri" panose="020F0502020204030204" pitchFamily="34" charset="0"/>
+                <a:cs typeface="Calibri" panose="020F0502020204030204" pitchFamily="34" charset="0"/>
+              </a:rPr>
+              <a:t> </a:t>
+            </a:r>
+            <a:r>
+              <a:rPr lang="en-US" sz="1700" dirty="0" err="1">
+                <a:latin typeface="Calibri" panose="020F0502020204030204" pitchFamily="34" charset="0"/>
+                <a:cs typeface="Calibri" panose="020F0502020204030204" pitchFamily="34" charset="0"/>
+              </a:rPr>
+              <a:t>trung</a:t>
+            </a:r>
+            <a:r>
+              <a:rPr lang="en-US" sz="1700" dirty="0">
+                <a:latin typeface="Calibri" panose="020F0502020204030204" pitchFamily="34" charset="0"/>
+                <a:cs typeface="Calibri" panose="020F0502020204030204" pitchFamily="34" charset="0"/>
+              </a:rPr>
+              <a:t> </a:t>
+            </a:r>
+            <a:r>
+              <a:rPr lang="en-US" sz="1700" dirty="0" err="1">
+                <a:latin typeface="Calibri" panose="020F0502020204030204" pitchFamily="34" charset="0"/>
+                <a:cs typeface="Calibri" panose="020F0502020204030204" pitchFamily="34" charset="0"/>
+              </a:rPr>
+              <a:t>bình</a:t>
+            </a:r>
+            <a:r>
+              <a:rPr lang="en-US" sz="1700" dirty="0">
+                <a:latin typeface="Calibri" panose="020F0502020204030204" pitchFamily="34" charset="0"/>
+                <a:cs typeface="Calibri" panose="020F0502020204030204" pitchFamily="34" charset="0"/>
+              </a:rPr>
+              <a:t> </a:t>
+            </a:r>
+            <a:r>
+              <a:rPr lang="en-US" sz="1700" dirty="0" err="1">
+                <a:latin typeface="Calibri" panose="020F0502020204030204" pitchFamily="34" charset="0"/>
+                <a:cs typeface="Calibri" panose="020F0502020204030204" pitchFamily="34" charset="0"/>
+              </a:rPr>
+              <a:t>cộng</a:t>
+            </a:r>
+            <a:r>
+              <a:rPr lang="en-US" sz="1700" dirty="0">
+                <a:latin typeface="Calibri" panose="020F0502020204030204" pitchFamily="34" charset="0"/>
+                <a:cs typeface="Calibri" panose="020F0502020204030204" pitchFamily="34" charset="0"/>
+              </a:rPr>
+              <a:t>, ta </a:t>
+            </a:r>
+            <a:r>
+              <a:rPr lang="en-US" sz="1700" dirty="0" err="1">
+                <a:latin typeface="Calibri" panose="020F0502020204030204" pitchFamily="34" charset="0"/>
+                <a:cs typeface="Calibri" panose="020F0502020204030204" pitchFamily="34" charset="0"/>
+              </a:rPr>
+              <a:t>thu</a:t>
+            </a:r>
+            <a:r>
+              <a:rPr lang="en-US" sz="1700" dirty="0">
+                <a:latin typeface="Calibri" panose="020F0502020204030204" pitchFamily="34" charset="0"/>
+                <a:cs typeface="Calibri" panose="020F0502020204030204" pitchFamily="34" charset="0"/>
+              </a:rPr>
+              <a:t> </a:t>
+            </a:r>
+            <a:r>
+              <a:rPr lang="en-US" sz="1700" dirty="0" err="1">
+                <a:latin typeface="Calibri" panose="020F0502020204030204" pitchFamily="34" charset="0"/>
+                <a:cs typeface="Calibri" panose="020F0502020204030204" pitchFamily="34" charset="0"/>
+              </a:rPr>
+              <a:t>được</a:t>
+            </a:r>
+            <a:r>
+              <a:rPr lang="en-US" sz="1700" dirty="0">
+                <a:latin typeface="Calibri" panose="020F0502020204030204" pitchFamily="34" charset="0"/>
+                <a:cs typeface="Calibri" panose="020F0502020204030204" pitchFamily="34" charset="0"/>
+              </a:rPr>
+              <a:t> embedding </a:t>
+            </a:r>
+            <a:r>
+              <a:rPr lang="en-US" sz="1700" dirty="0" err="1">
+                <a:latin typeface="Calibri" panose="020F0502020204030204" pitchFamily="34" charset="0"/>
+                <a:cs typeface="Calibri" panose="020F0502020204030204" pitchFamily="34" charset="0"/>
+              </a:rPr>
+              <a:t>cần</a:t>
+            </a:r>
+            <a:r>
+              <a:rPr lang="en-US" sz="1700" dirty="0">
+                <a:latin typeface="Calibri" panose="020F0502020204030204" pitchFamily="34" charset="0"/>
+                <a:cs typeface="Calibri" panose="020F0502020204030204" pitchFamily="34" charset="0"/>
+              </a:rPr>
+              <a:t> </a:t>
+            </a:r>
+            <a:r>
+              <a:rPr lang="en-US" sz="1700" dirty="0" err="1">
+                <a:latin typeface="Calibri" panose="020F0502020204030204" pitchFamily="34" charset="0"/>
+                <a:cs typeface="Calibri" panose="020F0502020204030204" pitchFamily="34" charset="0"/>
+              </a:rPr>
+              <a:t>tìm</a:t>
+            </a:r>
+            <a:endParaRPr lang="en-US" sz="1700" dirty="0">
+              <a:latin typeface="Calibri" panose="020F0502020204030204" pitchFamily="34" charset="0"/>
+              <a:cs typeface="Calibri" panose="020F0502020204030204" pitchFamily="34" charset="0"/>
+            </a:endParaRPr>
+          </a:p>
+        </p:txBody>
+      </p:sp>
+    </p:spTree>
+    <p:extLst>
+      <p:ext uri="{BB962C8B-B14F-4D97-AF65-F5344CB8AC3E}">
+        <p14:creationId xmlns:p14="http://schemas.microsoft.com/office/powerpoint/2010/main" val="2082826794"/>
+      </p:ext>
+    </p:extLst>
+  </p:cSld>
+  <p:clrMapOvr>
+    <a:masterClrMapping/>
+  </p:clrMapOvr>
+</p:sld>
+</file>
+
 <file path=ppt/slides/slide2.xml><?xml version="1.0" encoding="utf-8"?>
 <p:sld xmlns:a="http://schemas.openxmlformats.org/drawingml/2006/main" xmlns:r="http://schemas.openxmlformats.org/officeDocument/2006/relationships" xmlns:p="http://schemas.openxmlformats.org/presentationml/2006/main">
   <p:cSld>
@@ -9639,8 +10501,8 @@
           </a:p>
         </p:txBody>
       </p:sp>
-      <mc:AlternateContent xmlns:mc="http://schemas.openxmlformats.org/markup-compatibility/2006">
-        <mc:Choice xmlns:a14="http://schemas.microsoft.com/office/drawing/2010/main" Requires="a14">
+      <mc:AlternateContent xmlns:mc="http://schemas.openxmlformats.org/markup-compatibility/2006" xmlns:a14="http://schemas.microsoft.com/office/drawing/2010/main">
+        <mc:Choice Requires="a14">
           <p:sp>
             <p:nvSpPr>
               <p:cNvPr id="3" name="Content Placeholder 2">
@@ -10561,7 +11423,7 @@
             </p:txBody>
           </p:sp>
         </mc:Choice>
-        <mc:Fallback>
+        <mc:Fallback xmlns="">
           <p:sp>
             <p:nvSpPr>
               <p:cNvPr id="3" name="Content Placeholder 2">

</xml_diff>

<commit_message>
synthesizer: encoder + attention
</commit_message>
<xml_diff>
--- a/Voice_Cloning/Slide.pptx
+++ b/Voice_Cloning/Slide.pptx
@@ -5,7 +5,7 @@
     <p:sldMasterId id="2147483725" r:id="rId1"/>
   </p:sldMasterIdLst>
   <p:notesMasterIdLst>
-    <p:notesMasterId r:id="rId21"/>
+    <p:notesMasterId r:id="rId22"/>
   </p:notesMasterIdLst>
   <p:sldIdLst>
     <p:sldId id="256" r:id="rId2"/>
@@ -27,6 +27,7 @@
     <p:sldId id="277" r:id="rId18"/>
     <p:sldId id="279" r:id="rId19"/>
     <p:sldId id="280" r:id="rId20"/>
+    <p:sldId id="281" r:id="rId21"/>
   </p:sldIdLst>
   <p:sldSz cx="12192000" cy="6858000"/>
   <p:notesSz cx="6858000" cy="9144000"/>
@@ -136,7 +137,7 @@
 <file path=ppt/revisionInfo.xml><?xml version="1.0" encoding="utf-8"?>
 <p1510:revInfo xmlns:a="http://schemas.openxmlformats.org/drawingml/2006/main" xmlns:r="http://schemas.openxmlformats.org/officeDocument/2006/relationships" xmlns:p1510="http://schemas.microsoft.com/office/powerpoint/2015/10/main">
   <p1510:revLst>
-    <p1510:client id="{F036155E-A26E-8E46-BB9B-0319A147988A}" v="26" dt="2021-06-30T10:09:07.049"/>
+    <p1510:client id="{F036155E-A26E-8E46-BB9B-0319A147988A}" v="469" dt="2021-07-02T03:09:06.710"/>
   </p1510:revLst>
 </p1510:revInfo>
 </file>
@@ -146,7 +147,7 @@
   <pc:docChgLst>
     <pc:chgData name="NGUYỄN BẢO LONG" userId="156f7280-0c23-4eda-9828-bb67a3ec36e5" providerId="ADAL" clId="{F036155E-A26E-8E46-BB9B-0319A147988A}"/>
     <pc:docChg chg="undo redo custSel addSld delSld modSld sldOrd">
-      <pc:chgData name="NGUYỄN BẢO LONG" userId="156f7280-0c23-4eda-9828-bb67a3ec36e5" providerId="ADAL" clId="{F036155E-A26E-8E46-BB9B-0319A147988A}" dt="2021-06-30T10:09:32.615" v="2282" actId="20577"/>
+      <pc:chgData name="NGUYỄN BẢO LONG" userId="156f7280-0c23-4eda-9828-bb67a3ec36e5" providerId="ADAL" clId="{F036155E-A26E-8E46-BB9B-0319A147988A}" dt="2021-07-02T08:03:53.410" v="5495" actId="26606"/>
       <pc:docMkLst>
         <pc:docMk/>
       </pc:docMkLst>
@@ -172,20 +173,92 @@
           <pc:sldMk cId="2400984561" sldId="268"/>
         </pc:sldMkLst>
       </pc:sldChg>
-      <pc:sldChg chg="modSp mod">
-        <pc:chgData name="NGUYỄN BẢO LONG" userId="156f7280-0c23-4eda-9828-bb67a3ec36e5" providerId="ADAL" clId="{F036155E-A26E-8E46-BB9B-0319A147988A}" dt="2021-06-30T09:12:04.271" v="1339" actId="2711"/>
+      <pc:sldChg chg="addSp delSp modSp mod">
+        <pc:chgData name="NGUYỄN BẢO LONG" userId="156f7280-0c23-4eda-9828-bb67a3ec36e5" providerId="ADAL" clId="{F036155E-A26E-8E46-BB9B-0319A147988A}" dt="2021-07-02T08:03:53.410" v="5495" actId="26606"/>
         <pc:sldMkLst>
           <pc:docMk/>
           <pc:sldMk cId="2082826794" sldId="270"/>
         </pc:sldMkLst>
         <pc:spChg chg="mod">
-          <ac:chgData name="NGUYỄN BẢO LONG" userId="156f7280-0c23-4eda-9828-bb67a3ec36e5" providerId="ADAL" clId="{F036155E-A26E-8E46-BB9B-0319A147988A}" dt="2021-06-30T09:12:04.271" v="1339" actId="2711"/>
+          <ac:chgData name="NGUYỄN BẢO LONG" userId="156f7280-0c23-4eda-9828-bb67a3ec36e5" providerId="ADAL" clId="{F036155E-A26E-8E46-BB9B-0319A147988A}" dt="2021-07-02T08:03:53.410" v="5495" actId="26606"/>
           <ac:spMkLst>
             <pc:docMk/>
             <pc:sldMk cId="2082826794" sldId="270"/>
             <ac:spMk id="2" creationId="{57742997-3E17-1948-8896-642465234691}"/>
           </ac:spMkLst>
         </pc:spChg>
+        <pc:spChg chg="mod">
+          <ac:chgData name="NGUYỄN BẢO LONG" userId="156f7280-0c23-4eda-9828-bb67a3ec36e5" providerId="ADAL" clId="{F036155E-A26E-8E46-BB9B-0319A147988A}" dt="2021-07-02T08:03:53.410" v="5495" actId="26606"/>
+          <ac:spMkLst>
+            <pc:docMk/>
+            <pc:sldMk cId="2082826794" sldId="270"/>
+            <ac:spMk id="9" creationId="{03F3149E-2C84-4215-87A4-F4E681406AB2}"/>
+          </ac:spMkLst>
+        </pc:spChg>
+        <pc:spChg chg="del">
+          <ac:chgData name="NGUYỄN BẢO LONG" userId="156f7280-0c23-4eda-9828-bb67a3ec36e5" providerId="ADAL" clId="{F036155E-A26E-8E46-BB9B-0319A147988A}" dt="2021-07-02T08:03:53.410" v="5495" actId="26606"/>
+          <ac:spMkLst>
+            <pc:docMk/>
+            <pc:sldMk cId="2082826794" sldId="270"/>
+            <ac:spMk id="15" creationId="{92468898-5A6E-4D55-85EC-308E785EE06C}"/>
+          </ac:spMkLst>
+        </pc:spChg>
+        <pc:spChg chg="del">
+          <ac:chgData name="NGUYỄN BẢO LONG" userId="156f7280-0c23-4eda-9828-bb67a3ec36e5" providerId="ADAL" clId="{F036155E-A26E-8E46-BB9B-0319A147988A}" dt="2021-07-02T08:03:53.410" v="5495" actId="26606"/>
+          <ac:spMkLst>
+            <pc:docMk/>
+            <pc:sldMk cId="2082826794" sldId="270"/>
+            <ac:spMk id="17" creationId="{3E23A947-2D45-4208-AE2B-64948C87A3EB}"/>
+          </ac:spMkLst>
+        </pc:spChg>
+        <pc:spChg chg="del">
+          <ac:chgData name="NGUYỄN BẢO LONG" userId="156f7280-0c23-4eda-9828-bb67a3ec36e5" providerId="ADAL" clId="{F036155E-A26E-8E46-BB9B-0319A147988A}" dt="2021-07-02T08:03:53.410" v="5495" actId="26606"/>
+          <ac:spMkLst>
+            <pc:docMk/>
+            <pc:sldMk cId="2082826794" sldId="270"/>
+            <ac:spMk id="19" creationId="{E5BBB0F9-6A59-4D02-A9C7-A2D6516684CE}"/>
+          </ac:spMkLst>
+        </pc:spChg>
+        <pc:spChg chg="add">
+          <ac:chgData name="NGUYỄN BẢO LONG" userId="156f7280-0c23-4eda-9828-bb67a3ec36e5" providerId="ADAL" clId="{F036155E-A26E-8E46-BB9B-0319A147988A}" dt="2021-07-02T08:03:53.410" v="5495" actId="26606"/>
+          <ac:spMkLst>
+            <pc:docMk/>
+            <pc:sldMk cId="2082826794" sldId="270"/>
+            <ac:spMk id="24" creationId="{84ECDE7A-6944-466D-8FFE-149A29BA6BAE}"/>
+          </ac:spMkLst>
+        </pc:spChg>
+        <pc:spChg chg="add">
+          <ac:chgData name="NGUYỄN BẢO LONG" userId="156f7280-0c23-4eda-9828-bb67a3ec36e5" providerId="ADAL" clId="{F036155E-A26E-8E46-BB9B-0319A147988A}" dt="2021-07-02T08:03:53.410" v="5495" actId="26606"/>
+          <ac:spMkLst>
+            <pc:docMk/>
+            <pc:sldMk cId="2082826794" sldId="270"/>
+            <ac:spMk id="26" creationId="{B3420082-9415-44EC-802E-C77D71D59C57}"/>
+          </ac:spMkLst>
+        </pc:spChg>
+        <pc:spChg chg="add">
+          <ac:chgData name="NGUYỄN BẢO LONG" userId="156f7280-0c23-4eda-9828-bb67a3ec36e5" providerId="ADAL" clId="{F036155E-A26E-8E46-BB9B-0319A147988A}" dt="2021-07-02T08:03:53.410" v="5495" actId="26606"/>
+          <ac:spMkLst>
+            <pc:docMk/>
+            <pc:sldMk cId="2082826794" sldId="270"/>
+            <ac:spMk id="28" creationId="{55A52C45-1FCB-4636-A80F-2849B8226C01}"/>
+          </ac:spMkLst>
+        </pc:spChg>
+        <pc:spChg chg="add">
+          <ac:chgData name="NGUYỄN BẢO LONG" userId="156f7280-0c23-4eda-9828-bb67a3ec36e5" providerId="ADAL" clId="{F036155E-A26E-8E46-BB9B-0319A147988A}" dt="2021-07-02T08:03:53.410" v="5495" actId="26606"/>
+          <ac:spMkLst>
+            <pc:docMk/>
+            <pc:sldMk cId="2082826794" sldId="270"/>
+            <ac:spMk id="30" creationId="{768EB4DD-3704-43AD-92B3-C4E0C6EA92CB}"/>
+          </ac:spMkLst>
+        </pc:spChg>
+        <pc:picChg chg="mod">
+          <ac:chgData name="NGUYỄN BẢO LONG" userId="156f7280-0c23-4eda-9828-bb67a3ec36e5" providerId="ADAL" clId="{F036155E-A26E-8E46-BB9B-0319A147988A}" dt="2021-07-02T08:03:53.410" v="5495" actId="26606"/>
+          <ac:picMkLst>
+            <pc:docMk/>
+            <pc:sldMk cId="2082826794" sldId="270"/>
+            <ac:picMk id="10" creationId="{4BF3A328-3C60-2940-8572-5558BE350292}"/>
+          </ac:picMkLst>
+        </pc:picChg>
       </pc:sldChg>
       <pc:sldChg chg="addSp delSp modSp add del mod setBg">
         <pc:chgData name="NGUYỄN BẢO LONG" userId="156f7280-0c23-4eda-9828-bb67a3ec36e5" providerId="ADAL" clId="{F036155E-A26E-8E46-BB9B-0319A147988A}" dt="2021-06-30T08:38:09.154" v="171" actId="2696"/>
@@ -407,13 +480,13 @@
         </pc:sldMkLst>
       </pc:sldChg>
       <pc:sldChg chg="modSp add mod ord modNotesTx">
-        <pc:chgData name="NGUYỄN BẢO LONG" userId="156f7280-0c23-4eda-9828-bb67a3ec36e5" providerId="ADAL" clId="{F036155E-A26E-8E46-BB9B-0319A147988A}" dt="2021-06-30T09:12:12.271" v="1343" actId="2711"/>
+        <pc:chgData name="NGUYỄN BẢO LONG" userId="156f7280-0c23-4eda-9828-bb67a3ec36e5" providerId="ADAL" clId="{F036155E-A26E-8E46-BB9B-0319A147988A}" dt="2021-07-02T01:51:04.084" v="3286" actId="20577"/>
         <pc:sldMkLst>
           <pc:docMk/>
           <pc:sldMk cId="3948645139" sldId="275"/>
         </pc:sldMkLst>
         <pc:spChg chg="mod">
-          <ac:chgData name="NGUYỄN BẢO LONG" userId="156f7280-0c23-4eda-9828-bb67a3ec36e5" providerId="ADAL" clId="{F036155E-A26E-8E46-BB9B-0319A147988A}" dt="2021-06-30T09:12:12.271" v="1343" actId="2711"/>
+          <ac:chgData name="NGUYỄN BẢO LONG" userId="156f7280-0c23-4eda-9828-bb67a3ec36e5" providerId="ADAL" clId="{F036155E-A26E-8E46-BB9B-0319A147988A}" dt="2021-07-02T01:51:04.084" v="3286" actId="20577"/>
           <ac:spMkLst>
             <pc:docMk/>
             <pc:sldMk cId="3948645139" sldId="275"/>
@@ -430,13 +503,13 @@
         </pc:spChg>
       </pc:sldChg>
       <pc:sldChg chg="addSp delSp modSp add mod setBg modNotesTx">
-        <pc:chgData name="NGUYỄN BẢO LONG" userId="156f7280-0c23-4eda-9828-bb67a3ec36e5" providerId="ADAL" clId="{F036155E-A26E-8E46-BB9B-0319A147988A}" dt="2021-06-30T09:27:26.757" v="2203" actId="20577"/>
+        <pc:chgData name="NGUYỄN BẢO LONG" userId="156f7280-0c23-4eda-9828-bb67a3ec36e5" providerId="ADAL" clId="{F036155E-A26E-8E46-BB9B-0319A147988A}" dt="2021-07-02T03:08:54.345" v="5482" actId="255"/>
         <pc:sldMkLst>
           <pc:docMk/>
           <pc:sldMk cId="32854595" sldId="276"/>
         </pc:sldMkLst>
         <pc:spChg chg="mod ord">
-          <ac:chgData name="NGUYỄN BẢO LONG" userId="156f7280-0c23-4eda-9828-bb67a3ec36e5" providerId="ADAL" clId="{F036155E-A26E-8E46-BB9B-0319A147988A}" dt="2021-06-30T09:12:15.700" v="1344" actId="2711"/>
+          <ac:chgData name="NGUYỄN BẢO LONG" userId="156f7280-0c23-4eda-9828-bb67a3ec36e5" providerId="ADAL" clId="{F036155E-A26E-8E46-BB9B-0319A147988A}" dt="2021-07-02T03:08:54.345" v="5482" actId="255"/>
           <ac:spMkLst>
             <pc:docMk/>
             <pc:sldMk cId="32854595" sldId="276"/>
@@ -645,13 +718,13 @@
         </pc:picChg>
       </pc:sldChg>
       <pc:sldChg chg="addSp delSp modSp new mod modNotesTx">
-        <pc:chgData name="NGUYỄN BẢO LONG" userId="156f7280-0c23-4eda-9828-bb67a3ec36e5" providerId="ADAL" clId="{F036155E-A26E-8E46-BB9B-0319A147988A}" dt="2021-06-30T09:27:00.255" v="2202" actId="1076"/>
+        <pc:chgData name="NGUYỄN BẢO LONG" userId="156f7280-0c23-4eda-9828-bb67a3ec36e5" providerId="ADAL" clId="{F036155E-A26E-8E46-BB9B-0319A147988A}" dt="2021-07-02T02:32:18.446" v="4515" actId="14100"/>
         <pc:sldMkLst>
           <pc:docMk/>
           <pc:sldMk cId="3521728813" sldId="277"/>
         </pc:sldMkLst>
         <pc:spChg chg="mod">
-          <ac:chgData name="NGUYỄN BẢO LONG" userId="156f7280-0c23-4eda-9828-bb67a3ec36e5" providerId="ADAL" clId="{F036155E-A26E-8E46-BB9B-0319A147988A}" dt="2021-06-30T09:12:46.681" v="1347" actId="20577"/>
+          <ac:chgData name="NGUYỄN BẢO LONG" userId="156f7280-0c23-4eda-9828-bb67a3ec36e5" providerId="ADAL" clId="{F036155E-A26E-8E46-BB9B-0319A147988A}" dt="2021-07-02T01:50:56.922" v="3284" actId="20577"/>
           <ac:spMkLst>
             <pc:docMk/>
             <pc:sldMk cId="3521728813" sldId="277"/>
@@ -659,7 +732,7 @@
           </ac:spMkLst>
         </pc:spChg>
         <pc:spChg chg="mod">
-          <ac:chgData name="NGUYỄN BẢO LONG" userId="156f7280-0c23-4eda-9828-bb67a3ec36e5" providerId="ADAL" clId="{F036155E-A26E-8E46-BB9B-0319A147988A}" dt="2021-06-30T09:24:59.566" v="2169" actId="21"/>
+          <ac:chgData name="NGUYỄN BẢO LONG" userId="156f7280-0c23-4eda-9828-bb67a3ec36e5" providerId="ADAL" clId="{F036155E-A26E-8E46-BB9B-0319A147988A}" dt="2021-07-02T02:32:12.234" v="4514" actId="15"/>
           <ac:spMkLst>
             <pc:docMk/>
             <pc:sldMk cId="3521728813" sldId="277"/>
@@ -675,7 +748,7 @@
           </ac:picMkLst>
         </pc:picChg>
         <pc:picChg chg="add mod">
-          <ac:chgData name="NGUYỄN BẢO LONG" userId="156f7280-0c23-4eda-9828-bb67a3ec36e5" providerId="ADAL" clId="{F036155E-A26E-8E46-BB9B-0319A147988A}" dt="2021-06-30T09:27:00.255" v="2202" actId="1076"/>
+          <ac:chgData name="NGUYỄN BẢO LONG" userId="156f7280-0c23-4eda-9828-bb67a3ec36e5" providerId="ADAL" clId="{F036155E-A26E-8E46-BB9B-0319A147988A}" dt="2021-07-02T02:32:18.446" v="4515" actId="14100"/>
           <ac:picMkLst>
             <pc:docMk/>
             <pc:sldMk cId="3521728813" sldId="277"/>
@@ -690,14 +763,14 @@
           <pc:sldMk cId="4164608468" sldId="278"/>
         </pc:sldMkLst>
       </pc:sldChg>
-      <pc:sldChg chg="delSp modSp add mod modNotesTx">
-        <pc:chgData name="NGUYỄN BẢO LONG" userId="156f7280-0c23-4eda-9828-bb67a3ec36e5" providerId="ADAL" clId="{F036155E-A26E-8E46-BB9B-0319A147988A}" dt="2021-06-30T10:09:21.418" v="2275" actId="255"/>
+      <pc:sldChg chg="addSp delSp modSp add mod modNotesTx">
+        <pc:chgData name="NGUYỄN BẢO LONG" userId="156f7280-0c23-4eda-9828-bb67a3ec36e5" providerId="ADAL" clId="{F036155E-A26E-8E46-BB9B-0319A147988A}" dt="2021-07-02T03:08:28.915" v="5481" actId="1076"/>
         <pc:sldMkLst>
           <pc:docMk/>
           <pc:sldMk cId="360644981" sldId="279"/>
         </pc:sldMkLst>
         <pc:spChg chg="mod">
-          <ac:chgData name="NGUYỄN BẢO LONG" userId="156f7280-0c23-4eda-9828-bb67a3ec36e5" providerId="ADAL" clId="{F036155E-A26E-8E46-BB9B-0319A147988A}" dt="2021-06-30T09:27:43.338" v="2209" actId="20577"/>
+          <ac:chgData name="NGUYỄN BẢO LONG" userId="156f7280-0c23-4eda-9828-bb67a3ec36e5" providerId="ADAL" clId="{F036155E-A26E-8E46-BB9B-0319A147988A}" dt="2021-07-02T01:50:50.996" v="3283" actId="20577"/>
           <ac:spMkLst>
             <pc:docMk/>
             <pc:sldMk cId="360644981" sldId="279"/>
@@ -705,13 +778,29 @@
           </ac:spMkLst>
         </pc:spChg>
         <pc:spChg chg="mod">
-          <ac:chgData name="NGUYỄN BẢO LONG" userId="156f7280-0c23-4eda-9828-bb67a3ec36e5" providerId="ADAL" clId="{F036155E-A26E-8E46-BB9B-0319A147988A}" dt="2021-06-30T10:09:21.418" v="2275" actId="255"/>
+          <ac:chgData name="NGUYỄN BẢO LONG" userId="156f7280-0c23-4eda-9828-bb67a3ec36e5" providerId="ADAL" clId="{F036155E-A26E-8E46-BB9B-0319A147988A}" dt="2021-07-02T03:08:21.448" v="5480" actId="20577"/>
           <ac:spMkLst>
             <pc:docMk/>
             <pc:sldMk cId="360644981" sldId="279"/>
             <ac:spMk id="3" creationId="{1F707462-72B9-E94F-AE0F-C78BC243524C}"/>
           </ac:spMkLst>
         </pc:spChg>
+        <pc:spChg chg="add del mod">
+          <ac:chgData name="NGUYỄN BẢO LONG" userId="156f7280-0c23-4eda-9828-bb67a3ec36e5" providerId="ADAL" clId="{F036155E-A26E-8E46-BB9B-0319A147988A}" dt="2021-07-02T01:45:50.162" v="3282"/>
+          <ac:spMkLst>
+            <pc:docMk/>
+            <pc:sldMk cId="360644981" sldId="279"/>
+            <ac:spMk id="6" creationId="{A1690527-BB1B-8141-AC20-2C221A1079E9}"/>
+          </ac:spMkLst>
+        </pc:spChg>
+        <pc:picChg chg="add mod">
+          <ac:chgData name="NGUYỄN BẢO LONG" userId="156f7280-0c23-4eda-9828-bb67a3ec36e5" providerId="ADAL" clId="{F036155E-A26E-8E46-BB9B-0319A147988A}" dt="2021-07-02T03:08:28.915" v="5481" actId="1076"/>
+          <ac:picMkLst>
+            <pc:docMk/>
+            <pc:sldMk cId="360644981" sldId="279"/>
+            <ac:picMk id="5" creationId="{BE63F673-769B-8841-BC1C-9DB99865C839}"/>
+          </ac:picMkLst>
+        </pc:picChg>
         <pc:picChg chg="del">
           <ac:chgData name="NGUYỄN BẢO LONG" userId="156f7280-0c23-4eda-9828-bb67a3ec36e5" providerId="ADAL" clId="{F036155E-A26E-8E46-BB9B-0319A147988A}" dt="2021-06-30T09:38:26.020" v="2216" actId="478"/>
           <ac:picMkLst>
@@ -721,28 +810,313 @@
           </ac:picMkLst>
         </pc:picChg>
       </pc:sldChg>
-      <pc:sldChg chg="modSp add mod">
-        <pc:chgData name="NGUYỄN BẢO LONG" userId="156f7280-0c23-4eda-9828-bb67a3ec36e5" providerId="ADAL" clId="{F036155E-A26E-8E46-BB9B-0319A147988A}" dt="2021-06-30T10:09:32.615" v="2282" actId="20577"/>
+      <pc:sldChg chg="addSp delSp modSp add mod setBg modNotesTx">
+        <pc:chgData name="NGUYỄN BẢO LONG" userId="156f7280-0c23-4eda-9828-bb67a3ec36e5" providerId="ADAL" clId="{F036155E-A26E-8E46-BB9B-0319A147988A}" dt="2021-07-02T03:07:16.714" v="5460" actId="20577"/>
         <pc:sldMkLst>
           <pc:docMk/>
           <pc:sldMk cId="2289153986" sldId="280"/>
         </pc:sldMkLst>
         <pc:spChg chg="mod">
-          <ac:chgData name="NGUYỄN BẢO LONG" userId="156f7280-0c23-4eda-9828-bb67a3ec36e5" providerId="ADAL" clId="{F036155E-A26E-8E46-BB9B-0319A147988A}" dt="2021-06-30T10:09:09.226" v="2273" actId="20577"/>
+          <ac:chgData name="NGUYỄN BẢO LONG" userId="156f7280-0c23-4eda-9828-bb67a3ec36e5" providerId="ADAL" clId="{F036155E-A26E-8E46-BB9B-0319A147988A}" dt="2021-07-02T03:02:57.319" v="5228" actId="26606"/>
           <ac:spMkLst>
             <pc:docMk/>
             <pc:sldMk cId="2289153986" sldId="280"/>
             <ac:spMk id="2" creationId="{37AE4411-9454-7945-AA17-0D5F274B1E1C}"/>
           </ac:spMkLst>
         </pc:spChg>
-        <pc:spChg chg="mod">
-          <ac:chgData name="NGUYỄN BẢO LONG" userId="156f7280-0c23-4eda-9828-bb67a3ec36e5" providerId="ADAL" clId="{F036155E-A26E-8E46-BB9B-0319A147988A}" dt="2021-06-30T10:09:32.615" v="2282" actId="20577"/>
+        <pc:spChg chg="mod ord">
+          <ac:chgData name="NGUYỄN BẢO LONG" userId="156f7280-0c23-4eda-9828-bb67a3ec36e5" providerId="ADAL" clId="{F036155E-A26E-8E46-BB9B-0319A147988A}" dt="2021-07-02T03:05:31.996" v="5327" actId="20577"/>
           <ac:spMkLst>
             <pc:docMk/>
             <pc:sldMk cId="2289153986" sldId="280"/>
             <ac:spMk id="3" creationId="{1F707462-72B9-E94F-AE0F-C78BC243524C}"/>
           </ac:spMkLst>
         </pc:spChg>
+        <pc:spChg chg="add del">
+          <ac:chgData name="NGUYỄN BẢO LONG" userId="156f7280-0c23-4eda-9828-bb67a3ec36e5" providerId="ADAL" clId="{F036155E-A26E-8E46-BB9B-0319A147988A}" dt="2021-07-02T03:03:04.665" v="5232" actId="26606"/>
+          <ac:spMkLst>
+            <pc:docMk/>
+            <pc:sldMk cId="2289153986" sldId="280"/>
+            <ac:spMk id="10" creationId="{2C9A9DA9-7DC8-488B-A882-123947B0F3D9}"/>
+          </ac:spMkLst>
+        </pc:spChg>
+        <pc:spChg chg="add del">
+          <ac:chgData name="NGUYỄN BẢO LONG" userId="156f7280-0c23-4eda-9828-bb67a3ec36e5" providerId="ADAL" clId="{F036155E-A26E-8E46-BB9B-0319A147988A}" dt="2021-07-02T03:03:04.665" v="5232" actId="26606"/>
+          <ac:spMkLst>
+            <pc:docMk/>
+            <pc:sldMk cId="2289153986" sldId="280"/>
+            <ac:spMk id="12" creationId="{57F6BDD4-E066-4008-8011-6CC31AEB4556}"/>
+          </ac:spMkLst>
+        </pc:spChg>
+        <pc:spChg chg="add del">
+          <ac:chgData name="NGUYỄN BẢO LONG" userId="156f7280-0c23-4eda-9828-bb67a3ec36e5" providerId="ADAL" clId="{F036155E-A26E-8E46-BB9B-0319A147988A}" dt="2021-07-02T03:03:04.665" v="5232" actId="26606"/>
+          <ac:spMkLst>
+            <pc:docMk/>
+            <pc:sldMk cId="2289153986" sldId="280"/>
+            <ac:spMk id="14" creationId="{2711A8FB-68FC-45FC-B01E-38F809E2D439}"/>
+          </ac:spMkLst>
+        </pc:spChg>
+        <pc:spChg chg="add del">
+          <ac:chgData name="NGUYỄN BẢO LONG" userId="156f7280-0c23-4eda-9828-bb67a3ec36e5" providerId="ADAL" clId="{F036155E-A26E-8E46-BB9B-0319A147988A}" dt="2021-07-02T03:03:04.665" v="5232" actId="26606"/>
+          <ac:spMkLst>
+            <pc:docMk/>
+            <pc:sldMk cId="2289153986" sldId="280"/>
+            <ac:spMk id="16" creationId="{2A865FE3-5FC9-4049-87CF-30019C46C0F5}"/>
+          </ac:spMkLst>
+        </pc:spChg>
+        <pc:spChg chg="add del">
+          <ac:chgData name="NGUYỄN BẢO LONG" userId="156f7280-0c23-4eda-9828-bb67a3ec36e5" providerId="ADAL" clId="{F036155E-A26E-8E46-BB9B-0319A147988A}" dt="2021-07-02T03:02:51.126" v="5222" actId="26606"/>
+          <ac:spMkLst>
+            <pc:docMk/>
+            <pc:sldMk cId="2289153986" sldId="280"/>
+            <ac:spMk id="18" creationId="{2C9A9DA9-7DC8-488B-A882-123947B0F3D9}"/>
+          </ac:spMkLst>
+        </pc:spChg>
+        <pc:spChg chg="add del">
+          <ac:chgData name="NGUYỄN BẢO LONG" userId="156f7280-0c23-4eda-9828-bb67a3ec36e5" providerId="ADAL" clId="{F036155E-A26E-8E46-BB9B-0319A147988A}" dt="2021-07-02T03:02:51.126" v="5222" actId="26606"/>
+          <ac:spMkLst>
+            <pc:docMk/>
+            <pc:sldMk cId="2289153986" sldId="280"/>
+            <ac:spMk id="19" creationId="{57F6BDD4-E066-4008-8011-6CC31AEB4556}"/>
+          </ac:spMkLst>
+        </pc:spChg>
+        <pc:spChg chg="add del">
+          <ac:chgData name="NGUYỄN BẢO LONG" userId="156f7280-0c23-4eda-9828-bb67a3ec36e5" providerId="ADAL" clId="{F036155E-A26E-8E46-BB9B-0319A147988A}" dt="2021-07-02T03:02:51.126" v="5222" actId="26606"/>
+          <ac:spMkLst>
+            <pc:docMk/>
+            <pc:sldMk cId="2289153986" sldId="280"/>
+            <ac:spMk id="20" creationId="{2711A8FB-68FC-45FC-B01E-38F809E2D439}"/>
+          </ac:spMkLst>
+        </pc:spChg>
+        <pc:spChg chg="add del">
+          <ac:chgData name="NGUYỄN BẢO LONG" userId="156f7280-0c23-4eda-9828-bb67a3ec36e5" providerId="ADAL" clId="{F036155E-A26E-8E46-BB9B-0319A147988A}" dt="2021-07-02T03:02:48.511" v="5220" actId="26606"/>
+          <ac:spMkLst>
+            <pc:docMk/>
+            <pc:sldMk cId="2289153986" sldId="280"/>
+            <ac:spMk id="21" creationId="{2C9A9DA9-7DC8-488B-A882-123947B0F3D9}"/>
+          </ac:spMkLst>
+        </pc:spChg>
+        <pc:spChg chg="add del">
+          <ac:chgData name="NGUYỄN BẢO LONG" userId="156f7280-0c23-4eda-9828-bb67a3ec36e5" providerId="ADAL" clId="{F036155E-A26E-8E46-BB9B-0319A147988A}" dt="2021-07-02T03:02:51.126" v="5222" actId="26606"/>
+          <ac:spMkLst>
+            <pc:docMk/>
+            <pc:sldMk cId="2289153986" sldId="280"/>
+            <ac:spMk id="22" creationId="{2A865FE3-5FC9-4049-87CF-30019C46C0F5}"/>
+          </ac:spMkLst>
+        </pc:spChg>
+        <pc:spChg chg="add del">
+          <ac:chgData name="NGUYỄN BẢO LONG" userId="156f7280-0c23-4eda-9828-bb67a3ec36e5" providerId="ADAL" clId="{F036155E-A26E-8E46-BB9B-0319A147988A}" dt="2021-07-02T03:02:48.511" v="5220" actId="26606"/>
+          <ac:spMkLst>
+            <pc:docMk/>
+            <pc:sldMk cId="2289153986" sldId="280"/>
+            <ac:spMk id="23" creationId="{57F6BDD4-E066-4008-8011-6CC31AEB4556}"/>
+          </ac:spMkLst>
+        </pc:spChg>
+        <pc:spChg chg="add del">
+          <ac:chgData name="NGUYỄN BẢO LONG" userId="156f7280-0c23-4eda-9828-bb67a3ec36e5" providerId="ADAL" clId="{F036155E-A26E-8E46-BB9B-0319A147988A}" dt="2021-07-02T03:02:52.536" v="5224" actId="26606"/>
+          <ac:spMkLst>
+            <pc:docMk/>
+            <pc:sldMk cId="2289153986" sldId="280"/>
+            <ac:spMk id="24" creationId="{2C9A9DA9-7DC8-488B-A882-123947B0F3D9}"/>
+          </ac:spMkLst>
+        </pc:spChg>
+        <pc:spChg chg="add del">
+          <ac:chgData name="NGUYỄN BẢO LONG" userId="156f7280-0c23-4eda-9828-bb67a3ec36e5" providerId="ADAL" clId="{F036155E-A26E-8E46-BB9B-0319A147988A}" dt="2021-07-02T03:02:48.511" v="5220" actId="26606"/>
+          <ac:spMkLst>
+            <pc:docMk/>
+            <pc:sldMk cId="2289153986" sldId="280"/>
+            <ac:spMk id="25" creationId="{2711A8FB-68FC-45FC-B01E-38F809E2D439}"/>
+          </ac:spMkLst>
+        </pc:spChg>
+        <pc:spChg chg="add del">
+          <ac:chgData name="NGUYỄN BẢO LONG" userId="156f7280-0c23-4eda-9828-bb67a3ec36e5" providerId="ADAL" clId="{F036155E-A26E-8E46-BB9B-0319A147988A}" dt="2021-07-02T03:02:52.536" v="5224" actId="26606"/>
+          <ac:spMkLst>
+            <pc:docMk/>
+            <pc:sldMk cId="2289153986" sldId="280"/>
+            <ac:spMk id="26" creationId="{57F6BDD4-E066-4008-8011-6CC31AEB4556}"/>
+          </ac:spMkLst>
+        </pc:spChg>
+        <pc:spChg chg="add del">
+          <ac:chgData name="NGUYỄN BẢO LONG" userId="156f7280-0c23-4eda-9828-bb67a3ec36e5" providerId="ADAL" clId="{F036155E-A26E-8E46-BB9B-0319A147988A}" dt="2021-07-02T03:02:48.511" v="5220" actId="26606"/>
+          <ac:spMkLst>
+            <pc:docMk/>
+            <pc:sldMk cId="2289153986" sldId="280"/>
+            <ac:spMk id="27" creationId="{2A865FE3-5FC9-4049-87CF-30019C46C0F5}"/>
+          </ac:spMkLst>
+        </pc:spChg>
+        <pc:spChg chg="add del">
+          <ac:chgData name="NGUYỄN BẢO LONG" userId="156f7280-0c23-4eda-9828-bb67a3ec36e5" providerId="ADAL" clId="{F036155E-A26E-8E46-BB9B-0319A147988A}" dt="2021-07-02T03:02:52.536" v="5224" actId="26606"/>
+          <ac:spMkLst>
+            <pc:docMk/>
+            <pc:sldMk cId="2289153986" sldId="280"/>
+            <ac:spMk id="28" creationId="{2711A8FB-68FC-45FC-B01E-38F809E2D439}"/>
+          </ac:spMkLst>
+        </pc:spChg>
+        <pc:spChg chg="add del">
+          <ac:chgData name="NGUYỄN BẢO LONG" userId="156f7280-0c23-4eda-9828-bb67a3ec36e5" providerId="ADAL" clId="{F036155E-A26E-8E46-BB9B-0319A147988A}" dt="2021-07-02T03:02:52.536" v="5224" actId="26606"/>
+          <ac:spMkLst>
+            <pc:docMk/>
+            <pc:sldMk cId="2289153986" sldId="280"/>
+            <ac:spMk id="29" creationId="{2A865FE3-5FC9-4049-87CF-30019C46C0F5}"/>
+          </ac:spMkLst>
+        </pc:spChg>
+        <pc:spChg chg="add del">
+          <ac:chgData name="NGUYỄN BẢO LONG" userId="156f7280-0c23-4eda-9828-bb67a3ec36e5" providerId="ADAL" clId="{F036155E-A26E-8E46-BB9B-0319A147988A}" dt="2021-07-02T03:02:55.837" v="5226" actId="26606"/>
+          <ac:spMkLst>
+            <pc:docMk/>
+            <pc:sldMk cId="2289153986" sldId="280"/>
+            <ac:spMk id="31" creationId="{1ECAB1E8-8195-4748-BE71-FF806D86892E}"/>
+          </ac:spMkLst>
+        </pc:spChg>
+        <pc:spChg chg="add del">
+          <ac:chgData name="NGUYỄN BẢO LONG" userId="156f7280-0c23-4eda-9828-bb67a3ec36e5" providerId="ADAL" clId="{F036155E-A26E-8E46-BB9B-0319A147988A}" dt="2021-07-02T03:02:55.837" v="5226" actId="26606"/>
+          <ac:spMkLst>
+            <pc:docMk/>
+            <pc:sldMk cId="2289153986" sldId="280"/>
+            <ac:spMk id="32" creationId="{57F6BDD4-E066-4008-8011-6CC31AEB4556}"/>
+          </ac:spMkLst>
+        </pc:spChg>
+        <pc:spChg chg="add del">
+          <ac:chgData name="NGUYỄN BẢO LONG" userId="156f7280-0c23-4eda-9828-bb67a3ec36e5" providerId="ADAL" clId="{F036155E-A26E-8E46-BB9B-0319A147988A}" dt="2021-07-02T03:02:55.837" v="5226" actId="26606"/>
+          <ac:spMkLst>
+            <pc:docMk/>
+            <pc:sldMk cId="2289153986" sldId="280"/>
+            <ac:spMk id="33" creationId="{2711A8FB-68FC-45FC-B01E-38F809E2D439}"/>
+          </ac:spMkLst>
+        </pc:spChg>
+        <pc:spChg chg="add del">
+          <ac:chgData name="NGUYỄN BẢO LONG" userId="156f7280-0c23-4eda-9828-bb67a3ec36e5" providerId="ADAL" clId="{F036155E-A26E-8E46-BB9B-0319A147988A}" dt="2021-07-02T03:02:55.837" v="5226" actId="26606"/>
+          <ac:spMkLst>
+            <pc:docMk/>
+            <pc:sldMk cId="2289153986" sldId="280"/>
+            <ac:spMk id="34" creationId="{2A865FE3-5FC9-4049-87CF-30019C46C0F5}"/>
+          </ac:spMkLst>
+        </pc:spChg>
+        <pc:spChg chg="add del">
+          <ac:chgData name="NGUYỄN BẢO LONG" userId="156f7280-0c23-4eda-9828-bb67a3ec36e5" providerId="ADAL" clId="{F036155E-A26E-8E46-BB9B-0319A147988A}" dt="2021-07-02T03:02:57.319" v="5228" actId="26606"/>
+          <ac:spMkLst>
+            <pc:docMk/>
+            <pc:sldMk cId="2289153986" sldId="280"/>
+            <ac:spMk id="36" creationId="{0288C6B4-AFC3-407F-A595-EFFD38D4CCAF}"/>
+          </ac:spMkLst>
+        </pc:spChg>
+        <pc:spChg chg="add del">
+          <ac:chgData name="NGUYỄN BẢO LONG" userId="156f7280-0c23-4eda-9828-bb67a3ec36e5" providerId="ADAL" clId="{F036155E-A26E-8E46-BB9B-0319A147988A}" dt="2021-07-02T03:02:57.319" v="5228" actId="26606"/>
+          <ac:spMkLst>
+            <pc:docMk/>
+            <pc:sldMk cId="2289153986" sldId="280"/>
+            <ac:spMk id="37" creationId="{CF236821-17FE-429B-8D2C-08E13A64EA40}"/>
+          </ac:spMkLst>
+        </pc:spChg>
+        <pc:spChg chg="add del">
+          <ac:chgData name="NGUYỄN BẢO LONG" userId="156f7280-0c23-4eda-9828-bb67a3ec36e5" providerId="ADAL" clId="{F036155E-A26E-8E46-BB9B-0319A147988A}" dt="2021-07-02T03:02:57.319" v="5228" actId="26606"/>
+          <ac:spMkLst>
+            <pc:docMk/>
+            <pc:sldMk cId="2289153986" sldId="280"/>
+            <ac:spMk id="38" creationId="{C0BDBCD2-E081-43AB-9119-C55465E59757}"/>
+          </ac:spMkLst>
+        </pc:spChg>
+        <pc:spChg chg="add del">
+          <ac:chgData name="NGUYỄN BẢO LONG" userId="156f7280-0c23-4eda-9828-bb67a3ec36e5" providerId="ADAL" clId="{F036155E-A26E-8E46-BB9B-0319A147988A}" dt="2021-07-02T03:02:57.319" v="5228" actId="26606"/>
+          <ac:spMkLst>
+            <pc:docMk/>
+            <pc:sldMk cId="2289153986" sldId="280"/>
+            <ac:spMk id="39" creationId="{98E79BE4-34FE-485A-98A5-92CE8F7C4743}"/>
+          </ac:spMkLst>
+        </pc:spChg>
+        <pc:spChg chg="add del">
+          <ac:chgData name="NGUYỄN BẢO LONG" userId="156f7280-0c23-4eda-9828-bb67a3ec36e5" providerId="ADAL" clId="{F036155E-A26E-8E46-BB9B-0319A147988A}" dt="2021-07-02T03:02:57.319" v="5228" actId="26606"/>
+          <ac:spMkLst>
+            <pc:docMk/>
+            <pc:sldMk cId="2289153986" sldId="280"/>
+            <ac:spMk id="40" creationId="{7A5F0580-5EE9-419F-96EE-B6529EF6E7D0}"/>
+          </ac:spMkLst>
+        </pc:spChg>
+        <pc:spChg chg="add del">
+          <ac:chgData name="NGUYỄN BẢO LONG" userId="156f7280-0c23-4eda-9828-bb67a3ec36e5" providerId="ADAL" clId="{F036155E-A26E-8E46-BB9B-0319A147988A}" dt="2021-07-02T03:03:04.665" v="5232" actId="26606"/>
+          <ac:spMkLst>
+            <pc:docMk/>
+            <pc:sldMk cId="2289153986" sldId="280"/>
+            <ac:spMk id="42" creationId="{1ECAB1E8-8195-4748-BE71-FF806D86892E}"/>
+          </ac:spMkLst>
+        </pc:spChg>
+        <pc:spChg chg="add del">
+          <ac:chgData name="NGUYỄN BẢO LONG" userId="156f7280-0c23-4eda-9828-bb67a3ec36e5" providerId="ADAL" clId="{F036155E-A26E-8E46-BB9B-0319A147988A}" dt="2021-07-02T03:03:04.665" v="5232" actId="26606"/>
+          <ac:spMkLst>
+            <pc:docMk/>
+            <pc:sldMk cId="2289153986" sldId="280"/>
+            <ac:spMk id="43" creationId="{57F6BDD4-E066-4008-8011-6CC31AEB4556}"/>
+          </ac:spMkLst>
+        </pc:spChg>
+        <pc:spChg chg="add del">
+          <ac:chgData name="NGUYỄN BẢO LONG" userId="156f7280-0c23-4eda-9828-bb67a3ec36e5" providerId="ADAL" clId="{F036155E-A26E-8E46-BB9B-0319A147988A}" dt="2021-07-02T03:03:04.665" v="5232" actId="26606"/>
+          <ac:spMkLst>
+            <pc:docMk/>
+            <pc:sldMk cId="2289153986" sldId="280"/>
+            <ac:spMk id="44" creationId="{2711A8FB-68FC-45FC-B01E-38F809E2D439}"/>
+          </ac:spMkLst>
+        </pc:spChg>
+        <pc:spChg chg="add del">
+          <ac:chgData name="NGUYỄN BẢO LONG" userId="156f7280-0c23-4eda-9828-bb67a3ec36e5" providerId="ADAL" clId="{F036155E-A26E-8E46-BB9B-0319A147988A}" dt="2021-07-02T03:03:04.665" v="5232" actId="26606"/>
+          <ac:spMkLst>
+            <pc:docMk/>
+            <pc:sldMk cId="2289153986" sldId="280"/>
+            <ac:spMk id="45" creationId="{2A865FE3-5FC9-4049-87CF-30019C46C0F5}"/>
+          </ac:spMkLst>
+        </pc:spChg>
+        <pc:picChg chg="add mod">
+          <ac:chgData name="NGUYỄN BẢO LONG" userId="156f7280-0c23-4eda-9828-bb67a3ec36e5" providerId="ADAL" clId="{F036155E-A26E-8E46-BB9B-0319A147988A}" dt="2021-07-02T03:03:04.665" v="5232" actId="26606"/>
+          <ac:picMkLst>
+            <pc:docMk/>
+            <pc:sldMk cId="2289153986" sldId="280"/>
+            <ac:picMk id="5" creationId="{BF76CFDE-57D4-CB48-9F4E-891CB9537B0F}"/>
+          </ac:picMkLst>
+        </pc:picChg>
+      </pc:sldChg>
+      <pc:sldChg chg="new del">
+        <pc:chgData name="NGUYỄN BẢO LONG" userId="156f7280-0c23-4eda-9828-bb67a3ec36e5" providerId="ADAL" clId="{F036155E-A26E-8E46-BB9B-0319A147988A}" dt="2021-07-02T03:07:29.789" v="5461" actId="2696"/>
+        <pc:sldMkLst>
+          <pc:docMk/>
+          <pc:sldMk cId="3755154351" sldId="281"/>
+        </pc:sldMkLst>
+      </pc:sldChg>
+      <pc:sldChg chg="delSp modSp add mod modNotesTx">
+        <pc:chgData name="NGUYỄN BẢO LONG" userId="156f7280-0c23-4eda-9828-bb67a3ec36e5" providerId="ADAL" clId="{F036155E-A26E-8E46-BB9B-0319A147988A}" dt="2021-07-02T08:02:58.413" v="5494" actId="478"/>
+        <pc:sldMkLst>
+          <pc:docMk/>
+          <pc:sldMk cId="4256298490" sldId="281"/>
+        </pc:sldMkLst>
+        <pc:spChg chg="mod">
+          <ac:chgData name="NGUYỄN BẢO LONG" userId="156f7280-0c23-4eda-9828-bb67a3ec36e5" providerId="ADAL" clId="{F036155E-A26E-8E46-BB9B-0319A147988A}" dt="2021-07-02T03:09:11.104" v="5485" actId="20577"/>
+          <ac:spMkLst>
+            <pc:docMk/>
+            <pc:sldMk cId="4256298490" sldId="281"/>
+            <ac:spMk id="2" creationId="{37AE4411-9454-7945-AA17-0D5F274B1E1C}"/>
+          </ac:spMkLst>
+        </pc:spChg>
+        <pc:spChg chg="mod">
+          <ac:chgData name="NGUYỄN BẢO LONG" userId="156f7280-0c23-4eda-9828-bb67a3ec36e5" providerId="ADAL" clId="{F036155E-A26E-8E46-BB9B-0319A147988A}" dt="2021-07-02T08:02:56.959" v="5493" actId="20577"/>
+          <ac:spMkLst>
+            <pc:docMk/>
+            <pc:sldMk cId="4256298490" sldId="281"/>
+            <ac:spMk id="3" creationId="{1F707462-72B9-E94F-AE0F-C78BC243524C}"/>
+          </ac:spMkLst>
+        </pc:spChg>
+        <pc:picChg chg="del">
+          <ac:chgData name="NGUYỄN BẢO LONG" userId="156f7280-0c23-4eda-9828-bb67a3ec36e5" providerId="ADAL" clId="{F036155E-A26E-8E46-BB9B-0319A147988A}" dt="2021-07-02T08:02:58.413" v="5494" actId="478"/>
+          <ac:picMkLst>
+            <pc:docMk/>
+            <pc:sldMk cId="4256298490" sldId="281"/>
+            <ac:picMk id="7" creationId="{24456DEB-B643-1C41-B3A9-D2EAA6817C84}"/>
+          </ac:picMkLst>
+        </pc:picChg>
+      </pc:sldChg>
+      <pc:sldChg chg="add del">
+        <pc:chgData name="NGUYỄN BẢO LONG" userId="156f7280-0c23-4eda-9828-bb67a3ec36e5" providerId="ADAL" clId="{F036155E-A26E-8E46-BB9B-0319A147988A}" dt="2021-07-02T03:11:48.213" v="5491" actId="2696"/>
+        <pc:sldMkLst>
+          <pc:docMk/>
+          <pc:sldMk cId="199519311" sldId="282"/>
+        </pc:sldMkLst>
       </pc:sldChg>
     </pc:docChg>
   </pc:docChgLst>
@@ -831,7 +1205,7 @@
           <a:p>
             <a:fld id="{27B9B13B-C1A0-FC4E-9BC2-CBAAD45B1A60}" type="datetimeFigureOut">
               <a:rPr lang="en-VN" smtClean="0"/>
-              <a:t>6/30/21</a:t>
+              <a:t>7/2/21</a:t>
             </a:fld>
             <a:endParaRPr lang="en-VN"/>
           </a:p>
@@ -2324,7 +2698,60 @@
           <a:bodyPr/>
           <a:lstStyle/>
           <a:p>
-            <a:endParaRPr lang="en-VN" dirty="0"/>
+            <a:pPr marL="171450" indent="-171450">
+              <a:buFontTx/>
+              <a:buChar char="-"/>
+            </a:pPr>
+            <a:r>
+              <a:rPr lang="en-US" dirty="0"/>
+              <a:t>Q</a:t>
+            </a:r>
+            <a:r>
+              <a:rPr lang="en-VN" dirty="0"/>
+              <a:t>uy trình</a:t>
+            </a:r>
+          </a:p>
+          <a:p>
+            <a:pPr marL="628650" lvl="1" indent="-171450">
+              <a:buFontTx/>
+              <a:buChar char="-"/>
+            </a:pPr>
+            <a:r>
+              <a:rPr lang="en-VN" dirty="0"/>
+              <a:t>Các frame output của LSTM lần lượt được </a:t>
+            </a:r>
+            <a:r>
+              <a:rPr lang="en-US" dirty="0"/>
+              <a:t>concatenated </a:t>
+            </a:r>
+            <a:r>
+              <a:rPr lang="en-US" dirty="0" err="1"/>
+              <a:t>với</a:t>
+            </a:r>
+            <a:r>
+              <a:rPr lang="en-US" dirty="0"/>
+              <a:t> speaker embedding</a:t>
+            </a:r>
+          </a:p>
+          <a:p>
+            <a:pPr marL="628650" lvl="1" indent="-171450">
+              <a:buFontTx/>
+              <a:buChar char="-"/>
+            </a:pPr>
+            <a:r>
+              <a:rPr lang="en-VN" dirty="0"/>
+              <a:t>Sau đó được đưa vào một mạng Location Sensitive Attention (thực chất là mạng fully connected)</a:t>
+            </a:r>
+          </a:p>
+          <a:p>
+            <a:pPr marL="628650" lvl="1" indent="-171450">
+              <a:buFontTx/>
+              <a:buChar char="-"/>
+            </a:pPr>
+            <a:r>
+              <a:rPr lang="en-VN" dirty="0"/>
+              <a:t>Kiến trúc: bao gồm 2 lớp, 1 lớp Dense và 1 lớp softmax</a:t>
+            </a:r>
           </a:p>
         </p:txBody>
       </p:sp>
@@ -2408,7 +2835,10 @@
           <a:bodyPr/>
           <a:lstStyle/>
           <a:p>
-            <a:endParaRPr lang="en-VN" dirty="0"/>
+            <a:r>
+              <a:rPr lang="en-VN" dirty="0"/>
+              <a:t>- o’_i được tạo thành từ các giá trị o_i concate với speaker embedding</a:t>
+            </a:r>
           </a:p>
         </p:txBody>
       </p:sp>
@@ -2439,6 +2869,90 @@
     <p:extLst>
       <p:ext uri="{BB962C8B-B14F-4D97-AF65-F5344CB8AC3E}">
         <p14:creationId xmlns:p14="http://schemas.microsoft.com/office/powerpoint/2010/main" val="1819114452"/>
+      </p:ext>
+    </p:extLst>
+  </p:cSld>
+  <p:clrMapOvr>
+    <a:masterClrMapping/>
+  </p:clrMapOvr>
+</p:notes>
+</file>
+
+<file path=ppt/notesSlides/notesSlide17.xml><?xml version="1.0" encoding="utf-8"?>
+<p:notes xmlns:a="http://schemas.openxmlformats.org/drawingml/2006/main" xmlns:r="http://schemas.openxmlformats.org/officeDocument/2006/relationships" xmlns:p="http://schemas.openxmlformats.org/presentationml/2006/main">
+  <p:cSld>
+    <p:spTree>
+      <p:nvGrpSpPr>
+        <p:cNvPr id="1" name=""/>
+        <p:cNvGrpSpPr/>
+        <p:nvPr/>
+      </p:nvGrpSpPr>
+      <p:grpSpPr>
+        <a:xfrm>
+          <a:off x="0" y="0"/>
+          <a:ext cx="0" cy="0"/>
+          <a:chOff x="0" y="0"/>
+          <a:chExt cx="0" cy="0"/>
+        </a:xfrm>
+      </p:grpSpPr>
+      <p:sp>
+        <p:nvSpPr>
+          <p:cNvPr id="2" name="Slide Image Placeholder 1"/>
+          <p:cNvSpPr>
+            <a:spLocks noGrp="1" noRot="1" noChangeAspect="1"/>
+          </p:cNvSpPr>
+          <p:nvPr>
+            <p:ph type="sldImg"/>
+          </p:nvPr>
+        </p:nvSpPr>
+        <p:spPr/>
+      </p:sp>
+      <p:sp>
+        <p:nvSpPr>
+          <p:cNvPr id="3" name="Notes Placeholder 2"/>
+          <p:cNvSpPr>
+            <a:spLocks noGrp="1"/>
+          </p:cNvSpPr>
+          <p:nvPr>
+            <p:ph type="body" idx="1"/>
+          </p:nvPr>
+        </p:nvSpPr>
+        <p:spPr/>
+        <p:txBody>
+          <a:bodyPr/>
+          <a:lstStyle/>
+          <a:p>
+            <a:endParaRPr lang="en-VN" dirty="0"/>
+          </a:p>
+        </p:txBody>
+      </p:sp>
+      <p:sp>
+        <p:nvSpPr>
+          <p:cNvPr id="4" name="Slide Number Placeholder 3"/>
+          <p:cNvSpPr>
+            <a:spLocks noGrp="1"/>
+          </p:cNvSpPr>
+          <p:nvPr>
+            <p:ph type="sldNum" sz="quarter" idx="5"/>
+          </p:nvPr>
+        </p:nvSpPr>
+        <p:spPr/>
+        <p:txBody>
+          <a:bodyPr/>
+          <a:lstStyle/>
+          <a:p>
+            <a:fld id="{AE01A4AD-3912-D14D-ABF4-A3E15A5DC8AA}" type="slidenum">
+              <a:rPr lang="en-VN" smtClean="0"/>
+              <a:t>20</a:t>
+            </a:fld>
+            <a:endParaRPr lang="en-VN"/>
+          </a:p>
+        </p:txBody>
+      </p:sp>
+    </p:spTree>
+    <p:extLst>
+      <p:ext uri="{BB962C8B-B14F-4D97-AF65-F5344CB8AC3E}">
+        <p14:creationId xmlns:p14="http://schemas.microsoft.com/office/powerpoint/2010/main" val="3644830567"/>
       </p:ext>
     </p:extLst>
   </p:cSld>
@@ -3533,7 +4047,7 @@
           <a:p>
             <a:fld id="{02AC24A9-CCB6-4F8D-B8DB-C2F3692CFA5A}" type="datetimeFigureOut">
               <a:rPr lang="en-US" smtClean="0"/>
-              <a:t>6/30/21</a:t>
+              <a:t>7/2/21</a:t>
             </a:fld>
             <a:endParaRPr lang="en-US" dirty="0"/>
           </a:p>
@@ -3903,7 +4417,7 @@
           <a:p>
             <a:fld id="{02AC24A9-CCB6-4F8D-B8DB-C2F3692CFA5A}" type="datetimeFigureOut">
               <a:rPr lang="en-US" smtClean="0"/>
-              <a:t>6/30/21</a:t>
+              <a:t>7/2/21</a:t>
             </a:fld>
             <a:endParaRPr lang="en-US"/>
           </a:p>
@@ -4112,7 +4626,7 @@
           <a:p>
             <a:fld id="{02AC24A9-CCB6-4F8D-B8DB-C2F3692CFA5A}" type="datetimeFigureOut">
               <a:rPr lang="en-US" smtClean="0"/>
-              <a:t>6/30/21</a:t>
+              <a:t>7/2/21</a:t>
             </a:fld>
             <a:endParaRPr lang="en-US"/>
           </a:p>
@@ -4582,7 +5096,7 @@
           <a:p>
             <a:fld id="{02AC24A9-CCB6-4F8D-B8DB-C2F3692CFA5A}" type="datetimeFigureOut">
               <a:rPr lang="en-US" smtClean="0"/>
-              <a:t>6/30/21</a:t>
+              <a:t>7/2/21</a:t>
             </a:fld>
             <a:endParaRPr lang="en-US"/>
           </a:p>
@@ -5036,7 +5550,7 @@
           <a:p>
             <a:fld id="{02AC24A9-CCB6-4F8D-B8DB-C2F3692CFA5A}" type="datetimeFigureOut">
               <a:rPr lang="en-US" smtClean="0"/>
-              <a:t>6/30/21</a:t>
+              <a:t>7/2/21</a:t>
             </a:fld>
             <a:endParaRPr lang="en-US"/>
           </a:p>
@@ -5568,7 +6082,7 @@
           <a:p>
             <a:fld id="{02AC24A9-CCB6-4F8D-B8DB-C2F3692CFA5A}" type="datetimeFigureOut">
               <a:rPr lang="en-US" smtClean="0"/>
-              <a:t>6/30/21</a:t>
+              <a:t>7/2/21</a:t>
             </a:fld>
             <a:endParaRPr lang="en-US"/>
           </a:p>
@@ -6267,7 +6781,7 @@
           <a:p>
             <a:fld id="{02AC24A9-CCB6-4F8D-B8DB-C2F3692CFA5A}" type="datetimeFigureOut">
               <a:rPr lang="en-US" smtClean="0"/>
-              <a:t>6/30/21</a:t>
+              <a:t>7/2/21</a:t>
             </a:fld>
             <a:endParaRPr lang="en-US"/>
           </a:p>
@@ -6596,7 +7110,7 @@
           <a:p>
             <a:fld id="{02AC24A9-CCB6-4F8D-B8DB-C2F3692CFA5A}" type="datetimeFigureOut">
               <a:rPr lang="en-US" smtClean="0"/>
-              <a:t>6/30/21</a:t>
+              <a:t>7/2/21</a:t>
             </a:fld>
             <a:endParaRPr lang="en-US"/>
           </a:p>
@@ -6709,7 +7223,7 @@
           <a:p>
             <a:fld id="{02AC24A9-CCB6-4F8D-B8DB-C2F3692CFA5A}" type="datetimeFigureOut">
               <a:rPr lang="en-US" smtClean="0"/>
-              <a:t>6/30/21</a:t>
+              <a:t>7/2/21</a:t>
             </a:fld>
             <a:endParaRPr lang="en-US"/>
           </a:p>
@@ -7204,7 +7718,7 @@
           <a:p>
             <a:fld id="{02AC24A9-CCB6-4F8D-B8DB-C2F3692CFA5A}" type="datetimeFigureOut">
               <a:rPr lang="en-US" smtClean="0"/>
-              <a:t>6/30/21</a:t>
+              <a:t>7/2/21</a:t>
             </a:fld>
             <a:endParaRPr lang="en-US" dirty="0"/>
           </a:p>
@@ -7681,7 +8195,7 @@
           <a:p>
             <a:fld id="{02AC24A9-CCB6-4F8D-B8DB-C2F3692CFA5A}" type="datetimeFigureOut">
               <a:rPr lang="en-US" smtClean="0"/>
-              <a:t>6/30/21</a:t>
+              <a:t>7/2/21</a:t>
             </a:fld>
             <a:endParaRPr lang="en-US"/>
           </a:p>
@@ -7924,7 +8438,7 @@
           <a:p>
             <a:fld id="{02AC24A9-CCB6-4F8D-B8DB-C2F3692CFA5A}" type="datetimeFigureOut">
               <a:rPr lang="en-US" smtClean="0"/>
-              <a:t>6/30/21</a:t>
+              <a:t>7/2/21</a:t>
             </a:fld>
             <a:endParaRPr lang="en-US"/>
           </a:p>
@@ -11501,10 +12015,10 @@
       </p:grpSpPr>
       <p:sp useBgFill="1">
         <p:nvSpPr>
-          <p:cNvPr id="15" name="Rectangle 14">
+          <p:cNvPr id="24" name="Rectangle 23">
             <a:extLst>
               <a:ext uri="{FF2B5EF4-FFF2-40B4-BE49-F238E27FC236}">
-                <a16:creationId xmlns:a16="http://schemas.microsoft.com/office/drawing/2014/main" id="{92468898-5A6E-4D55-85EC-308E785EE06C}"/>
+                <a16:creationId xmlns:a16="http://schemas.microsoft.com/office/drawing/2014/main" id="{84ECDE7A-6944-466D-8FFE-149A29BA6BAE}"/>
               </a:ext>
               <a:ext uri="{C183D7F6-B498-43B3-948B-1728B52AA6E4}">
                 <adec:decorative xmlns:adec="http://schemas.microsoft.com/office/drawing/2017/decorative" val="1"/>
@@ -11559,987 +12073,9 @@
           </a:p>
         </p:txBody>
       </p:sp>
-      <p:sp>
-        <p:nvSpPr>
-          <p:cNvPr id="2" name="Title 1">
-            <a:extLst>
-              <a:ext uri="{FF2B5EF4-FFF2-40B4-BE49-F238E27FC236}">
-                <a16:creationId xmlns:a16="http://schemas.microsoft.com/office/drawing/2014/main" id="{57742997-3E17-1948-8896-642465234691}"/>
-              </a:ext>
-            </a:extLst>
-          </p:cNvPr>
-          <p:cNvSpPr>
-            <a:spLocks noGrp="1"/>
-          </p:cNvSpPr>
-          <p:nvPr>
-            <p:ph type="title"/>
-          </p:nvPr>
-        </p:nvSpPr>
-        <p:spPr>
-          <a:xfrm>
-            <a:off x="429768" y="411480"/>
-            <a:ext cx="11201400" cy="1106424"/>
-          </a:xfrm>
-        </p:spPr>
-        <p:txBody>
-          <a:bodyPr>
-            <a:normAutofit/>
-          </a:bodyPr>
-          <a:lstStyle/>
-          <a:p>
-            <a:r>
-              <a:rPr lang="en-US" sz="3600" dirty="0">
-                <a:latin typeface="Calibri" panose="020F0502020204030204" pitchFamily="34" charset="0"/>
-                <a:cs typeface="Calibri" panose="020F0502020204030204" pitchFamily="34" charset="0"/>
-              </a:rPr>
-              <a:t>Chi </a:t>
-            </a:r>
-            <a:r>
-              <a:rPr lang="en-US" sz="3600" dirty="0" err="1">
-                <a:latin typeface="Calibri" panose="020F0502020204030204" pitchFamily="34" charset="0"/>
-                <a:cs typeface="Calibri" panose="020F0502020204030204" pitchFamily="34" charset="0"/>
-              </a:rPr>
-              <a:t>tiết</a:t>
-            </a:r>
-            <a:r>
-              <a:rPr lang="en-US" sz="3600" dirty="0">
-                <a:latin typeface="Calibri" panose="020F0502020204030204" pitchFamily="34" charset="0"/>
-                <a:cs typeface="Calibri" panose="020F0502020204030204" pitchFamily="34" charset="0"/>
-              </a:rPr>
-              <a:t> SV2TTS – Speaker Encoder (3)</a:t>
-            </a:r>
-            <a:endParaRPr lang="en-VN" sz="3600" dirty="0">
-              <a:latin typeface="Calibri" panose="020F0502020204030204" pitchFamily="34" charset="0"/>
-              <a:cs typeface="Calibri" panose="020F0502020204030204" pitchFamily="34" charset="0"/>
-            </a:endParaRPr>
-          </a:p>
-        </p:txBody>
-      </p:sp>
-      <p:sp>
-        <p:nvSpPr>
-          <p:cNvPr id="17" name="Rectangle 16">
-            <a:extLst>
-              <a:ext uri="{FF2B5EF4-FFF2-40B4-BE49-F238E27FC236}">
-                <a16:creationId xmlns:a16="http://schemas.microsoft.com/office/drawing/2014/main" id="{3E23A947-2D45-4208-AE2B-64948C87A3EB}"/>
-              </a:ext>
-              <a:ext uri="{C183D7F6-B498-43B3-948B-1728B52AA6E4}">
-                <adec:decorative xmlns:adec="http://schemas.microsoft.com/office/drawing/2017/decorative" val="1"/>
-              </a:ext>
-            </a:extLst>
-          </p:cNvPr>
-          <p:cNvSpPr>
-            <a:spLocks noGrp="1" noRot="1" noChangeAspect="1" noMove="1" noResize="1" noEditPoints="1" noAdjustHandles="1" noChangeArrowheads="1" noChangeShapeType="1" noTextEdit="1"/>
-          </p:cNvSpPr>
-          <p:nvPr>
-            <p:extLst>
-              <p:ext uri="{386F3935-93C4-4BCD-93E2-E3B085C9AB24}">
-                <p16:designElem xmlns:p16="http://schemas.microsoft.com/office/powerpoint/2015/main" val="1"/>
-              </p:ext>
-            </p:extLst>
-          </p:nvPr>
-        </p:nvSpPr>
-        <p:spPr>
-          <a:xfrm>
-            <a:off x="0" y="598458"/>
-            <a:ext cx="128016" cy="704088"/>
-          </a:xfrm>
-          <a:prstGeom prst="rect">
-            <a:avLst/>
-          </a:prstGeom>
-          <a:solidFill>
-            <a:schemeClr val="accent1"/>
-          </a:solidFill>
-          <a:ln>
-            <a:noFill/>
-          </a:ln>
-        </p:spPr>
-        <p:style>
-          <a:lnRef idx="2">
-            <a:schemeClr val="accent1">
-              <a:shade val="50000"/>
-            </a:schemeClr>
-          </a:lnRef>
-          <a:fillRef idx="1">
-            <a:schemeClr val="accent1"/>
-          </a:fillRef>
-          <a:effectRef idx="0">
-            <a:schemeClr val="accent1"/>
-          </a:effectRef>
-          <a:fontRef idx="minor">
-            <a:schemeClr val="lt1"/>
-          </a:fontRef>
-        </p:style>
-        <p:txBody>
-          <a:bodyPr rtlCol="0" anchor="ctr"/>
-          <a:lstStyle/>
-          <a:p>
-            <a:pPr marL="0" marR="0" lvl="0" indent="0" algn="ctr" defTabSz="914400" rtl="0" eaLnBrk="1" fontAlgn="auto" latinLnBrk="0" hangingPunct="1">
-              <a:lnSpc>
-                <a:spcPct val="100000"/>
-              </a:lnSpc>
-              <a:spcBef>
-                <a:spcPts val="0"/>
-              </a:spcBef>
-              <a:spcAft>
-                <a:spcPts val="0"/>
-              </a:spcAft>
-              <a:buClrTx/>
-              <a:buSzTx/>
-              <a:buFontTx/>
-              <a:buNone/>
-              <a:tabLst/>
-              <a:defRPr/>
-            </a:pPr>
-            <a:endParaRPr kumimoji="0" lang="en-US" sz="1800" b="0" i="0" u="none" strike="noStrike" kern="1200" cap="none" spc="0" normalizeH="0" baseline="0" noProof="0">
-              <a:ln>
-                <a:noFill/>
-              </a:ln>
-              <a:solidFill>
-                <a:prstClr val="white"/>
-              </a:solidFill>
-              <a:effectLst/>
-              <a:uLnTx/>
-              <a:uFillTx/>
-              <a:latin typeface="Calibri" panose="020F0502020204030204"/>
-              <a:ea typeface="+mn-ea"/>
-              <a:cs typeface="+mn-cs"/>
-            </a:endParaRPr>
-          </a:p>
-        </p:txBody>
-      </p:sp>
-      <p:pic>
-        <p:nvPicPr>
-          <p:cNvPr id="10" name="Content Placeholder 4" descr="Diagram&#10;&#10;Description automatically generated">
-            <a:extLst>
-              <a:ext uri="{FF2B5EF4-FFF2-40B4-BE49-F238E27FC236}">
-                <a16:creationId xmlns:a16="http://schemas.microsoft.com/office/drawing/2014/main" id="{4BF3A328-3C60-2940-8572-5558BE350292}"/>
-              </a:ext>
-            </a:extLst>
-          </p:cNvPr>
-          <p:cNvPicPr>
-            <a:picLocks noChangeAspect="1"/>
-          </p:cNvPicPr>
-          <p:nvPr/>
-        </p:nvPicPr>
-        <p:blipFill>
-          <a:blip r:embed="rId3"/>
-          <a:stretch>
-            <a:fillRect/>
-          </a:stretch>
-        </p:blipFill>
-        <p:spPr>
-          <a:xfrm>
-            <a:off x="429768" y="2109304"/>
-            <a:ext cx="6702552" cy="3736672"/>
-          </a:xfrm>
-          <a:prstGeom prst="rect">
-            <a:avLst/>
-          </a:prstGeom>
-        </p:spPr>
-      </p:pic>
       <p:sp useBgFill="1">
         <p:nvSpPr>
-          <p:cNvPr id="19" name="Rectangle 18">
-            <a:extLst>
-              <a:ext uri="{FF2B5EF4-FFF2-40B4-BE49-F238E27FC236}">
-                <a16:creationId xmlns:a16="http://schemas.microsoft.com/office/drawing/2014/main" id="{E5BBB0F9-6A59-4D02-A9C7-A2D6516684CE}"/>
-              </a:ext>
-              <a:ext uri="{C183D7F6-B498-43B3-948B-1728B52AA6E4}">
-                <adec:decorative xmlns:adec="http://schemas.microsoft.com/office/drawing/2017/decorative" val="1"/>
-              </a:ext>
-            </a:extLst>
-          </p:cNvPr>
-          <p:cNvSpPr>
-            <a:spLocks noGrp="1" noRot="1" noChangeAspect="1" noMove="1" noResize="1" noEditPoints="1" noAdjustHandles="1" noChangeArrowheads="1" noChangeShapeType="1" noTextEdit="1"/>
-          </p:cNvSpPr>
-          <p:nvPr>
-            <p:extLst>
-              <p:ext uri="{386F3935-93C4-4BCD-93E2-E3B085C9AB24}">
-                <p16:designElem xmlns:p16="http://schemas.microsoft.com/office/powerpoint/2015/main" val="1"/>
-              </p:ext>
-            </p:extLst>
-          </p:nvPr>
-        </p:nvSpPr>
-        <p:spPr>
-          <a:xfrm>
-            <a:off x="7543801" y="1721922"/>
-            <a:ext cx="4218432" cy="4520560"/>
-          </a:xfrm>
-          <a:prstGeom prst="rect">
-            <a:avLst/>
-          </a:prstGeom>
-          <a:ln w="9525">
-            <a:solidFill>
-              <a:schemeClr val="tx2">
-                <a:lumMod val="10000"/>
-                <a:lumOff val="90000"/>
-              </a:schemeClr>
-            </a:solidFill>
-          </a:ln>
-          <a:effectLst>
-            <a:outerShdw blurRad="50800" dist="38100" dir="2700000" algn="tl" rotWithShape="0">
-              <a:schemeClr val="bg1">
-                <a:lumMod val="85000"/>
-                <a:alpha val="30000"/>
-              </a:schemeClr>
-            </a:outerShdw>
-          </a:effectLst>
-        </p:spPr>
-        <p:style>
-          <a:lnRef idx="2">
-            <a:schemeClr val="accent1">
-              <a:shade val="50000"/>
-            </a:schemeClr>
-          </a:lnRef>
-          <a:fillRef idx="1">
-            <a:schemeClr val="accent1"/>
-          </a:fillRef>
-          <a:effectRef idx="0">
-            <a:schemeClr val="accent1"/>
-          </a:effectRef>
-          <a:fontRef idx="minor">
-            <a:schemeClr val="lt1"/>
-          </a:fontRef>
-        </p:style>
-        <p:txBody>
-          <a:bodyPr rtlCol="0" anchor="ctr"/>
-          <a:lstStyle/>
-          <a:p>
-            <a:pPr marL="0" marR="0" lvl="0" indent="0" algn="ctr" defTabSz="914400" rtl="0" eaLnBrk="1" fontAlgn="auto" latinLnBrk="0" hangingPunct="1">
-              <a:lnSpc>
-                <a:spcPct val="100000"/>
-              </a:lnSpc>
-              <a:spcBef>
-                <a:spcPts val="0"/>
-              </a:spcBef>
-              <a:spcAft>
-                <a:spcPts val="0"/>
-              </a:spcAft>
-              <a:buClrTx/>
-              <a:buSzTx/>
-              <a:buFontTx/>
-              <a:buNone/>
-              <a:tabLst/>
-              <a:defRPr/>
-            </a:pPr>
-            <a:endParaRPr kumimoji="0" lang="en-US" sz="1800" b="0" i="0" u="none" strike="noStrike" kern="1200" cap="none" spc="0" normalizeH="0" baseline="0" noProof="0">
-              <a:ln>
-                <a:noFill/>
-              </a:ln>
-              <a:solidFill>
-                <a:prstClr val="white"/>
-              </a:solidFill>
-              <a:effectLst/>
-              <a:uLnTx/>
-              <a:uFillTx/>
-              <a:latin typeface="Calibri" panose="020F0502020204030204"/>
-              <a:ea typeface="+mn-ea"/>
-              <a:cs typeface="+mn-cs"/>
-            </a:endParaRPr>
-          </a:p>
-        </p:txBody>
-      </p:sp>
-      <p:sp>
-        <p:nvSpPr>
-          <p:cNvPr id="9" name="Content Placeholder 8">
-            <a:extLst>
-              <a:ext uri="{FF2B5EF4-FFF2-40B4-BE49-F238E27FC236}">
-                <a16:creationId xmlns:a16="http://schemas.microsoft.com/office/drawing/2014/main" id="{03F3149E-2C84-4215-87A4-F4E681406AB2}"/>
-              </a:ext>
-            </a:extLst>
-          </p:cNvPr>
-          <p:cNvSpPr>
-            <a:spLocks noGrp="1"/>
-          </p:cNvSpPr>
-          <p:nvPr>
-            <p:ph idx="1"/>
-          </p:nvPr>
-        </p:nvSpPr>
-        <p:spPr>
-          <a:xfrm>
-            <a:off x="7938752" y="2020824"/>
-            <a:ext cx="3455097" cy="3959352"/>
-          </a:xfrm>
-        </p:spPr>
-        <p:txBody>
-          <a:bodyPr anchor="ctr">
-            <a:normAutofit/>
-          </a:bodyPr>
-          <a:lstStyle/>
-          <a:p>
-            <a:pPr>
-              <a:buFont typeface="Wingdings" pitchFamily="2" charset="2"/>
-              <a:buChar char="§"/>
-            </a:pPr>
-            <a:r>
-              <a:rPr lang="en-US" sz="1700" dirty="0" err="1">
-                <a:latin typeface="Calibri" panose="020F0502020204030204" pitchFamily="34" charset="0"/>
-                <a:cs typeface="Calibri" panose="020F0502020204030204" pitchFamily="34" charset="0"/>
-              </a:rPr>
-              <a:t>Trong</a:t>
-            </a:r>
-            <a:r>
-              <a:rPr lang="en-US" sz="1700" dirty="0">
-                <a:latin typeface="Calibri" panose="020F0502020204030204" pitchFamily="34" charset="0"/>
-                <a:cs typeface="Calibri" panose="020F0502020204030204" pitchFamily="34" charset="0"/>
-              </a:rPr>
-              <a:t> </a:t>
-            </a:r>
-            <a:r>
-              <a:rPr lang="en-US" sz="1700" dirty="0" err="1">
-                <a:latin typeface="Calibri" panose="020F0502020204030204" pitchFamily="34" charset="0"/>
-                <a:cs typeface="Calibri" panose="020F0502020204030204" pitchFamily="34" charset="0"/>
-              </a:rPr>
-              <a:t>quá</a:t>
-            </a:r>
-            <a:r>
-              <a:rPr lang="en-US" sz="1700" dirty="0">
-                <a:latin typeface="Calibri" panose="020F0502020204030204" pitchFamily="34" charset="0"/>
-                <a:cs typeface="Calibri" panose="020F0502020204030204" pitchFamily="34" charset="0"/>
-              </a:rPr>
-              <a:t> </a:t>
-            </a:r>
-            <a:r>
-              <a:rPr lang="en-US" sz="1700" dirty="0" err="1">
-                <a:latin typeface="Calibri" panose="020F0502020204030204" pitchFamily="34" charset="0"/>
-                <a:cs typeface="Calibri" panose="020F0502020204030204" pitchFamily="34" charset="0"/>
-              </a:rPr>
-              <a:t>trình</a:t>
-            </a:r>
-            <a:r>
-              <a:rPr lang="en-US" sz="1700" dirty="0">
-                <a:latin typeface="Calibri" panose="020F0502020204030204" pitchFamily="34" charset="0"/>
-                <a:cs typeface="Calibri" panose="020F0502020204030204" pitchFamily="34" charset="0"/>
-              </a:rPr>
-              <a:t> </a:t>
-            </a:r>
-            <a:r>
-              <a:rPr lang="en-US" sz="1700" dirty="0" err="1">
-                <a:latin typeface="Calibri" panose="020F0502020204030204" pitchFamily="34" charset="0"/>
-                <a:cs typeface="Calibri" panose="020F0502020204030204" pitchFamily="34" charset="0"/>
-              </a:rPr>
-              <a:t>chạy</a:t>
-            </a:r>
-            <a:r>
-              <a:rPr lang="en-US" sz="1700" dirty="0">
-                <a:latin typeface="Calibri" panose="020F0502020204030204" pitchFamily="34" charset="0"/>
-                <a:cs typeface="Calibri" panose="020F0502020204030204" pitchFamily="34" charset="0"/>
-              </a:rPr>
-              <a:t> </a:t>
-            </a:r>
-            <a:r>
-              <a:rPr lang="en-US" sz="1700" dirty="0" err="1">
-                <a:latin typeface="Calibri" panose="020F0502020204030204" pitchFamily="34" charset="0"/>
-                <a:cs typeface="Calibri" panose="020F0502020204030204" pitchFamily="34" charset="0"/>
-              </a:rPr>
-              <a:t>thực</a:t>
-            </a:r>
-            <a:r>
-              <a:rPr lang="en-US" sz="1700" dirty="0">
-                <a:latin typeface="Calibri" panose="020F0502020204030204" pitchFamily="34" charset="0"/>
-                <a:cs typeface="Calibri" panose="020F0502020204030204" pitchFamily="34" charset="0"/>
-              </a:rPr>
-              <a:t> </a:t>
-            </a:r>
-            <a:r>
-              <a:rPr lang="en-US" sz="1700" dirty="0" err="1">
-                <a:latin typeface="Calibri" panose="020F0502020204030204" pitchFamily="34" charset="0"/>
-                <a:cs typeface="Calibri" panose="020F0502020204030204" pitchFamily="34" charset="0"/>
-              </a:rPr>
-              <a:t>tế</a:t>
-            </a:r>
-            <a:r>
-              <a:rPr lang="en-US" sz="1700" dirty="0">
-                <a:latin typeface="Calibri" panose="020F0502020204030204" pitchFamily="34" charset="0"/>
-                <a:cs typeface="Calibri" panose="020F0502020204030204" pitchFamily="34" charset="0"/>
-              </a:rPr>
-              <a:t>, file </a:t>
-            </a:r>
-            <a:r>
-              <a:rPr lang="en-US" sz="1700" dirty="0" err="1">
-                <a:latin typeface="Calibri" panose="020F0502020204030204" pitchFamily="34" charset="0"/>
-                <a:cs typeface="Calibri" panose="020F0502020204030204" pitchFamily="34" charset="0"/>
-              </a:rPr>
-              <a:t>âm</a:t>
-            </a:r>
-            <a:r>
-              <a:rPr lang="en-US" sz="1700" dirty="0">
-                <a:latin typeface="Calibri" panose="020F0502020204030204" pitchFamily="34" charset="0"/>
-                <a:cs typeface="Calibri" panose="020F0502020204030204" pitchFamily="34" charset="0"/>
-              </a:rPr>
-              <a:t> </a:t>
-            </a:r>
-            <a:r>
-              <a:rPr lang="en-US" sz="1700" dirty="0" err="1">
-                <a:latin typeface="Calibri" panose="020F0502020204030204" pitchFamily="34" charset="0"/>
-                <a:cs typeface="Calibri" panose="020F0502020204030204" pitchFamily="34" charset="0"/>
-              </a:rPr>
-              <a:t>thanh</a:t>
-            </a:r>
-            <a:r>
-              <a:rPr lang="en-US" sz="1700" dirty="0">
-                <a:latin typeface="Calibri" panose="020F0502020204030204" pitchFamily="34" charset="0"/>
-                <a:cs typeface="Calibri" panose="020F0502020204030204" pitchFamily="34" charset="0"/>
-              </a:rPr>
-              <a:t> input </a:t>
-            </a:r>
-            <a:r>
-              <a:rPr lang="en-US" sz="1700" dirty="0" err="1">
-                <a:latin typeface="Calibri" panose="020F0502020204030204" pitchFamily="34" charset="0"/>
-                <a:cs typeface="Calibri" panose="020F0502020204030204" pitchFamily="34" charset="0"/>
-              </a:rPr>
-              <a:t>được</a:t>
-            </a:r>
-            <a:r>
-              <a:rPr lang="en-US" sz="1700" dirty="0">
-                <a:latin typeface="Calibri" panose="020F0502020204030204" pitchFamily="34" charset="0"/>
-                <a:cs typeface="Calibri" panose="020F0502020204030204" pitchFamily="34" charset="0"/>
-              </a:rPr>
-              <a:t> </a:t>
-            </a:r>
-            <a:r>
-              <a:rPr lang="en-US" sz="1700" dirty="0" err="1">
-                <a:latin typeface="Calibri" panose="020F0502020204030204" pitchFamily="34" charset="0"/>
-                <a:cs typeface="Calibri" panose="020F0502020204030204" pitchFamily="34" charset="0"/>
-              </a:rPr>
-              <a:t>cắt</a:t>
-            </a:r>
-            <a:r>
-              <a:rPr lang="en-US" sz="1700" dirty="0">
-                <a:latin typeface="Calibri" panose="020F0502020204030204" pitchFamily="34" charset="0"/>
-                <a:cs typeface="Calibri" panose="020F0502020204030204" pitchFamily="34" charset="0"/>
-              </a:rPr>
-              <a:t> </a:t>
-            </a:r>
-            <a:r>
-              <a:rPr lang="en-US" sz="1700" dirty="0" err="1">
-                <a:latin typeface="Calibri" panose="020F0502020204030204" pitchFamily="34" charset="0"/>
-                <a:cs typeface="Calibri" panose="020F0502020204030204" pitchFamily="34" charset="0"/>
-              </a:rPr>
-              <a:t>thành</a:t>
-            </a:r>
-            <a:r>
-              <a:rPr lang="en-US" sz="1700" dirty="0">
-                <a:latin typeface="Calibri" panose="020F0502020204030204" pitchFamily="34" charset="0"/>
-                <a:cs typeface="Calibri" panose="020F0502020204030204" pitchFamily="34" charset="0"/>
-              </a:rPr>
-              <a:t> </a:t>
-            </a:r>
-            <a:r>
-              <a:rPr lang="en-US" sz="1700" dirty="0" err="1">
-                <a:latin typeface="Calibri" panose="020F0502020204030204" pitchFamily="34" charset="0"/>
-                <a:cs typeface="Calibri" panose="020F0502020204030204" pitchFamily="34" charset="0"/>
-              </a:rPr>
-              <a:t>các</a:t>
-            </a:r>
-            <a:r>
-              <a:rPr lang="en-US" sz="1700" dirty="0">
-                <a:latin typeface="Calibri" panose="020F0502020204030204" pitchFamily="34" charset="0"/>
-                <a:cs typeface="Calibri" panose="020F0502020204030204" pitchFamily="34" charset="0"/>
-              </a:rPr>
-              <a:t> segment 1.6s, stride = 50% </a:t>
-            </a:r>
-            <a:r>
-              <a:rPr lang="en-US" sz="1700" dirty="0" err="1">
-                <a:latin typeface="Calibri" panose="020F0502020204030204" pitchFamily="34" charset="0"/>
-                <a:cs typeface="Calibri" panose="020F0502020204030204" pitchFamily="34" charset="0"/>
-              </a:rPr>
-              <a:t>để</a:t>
-            </a:r>
-            <a:r>
-              <a:rPr lang="en-US" sz="1700" dirty="0">
-                <a:latin typeface="Calibri" panose="020F0502020204030204" pitchFamily="34" charset="0"/>
-                <a:cs typeface="Calibri" panose="020F0502020204030204" pitchFamily="34" charset="0"/>
-              </a:rPr>
-              <a:t> </a:t>
-            </a:r>
-            <a:r>
-              <a:rPr lang="en-US" sz="1700" dirty="0" err="1">
-                <a:latin typeface="Calibri" panose="020F0502020204030204" pitchFamily="34" charset="0"/>
-                <a:cs typeface="Calibri" panose="020F0502020204030204" pitchFamily="34" charset="0"/>
-              </a:rPr>
-              <a:t>đưa</a:t>
-            </a:r>
-            <a:r>
-              <a:rPr lang="en-US" sz="1700" dirty="0">
-                <a:latin typeface="Calibri" panose="020F0502020204030204" pitchFamily="34" charset="0"/>
-                <a:cs typeface="Calibri" panose="020F0502020204030204" pitchFamily="34" charset="0"/>
-              </a:rPr>
-              <a:t> </a:t>
-            </a:r>
-            <a:r>
-              <a:rPr lang="en-US" sz="1700" dirty="0" err="1">
-                <a:latin typeface="Calibri" panose="020F0502020204030204" pitchFamily="34" charset="0"/>
-                <a:cs typeface="Calibri" panose="020F0502020204030204" pitchFamily="34" charset="0"/>
-              </a:rPr>
-              <a:t>vào</a:t>
-            </a:r>
-            <a:r>
-              <a:rPr lang="en-US" sz="1700" dirty="0">
-                <a:latin typeface="Calibri" panose="020F0502020204030204" pitchFamily="34" charset="0"/>
-                <a:cs typeface="Calibri" panose="020F0502020204030204" pitchFamily="34" charset="0"/>
-              </a:rPr>
-              <a:t> model LSTM</a:t>
-            </a:r>
-          </a:p>
-          <a:p>
-            <a:pPr>
-              <a:buFont typeface="Wingdings" pitchFamily="2" charset="2"/>
-              <a:buChar char="§"/>
-            </a:pPr>
-            <a:r>
-              <a:rPr lang="en-US" sz="1700" dirty="0" err="1">
-                <a:latin typeface="Calibri" panose="020F0502020204030204" pitchFamily="34" charset="0"/>
-                <a:cs typeface="Calibri" panose="020F0502020204030204" pitchFamily="34" charset="0"/>
-              </a:rPr>
-              <a:t>Chuẩn</a:t>
-            </a:r>
-            <a:r>
-              <a:rPr lang="en-US" sz="1700" dirty="0">
-                <a:latin typeface="Calibri" panose="020F0502020204030204" pitchFamily="34" charset="0"/>
-                <a:cs typeface="Calibri" panose="020F0502020204030204" pitchFamily="34" charset="0"/>
-              </a:rPr>
-              <a:t> </a:t>
-            </a:r>
-            <a:r>
-              <a:rPr lang="en-US" sz="1700" dirty="0" err="1">
-                <a:latin typeface="Calibri" panose="020F0502020204030204" pitchFamily="34" charset="0"/>
-                <a:cs typeface="Calibri" panose="020F0502020204030204" pitchFamily="34" charset="0"/>
-              </a:rPr>
-              <a:t>hóa</a:t>
-            </a:r>
-            <a:r>
-              <a:rPr lang="en-US" sz="1700" dirty="0">
-                <a:latin typeface="Calibri" panose="020F0502020204030204" pitchFamily="34" charset="0"/>
-                <a:cs typeface="Calibri" panose="020F0502020204030204" pitchFamily="34" charset="0"/>
-              </a:rPr>
-              <a:t> </a:t>
-            </a:r>
-            <a:r>
-              <a:rPr lang="en-US" sz="1700" dirty="0" err="1">
-                <a:latin typeface="Calibri" panose="020F0502020204030204" pitchFamily="34" charset="0"/>
-                <a:cs typeface="Calibri" panose="020F0502020204030204" pitchFamily="34" charset="0"/>
-              </a:rPr>
-              <a:t>các</a:t>
-            </a:r>
-            <a:r>
-              <a:rPr lang="en-US" sz="1700" dirty="0">
-                <a:latin typeface="Calibri" panose="020F0502020204030204" pitchFamily="34" charset="0"/>
-                <a:cs typeface="Calibri" panose="020F0502020204030204" pitchFamily="34" charset="0"/>
-              </a:rPr>
-              <a:t> output </a:t>
-            </a:r>
-            <a:r>
-              <a:rPr lang="en-US" sz="1700" dirty="0" err="1">
-                <a:latin typeface="Calibri" panose="020F0502020204030204" pitchFamily="34" charset="0"/>
-                <a:cs typeface="Calibri" panose="020F0502020204030204" pitchFamily="34" charset="0"/>
-              </a:rPr>
-              <a:t>rồi</a:t>
-            </a:r>
-            <a:r>
-              <a:rPr lang="en-US" sz="1700" dirty="0">
-                <a:latin typeface="Calibri" panose="020F0502020204030204" pitchFamily="34" charset="0"/>
-                <a:cs typeface="Calibri" panose="020F0502020204030204" pitchFamily="34" charset="0"/>
-              </a:rPr>
-              <a:t> </a:t>
-            </a:r>
-            <a:r>
-              <a:rPr lang="en-US" sz="1700" dirty="0" err="1">
-                <a:latin typeface="Calibri" panose="020F0502020204030204" pitchFamily="34" charset="0"/>
-                <a:cs typeface="Calibri" panose="020F0502020204030204" pitchFamily="34" charset="0"/>
-              </a:rPr>
-              <a:t>lấy</a:t>
-            </a:r>
-            <a:r>
-              <a:rPr lang="en-US" sz="1700" dirty="0">
-                <a:latin typeface="Calibri" panose="020F0502020204030204" pitchFamily="34" charset="0"/>
-                <a:cs typeface="Calibri" panose="020F0502020204030204" pitchFamily="34" charset="0"/>
-              </a:rPr>
-              <a:t> </a:t>
-            </a:r>
-            <a:r>
-              <a:rPr lang="en-US" sz="1700" dirty="0" err="1">
-                <a:latin typeface="Calibri" panose="020F0502020204030204" pitchFamily="34" charset="0"/>
-                <a:cs typeface="Calibri" panose="020F0502020204030204" pitchFamily="34" charset="0"/>
-              </a:rPr>
-              <a:t>trung</a:t>
-            </a:r>
-            <a:r>
-              <a:rPr lang="en-US" sz="1700" dirty="0">
-                <a:latin typeface="Calibri" panose="020F0502020204030204" pitchFamily="34" charset="0"/>
-                <a:cs typeface="Calibri" panose="020F0502020204030204" pitchFamily="34" charset="0"/>
-              </a:rPr>
-              <a:t> </a:t>
-            </a:r>
-            <a:r>
-              <a:rPr lang="en-US" sz="1700" dirty="0" err="1">
-                <a:latin typeface="Calibri" panose="020F0502020204030204" pitchFamily="34" charset="0"/>
-                <a:cs typeface="Calibri" panose="020F0502020204030204" pitchFamily="34" charset="0"/>
-              </a:rPr>
-              <a:t>bình</a:t>
-            </a:r>
-            <a:r>
-              <a:rPr lang="en-US" sz="1700" dirty="0">
-                <a:latin typeface="Calibri" panose="020F0502020204030204" pitchFamily="34" charset="0"/>
-                <a:cs typeface="Calibri" panose="020F0502020204030204" pitchFamily="34" charset="0"/>
-              </a:rPr>
-              <a:t> </a:t>
-            </a:r>
-            <a:r>
-              <a:rPr lang="en-US" sz="1700" dirty="0" err="1">
-                <a:latin typeface="Calibri" panose="020F0502020204030204" pitchFamily="34" charset="0"/>
-                <a:cs typeface="Calibri" panose="020F0502020204030204" pitchFamily="34" charset="0"/>
-              </a:rPr>
-              <a:t>cộng</a:t>
-            </a:r>
-            <a:r>
-              <a:rPr lang="en-US" sz="1700" dirty="0">
-                <a:latin typeface="Calibri" panose="020F0502020204030204" pitchFamily="34" charset="0"/>
-                <a:cs typeface="Calibri" panose="020F0502020204030204" pitchFamily="34" charset="0"/>
-              </a:rPr>
-              <a:t>, ta </a:t>
-            </a:r>
-            <a:r>
-              <a:rPr lang="en-US" sz="1700" dirty="0" err="1">
-                <a:latin typeface="Calibri" panose="020F0502020204030204" pitchFamily="34" charset="0"/>
-                <a:cs typeface="Calibri" panose="020F0502020204030204" pitchFamily="34" charset="0"/>
-              </a:rPr>
-              <a:t>thu</a:t>
-            </a:r>
-            <a:r>
-              <a:rPr lang="en-US" sz="1700" dirty="0">
-                <a:latin typeface="Calibri" panose="020F0502020204030204" pitchFamily="34" charset="0"/>
-                <a:cs typeface="Calibri" panose="020F0502020204030204" pitchFamily="34" charset="0"/>
-              </a:rPr>
-              <a:t> </a:t>
-            </a:r>
-            <a:r>
-              <a:rPr lang="en-US" sz="1700" dirty="0" err="1">
-                <a:latin typeface="Calibri" panose="020F0502020204030204" pitchFamily="34" charset="0"/>
-                <a:cs typeface="Calibri" panose="020F0502020204030204" pitchFamily="34" charset="0"/>
-              </a:rPr>
-              <a:t>được</a:t>
-            </a:r>
-            <a:r>
-              <a:rPr lang="en-US" sz="1700" dirty="0">
-                <a:latin typeface="Calibri" panose="020F0502020204030204" pitchFamily="34" charset="0"/>
-                <a:cs typeface="Calibri" panose="020F0502020204030204" pitchFamily="34" charset="0"/>
-              </a:rPr>
-              <a:t> embedding </a:t>
-            </a:r>
-            <a:r>
-              <a:rPr lang="en-US" sz="1700" dirty="0" err="1">
-                <a:latin typeface="Calibri" panose="020F0502020204030204" pitchFamily="34" charset="0"/>
-                <a:cs typeface="Calibri" panose="020F0502020204030204" pitchFamily="34" charset="0"/>
-              </a:rPr>
-              <a:t>của</a:t>
-            </a:r>
-            <a:r>
-              <a:rPr lang="en-US" sz="1700" dirty="0">
-                <a:latin typeface="Calibri" panose="020F0502020204030204" pitchFamily="34" charset="0"/>
-                <a:cs typeface="Calibri" panose="020F0502020204030204" pitchFamily="34" charset="0"/>
-              </a:rPr>
-              <a:t> </a:t>
-            </a:r>
-            <a:r>
-              <a:rPr lang="en-US" sz="1700" dirty="0" err="1">
-                <a:latin typeface="Calibri" panose="020F0502020204030204" pitchFamily="34" charset="0"/>
-                <a:cs typeface="Calibri" panose="020F0502020204030204" pitchFamily="34" charset="0"/>
-              </a:rPr>
-              <a:t>giọng</a:t>
-            </a:r>
-            <a:r>
-              <a:rPr lang="en-US" sz="1700" dirty="0">
-                <a:latin typeface="Calibri" panose="020F0502020204030204" pitchFamily="34" charset="0"/>
-                <a:cs typeface="Calibri" panose="020F0502020204030204" pitchFamily="34" charset="0"/>
-              </a:rPr>
-              <a:t> </a:t>
-            </a:r>
-            <a:r>
-              <a:rPr lang="en-US" sz="1700" dirty="0" err="1">
-                <a:latin typeface="Calibri" panose="020F0502020204030204" pitchFamily="34" charset="0"/>
-                <a:cs typeface="Calibri" panose="020F0502020204030204" pitchFamily="34" charset="0"/>
-              </a:rPr>
-              <a:t>nói</a:t>
-            </a:r>
-            <a:r>
-              <a:rPr lang="en-US" sz="1700" dirty="0">
-                <a:latin typeface="Calibri" panose="020F0502020204030204" pitchFamily="34" charset="0"/>
-                <a:cs typeface="Calibri" panose="020F0502020204030204" pitchFamily="34" charset="0"/>
-              </a:rPr>
-              <a:t>.</a:t>
-            </a:r>
-          </a:p>
-        </p:txBody>
-      </p:sp>
-    </p:spTree>
-    <p:extLst>
-      <p:ext uri="{BB962C8B-B14F-4D97-AF65-F5344CB8AC3E}">
-        <p14:creationId xmlns:p14="http://schemas.microsoft.com/office/powerpoint/2010/main" val="2082826794"/>
-      </p:ext>
-    </p:extLst>
-  </p:cSld>
-  <p:clrMapOvr>
-    <a:masterClrMapping/>
-  </p:clrMapOvr>
-</p:sld>
-</file>
-
-<file path=ppt/slides/slide15.xml><?xml version="1.0" encoding="utf-8"?>
-<p:sld xmlns:a="http://schemas.openxmlformats.org/drawingml/2006/main" xmlns:r="http://schemas.openxmlformats.org/officeDocument/2006/relationships" xmlns:p="http://schemas.openxmlformats.org/presentationml/2006/main">
-  <p:cSld>
-    <p:spTree>
-      <p:nvGrpSpPr>
-        <p:cNvPr id="1" name=""/>
-        <p:cNvGrpSpPr/>
-        <p:nvPr/>
-      </p:nvGrpSpPr>
-      <p:grpSpPr>
-        <a:xfrm>
-          <a:off x="0" y="0"/>
-          <a:ext cx="0" cy="0"/>
-          <a:chOff x="0" y="0"/>
-          <a:chExt cx="0" cy="0"/>
-        </a:xfrm>
-      </p:grpSpPr>
-      <p:sp>
-        <p:nvSpPr>
-          <p:cNvPr id="2" name="Title 1">
-            <a:extLst>
-              <a:ext uri="{FF2B5EF4-FFF2-40B4-BE49-F238E27FC236}">
-                <a16:creationId xmlns:a16="http://schemas.microsoft.com/office/drawing/2014/main" id="{57742997-3E17-1948-8896-642465234691}"/>
-              </a:ext>
-            </a:extLst>
-          </p:cNvPr>
-          <p:cNvSpPr>
-            <a:spLocks noGrp="1"/>
-          </p:cNvSpPr>
-          <p:nvPr>
-            <p:ph type="title"/>
-          </p:nvPr>
-        </p:nvSpPr>
-        <p:spPr/>
-        <p:txBody>
-          <a:bodyPr>
-            <a:normAutofit/>
-          </a:bodyPr>
-          <a:lstStyle/>
-          <a:p>
-            <a:r>
-              <a:rPr lang="en-US" sz="4500" dirty="0">
-                <a:latin typeface="Calibri" panose="020F0502020204030204" pitchFamily="34" charset="0"/>
-                <a:cs typeface="Calibri" panose="020F0502020204030204" pitchFamily="34" charset="0"/>
-              </a:rPr>
-              <a:t>Chi </a:t>
-            </a:r>
-            <a:r>
-              <a:rPr lang="en-US" sz="4500" dirty="0" err="1">
-                <a:latin typeface="Calibri" panose="020F0502020204030204" pitchFamily="34" charset="0"/>
-                <a:cs typeface="Calibri" panose="020F0502020204030204" pitchFamily="34" charset="0"/>
-              </a:rPr>
-              <a:t>tiết</a:t>
-            </a:r>
-            <a:r>
-              <a:rPr lang="en-US" sz="4500" dirty="0">
-                <a:latin typeface="Calibri" panose="020F0502020204030204" pitchFamily="34" charset="0"/>
-                <a:cs typeface="Calibri" panose="020F0502020204030204" pitchFamily="34" charset="0"/>
-              </a:rPr>
-              <a:t> SV2TTS – </a:t>
-            </a:r>
-            <a:r>
-              <a:rPr lang="en-US" sz="4500" dirty="0" err="1">
-                <a:latin typeface="Calibri" panose="020F0502020204030204" pitchFamily="34" charset="0"/>
-                <a:cs typeface="Calibri" panose="020F0502020204030204" pitchFamily="34" charset="0"/>
-              </a:rPr>
-              <a:t>Synthersizer</a:t>
-            </a:r>
-            <a:endParaRPr lang="en-VN" sz="4500" dirty="0">
-              <a:latin typeface="Calibri" panose="020F0502020204030204" pitchFamily="34" charset="0"/>
-              <a:cs typeface="Calibri" panose="020F0502020204030204" pitchFamily="34" charset="0"/>
-            </a:endParaRPr>
-          </a:p>
-        </p:txBody>
-      </p:sp>
-      <p:sp>
-        <p:nvSpPr>
-          <p:cNvPr id="3" name="Content Placeholder 2">
-            <a:extLst>
-              <a:ext uri="{FF2B5EF4-FFF2-40B4-BE49-F238E27FC236}">
-                <a16:creationId xmlns:a16="http://schemas.microsoft.com/office/drawing/2014/main" id="{21E13F80-A6C6-3848-B823-F5D33AA86254}"/>
-              </a:ext>
-            </a:extLst>
-          </p:cNvPr>
-          <p:cNvSpPr>
-            <a:spLocks noGrp="1"/>
-          </p:cNvSpPr>
-          <p:nvPr>
-            <p:ph idx="1"/>
-          </p:nvPr>
-        </p:nvSpPr>
-        <p:spPr>
-          <a:xfrm>
-            <a:off x="1115568" y="2478024"/>
-            <a:ext cx="10168128" cy="4190062"/>
-          </a:xfrm>
-        </p:spPr>
-        <p:txBody>
-          <a:bodyPr/>
-          <a:lstStyle/>
-          <a:p>
-            <a:pPr>
-              <a:buFont typeface="Wingdings" pitchFamily="2" charset="2"/>
-              <a:buChar char="§"/>
-            </a:pPr>
-            <a:r>
-              <a:rPr lang="en-VN" dirty="0">
-                <a:latin typeface="Calibri" panose="020F0502020204030204" pitchFamily="34" charset="0"/>
-                <a:cs typeface="Calibri" panose="020F0502020204030204" pitchFamily="34" charset="0"/>
-              </a:rPr>
-              <a:t>Kiến trúc</a:t>
-            </a:r>
-          </a:p>
-          <a:p>
-            <a:pPr lvl="1">
-              <a:buFont typeface="Wingdings" pitchFamily="2" charset="2"/>
-              <a:buChar char="§"/>
-            </a:pPr>
-            <a:r>
-              <a:rPr lang="en-VN" dirty="0">
-                <a:latin typeface="Calibri" panose="020F0502020204030204" pitchFamily="34" charset="0"/>
-                <a:cs typeface="Calibri" panose="020F0502020204030204" pitchFamily="34" charset="0"/>
-              </a:rPr>
-              <a:t>Nhìn tổng quan, Synthesizer là một biến thể “nhẹ” của Tacotron 2 (không bao gồm module Wavenet)</a:t>
-            </a:r>
-          </a:p>
-          <a:p>
-            <a:pPr lvl="1">
-              <a:buFont typeface="Wingdings" pitchFamily="2" charset="2"/>
-              <a:buChar char="§"/>
-            </a:pPr>
-            <a:r>
-              <a:rPr lang="en-VN" dirty="0">
-                <a:latin typeface="Calibri" panose="020F0502020204030204" pitchFamily="34" charset="0"/>
-                <a:cs typeface="Calibri" panose="020F0502020204030204" pitchFamily="34" charset="0"/>
-              </a:rPr>
-              <a:t>Input: Đoạn text cần generate giọng nói và speaker embedding từ mạng Speaker Encoder</a:t>
-            </a:r>
-          </a:p>
-          <a:p>
-            <a:pPr lvl="1">
-              <a:buFont typeface="Wingdings" pitchFamily="2" charset="2"/>
-              <a:buChar char="§"/>
-            </a:pPr>
-            <a:r>
-              <a:rPr lang="en-VN" dirty="0">
-                <a:latin typeface="Calibri" panose="020F0502020204030204" pitchFamily="34" charset="0"/>
-                <a:cs typeface="Calibri" panose="020F0502020204030204" pitchFamily="34" charset="0"/>
-              </a:rPr>
-              <a:t>Output: Biểu đồ mel – spectrogram biểu thị âm thanh của giọng nói</a:t>
-            </a:r>
-          </a:p>
-        </p:txBody>
-      </p:sp>
-    </p:spTree>
-    <p:extLst>
-      <p:ext uri="{BB962C8B-B14F-4D97-AF65-F5344CB8AC3E}">
-        <p14:creationId xmlns:p14="http://schemas.microsoft.com/office/powerpoint/2010/main" val="3948645139"/>
-      </p:ext>
-    </p:extLst>
-  </p:cSld>
-  <p:clrMapOvr>
-    <a:masterClrMapping/>
-  </p:clrMapOvr>
-</p:sld>
-</file>
-
-<file path=ppt/slides/slide16.xml><?xml version="1.0" encoding="utf-8"?>
-<p:sld xmlns:a="http://schemas.openxmlformats.org/drawingml/2006/main" xmlns:r="http://schemas.openxmlformats.org/officeDocument/2006/relationships" xmlns:p="http://schemas.openxmlformats.org/presentationml/2006/main">
-  <p:cSld>
-    <p:bg>
-      <p:bgPr>
-        <a:solidFill>
-          <a:schemeClr val="bg1"/>
-        </a:solidFill>
-        <a:effectLst/>
-      </p:bgPr>
-    </p:bg>
-    <p:spTree>
-      <p:nvGrpSpPr>
-        <p:cNvPr id="1" name=""/>
-        <p:cNvGrpSpPr/>
-        <p:nvPr/>
-      </p:nvGrpSpPr>
-      <p:grpSpPr>
-        <a:xfrm>
-          <a:off x="0" y="0"/>
-          <a:ext cx="0" cy="0"/>
-          <a:chOff x="0" y="0"/>
-          <a:chExt cx="0" cy="0"/>
-        </a:xfrm>
-      </p:grpSpPr>
-      <p:sp useBgFill="1">
-        <p:nvSpPr>
           <p:cNvPr id="26" name="Rectangle 25">
-            <a:extLst>
-              <a:ext uri="{FF2B5EF4-FFF2-40B4-BE49-F238E27FC236}">
-                <a16:creationId xmlns:a16="http://schemas.microsoft.com/office/drawing/2014/main" id="{84ECDE7A-6944-466D-8FFE-149A29BA6BAE}"/>
-              </a:ext>
-              <a:ext uri="{C183D7F6-B498-43B3-948B-1728B52AA6E4}">
-                <adec:decorative xmlns:adec="http://schemas.microsoft.com/office/drawing/2017/decorative" val="1"/>
-              </a:ext>
-            </a:extLst>
-          </p:cNvPr>
-          <p:cNvSpPr>
-            <a:spLocks noGrp="1" noRot="1" noChangeAspect="1" noMove="1" noResize="1" noEditPoints="1" noAdjustHandles="1" noChangeArrowheads="1" noChangeShapeType="1" noTextEdit="1"/>
-          </p:cNvSpPr>
-          <p:nvPr>
-            <p:extLst>
-              <p:ext uri="{386F3935-93C4-4BCD-93E2-E3B085C9AB24}">
-                <p16:designElem xmlns:p16="http://schemas.microsoft.com/office/powerpoint/2015/main" val="1"/>
-              </p:ext>
-            </p:extLst>
-          </p:nvPr>
-        </p:nvSpPr>
-        <p:spPr>
-          <a:xfrm>
-            <a:off x="0" y="0"/>
-            <a:ext cx="12192000" cy="6858000"/>
-          </a:xfrm>
-          <a:prstGeom prst="rect">
-            <a:avLst/>
-          </a:prstGeom>
-          <a:ln>
-            <a:noFill/>
-          </a:ln>
-        </p:spPr>
-        <p:style>
-          <a:lnRef idx="2">
-            <a:schemeClr val="accent1">
-              <a:shade val="50000"/>
-            </a:schemeClr>
-          </a:lnRef>
-          <a:fillRef idx="1">
-            <a:schemeClr val="accent1"/>
-          </a:fillRef>
-          <a:effectRef idx="0">
-            <a:schemeClr val="accent1"/>
-          </a:effectRef>
-          <a:fontRef idx="minor">
-            <a:schemeClr val="lt1"/>
-          </a:fontRef>
-        </p:style>
-        <p:txBody>
-          <a:bodyPr rtlCol="0" anchor="ctr"/>
-          <a:lstStyle/>
-          <a:p>
-            <a:pPr algn="ctr"/>
-            <a:endParaRPr lang="en-US"/>
-          </a:p>
-        </p:txBody>
-      </p:sp>
-      <p:sp useBgFill="1">
-        <p:nvSpPr>
-          <p:cNvPr id="28" name="Rectangle 27">
             <a:extLst>
               <a:ext uri="{FF2B5EF4-FFF2-40B4-BE49-F238E27FC236}">
                 <a16:creationId xmlns:a16="http://schemas.microsoft.com/office/drawing/2014/main" id="{B3420082-9415-44EC-802E-C77D71D59C57}"/>
@@ -12641,7 +12177,7 @@
       </p:sp>
       <p:sp useBgFill="1">
         <p:nvSpPr>
-          <p:cNvPr id="30" name="Rectangle 29">
+          <p:cNvPr id="28" name="Rectangle 27">
             <a:extLst>
               <a:ext uri="{FF2B5EF4-FFF2-40B4-BE49-F238E27FC236}">
                 <a16:creationId xmlns:a16="http://schemas.microsoft.com/office/drawing/2014/main" id="{55A52C45-1FCB-4636-A80F-2849B8226C01}"/>
@@ -12758,41 +12294,13 @@
           <a:lstStyle/>
           <a:p>
             <a:r>
-              <a:rPr lang="en-US" dirty="0">
+              <a:rPr lang="en-US">
                 <a:latin typeface="Calibri" panose="020F0502020204030204" pitchFamily="34" charset="0"/>
                 <a:cs typeface="Calibri" panose="020F0502020204030204" pitchFamily="34" charset="0"/>
               </a:rPr>
-              <a:t>Chi </a:t>
-            </a:r>
-            <a:r>
-              <a:rPr lang="en-US" dirty="0" err="1">
-                <a:latin typeface="Calibri" panose="020F0502020204030204" pitchFamily="34" charset="0"/>
-                <a:cs typeface="Calibri" panose="020F0502020204030204" pitchFamily="34" charset="0"/>
-              </a:rPr>
-              <a:t>tiết</a:t>
-            </a:r>
-            <a:r>
-              <a:rPr lang="en-US" dirty="0">
-                <a:latin typeface="Calibri" panose="020F0502020204030204" pitchFamily="34" charset="0"/>
-                <a:cs typeface="Calibri" panose="020F0502020204030204" pitchFamily="34" charset="0"/>
-              </a:rPr>
-              <a:t> SV2TTS – </a:t>
-            </a:r>
-            <a:r>
-              <a:rPr lang="en-US" dirty="0" err="1">
-                <a:latin typeface="Calibri" panose="020F0502020204030204" pitchFamily="34" charset="0"/>
-                <a:cs typeface="Calibri" panose="020F0502020204030204" pitchFamily="34" charset="0"/>
-              </a:rPr>
-              <a:t>Synthersizer</a:t>
-            </a:r>
-            <a:r>
-              <a:rPr lang="en-US" dirty="0">
-                <a:latin typeface="Calibri" panose="020F0502020204030204" pitchFamily="34" charset="0"/>
-                <a:cs typeface="Calibri" panose="020F0502020204030204" pitchFamily="34" charset="0"/>
-              </a:rPr>
-              <a:t> (1)</a:t>
-            </a:r>
-            <a:endParaRPr lang="en-VN" dirty="0">
+              <a:t>Chi tiết SV2TTS – Speaker Encoder (3)</a:t>
+            </a:r>
+            <a:endParaRPr lang="en-VN">
               <a:latin typeface="Calibri" panose="020F0502020204030204" pitchFamily="34" charset="0"/>
               <a:cs typeface="Calibri" panose="020F0502020204030204" pitchFamily="34" charset="0"/>
             </a:endParaRPr>
@@ -12801,7 +12309,7 @@
       </p:sp>
       <p:sp>
         <p:nvSpPr>
-          <p:cNvPr id="32" name="Rectangle 31">
+          <p:cNvPr id="30" name="Rectangle 29">
             <a:extLst>
               <a:ext uri="{FF2B5EF4-FFF2-40B4-BE49-F238E27FC236}">
                 <a16:creationId xmlns:a16="http://schemas.microsoft.com/office/drawing/2014/main" id="{768EB4DD-3704-43AD-92B3-C4E0C6EA92CB}"/>
@@ -12893,6 +12401,688 @@
       </p:sp>
       <p:pic>
         <p:nvPicPr>
+          <p:cNvPr id="10" name="Content Placeholder 4" descr="Diagram&#10;&#10;Description automatically generated">
+            <a:extLst>
+              <a:ext uri="{FF2B5EF4-FFF2-40B4-BE49-F238E27FC236}">
+                <a16:creationId xmlns:a16="http://schemas.microsoft.com/office/drawing/2014/main" id="{4BF3A328-3C60-2940-8572-5558BE350292}"/>
+              </a:ext>
+            </a:extLst>
+          </p:cNvPr>
+          <p:cNvPicPr>
+            <a:picLocks noChangeAspect="1"/>
+          </p:cNvPicPr>
+          <p:nvPr/>
+        </p:nvPicPr>
+        <p:blipFill rotWithShape="1">
+          <a:blip r:embed="rId3"/>
+          <a:srcRect l="9303" r="1" b="1"/>
+          <a:stretch/>
+        </p:blipFill>
+        <p:spPr>
+          <a:xfrm>
+            <a:off x="908304" y="2478024"/>
+            <a:ext cx="6009855" cy="3694176"/>
+          </a:xfrm>
+          <a:prstGeom prst="rect">
+            <a:avLst/>
+          </a:prstGeom>
+        </p:spPr>
+      </p:pic>
+      <p:sp>
+        <p:nvSpPr>
+          <p:cNvPr id="9" name="Content Placeholder 8">
+            <a:extLst>
+              <a:ext uri="{FF2B5EF4-FFF2-40B4-BE49-F238E27FC236}">
+                <a16:creationId xmlns:a16="http://schemas.microsoft.com/office/drawing/2014/main" id="{03F3149E-2C84-4215-87A4-F4E681406AB2}"/>
+              </a:ext>
+            </a:extLst>
+          </p:cNvPr>
+          <p:cNvSpPr>
+            <a:spLocks noGrp="1"/>
+          </p:cNvSpPr>
+          <p:nvPr>
+            <p:ph idx="1"/>
+          </p:nvPr>
+        </p:nvSpPr>
+        <p:spPr>
+          <a:xfrm>
+            <a:off x="7411453" y="2478024"/>
+            <a:ext cx="3872243" cy="3694176"/>
+          </a:xfrm>
+        </p:spPr>
+        <p:txBody>
+          <a:bodyPr anchor="ctr">
+            <a:normAutofit/>
+          </a:bodyPr>
+          <a:lstStyle/>
+          <a:p>
+            <a:pPr>
+              <a:buFont typeface="Wingdings" pitchFamily="2" charset="2"/>
+              <a:buChar char="§"/>
+            </a:pPr>
+            <a:r>
+              <a:rPr lang="en-US" sz="1800">
+                <a:latin typeface="Calibri" panose="020F0502020204030204" pitchFamily="34" charset="0"/>
+                <a:cs typeface="Calibri" panose="020F0502020204030204" pitchFamily="34" charset="0"/>
+              </a:rPr>
+              <a:t>Trong quá trình chạy thực tế, file âm thanh input được cắt thành các segment 1.6s, stride = 50% để đưa vào model LSTM</a:t>
+            </a:r>
+          </a:p>
+          <a:p>
+            <a:pPr>
+              <a:buFont typeface="Wingdings" pitchFamily="2" charset="2"/>
+              <a:buChar char="§"/>
+            </a:pPr>
+            <a:r>
+              <a:rPr lang="en-US" sz="1800">
+                <a:latin typeface="Calibri" panose="020F0502020204030204" pitchFamily="34" charset="0"/>
+                <a:cs typeface="Calibri" panose="020F0502020204030204" pitchFamily="34" charset="0"/>
+              </a:rPr>
+              <a:t>Chuẩn hóa các output rồi lấy trung bình cộng, ta thu được embedding của giọng nói.</a:t>
+            </a:r>
+          </a:p>
+        </p:txBody>
+      </p:sp>
+    </p:spTree>
+    <p:extLst>
+      <p:ext uri="{BB962C8B-B14F-4D97-AF65-F5344CB8AC3E}">
+        <p14:creationId xmlns:p14="http://schemas.microsoft.com/office/powerpoint/2010/main" val="2082826794"/>
+      </p:ext>
+    </p:extLst>
+  </p:cSld>
+  <p:clrMapOvr>
+    <a:masterClrMapping/>
+  </p:clrMapOvr>
+</p:sld>
+</file>
+
+<file path=ppt/slides/slide15.xml><?xml version="1.0" encoding="utf-8"?>
+<p:sld xmlns:a="http://schemas.openxmlformats.org/drawingml/2006/main" xmlns:r="http://schemas.openxmlformats.org/officeDocument/2006/relationships" xmlns:p="http://schemas.openxmlformats.org/presentationml/2006/main">
+  <p:cSld>
+    <p:spTree>
+      <p:nvGrpSpPr>
+        <p:cNvPr id="1" name=""/>
+        <p:cNvGrpSpPr/>
+        <p:nvPr/>
+      </p:nvGrpSpPr>
+      <p:grpSpPr>
+        <a:xfrm>
+          <a:off x="0" y="0"/>
+          <a:ext cx="0" cy="0"/>
+          <a:chOff x="0" y="0"/>
+          <a:chExt cx="0" cy="0"/>
+        </a:xfrm>
+      </p:grpSpPr>
+      <p:sp>
+        <p:nvSpPr>
+          <p:cNvPr id="2" name="Title 1">
+            <a:extLst>
+              <a:ext uri="{FF2B5EF4-FFF2-40B4-BE49-F238E27FC236}">
+                <a16:creationId xmlns:a16="http://schemas.microsoft.com/office/drawing/2014/main" id="{57742997-3E17-1948-8896-642465234691}"/>
+              </a:ext>
+            </a:extLst>
+          </p:cNvPr>
+          <p:cNvSpPr>
+            <a:spLocks noGrp="1"/>
+          </p:cNvSpPr>
+          <p:nvPr>
+            <p:ph type="title"/>
+          </p:nvPr>
+        </p:nvSpPr>
+        <p:spPr/>
+        <p:txBody>
+          <a:bodyPr>
+            <a:normAutofit/>
+          </a:bodyPr>
+          <a:lstStyle/>
+          <a:p>
+            <a:r>
+              <a:rPr lang="en-US" sz="4500" dirty="0">
+                <a:latin typeface="Calibri" panose="020F0502020204030204" pitchFamily="34" charset="0"/>
+                <a:cs typeface="Calibri" panose="020F0502020204030204" pitchFamily="34" charset="0"/>
+              </a:rPr>
+              <a:t>Chi </a:t>
+            </a:r>
+            <a:r>
+              <a:rPr lang="en-US" sz="4500" dirty="0" err="1">
+                <a:latin typeface="Calibri" panose="020F0502020204030204" pitchFamily="34" charset="0"/>
+                <a:cs typeface="Calibri" panose="020F0502020204030204" pitchFamily="34" charset="0"/>
+              </a:rPr>
+              <a:t>tiết</a:t>
+            </a:r>
+            <a:r>
+              <a:rPr lang="en-US" sz="4500" dirty="0">
+                <a:latin typeface="Calibri" panose="020F0502020204030204" pitchFamily="34" charset="0"/>
+                <a:cs typeface="Calibri" panose="020F0502020204030204" pitchFamily="34" charset="0"/>
+              </a:rPr>
+              <a:t> SV2TTS – Synthesizer</a:t>
+            </a:r>
+            <a:endParaRPr lang="en-VN" sz="4500" dirty="0">
+              <a:latin typeface="Calibri" panose="020F0502020204030204" pitchFamily="34" charset="0"/>
+              <a:cs typeface="Calibri" panose="020F0502020204030204" pitchFamily="34" charset="0"/>
+            </a:endParaRPr>
+          </a:p>
+        </p:txBody>
+      </p:sp>
+      <p:sp>
+        <p:nvSpPr>
+          <p:cNvPr id="3" name="Content Placeholder 2">
+            <a:extLst>
+              <a:ext uri="{FF2B5EF4-FFF2-40B4-BE49-F238E27FC236}">
+                <a16:creationId xmlns:a16="http://schemas.microsoft.com/office/drawing/2014/main" id="{21E13F80-A6C6-3848-B823-F5D33AA86254}"/>
+              </a:ext>
+            </a:extLst>
+          </p:cNvPr>
+          <p:cNvSpPr>
+            <a:spLocks noGrp="1"/>
+          </p:cNvSpPr>
+          <p:nvPr>
+            <p:ph idx="1"/>
+          </p:nvPr>
+        </p:nvSpPr>
+        <p:spPr>
+          <a:xfrm>
+            <a:off x="1115568" y="2478024"/>
+            <a:ext cx="10168128" cy="4190062"/>
+          </a:xfrm>
+        </p:spPr>
+        <p:txBody>
+          <a:bodyPr/>
+          <a:lstStyle/>
+          <a:p>
+            <a:pPr>
+              <a:buFont typeface="Wingdings" pitchFamily="2" charset="2"/>
+              <a:buChar char="§"/>
+            </a:pPr>
+            <a:r>
+              <a:rPr lang="en-VN" dirty="0">
+                <a:latin typeface="Calibri" panose="020F0502020204030204" pitchFamily="34" charset="0"/>
+                <a:cs typeface="Calibri" panose="020F0502020204030204" pitchFamily="34" charset="0"/>
+              </a:rPr>
+              <a:t>Kiến trúc</a:t>
+            </a:r>
+          </a:p>
+          <a:p>
+            <a:pPr lvl="1">
+              <a:buFont typeface="Wingdings" pitchFamily="2" charset="2"/>
+              <a:buChar char="§"/>
+            </a:pPr>
+            <a:r>
+              <a:rPr lang="en-VN" dirty="0">
+                <a:latin typeface="Calibri" panose="020F0502020204030204" pitchFamily="34" charset="0"/>
+                <a:cs typeface="Calibri" panose="020F0502020204030204" pitchFamily="34" charset="0"/>
+              </a:rPr>
+              <a:t>Nhìn tổng quan, Synthesizer là một biến thể “nhẹ” của Tacotron 2 (không bao gồm module Wavenet)</a:t>
+            </a:r>
+          </a:p>
+          <a:p>
+            <a:pPr lvl="1">
+              <a:buFont typeface="Wingdings" pitchFamily="2" charset="2"/>
+              <a:buChar char="§"/>
+            </a:pPr>
+            <a:r>
+              <a:rPr lang="en-VN" dirty="0">
+                <a:latin typeface="Calibri" panose="020F0502020204030204" pitchFamily="34" charset="0"/>
+                <a:cs typeface="Calibri" panose="020F0502020204030204" pitchFamily="34" charset="0"/>
+              </a:rPr>
+              <a:t>Input: Đoạn text cần generate giọng nói và speaker embedding từ mạng Speaker Encoder</a:t>
+            </a:r>
+          </a:p>
+          <a:p>
+            <a:pPr lvl="1">
+              <a:buFont typeface="Wingdings" pitchFamily="2" charset="2"/>
+              <a:buChar char="§"/>
+            </a:pPr>
+            <a:r>
+              <a:rPr lang="en-VN" dirty="0">
+                <a:latin typeface="Calibri" panose="020F0502020204030204" pitchFamily="34" charset="0"/>
+                <a:cs typeface="Calibri" panose="020F0502020204030204" pitchFamily="34" charset="0"/>
+              </a:rPr>
+              <a:t>Output: Biểu đồ mel – spectrogram biểu thị âm thanh của giọng nói</a:t>
+            </a:r>
+          </a:p>
+        </p:txBody>
+      </p:sp>
+    </p:spTree>
+    <p:extLst>
+      <p:ext uri="{BB962C8B-B14F-4D97-AF65-F5344CB8AC3E}">
+        <p14:creationId xmlns:p14="http://schemas.microsoft.com/office/powerpoint/2010/main" val="3948645139"/>
+      </p:ext>
+    </p:extLst>
+  </p:cSld>
+  <p:clrMapOvr>
+    <a:masterClrMapping/>
+  </p:clrMapOvr>
+</p:sld>
+</file>
+
+<file path=ppt/slides/slide16.xml><?xml version="1.0" encoding="utf-8"?>
+<p:sld xmlns:a="http://schemas.openxmlformats.org/drawingml/2006/main" xmlns:r="http://schemas.openxmlformats.org/officeDocument/2006/relationships" xmlns:p="http://schemas.openxmlformats.org/presentationml/2006/main">
+  <p:cSld>
+    <p:bg>
+      <p:bgPr>
+        <a:solidFill>
+          <a:schemeClr val="bg1"/>
+        </a:solidFill>
+        <a:effectLst/>
+      </p:bgPr>
+    </p:bg>
+    <p:spTree>
+      <p:nvGrpSpPr>
+        <p:cNvPr id="1" name=""/>
+        <p:cNvGrpSpPr/>
+        <p:nvPr/>
+      </p:nvGrpSpPr>
+      <p:grpSpPr>
+        <a:xfrm>
+          <a:off x="0" y="0"/>
+          <a:ext cx="0" cy="0"/>
+          <a:chOff x="0" y="0"/>
+          <a:chExt cx="0" cy="0"/>
+        </a:xfrm>
+      </p:grpSpPr>
+      <p:sp useBgFill="1">
+        <p:nvSpPr>
+          <p:cNvPr id="26" name="Rectangle 25">
+            <a:extLst>
+              <a:ext uri="{FF2B5EF4-FFF2-40B4-BE49-F238E27FC236}">
+                <a16:creationId xmlns:a16="http://schemas.microsoft.com/office/drawing/2014/main" id="{84ECDE7A-6944-466D-8FFE-149A29BA6BAE}"/>
+              </a:ext>
+              <a:ext uri="{C183D7F6-B498-43B3-948B-1728B52AA6E4}">
+                <adec:decorative xmlns:adec="http://schemas.microsoft.com/office/drawing/2017/decorative" val="1"/>
+              </a:ext>
+            </a:extLst>
+          </p:cNvPr>
+          <p:cNvSpPr>
+            <a:spLocks noGrp="1" noRot="1" noChangeAspect="1" noMove="1" noResize="1" noEditPoints="1" noAdjustHandles="1" noChangeArrowheads="1" noChangeShapeType="1" noTextEdit="1"/>
+          </p:cNvSpPr>
+          <p:nvPr>
+            <p:extLst>
+              <p:ext uri="{386F3935-93C4-4BCD-93E2-E3B085C9AB24}">
+                <p16:designElem xmlns:p16="http://schemas.microsoft.com/office/powerpoint/2015/main" val="1"/>
+              </p:ext>
+            </p:extLst>
+          </p:nvPr>
+        </p:nvSpPr>
+        <p:spPr>
+          <a:xfrm>
+            <a:off x="0" y="0"/>
+            <a:ext cx="12192000" cy="6858000"/>
+          </a:xfrm>
+          <a:prstGeom prst="rect">
+            <a:avLst/>
+          </a:prstGeom>
+          <a:ln>
+            <a:noFill/>
+          </a:ln>
+        </p:spPr>
+        <p:style>
+          <a:lnRef idx="2">
+            <a:schemeClr val="accent1">
+              <a:shade val="50000"/>
+            </a:schemeClr>
+          </a:lnRef>
+          <a:fillRef idx="1">
+            <a:schemeClr val="accent1"/>
+          </a:fillRef>
+          <a:effectRef idx="0">
+            <a:schemeClr val="accent1"/>
+          </a:effectRef>
+          <a:fontRef idx="minor">
+            <a:schemeClr val="lt1"/>
+          </a:fontRef>
+        </p:style>
+        <p:txBody>
+          <a:bodyPr rtlCol="0" anchor="ctr"/>
+          <a:lstStyle/>
+          <a:p>
+            <a:pPr algn="ctr"/>
+            <a:endParaRPr lang="en-US"/>
+          </a:p>
+        </p:txBody>
+      </p:sp>
+      <p:sp useBgFill="1">
+        <p:nvSpPr>
+          <p:cNvPr id="28" name="Rectangle 27">
+            <a:extLst>
+              <a:ext uri="{FF2B5EF4-FFF2-40B4-BE49-F238E27FC236}">
+                <a16:creationId xmlns:a16="http://schemas.microsoft.com/office/drawing/2014/main" id="{B3420082-9415-44EC-802E-C77D71D59C57}"/>
+              </a:ext>
+              <a:ext uri="{C183D7F6-B498-43B3-948B-1728B52AA6E4}">
+                <adec:decorative xmlns:adec="http://schemas.microsoft.com/office/drawing/2017/decorative" val="1"/>
+              </a:ext>
+            </a:extLst>
+          </p:cNvPr>
+          <p:cNvSpPr>
+            <a:spLocks noGrp="1" noRot="1" noChangeAspect="1" noMove="1" noResize="1" noEditPoints="1" noAdjustHandles="1" noChangeArrowheads="1" noChangeShapeType="1" noTextEdit="1"/>
+          </p:cNvSpPr>
+          <p:nvPr>
+            <p:extLst>
+              <p:ext uri="{386F3935-93C4-4BCD-93E2-E3B085C9AB24}">
+                <p16:designElem xmlns:p16="http://schemas.microsoft.com/office/powerpoint/2015/main" val="1"/>
+              </p:ext>
+            </p:extLst>
+          </p:nvPr>
+        </p:nvSpPr>
+        <p:spPr>
+          <a:xfrm>
+            <a:off x="558209" y="0"/>
+            <a:ext cx="11167447" cy="2018806"/>
+          </a:xfrm>
+          <a:prstGeom prst="rect">
+            <a:avLst/>
+          </a:prstGeom>
+          <a:ln w="12700">
+            <a:solidFill>
+              <a:schemeClr val="tx2">
+                <a:lumMod val="10000"/>
+                <a:lumOff val="90000"/>
+              </a:schemeClr>
+            </a:solidFill>
+          </a:ln>
+          <a:effectLst>
+            <a:outerShdw blurRad="50800" dist="38100" dir="2700000" algn="tl" rotWithShape="0">
+              <a:schemeClr val="bg1">
+                <a:lumMod val="85000"/>
+                <a:alpha val="30000"/>
+              </a:schemeClr>
+            </a:outerShdw>
+          </a:effectLst>
+        </p:spPr>
+        <p:style>
+          <a:lnRef idx="2">
+            <a:schemeClr val="accent1">
+              <a:shade val="50000"/>
+            </a:schemeClr>
+          </a:lnRef>
+          <a:fillRef idx="1">
+            <a:schemeClr val="accent1"/>
+          </a:fillRef>
+          <a:effectRef idx="0">
+            <a:schemeClr val="accent1"/>
+          </a:effectRef>
+          <a:fontRef idx="minor">
+            <a:schemeClr val="lt1"/>
+          </a:fontRef>
+        </p:style>
+        <p:txBody>
+          <a:bodyPr rtlCol="0" anchor="ctr"/>
+          <a:lstStyle/>
+          <a:p>
+            <a:pPr marL="0" marR="0" lvl="0" indent="0" algn="ctr" defTabSz="914400" rtl="0" eaLnBrk="1" fontAlgn="auto" latinLnBrk="0" hangingPunct="1">
+              <a:lnSpc>
+                <a:spcPct val="100000"/>
+              </a:lnSpc>
+              <a:spcBef>
+                <a:spcPts val="0"/>
+              </a:spcBef>
+              <a:spcAft>
+                <a:spcPts val="0"/>
+              </a:spcAft>
+              <a:buClrTx/>
+              <a:buSzTx/>
+              <a:buFontTx/>
+              <a:buNone/>
+              <a:tabLst/>
+              <a:defRPr/>
+            </a:pPr>
+            <a:endParaRPr kumimoji="0" lang="en-US" sz="1800" b="0" i="0" u="none" strike="noStrike" kern="1200" cap="none" spc="0" normalizeH="0" baseline="0" noProof="0">
+              <a:ln>
+                <a:noFill/>
+              </a:ln>
+              <a:solidFill>
+                <a:prstClr val="white"/>
+              </a:solidFill>
+              <a:effectLst/>
+              <a:uLnTx/>
+              <a:uFillTx/>
+              <a:latin typeface="Calibri" panose="020F0502020204030204"/>
+              <a:ea typeface="+mn-ea"/>
+              <a:cs typeface="+mn-cs"/>
+            </a:endParaRPr>
+          </a:p>
+        </p:txBody>
+      </p:sp>
+      <p:sp useBgFill="1">
+        <p:nvSpPr>
+          <p:cNvPr id="30" name="Rectangle 29">
+            <a:extLst>
+              <a:ext uri="{FF2B5EF4-FFF2-40B4-BE49-F238E27FC236}">
+                <a16:creationId xmlns:a16="http://schemas.microsoft.com/office/drawing/2014/main" id="{55A52C45-1FCB-4636-A80F-2849B8226C01}"/>
+              </a:ext>
+              <a:ext uri="{C183D7F6-B498-43B3-948B-1728B52AA6E4}">
+                <adec:decorative xmlns:adec="http://schemas.microsoft.com/office/drawing/2017/decorative" val="1"/>
+              </a:ext>
+            </a:extLst>
+          </p:cNvPr>
+          <p:cNvSpPr>
+            <a:spLocks noGrp="1" noRot="1" noChangeAspect="1" noMove="1" noResize="1" noEditPoints="1" noAdjustHandles="1" noChangeArrowheads="1" noChangeShapeType="1" noTextEdit="1"/>
+          </p:cNvSpPr>
+          <p:nvPr>
+            <p:extLst>
+              <p:ext uri="{386F3935-93C4-4BCD-93E2-E3B085C9AB24}">
+                <p16:designElem xmlns:p16="http://schemas.microsoft.com/office/powerpoint/2015/main" val="1"/>
+              </p:ext>
+            </p:extLst>
+          </p:nvPr>
+        </p:nvSpPr>
+        <p:spPr>
+          <a:xfrm>
+            <a:off x="566928" y="0"/>
+            <a:ext cx="11155680" cy="2011680"/>
+          </a:xfrm>
+          <a:prstGeom prst="rect">
+            <a:avLst/>
+          </a:prstGeom>
+          <a:ln w="12700">
+            <a:noFill/>
+          </a:ln>
+          <a:effectLst/>
+        </p:spPr>
+        <p:style>
+          <a:lnRef idx="2">
+            <a:schemeClr val="accent1">
+              <a:shade val="50000"/>
+            </a:schemeClr>
+          </a:lnRef>
+          <a:fillRef idx="1">
+            <a:schemeClr val="accent1"/>
+          </a:fillRef>
+          <a:effectRef idx="0">
+            <a:schemeClr val="accent1"/>
+          </a:effectRef>
+          <a:fontRef idx="minor">
+            <a:schemeClr val="lt1"/>
+          </a:fontRef>
+        </p:style>
+        <p:txBody>
+          <a:bodyPr rtlCol="0" anchor="ctr"/>
+          <a:lstStyle/>
+          <a:p>
+            <a:pPr marL="0" marR="0" lvl="0" indent="0" algn="ctr" defTabSz="914400" rtl="0" eaLnBrk="1" fontAlgn="auto" latinLnBrk="0" hangingPunct="1">
+              <a:lnSpc>
+                <a:spcPct val="100000"/>
+              </a:lnSpc>
+              <a:spcBef>
+                <a:spcPts val="0"/>
+              </a:spcBef>
+              <a:spcAft>
+                <a:spcPts val="0"/>
+              </a:spcAft>
+              <a:buClrTx/>
+              <a:buSzTx/>
+              <a:buFontTx/>
+              <a:buNone/>
+              <a:tabLst/>
+              <a:defRPr/>
+            </a:pPr>
+            <a:endParaRPr kumimoji="0" lang="en-US" sz="1800" b="0" i="0" u="none" strike="noStrike" kern="1200" cap="none" spc="0" normalizeH="0" baseline="0" noProof="0">
+              <a:ln>
+                <a:noFill/>
+              </a:ln>
+              <a:solidFill>
+                <a:prstClr val="white"/>
+              </a:solidFill>
+              <a:effectLst/>
+              <a:uLnTx/>
+              <a:uFillTx/>
+              <a:latin typeface="Calibri" panose="020F0502020204030204"/>
+              <a:ea typeface="+mn-ea"/>
+              <a:cs typeface="+mn-cs"/>
+            </a:endParaRPr>
+          </a:p>
+        </p:txBody>
+      </p:sp>
+      <p:sp>
+        <p:nvSpPr>
+          <p:cNvPr id="2" name="Title 1">
+            <a:extLst>
+              <a:ext uri="{FF2B5EF4-FFF2-40B4-BE49-F238E27FC236}">
+                <a16:creationId xmlns:a16="http://schemas.microsoft.com/office/drawing/2014/main" id="{57742997-3E17-1948-8896-642465234691}"/>
+              </a:ext>
+            </a:extLst>
+          </p:cNvPr>
+          <p:cNvSpPr>
+            <a:spLocks noGrp="1"/>
+          </p:cNvSpPr>
+          <p:nvPr>
+            <p:ph type="title"/>
+          </p:nvPr>
+        </p:nvSpPr>
+        <p:spPr>
+          <a:xfrm>
+            <a:off x="1115568" y="548640"/>
+            <a:ext cx="10168128" cy="1179576"/>
+          </a:xfrm>
+        </p:spPr>
+        <p:txBody>
+          <a:bodyPr>
+            <a:normAutofit/>
+          </a:bodyPr>
+          <a:lstStyle/>
+          <a:p>
+            <a:r>
+              <a:rPr lang="en-US" sz="4500" dirty="0">
+                <a:latin typeface="Calibri" panose="020F0502020204030204" pitchFamily="34" charset="0"/>
+                <a:cs typeface="Calibri" panose="020F0502020204030204" pitchFamily="34" charset="0"/>
+              </a:rPr>
+              <a:t>Chi </a:t>
+            </a:r>
+            <a:r>
+              <a:rPr lang="en-US" sz="4500" dirty="0" err="1">
+                <a:latin typeface="Calibri" panose="020F0502020204030204" pitchFamily="34" charset="0"/>
+                <a:cs typeface="Calibri" panose="020F0502020204030204" pitchFamily="34" charset="0"/>
+              </a:rPr>
+              <a:t>tiết</a:t>
+            </a:r>
+            <a:r>
+              <a:rPr lang="en-US" sz="4500" dirty="0">
+                <a:latin typeface="Calibri" panose="020F0502020204030204" pitchFamily="34" charset="0"/>
+                <a:cs typeface="Calibri" panose="020F0502020204030204" pitchFamily="34" charset="0"/>
+              </a:rPr>
+              <a:t> SV2TTS – Synthesizer (1)</a:t>
+            </a:r>
+            <a:endParaRPr lang="en-VN" sz="4500" dirty="0">
+              <a:latin typeface="Calibri" panose="020F0502020204030204" pitchFamily="34" charset="0"/>
+              <a:cs typeface="Calibri" panose="020F0502020204030204" pitchFamily="34" charset="0"/>
+            </a:endParaRPr>
+          </a:p>
+        </p:txBody>
+      </p:sp>
+      <p:sp>
+        <p:nvSpPr>
+          <p:cNvPr id="32" name="Rectangle 31">
+            <a:extLst>
+              <a:ext uri="{FF2B5EF4-FFF2-40B4-BE49-F238E27FC236}">
+                <a16:creationId xmlns:a16="http://schemas.microsoft.com/office/drawing/2014/main" id="{768EB4DD-3704-43AD-92B3-C4E0C6EA92CB}"/>
+              </a:ext>
+              <a:ext uri="{C183D7F6-B498-43B3-948B-1728B52AA6E4}">
+                <adec:decorative xmlns:adec="http://schemas.microsoft.com/office/drawing/2017/decorative" val="1"/>
+              </a:ext>
+            </a:extLst>
+          </p:cNvPr>
+          <p:cNvSpPr>
+            <a:spLocks noGrp="1" noRot="1" noChangeAspect="1" noMove="1" noResize="1" noEditPoints="1" noAdjustHandles="1" noChangeArrowheads="1" noChangeShapeType="1" noTextEdit="1"/>
+          </p:cNvSpPr>
+          <p:nvPr>
+            <p:extLst>
+              <p:ext uri="{386F3935-93C4-4BCD-93E2-E3B085C9AB24}">
+                <p16:designElem xmlns:p16="http://schemas.microsoft.com/office/powerpoint/2015/main" val="1"/>
+              </p:ext>
+            </p:extLst>
+          </p:nvPr>
+        </p:nvSpPr>
+        <p:spPr>
+          <a:xfrm>
+            <a:off x="498834" y="770799"/>
+            <a:ext cx="128016" cy="704088"/>
+          </a:xfrm>
+          <a:prstGeom prst="rect">
+            <a:avLst/>
+          </a:prstGeom>
+          <a:solidFill>
+            <a:schemeClr val="accent1"/>
+          </a:solidFill>
+          <a:ln>
+            <a:noFill/>
+          </a:ln>
+        </p:spPr>
+        <p:style>
+          <a:lnRef idx="2">
+            <a:schemeClr val="accent1">
+              <a:shade val="50000"/>
+            </a:schemeClr>
+          </a:lnRef>
+          <a:fillRef idx="1">
+            <a:schemeClr val="accent1"/>
+          </a:fillRef>
+          <a:effectRef idx="0">
+            <a:schemeClr val="accent1"/>
+          </a:effectRef>
+          <a:fontRef idx="minor">
+            <a:schemeClr val="lt1"/>
+          </a:fontRef>
+        </p:style>
+        <p:txBody>
+          <a:bodyPr rtlCol="0" anchor="ctr"/>
+          <a:lstStyle/>
+          <a:p>
+            <a:pPr marL="0" marR="0" lvl="0" indent="0" algn="ctr" defTabSz="914400" rtl="0" eaLnBrk="1" fontAlgn="auto" latinLnBrk="0" hangingPunct="1">
+              <a:lnSpc>
+                <a:spcPct val="100000"/>
+              </a:lnSpc>
+              <a:spcBef>
+                <a:spcPts val="0"/>
+              </a:spcBef>
+              <a:spcAft>
+                <a:spcPts val="0"/>
+              </a:spcAft>
+              <a:buClrTx/>
+              <a:buSzTx/>
+              <a:buFontTx/>
+              <a:buNone/>
+              <a:tabLst/>
+              <a:defRPr/>
+            </a:pPr>
+            <a:endParaRPr kumimoji="0" lang="en-US" sz="1800" b="0" i="0" u="none" strike="noStrike" kern="1200" cap="none" spc="0" normalizeH="0" baseline="0" noProof="0">
+              <a:ln>
+                <a:noFill/>
+              </a:ln>
+              <a:solidFill>
+                <a:prstClr val="white"/>
+              </a:solidFill>
+              <a:effectLst/>
+              <a:uLnTx/>
+              <a:uFillTx/>
+              <a:latin typeface="Calibri" panose="020F0502020204030204"/>
+              <a:ea typeface="+mn-ea"/>
+              <a:cs typeface="+mn-cs"/>
+            </a:endParaRPr>
+          </a:p>
+        </p:txBody>
+      </p:sp>
+      <p:pic>
+        <p:nvPicPr>
           <p:cNvPr id="17" name="Content Placeholder 16" descr="Diagram&#10;&#10;Description automatically generated">
             <a:extLst>
               <a:ext uri="{FF2B5EF4-FFF2-40B4-BE49-F238E27FC236}">
@@ -13161,21 +13351,7 @@
                 <a:latin typeface="Calibri" panose="020F0502020204030204" pitchFamily="34" charset="0"/>
                 <a:cs typeface="Calibri" panose="020F0502020204030204" pitchFamily="34" charset="0"/>
               </a:rPr>
-              <a:t> SV2TTS – </a:t>
-            </a:r>
-            <a:r>
-              <a:rPr lang="en-US" sz="4500" dirty="0" err="1">
-                <a:latin typeface="Calibri" panose="020F0502020204030204" pitchFamily="34" charset="0"/>
-                <a:cs typeface="Calibri" panose="020F0502020204030204" pitchFamily="34" charset="0"/>
-              </a:rPr>
-              <a:t>Synthersizer</a:t>
-            </a:r>
-            <a:r>
-              <a:rPr lang="en-US" sz="4500" dirty="0">
-                <a:latin typeface="Calibri" panose="020F0502020204030204" pitchFamily="34" charset="0"/>
-                <a:cs typeface="Calibri" panose="020F0502020204030204" pitchFamily="34" charset="0"/>
-              </a:rPr>
-              <a:t> (2)</a:t>
+              <a:t> SV2TTS – Synthesizer (2)</a:t>
             </a:r>
             <a:endParaRPr lang="en-VN" sz="4500" dirty="0">
               <a:latin typeface="Calibri" panose="020F0502020204030204" pitchFamily="34" charset="0"/>
@@ -13184,74 +13360,334 @@
           </a:p>
         </p:txBody>
       </p:sp>
-      <p:sp>
-        <p:nvSpPr>
-          <p:cNvPr id="3" name="Content Placeholder 2">
-            <a:extLst>
-              <a:ext uri="{FF2B5EF4-FFF2-40B4-BE49-F238E27FC236}">
-                <a16:creationId xmlns:a16="http://schemas.microsoft.com/office/drawing/2014/main" id="{1F707462-72B9-E94F-AE0F-C78BC243524C}"/>
-              </a:ext>
-            </a:extLst>
-          </p:cNvPr>
-          <p:cNvSpPr>
-            <a:spLocks noGrp="1"/>
-          </p:cNvSpPr>
-          <p:nvPr>
-            <p:ph idx="1"/>
-          </p:nvPr>
-        </p:nvSpPr>
-        <p:spPr/>
-        <p:txBody>
-          <a:bodyPr/>
-          <a:lstStyle/>
-          <a:p>
-            <a:pPr>
-              <a:buFont typeface="Wingdings" pitchFamily="2" charset="2"/>
-              <a:buChar char="§"/>
-            </a:pPr>
-            <a:r>
-              <a:rPr lang="en-VN" dirty="0">
-                <a:latin typeface="Calibri" panose="020F0502020204030204" pitchFamily="34" charset="0"/>
-                <a:cs typeface="Calibri" panose="020F0502020204030204" pitchFamily="34" charset="0"/>
-              </a:rPr>
-              <a:t>Encoder nhận vào một đoạn văn bản và trả ra thông tin mã hóa của đoạn văn bản đó</a:t>
-            </a:r>
-          </a:p>
-          <a:p>
-            <a:pPr>
-              <a:buFont typeface="Wingdings" pitchFamily="2" charset="2"/>
-              <a:buChar char="§"/>
-            </a:pPr>
-            <a:r>
-              <a:rPr lang="en-VN" dirty="0">
-                <a:latin typeface="Calibri" panose="020F0502020204030204" pitchFamily="34" charset="0"/>
-                <a:cs typeface="Calibri" panose="020F0502020204030204" pitchFamily="34" charset="0"/>
-              </a:rPr>
-              <a:t>Quy trình</a:t>
-            </a:r>
-          </a:p>
-          <a:p>
-            <a:pPr lvl="1">
-              <a:buFont typeface="Wingdings" pitchFamily="2" charset="2"/>
-              <a:buChar char="§"/>
-            </a:pPr>
-            <a:endParaRPr lang="en-VN" dirty="0">
-              <a:latin typeface="Calibri" panose="020F0502020204030204" pitchFamily="34" charset="0"/>
-              <a:cs typeface="Calibri" panose="020F0502020204030204" pitchFamily="34" charset="0"/>
-            </a:endParaRPr>
-          </a:p>
-          <a:p>
-            <a:pPr lvl="1">
-              <a:buFont typeface="Wingdings" pitchFamily="2" charset="2"/>
-              <a:buChar char="§"/>
-            </a:pPr>
-            <a:endParaRPr lang="en-VN" dirty="0">
-              <a:latin typeface="Calibri" panose="020F0502020204030204" pitchFamily="34" charset="0"/>
-              <a:cs typeface="Calibri" panose="020F0502020204030204" pitchFamily="34" charset="0"/>
-            </a:endParaRPr>
-          </a:p>
-        </p:txBody>
-      </p:sp>
+      <mc:AlternateContent xmlns:mc="http://schemas.openxmlformats.org/markup-compatibility/2006">
+        <mc:Choice xmlns:a14="http://schemas.microsoft.com/office/drawing/2010/main" Requires="a14">
+          <p:sp>
+            <p:nvSpPr>
+              <p:cNvPr id="3" name="Content Placeholder 2">
+                <a:extLst>
+                  <a:ext uri="{FF2B5EF4-FFF2-40B4-BE49-F238E27FC236}">
+                    <a16:creationId xmlns:a16="http://schemas.microsoft.com/office/drawing/2014/main" id="{1F707462-72B9-E94F-AE0F-C78BC243524C}"/>
+                  </a:ext>
+                </a:extLst>
+              </p:cNvPr>
+              <p:cNvSpPr>
+                <a:spLocks noGrp="1"/>
+              </p:cNvSpPr>
+              <p:nvPr>
+                <p:ph idx="1"/>
+              </p:nvPr>
+            </p:nvSpPr>
+            <p:spPr>
+              <a:xfrm>
+                <a:off x="1115568" y="2478024"/>
+                <a:ext cx="10602300" cy="3694176"/>
+              </a:xfrm>
+            </p:spPr>
+            <p:txBody>
+              <a:bodyPr/>
+              <a:lstStyle/>
+              <a:p>
+                <a:pPr>
+                  <a:buFont typeface="Wingdings" pitchFamily="2" charset="2"/>
+                  <a:buChar char="§"/>
+                </a:pPr>
+                <a:r>
+                  <a:rPr lang="en-VN" dirty="0">
+                    <a:latin typeface="Calibri" panose="020F0502020204030204" pitchFamily="34" charset="0"/>
+                    <a:cs typeface="Calibri" panose="020F0502020204030204" pitchFamily="34" charset="0"/>
+                  </a:rPr>
+                  <a:t>Encoder nhận vào một đoạn text và trả ra thông tin mã hóa của đoạn text đó</a:t>
+                </a:r>
+              </a:p>
+              <a:p>
+                <a:pPr lvl="1">
+                  <a:buFont typeface="Wingdings" pitchFamily="2" charset="2"/>
+                  <a:buChar char="§"/>
+                </a:pPr>
+                <a:r>
+                  <a:rPr lang="en-VN" dirty="0">
+                    <a:latin typeface="Calibri" panose="020F0502020204030204" pitchFamily="34" charset="0"/>
+                    <a:cs typeface="Calibri" panose="020F0502020204030204" pitchFamily="34" charset="0"/>
+                  </a:rPr>
+                  <a:t>Quy trình</a:t>
+                </a:r>
+              </a:p>
+              <a:p>
+                <a:pPr marL="0" indent="0">
+                  <a:buNone/>
+                </a:pPr>
+                <a:endParaRPr lang="en-VN" dirty="0">
+                  <a:latin typeface="Calibri" panose="020F0502020204030204" pitchFamily="34" charset="0"/>
+                  <a:cs typeface="Calibri" panose="020F0502020204030204" pitchFamily="34" charset="0"/>
+                </a:endParaRPr>
+              </a:p>
+              <a:p>
+                <a:pPr marL="0" indent="0">
+                  <a:buNone/>
+                </a:pPr>
+                <a:endParaRPr lang="en-VN" dirty="0">
+                  <a:latin typeface="Calibri" panose="020F0502020204030204" pitchFamily="34" charset="0"/>
+                  <a:cs typeface="Calibri" panose="020F0502020204030204" pitchFamily="34" charset="0"/>
+                </a:endParaRPr>
+              </a:p>
+              <a:p>
+                <a:pPr lvl="1">
+                  <a:buFont typeface="Wingdings" pitchFamily="2" charset="2"/>
+                  <a:buChar char="§"/>
+                </a:pPr>
+                <a:r>
+                  <a:rPr lang="en-VN" dirty="0">
+                    <a:latin typeface="Calibri" panose="020F0502020204030204" pitchFamily="34" charset="0"/>
+                    <a:cs typeface="Calibri" panose="020F0502020204030204" pitchFamily="34" charset="0"/>
+                  </a:rPr>
+                  <a:t>Output của bộ Encoder có dạng </a:t>
+                </a:r>
+                <a14:m>
+                  <m:oMath xmlns:m="http://schemas.openxmlformats.org/officeDocument/2006/math">
+                    <m:r>
+                      <a:rPr lang="en-US" b="0" i="1" smtClean="0">
+                        <a:latin typeface="Cambria Math" panose="02040503050406030204" pitchFamily="18" charset="0"/>
+                        <a:cs typeface="Calibri" panose="020F0502020204030204" pitchFamily="34" charset="0"/>
+                      </a:rPr>
+                      <m:t>[</m:t>
+                    </m:r>
+                    <m:sSub>
+                      <m:sSubPr>
+                        <m:ctrlPr>
+                          <a:rPr lang="en-US" b="0" i="1" smtClean="0">
+                            <a:latin typeface="Cambria Math" panose="02040503050406030204" pitchFamily="18" charset="0"/>
+                            <a:cs typeface="Calibri" panose="020F0502020204030204" pitchFamily="34" charset="0"/>
+                          </a:rPr>
+                        </m:ctrlPr>
+                      </m:sSubPr>
+                      <m:e>
+                        <m:r>
+                          <a:rPr lang="en-US" b="0" i="1" smtClean="0">
+                            <a:latin typeface="Cambria Math" panose="02040503050406030204" pitchFamily="18" charset="0"/>
+                            <a:cs typeface="Calibri" panose="020F0502020204030204" pitchFamily="34" charset="0"/>
+                          </a:rPr>
+                          <m:t>𝑜</m:t>
+                        </m:r>
+                      </m:e>
+                      <m:sub>
+                        <m:r>
+                          <a:rPr lang="en-US" b="0" i="1" smtClean="0">
+                            <a:latin typeface="Cambria Math" panose="02040503050406030204" pitchFamily="18" charset="0"/>
+                            <a:cs typeface="Calibri" panose="020F0502020204030204" pitchFamily="34" charset="0"/>
+                          </a:rPr>
+                          <m:t>0</m:t>
+                        </m:r>
+                      </m:sub>
+                    </m:sSub>
+                    <m:r>
+                      <a:rPr lang="en-US" b="0" i="1" smtClean="0">
+                        <a:latin typeface="Cambria Math" panose="02040503050406030204" pitchFamily="18" charset="0"/>
+                        <a:cs typeface="Calibri" panose="020F0502020204030204" pitchFamily="34" charset="0"/>
+                      </a:rPr>
+                      <m:t>,</m:t>
+                    </m:r>
+                    <m:sSub>
+                      <m:sSubPr>
+                        <m:ctrlPr>
+                          <a:rPr lang="en-US" b="0" i="1" smtClean="0">
+                            <a:latin typeface="Cambria Math" panose="02040503050406030204" pitchFamily="18" charset="0"/>
+                            <a:cs typeface="Calibri" panose="020F0502020204030204" pitchFamily="34" charset="0"/>
+                          </a:rPr>
+                        </m:ctrlPr>
+                      </m:sSubPr>
+                      <m:e>
+                        <m:r>
+                          <a:rPr lang="en-US" b="0" i="1" smtClean="0">
+                            <a:latin typeface="Cambria Math" panose="02040503050406030204" pitchFamily="18" charset="0"/>
+                            <a:cs typeface="Calibri" panose="020F0502020204030204" pitchFamily="34" charset="0"/>
+                          </a:rPr>
+                          <m:t>𝑜</m:t>
+                        </m:r>
+                      </m:e>
+                      <m:sub>
+                        <m:r>
+                          <a:rPr lang="en-US" b="0" i="1" smtClean="0">
+                            <a:latin typeface="Cambria Math" panose="02040503050406030204" pitchFamily="18" charset="0"/>
+                            <a:cs typeface="Calibri" panose="020F0502020204030204" pitchFamily="34" charset="0"/>
+                          </a:rPr>
+                          <m:t>1</m:t>
+                        </m:r>
+                      </m:sub>
+                    </m:sSub>
+                    <m:r>
+                      <a:rPr lang="en-US" b="0" i="1" smtClean="0">
+                        <a:latin typeface="Cambria Math" panose="02040503050406030204" pitchFamily="18" charset="0"/>
+                        <a:cs typeface="Calibri" panose="020F0502020204030204" pitchFamily="34" charset="0"/>
+                      </a:rPr>
+                      <m:t>,…,</m:t>
+                    </m:r>
+                    <m:sSub>
+                      <m:sSubPr>
+                        <m:ctrlPr>
+                          <a:rPr lang="en-US" b="0" i="1" smtClean="0">
+                            <a:latin typeface="Cambria Math" panose="02040503050406030204" pitchFamily="18" charset="0"/>
+                            <a:cs typeface="Calibri" panose="020F0502020204030204" pitchFamily="34" charset="0"/>
+                          </a:rPr>
+                        </m:ctrlPr>
+                      </m:sSubPr>
+                      <m:e>
+                        <m:r>
+                          <a:rPr lang="en-US" b="0" i="1" smtClean="0">
+                            <a:latin typeface="Cambria Math" panose="02040503050406030204" pitchFamily="18" charset="0"/>
+                            <a:cs typeface="Calibri" panose="020F0502020204030204" pitchFamily="34" charset="0"/>
+                          </a:rPr>
+                          <m:t>𝑜</m:t>
+                        </m:r>
+                      </m:e>
+                      <m:sub>
+                        <m:r>
+                          <a:rPr lang="en-US" b="0" i="1" smtClean="0">
+                            <a:latin typeface="Cambria Math" panose="02040503050406030204" pitchFamily="18" charset="0"/>
+                            <a:cs typeface="Calibri" panose="020F0502020204030204" pitchFamily="34" charset="0"/>
+                          </a:rPr>
+                          <m:t>𝑛</m:t>
+                        </m:r>
+                      </m:sub>
+                    </m:sSub>
+                    <m:r>
+                      <a:rPr lang="en-US" b="0" i="1" smtClean="0">
+                        <a:latin typeface="Cambria Math" panose="02040503050406030204" pitchFamily="18" charset="0"/>
+                        <a:cs typeface="Calibri" panose="020F0502020204030204" pitchFamily="34" charset="0"/>
+                      </a:rPr>
+                      <m:t>]</m:t>
+                    </m:r>
+                  </m:oMath>
+                </a14:m>
+                <a:r>
+                  <a:rPr lang="en-VN" dirty="0">
+                    <a:latin typeface="Calibri" panose="020F0502020204030204" pitchFamily="34" charset="0"/>
+                    <a:cs typeface="Calibri" panose="020F0502020204030204" pitchFamily="34" charset="0"/>
+                  </a:rPr>
+                  <a:t>, với </a:t>
+                </a:r>
+                <a14:m>
+                  <m:oMath xmlns:m="http://schemas.openxmlformats.org/officeDocument/2006/math">
+                    <m:sSub>
+                      <m:sSubPr>
+                        <m:ctrlPr>
+                          <a:rPr lang="en-VN" i="1" dirty="0" smtClean="0">
+                            <a:latin typeface="Cambria Math" panose="02040503050406030204" pitchFamily="18" charset="0"/>
+                            <a:cs typeface="Calibri" panose="020F0502020204030204" pitchFamily="34" charset="0"/>
+                          </a:rPr>
+                        </m:ctrlPr>
+                      </m:sSubPr>
+                      <m:e>
+                        <m:r>
+                          <a:rPr lang="en-VN" i="1" dirty="0" smtClean="0">
+                            <a:latin typeface="Cambria Math" panose="02040503050406030204" pitchFamily="18" charset="0"/>
+                            <a:cs typeface="Calibri" panose="020F0502020204030204" pitchFamily="34" charset="0"/>
+                          </a:rPr>
+                          <m:t>𝑜</m:t>
+                        </m:r>
+                      </m:e>
+                      <m:sub>
+                        <m:r>
+                          <a:rPr lang="en-VN" i="1" dirty="0" smtClean="0">
+                            <a:latin typeface="Cambria Math" panose="02040503050406030204" pitchFamily="18" charset="0"/>
+                            <a:cs typeface="Calibri" panose="020F0502020204030204" pitchFamily="34" charset="0"/>
+                          </a:rPr>
+                          <m:t>𝑖</m:t>
+                        </m:r>
+                      </m:sub>
+                    </m:sSub>
+                  </m:oMath>
+                </a14:m>
+                <a:r>
+                  <a:rPr lang="en-VN" dirty="0">
+                    <a:latin typeface="Calibri" panose="020F0502020204030204" pitchFamily="34" charset="0"/>
+                    <a:cs typeface="Calibri" panose="020F0502020204030204" pitchFamily="34" charset="0"/>
+                  </a:rPr>
+                  <a:t> là frame output của các cell LSTM thứ </a:t>
+                </a:r>
+                <a14:m>
+                  <m:oMath xmlns:m="http://schemas.openxmlformats.org/officeDocument/2006/math">
+                    <m:r>
+                      <a:rPr lang="en-VN" i="1" dirty="0" smtClean="0">
+                        <a:latin typeface="Cambria Math" panose="02040503050406030204" pitchFamily="18" charset="0"/>
+                        <a:cs typeface="Calibri" panose="020F0502020204030204" pitchFamily="34" charset="0"/>
+                      </a:rPr>
+                      <m:t>𝑖</m:t>
+                    </m:r>
+                  </m:oMath>
+                </a14:m>
+                <a:endParaRPr lang="en-VN" dirty="0">
+                  <a:latin typeface="Calibri" panose="020F0502020204030204" pitchFamily="34" charset="0"/>
+                  <a:cs typeface="Calibri" panose="020F0502020204030204" pitchFamily="34" charset="0"/>
+                </a:endParaRPr>
+              </a:p>
+              <a:p>
+                <a:pPr lvl="1">
+                  <a:buFont typeface="Wingdings" pitchFamily="2" charset="2"/>
+                  <a:buChar char="§"/>
+                </a:pPr>
+                <a:endParaRPr lang="en-VN" dirty="0">
+                  <a:latin typeface="Calibri" panose="020F0502020204030204" pitchFamily="34" charset="0"/>
+                  <a:cs typeface="Calibri" panose="020F0502020204030204" pitchFamily="34" charset="0"/>
+                </a:endParaRPr>
+              </a:p>
+              <a:p>
+                <a:pPr lvl="1">
+                  <a:buFont typeface="Wingdings" pitchFamily="2" charset="2"/>
+                  <a:buChar char="§"/>
+                </a:pPr>
+                <a:endParaRPr lang="en-VN" dirty="0">
+                  <a:latin typeface="Calibri" panose="020F0502020204030204" pitchFamily="34" charset="0"/>
+                  <a:cs typeface="Calibri" panose="020F0502020204030204" pitchFamily="34" charset="0"/>
+                </a:endParaRPr>
+              </a:p>
+            </p:txBody>
+          </p:sp>
+        </mc:Choice>
+        <mc:Fallback>
+          <p:sp>
+            <p:nvSpPr>
+              <p:cNvPr id="3" name="Content Placeholder 2">
+                <a:extLst>
+                  <a:ext uri="{FF2B5EF4-FFF2-40B4-BE49-F238E27FC236}">
+                    <a16:creationId xmlns:a16="http://schemas.microsoft.com/office/drawing/2014/main" id="{1F707462-72B9-E94F-AE0F-C78BC243524C}"/>
+                  </a:ext>
+                </a:extLst>
+              </p:cNvPr>
+              <p:cNvSpPr>
+                <a:spLocks noGrp="1" noRot="1" noChangeAspect="1" noMove="1" noResize="1" noEditPoints="1" noAdjustHandles="1" noChangeArrowheads="1" noChangeShapeType="1" noTextEdit="1"/>
+              </p:cNvSpPr>
+              <p:nvPr>
+                <p:ph idx="1"/>
+              </p:nvPr>
+            </p:nvSpPr>
+            <p:spPr>
+              <a:xfrm>
+                <a:off x="1115568" y="2478024"/>
+                <a:ext cx="10602300" cy="3694176"/>
+              </a:xfrm>
+              <a:blipFill>
+                <a:blip r:embed="rId3"/>
+                <a:stretch>
+                  <a:fillRect l="-718" t="-685"/>
+                </a:stretch>
+              </a:blipFill>
+            </p:spPr>
+            <p:txBody>
+              <a:bodyPr/>
+              <a:lstStyle/>
+              <a:p>
+                <a:r>
+                  <a:rPr lang="en-VN">
+                    <a:noFill/>
+                  </a:rPr>
+                  <a:t> </a:t>
+                </a:r>
+              </a:p>
+            </p:txBody>
+          </p:sp>
+        </mc:Fallback>
+      </mc:AlternateContent>
       <p:pic>
         <p:nvPicPr>
           <p:cNvPr id="7" name="Picture 6">
@@ -13267,15 +13703,14 @@
           <p:nvPr/>
         </p:nvPicPr>
         <p:blipFill>
-          <a:blip r:embed="rId3"/>
-          <a:stretch>
-            <a:fillRect/>
-          </a:stretch>
+          <a:blip r:embed="rId4"/>
+          <a:srcRect/>
+          <a:stretch/>
         </p:blipFill>
         <p:spPr>
           <a:xfrm>
-            <a:off x="1250141" y="4325112"/>
-            <a:ext cx="9898981" cy="854912"/>
+            <a:off x="1811867" y="3464712"/>
+            <a:ext cx="9338094" cy="860400"/>
           </a:xfrm>
           <a:prstGeom prst="rect">
             <a:avLst/>
@@ -13354,21 +13789,7 @@
                 <a:latin typeface="Calibri" panose="020F0502020204030204" pitchFamily="34" charset="0"/>
                 <a:cs typeface="Calibri" panose="020F0502020204030204" pitchFamily="34" charset="0"/>
               </a:rPr>
-              <a:t> SV2TTS – </a:t>
-            </a:r>
-            <a:r>
-              <a:rPr lang="en-US" sz="4500" dirty="0" err="1">
-                <a:latin typeface="Calibri" panose="020F0502020204030204" pitchFamily="34" charset="0"/>
-                <a:cs typeface="Calibri" panose="020F0502020204030204" pitchFamily="34" charset="0"/>
-              </a:rPr>
-              <a:t>Synthersizer</a:t>
-            </a:r>
-            <a:r>
-              <a:rPr lang="en-US" sz="4500" dirty="0">
-                <a:latin typeface="Calibri" panose="020F0502020204030204" pitchFamily="34" charset="0"/>
-                <a:cs typeface="Calibri" panose="020F0502020204030204" pitchFamily="34" charset="0"/>
-              </a:rPr>
-              <a:t> (3)</a:t>
+              <a:t> SV2TTS – Synthesizer (3)</a:t>
             </a:r>
             <a:endParaRPr lang="en-VN" sz="4500" dirty="0">
               <a:latin typeface="Calibri" panose="020F0502020204030204" pitchFamily="34" charset="0"/>
@@ -13393,27 +13814,79 @@
             <p:ph idx="1"/>
           </p:nvPr>
         </p:nvSpPr>
-        <p:spPr/>
+        <p:spPr>
+          <a:xfrm>
+            <a:off x="1115567" y="2478024"/>
+            <a:ext cx="10686965" cy="4379976"/>
+          </a:xfrm>
+        </p:spPr>
         <p:txBody>
           <a:bodyPr>
             <a:normAutofit/>
           </a:bodyPr>
           <a:lstStyle/>
           <a:p>
+            <a:pPr>
+              <a:buFont typeface="Wingdings" pitchFamily="2" charset="2"/>
+              <a:buChar char="§"/>
+            </a:pPr>
+            <a:r>
+              <a:rPr lang="en-VN" dirty="0">
+                <a:latin typeface="Calibri" panose="020F0502020204030204" pitchFamily="34" charset="0"/>
+                <a:cs typeface="Calibri" panose="020F0502020204030204" pitchFamily="34" charset="0"/>
+              </a:rPr>
+              <a:t>Location sensitive attention nhận vào các frame output của LSTM và speaker embedding của người nói. Nó biến đổi 2 thông tin này thành đầu vào của bộ decoder</a:t>
+            </a:r>
+          </a:p>
+          <a:p>
             <a:pPr lvl="1">
               <a:buFont typeface="Wingdings" pitchFamily="2" charset="2"/>
               <a:buChar char="§"/>
             </a:pPr>
             <a:r>
-              <a:rPr lang="en-VN" sz="2400" dirty="0">
+              <a:rPr lang="en-VN" dirty="0">
                 <a:latin typeface="Calibri" panose="020F0502020204030204" pitchFamily="34" charset="0"/>
                 <a:cs typeface="Calibri" panose="020F0502020204030204" pitchFamily="34" charset="0"/>
               </a:rPr>
-              <a:t>Location sensitive attention</a:t>
-            </a:r>
+              <a:t>Quy trình</a:t>
+            </a:r>
+            <a:endParaRPr lang="en-VN" sz="2200" dirty="0">
+              <a:latin typeface="Calibri" panose="020F0502020204030204" pitchFamily="34" charset="0"/>
+              <a:cs typeface="Calibri" panose="020F0502020204030204" pitchFamily="34" charset="0"/>
+            </a:endParaRPr>
           </a:p>
         </p:txBody>
       </p:sp>
+      <p:pic>
+        <p:nvPicPr>
+          <p:cNvPr id="5" name="Picture 4" descr="A picture containing text, clock&#10;&#10;Description automatically generated">
+            <a:extLst>
+              <a:ext uri="{FF2B5EF4-FFF2-40B4-BE49-F238E27FC236}">
+                <a16:creationId xmlns:a16="http://schemas.microsoft.com/office/drawing/2014/main" id="{BE63F673-769B-8841-BC1C-9DB99865C839}"/>
+              </a:ext>
+            </a:extLst>
+          </p:cNvPr>
+          <p:cNvPicPr>
+            <a:picLocks noChangeAspect="1"/>
+          </p:cNvPicPr>
+          <p:nvPr/>
+        </p:nvPicPr>
+        <p:blipFill>
+          <a:blip r:embed="rId3"/>
+          <a:stretch>
+            <a:fillRect/>
+          </a:stretch>
+        </p:blipFill>
+        <p:spPr>
+          <a:xfrm>
+            <a:off x="2446303" y="4116219"/>
+            <a:ext cx="7299393" cy="2006266"/>
+          </a:xfrm>
+          <a:prstGeom prst="rect">
+            <a:avLst/>
+          </a:prstGeom>
+        </p:spPr>
+      </p:pic>
     </p:spTree>
     <p:extLst>
       <p:ext uri="{BB962C8B-B14F-4D97-AF65-F5344CB8AC3E}">
@@ -13430,6 +13903,14 @@
 <file path=ppt/slides/slide19.xml><?xml version="1.0" encoding="utf-8"?>
 <p:sld xmlns:a="http://schemas.openxmlformats.org/drawingml/2006/main" xmlns:r="http://schemas.openxmlformats.org/officeDocument/2006/relationships" xmlns:p="http://schemas.openxmlformats.org/presentationml/2006/main">
   <p:cSld>
+    <p:bg>
+      <p:bgPr>
+        <a:solidFill>
+          <a:schemeClr val="bg1"/>
+        </a:solidFill>
+        <a:effectLst/>
+      </p:bgPr>
+    </p:bg>
     <p:spTree>
       <p:nvGrpSpPr>
         <p:cNvPr id="1" name=""/>
@@ -13444,6 +13925,168 @@
           <a:chExt cx="0" cy="0"/>
         </a:xfrm>
       </p:grpSpPr>
+      <p:sp useBgFill="1">
+        <p:nvSpPr>
+          <p:cNvPr id="10" name="Rectangle 9">
+            <a:extLst>
+              <a:ext uri="{FF2B5EF4-FFF2-40B4-BE49-F238E27FC236}">
+                <a16:creationId xmlns:a16="http://schemas.microsoft.com/office/drawing/2014/main" id="{2C9A9DA9-7DC8-488B-A882-123947B0F3D9}"/>
+              </a:ext>
+              <a:ext uri="{C183D7F6-B498-43B3-948B-1728B52AA6E4}">
+                <adec:decorative xmlns:adec="http://schemas.microsoft.com/office/drawing/2017/decorative" val="1"/>
+              </a:ext>
+            </a:extLst>
+          </p:cNvPr>
+          <p:cNvSpPr>
+            <a:spLocks noGrp="1" noRot="1" noChangeAspect="1" noMove="1" noResize="1" noEditPoints="1" noAdjustHandles="1" noChangeArrowheads="1" noChangeShapeType="1" noTextEdit="1"/>
+          </p:cNvSpPr>
+          <p:nvPr>
+            <p:extLst>
+              <p:ext uri="{386F3935-93C4-4BCD-93E2-E3B085C9AB24}">
+                <p16:designElem xmlns:p16="http://schemas.microsoft.com/office/powerpoint/2015/main" val="1"/>
+              </p:ext>
+            </p:extLst>
+          </p:nvPr>
+        </p:nvSpPr>
+        <p:spPr>
+          <a:xfrm>
+            <a:off x="0" y="0"/>
+            <a:ext cx="12192000" cy="6858000"/>
+          </a:xfrm>
+          <a:prstGeom prst="rect">
+            <a:avLst/>
+          </a:prstGeom>
+          <a:ln>
+            <a:noFill/>
+          </a:ln>
+        </p:spPr>
+        <p:style>
+          <a:lnRef idx="2">
+            <a:schemeClr val="accent1">
+              <a:shade val="50000"/>
+            </a:schemeClr>
+          </a:lnRef>
+          <a:fillRef idx="1">
+            <a:schemeClr val="accent1"/>
+          </a:fillRef>
+          <a:effectRef idx="0">
+            <a:schemeClr val="accent1"/>
+          </a:effectRef>
+          <a:fontRef idx="minor">
+            <a:schemeClr val="lt1"/>
+          </a:fontRef>
+        </p:style>
+        <p:txBody>
+          <a:bodyPr rtlCol="0" anchor="ctr"/>
+          <a:lstStyle/>
+          <a:p>
+            <a:pPr algn="ctr"/>
+            <a:endParaRPr lang="en-US"/>
+          </a:p>
+        </p:txBody>
+      </p:sp>
+      <p:sp useBgFill="1">
+        <p:nvSpPr>
+          <p:cNvPr id="12" name="Rectangle 11">
+            <a:extLst>
+              <a:ext uri="{FF2B5EF4-FFF2-40B4-BE49-F238E27FC236}">
+                <a16:creationId xmlns:a16="http://schemas.microsoft.com/office/drawing/2014/main" id="{57F6BDD4-E066-4008-8011-6CC31AEB4556}"/>
+              </a:ext>
+              <a:ext uri="{C183D7F6-B498-43B3-948B-1728B52AA6E4}">
+                <adec:decorative xmlns:adec="http://schemas.microsoft.com/office/drawing/2017/decorative" val="1"/>
+              </a:ext>
+            </a:extLst>
+          </p:cNvPr>
+          <p:cNvSpPr>
+            <a:spLocks noGrp="1" noRot="1" noChangeAspect="1" noMove="1" noResize="1" noEditPoints="1" noAdjustHandles="1" noChangeArrowheads="1" noChangeShapeType="1" noTextEdit="1"/>
+          </p:cNvSpPr>
+          <p:nvPr>
+            <p:extLst>
+              <p:ext uri="{386F3935-93C4-4BCD-93E2-E3B085C9AB24}">
+                <p16:designElem xmlns:p16="http://schemas.microsoft.com/office/powerpoint/2015/main" val="1"/>
+              </p:ext>
+            </p:extLst>
+          </p:nvPr>
+        </p:nvSpPr>
+        <p:spPr>
+          <a:xfrm>
+            <a:off x="409575" y="633619"/>
+            <a:ext cx="4279383" cy="5495925"/>
+          </a:xfrm>
+          <a:prstGeom prst="rect">
+            <a:avLst/>
+          </a:prstGeom>
+          <a:ln w="9525">
+            <a:solidFill>
+              <a:schemeClr val="tx2">
+                <a:lumMod val="10000"/>
+                <a:lumOff val="90000"/>
+              </a:schemeClr>
+            </a:solidFill>
+          </a:ln>
+          <a:effectLst>
+            <a:outerShdw blurRad="50800" dist="38100" dir="2700000" algn="tl" rotWithShape="0">
+              <a:schemeClr val="bg1">
+                <a:lumMod val="85000"/>
+                <a:alpha val="30000"/>
+              </a:schemeClr>
+            </a:outerShdw>
+          </a:effectLst>
+        </p:spPr>
+        <p:style>
+          <a:lnRef idx="2">
+            <a:schemeClr val="accent1">
+              <a:shade val="50000"/>
+            </a:schemeClr>
+          </a:lnRef>
+          <a:fillRef idx="1">
+            <a:schemeClr val="accent1"/>
+          </a:fillRef>
+          <a:effectRef idx="0">
+            <a:schemeClr val="accent1"/>
+          </a:effectRef>
+          <a:fontRef idx="minor">
+            <a:schemeClr val="lt1"/>
+          </a:fontRef>
+        </p:style>
+        <p:txBody>
+          <a:bodyPr rtlCol="0" anchor="ctr"/>
+          <a:lstStyle/>
+          <a:p>
+            <a:pPr marL="0" marR="0" lvl="0" indent="0" algn="ctr" defTabSz="914400" rtl="0" eaLnBrk="1" fontAlgn="auto" latinLnBrk="0" hangingPunct="1">
+              <a:lnSpc>
+                <a:spcPct val="100000"/>
+              </a:lnSpc>
+              <a:spcBef>
+                <a:spcPts val="0"/>
+              </a:spcBef>
+              <a:spcAft>
+                <a:spcPts val="0"/>
+              </a:spcAft>
+              <a:buClrTx/>
+              <a:buSzTx/>
+              <a:buFontTx/>
+              <a:buNone/>
+              <a:tabLst/>
+              <a:defRPr/>
+            </a:pPr>
+            <a:endParaRPr kumimoji="0" lang="en-US" sz="1800" b="0" i="0" u="none" strike="noStrike" kern="1200" cap="none" spc="0" normalizeH="0" baseline="0" noProof="0">
+              <a:ln>
+                <a:noFill/>
+              </a:ln>
+              <a:solidFill>
+                <a:prstClr val="white"/>
+              </a:solidFill>
+              <a:effectLst/>
+              <a:uLnTx/>
+              <a:uFillTx/>
+              <a:latin typeface="Calibri" panose="020F0502020204030204"/>
+              <a:ea typeface="+mn-ea"/>
+              <a:cs typeface="+mn-cs"/>
+            </a:endParaRPr>
+          </a:p>
+        </p:txBody>
+      </p:sp>
       <p:sp>
         <p:nvSpPr>
           <p:cNvPr id="2" name="Title 1">
@@ -13460,7 +14103,12 @@
             <p:ph type="title"/>
           </p:nvPr>
         </p:nvSpPr>
-        <p:spPr/>
+        <p:spPr>
+          <a:xfrm>
+            <a:off x="841247" y="978619"/>
+            <a:ext cx="3410712" cy="1106424"/>
+          </a:xfrm>
+        </p:spPr>
         <p:txBody>
           <a:bodyPr>
             <a:normAutofit/>
@@ -13468,41 +14116,13 @@
           <a:lstStyle/>
           <a:p>
             <a:r>
-              <a:rPr lang="en-US" sz="4500" dirty="0">
+              <a:rPr lang="en-US" sz="2800">
                 <a:latin typeface="Calibri" panose="020F0502020204030204" pitchFamily="34" charset="0"/>
                 <a:cs typeface="Calibri" panose="020F0502020204030204" pitchFamily="34" charset="0"/>
               </a:rPr>
-              <a:t>Chi </a:t>
-            </a:r>
-            <a:r>
-              <a:rPr lang="en-US" sz="4500" dirty="0" err="1">
-                <a:latin typeface="Calibri" panose="020F0502020204030204" pitchFamily="34" charset="0"/>
-                <a:cs typeface="Calibri" panose="020F0502020204030204" pitchFamily="34" charset="0"/>
-              </a:rPr>
-              <a:t>tiết</a:t>
-            </a:r>
-            <a:r>
-              <a:rPr lang="en-US" sz="4500" dirty="0">
-                <a:latin typeface="Calibri" panose="020F0502020204030204" pitchFamily="34" charset="0"/>
-                <a:cs typeface="Calibri" panose="020F0502020204030204" pitchFamily="34" charset="0"/>
-              </a:rPr>
-              <a:t> SV2TTS – </a:t>
-            </a:r>
-            <a:r>
-              <a:rPr lang="en-US" sz="4500" dirty="0" err="1">
-                <a:latin typeface="Calibri" panose="020F0502020204030204" pitchFamily="34" charset="0"/>
-                <a:cs typeface="Calibri" panose="020F0502020204030204" pitchFamily="34" charset="0"/>
-              </a:rPr>
-              <a:t>Synthersizer</a:t>
-            </a:r>
-            <a:r>
-              <a:rPr lang="en-US" sz="4500" dirty="0">
-                <a:latin typeface="Calibri" panose="020F0502020204030204" pitchFamily="34" charset="0"/>
-                <a:cs typeface="Calibri" panose="020F0502020204030204" pitchFamily="34" charset="0"/>
-              </a:rPr>
-              <a:t> (4)</a:t>
-            </a:r>
-            <a:endParaRPr lang="en-VN" sz="4500" dirty="0">
+              <a:t>Chi tiết SV2TTS – Synthersizer (4)</a:t>
+            </a:r>
+            <a:endParaRPr lang="en-VN" sz="2800">
               <a:latin typeface="Calibri" panose="020F0502020204030204" pitchFamily="34" charset="0"/>
               <a:cs typeface="Calibri" panose="020F0502020204030204" pitchFamily="34" charset="0"/>
             </a:endParaRPr>
@@ -13511,41 +14131,539 @@
       </p:sp>
       <p:sp>
         <p:nvSpPr>
-          <p:cNvPr id="3" name="Content Placeholder 2">
+          <p:cNvPr id="14" name="Rectangle 13">
             <a:extLst>
               <a:ext uri="{FF2B5EF4-FFF2-40B4-BE49-F238E27FC236}">
-                <a16:creationId xmlns:a16="http://schemas.microsoft.com/office/drawing/2014/main" id="{1F707462-72B9-E94F-AE0F-C78BC243524C}"/>
+                <a16:creationId xmlns:a16="http://schemas.microsoft.com/office/drawing/2014/main" id="{2711A8FB-68FC-45FC-B01E-38F809E2D439}"/>
+              </a:ext>
+              <a:ext uri="{C183D7F6-B498-43B3-948B-1728B52AA6E4}">
+                <adec:decorative xmlns:adec="http://schemas.microsoft.com/office/drawing/2017/decorative" val="1"/>
               </a:ext>
             </a:extLst>
           </p:cNvPr>
           <p:cNvSpPr>
-            <a:spLocks noGrp="1"/>
+            <a:spLocks noGrp="1" noRot="1" noChangeAspect="1" noMove="1" noResize="1" noEditPoints="1" noAdjustHandles="1" noChangeArrowheads="1" noChangeShapeType="1" noTextEdit="1"/>
           </p:cNvSpPr>
           <p:nvPr>
-            <p:ph idx="1"/>
+            <p:extLst>
+              <p:ext uri="{386F3935-93C4-4BCD-93E2-E3B085C9AB24}">
+                <p16:designElem xmlns:p16="http://schemas.microsoft.com/office/powerpoint/2015/main" val="1"/>
+              </p:ext>
+            </p:extLst>
           </p:nvPr>
         </p:nvSpPr>
-        <p:spPr/>
+        <p:spPr>
+          <a:xfrm>
+            <a:off x="345567" y="1171300"/>
+            <a:ext cx="128016" cy="704088"/>
+          </a:xfrm>
+          <a:prstGeom prst="rect">
+            <a:avLst/>
+          </a:prstGeom>
+          <a:solidFill>
+            <a:schemeClr val="accent1"/>
+          </a:solidFill>
+          <a:ln>
+            <a:noFill/>
+          </a:ln>
+        </p:spPr>
+        <p:style>
+          <a:lnRef idx="2">
+            <a:schemeClr val="accent1">
+              <a:shade val="50000"/>
+            </a:schemeClr>
+          </a:lnRef>
+          <a:fillRef idx="1">
+            <a:schemeClr val="accent1"/>
+          </a:fillRef>
+          <a:effectRef idx="0">
+            <a:schemeClr val="accent1"/>
+          </a:effectRef>
+          <a:fontRef idx="minor">
+            <a:schemeClr val="lt1"/>
+          </a:fontRef>
+        </p:style>
         <p:txBody>
-          <a:bodyPr>
-            <a:normAutofit/>
-          </a:bodyPr>
+          <a:bodyPr rtlCol="0" anchor="ctr"/>
           <a:lstStyle/>
           <a:p>
-            <a:pPr lvl="1">
-              <a:buFont typeface="Wingdings" pitchFamily="2" charset="2"/>
-              <a:buChar char="§"/>
+            <a:pPr marL="0" marR="0" lvl="0" indent="0" algn="ctr" defTabSz="914400" rtl="0" eaLnBrk="1" fontAlgn="auto" latinLnBrk="0" hangingPunct="1">
+              <a:lnSpc>
+                <a:spcPct val="100000"/>
+              </a:lnSpc>
+              <a:spcBef>
+                <a:spcPts val="0"/>
+              </a:spcBef>
+              <a:spcAft>
+                <a:spcPts val="0"/>
+              </a:spcAft>
+              <a:buClrTx/>
+              <a:buSzTx/>
+              <a:buFontTx/>
+              <a:buNone/>
+              <a:tabLst/>
+              <a:defRPr/>
             </a:pPr>
-            <a:r>
-              <a:rPr lang="en-VN" sz="2400" dirty="0">
-                <a:latin typeface="Calibri" panose="020F0502020204030204" pitchFamily="34" charset="0"/>
-                <a:cs typeface="Calibri" panose="020F0502020204030204" pitchFamily="34" charset="0"/>
-              </a:rPr>
-              <a:t>Decoder</a:t>
-            </a:r>
+            <a:endParaRPr kumimoji="0" lang="en-US" sz="1800" b="0" i="0" u="none" strike="noStrike" kern="1200" cap="none" spc="0" normalizeH="0" baseline="0" noProof="0">
+              <a:ln>
+                <a:noFill/>
+              </a:ln>
+              <a:solidFill>
+                <a:prstClr val="white"/>
+              </a:solidFill>
+              <a:effectLst/>
+              <a:uLnTx/>
+              <a:uFillTx/>
+              <a:latin typeface="Calibri" panose="020F0502020204030204"/>
+              <a:ea typeface="+mn-ea"/>
+              <a:cs typeface="+mn-cs"/>
+            </a:endParaRPr>
           </a:p>
         </p:txBody>
       </p:sp>
+      <p:sp>
+        <p:nvSpPr>
+          <p:cNvPr id="16" name="Rectangle 15">
+            <a:extLst>
+              <a:ext uri="{FF2B5EF4-FFF2-40B4-BE49-F238E27FC236}">
+                <a16:creationId xmlns:a16="http://schemas.microsoft.com/office/drawing/2014/main" id="{2A865FE3-5FC9-4049-87CF-30019C46C0F5}"/>
+              </a:ext>
+              <a:ext uri="{C183D7F6-B498-43B3-948B-1728B52AA6E4}">
+                <adec:decorative xmlns:adec="http://schemas.microsoft.com/office/drawing/2017/decorative" val="1"/>
+              </a:ext>
+            </a:extLst>
+          </p:cNvPr>
+          <p:cNvSpPr>
+            <a:spLocks noGrp="1" noRot="1" noChangeAspect="1" noMove="1" noResize="1" noEditPoints="1" noAdjustHandles="1" noChangeArrowheads="1" noChangeShapeType="1" noTextEdit="1"/>
+          </p:cNvSpPr>
+          <p:nvPr>
+            <p:extLst>
+              <p:ext uri="{386F3935-93C4-4BCD-93E2-E3B085C9AB24}">
+                <p16:designElem xmlns:p16="http://schemas.microsoft.com/office/powerpoint/2015/main" val="1"/>
+              </p:ext>
+            </p:extLst>
+          </p:nvPr>
+        </p:nvSpPr>
+        <p:spPr>
+          <a:xfrm>
+            <a:off x="877459" y="2093976"/>
+            <a:ext cx="3328416" cy="9144"/>
+          </a:xfrm>
+          <a:prstGeom prst="rect">
+            <a:avLst/>
+          </a:prstGeom>
+          <a:solidFill>
+            <a:schemeClr val="tx2">
+              <a:lumMod val="25000"/>
+              <a:lumOff val="75000"/>
+            </a:schemeClr>
+          </a:solidFill>
+          <a:ln w="3175">
+            <a:noFill/>
+          </a:ln>
+          <a:effectLst/>
+        </p:spPr>
+        <p:style>
+          <a:lnRef idx="2">
+            <a:schemeClr val="accent1">
+              <a:shade val="50000"/>
+            </a:schemeClr>
+          </a:lnRef>
+          <a:fillRef idx="1">
+            <a:schemeClr val="accent1"/>
+          </a:fillRef>
+          <a:effectRef idx="0">
+            <a:schemeClr val="accent1"/>
+          </a:effectRef>
+          <a:fontRef idx="minor">
+            <a:schemeClr val="lt1"/>
+          </a:fontRef>
+        </p:style>
+        <p:txBody>
+          <a:bodyPr rtlCol="0" anchor="ctr"/>
+          <a:lstStyle/>
+          <a:p>
+            <a:pPr marL="0" marR="0" lvl="0" indent="0" algn="ctr" defTabSz="914400" rtl="0" eaLnBrk="1" fontAlgn="auto" latinLnBrk="0" hangingPunct="1">
+              <a:lnSpc>
+                <a:spcPct val="100000"/>
+              </a:lnSpc>
+              <a:spcBef>
+                <a:spcPts val="0"/>
+              </a:spcBef>
+              <a:spcAft>
+                <a:spcPts val="0"/>
+              </a:spcAft>
+              <a:buClrTx/>
+              <a:buSzTx/>
+              <a:buFontTx/>
+              <a:buNone/>
+              <a:tabLst/>
+              <a:defRPr/>
+            </a:pPr>
+            <a:endParaRPr kumimoji="0" lang="en-US" sz="1800" b="0" i="0" u="none" strike="noStrike" kern="1200" cap="none" spc="0" normalizeH="0" baseline="0" noProof="0">
+              <a:ln>
+                <a:noFill/>
+              </a:ln>
+              <a:solidFill>
+                <a:prstClr val="white"/>
+              </a:solidFill>
+              <a:effectLst/>
+              <a:uLnTx/>
+              <a:uFillTx/>
+              <a:latin typeface="Calibri" panose="020F0502020204030204"/>
+              <a:ea typeface="+mn-ea"/>
+              <a:cs typeface="+mn-cs"/>
+            </a:endParaRPr>
+          </a:p>
+        </p:txBody>
+      </p:sp>
+      <mc:AlternateContent xmlns:mc="http://schemas.openxmlformats.org/markup-compatibility/2006">
+        <mc:Choice xmlns:a14="http://schemas.microsoft.com/office/drawing/2010/main" Requires="a14">
+          <p:sp>
+            <p:nvSpPr>
+              <p:cNvPr id="3" name="Content Placeholder 2">
+                <a:extLst>
+                  <a:ext uri="{FF2B5EF4-FFF2-40B4-BE49-F238E27FC236}">
+                    <a16:creationId xmlns:a16="http://schemas.microsoft.com/office/drawing/2014/main" id="{1F707462-72B9-E94F-AE0F-C78BC243524C}"/>
+                  </a:ext>
+                </a:extLst>
+              </p:cNvPr>
+              <p:cNvSpPr>
+                <a:spLocks noGrp="1"/>
+              </p:cNvSpPr>
+              <p:nvPr>
+                <p:ph idx="1"/>
+              </p:nvPr>
+            </p:nvSpPr>
+            <p:spPr>
+              <a:xfrm>
+                <a:off x="345567" y="2252870"/>
+                <a:ext cx="4343392" cy="3962367"/>
+              </a:xfrm>
+            </p:spPr>
+            <p:txBody>
+              <a:bodyPr>
+                <a:normAutofit/>
+              </a:bodyPr>
+              <a:lstStyle/>
+              <a:p>
+                <a:pPr lvl="1">
+                  <a:buFont typeface="Wingdings" pitchFamily="2" charset="2"/>
+                  <a:buChar char="§"/>
+                </a:pPr>
+                <a:r>
+                  <a:rPr lang="en-VN" sz="1700" dirty="0">
+                    <a:latin typeface="Calibri" panose="020F0502020204030204" pitchFamily="34" charset="0"/>
+                    <a:cs typeface="Calibri" panose="020F0502020204030204" pitchFamily="34" charset="0"/>
+                  </a:rPr>
+                  <a:t>Mục đích: Xem xét sự ảnh hưởng (xác suất) của các frame khác đến frame đang xét</a:t>
+                </a:r>
+              </a:p>
+              <a:p>
+                <a:pPr lvl="1">
+                  <a:buFont typeface="Wingdings" pitchFamily="2" charset="2"/>
+                  <a:buChar char="§"/>
+                </a:pPr>
+                <a:r>
+                  <a:rPr lang="en-VN" sz="1700" dirty="0">
+                    <a:latin typeface="Calibri" panose="020F0502020204030204" pitchFamily="34" charset="0"/>
+                    <a:cs typeface="Calibri" panose="020F0502020204030204" pitchFamily="34" charset="0"/>
+                  </a:rPr>
+                  <a:t>Ví dụ: Xét câu nói “Hôm nay thời tiết xấu. Chúng ta không thể ra ngoài”</a:t>
+                </a:r>
+              </a:p>
+              <a:p>
+                <a:pPr lvl="2">
+                  <a:buFont typeface="Wingdings" pitchFamily="2" charset="2"/>
+                  <a:buChar char="§"/>
+                </a:pPr>
+                <a:r>
+                  <a:rPr lang="en-VN" sz="1500" dirty="0">
+                    <a:latin typeface="Calibri" panose="020F0502020204030204" pitchFamily="34" charset="0"/>
+                    <a:cs typeface="Calibri" panose="020F0502020204030204" pitchFamily="34" charset="0"/>
+                  </a:rPr>
+                  <a:t>Các từ “hôm”, “nay” ảnh hưởng đến nhau rất nhiều</a:t>
+                </a:r>
+              </a:p>
+              <a:p>
+                <a:pPr lvl="2">
+                  <a:buFont typeface="Wingdings" pitchFamily="2" charset="2"/>
+                  <a:buChar char="§"/>
+                </a:pPr>
+                <a:r>
+                  <a:rPr lang="en-VN" sz="1500" dirty="0">
+                    <a:latin typeface="Calibri" panose="020F0502020204030204" pitchFamily="34" charset="0"/>
+                    <a:cs typeface="Calibri" panose="020F0502020204030204" pitchFamily="34" charset="0"/>
+                  </a:rPr>
+                  <a:t>Các từ “thời”, “ngoài” rất ít ảnh hưởng đến nhau</a:t>
+                </a:r>
+              </a:p>
+              <a:p>
+                <a:pPr lvl="1">
+                  <a:buFont typeface="Wingdings" pitchFamily="2" charset="2"/>
+                  <a:buChar char="§"/>
+                </a:pPr>
+                <a:r>
+                  <a:rPr lang="en-VN" sz="1700" dirty="0">
+                    <a:latin typeface="Calibri" panose="020F0502020204030204" pitchFamily="34" charset="0"/>
+                    <a:cs typeface="Calibri" panose="020F0502020204030204" pitchFamily="34" charset="0"/>
+                  </a:rPr>
+                  <a:t>Output có dạng </a:t>
+                </a:r>
+                <a14:m>
+                  <m:oMath xmlns:m="http://schemas.openxmlformats.org/officeDocument/2006/math">
+                    <m:d>
+                      <m:dPr>
+                        <m:begChr m:val="["/>
+                        <m:endChr m:val="]"/>
+                        <m:ctrlPr>
+                          <a:rPr lang="en-US" sz="1700" b="0" i="1" smtClean="0">
+                            <a:latin typeface="Cambria Math" panose="02040503050406030204" pitchFamily="18" charset="0"/>
+                            <a:cs typeface="Calibri" panose="020F0502020204030204" pitchFamily="34" charset="0"/>
+                          </a:rPr>
+                        </m:ctrlPr>
+                      </m:dPr>
+                      <m:e>
+                        <m:sSub>
+                          <m:sSubPr>
+                            <m:ctrlPr>
+                              <a:rPr lang="en-US" sz="1700" b="0" i="1" smtClean="0">
+                                <a:latin typeface="Cambria Math" panose="02040503050406030204" pitchFamily="18" charset="0"/>
+                                <a:cs typeface="Calibri" panose="020F0502020204030204" pitchFamily="34" charset="0"/>
+                              </a:rPr>
+                            </m:ctrlPr>
+                          </m:sSubPr>
+                          <m:e>
+                            <m:r>
+                              <a:rPr lang="en-US" sz="1700" b="0" i="1" smtClean="0">
+                                <a:latin typeface="Cambria Math" panose="02040503050406030204" pitchFamily="18" charset="0"/>
+                                <a:cs typeface="Calibri" panose="020F0502020204030204" pitchFamily="34" charset="0"/>
+                              </a:rPr>
+                              <m:t>𝑐</m:t>
+                            </m:r>
+                          </m:e>
+                          <m:sub>
+                            <m:r>
+                              <a:rPr lang="en-US" sz="1700" b="0" i="1" smtClean="0">
+                                <a:latin typeface="Cambria Math" panose="02040503050406030204" pitchFamily="18" charset="0"/>
+                                <a:cs typeface="Calibri" panose="020F0502020204030204" pitchFamily="34" charset="0"/>
+                              </a:rPr>
+                              <m:t>0</m:t>
+                            </m:r>
+                          </m:sub>
+                        </m:sSub>
+                        <m:r>
+                          <a:rPr lang="en-US" sz="1700" b="0" i="1" smtClean="0">
+                            <a:latin typeface="Cambria Math" panose="02040503050406030204" pitchFamily="18" charset="0"/>
+                            <a:cs typeface="Calibri" panose="020F0502020204030204" pitchFamily="34" charset="0"/>
+                          </a:rPr>
+                          <m:t>,</m:t>
+                        </m:r>
+                        <m:sSub>
+                          <m:sSubPr>
+                            <m:ctrlPr>
+                              <a:rPr lang="en-US" sz="1700" b="0" i="1" smtClean="0">
+                                <a:latin typeface="Cambria Math" panose="02040503050406030204" pitchFamily="18" charset="0"/>
+                                <a:cs typeface="Calibri" panose="020F0502020204030204" pitchFamily="34" charset="0"/>
+                              </a:rPr>
+                            </m:ctrlPr>
+                          </m:sSubPr>
+                          <m:e>
+                            <m:r>
+                              <a:rPr lang="en-US" sz="1700" b="0" i="1" smtClean="0">
+                                <a:latin typeface="Cambria Math" panose="02040503050406030204" pitchFamily="18" charset="0"/>
+                                <a:cs typeface="Calibri" panose="020F0502020204030204" pitchFamily="34" charset="0"/>
+                              </a:rPr>
+                              <m:t>𝑐</m:t>
+                            </m:r>
+                          </m:e>
+                          <m:sub>
+                            <m:r>
+                              <a:rPr lang="en-US" sz="1700" b="0" i="1" smtClean="0">
+                                <a:latin typeface="Cambria Math" panose="02040503050406030204" pitchFamily="18" charset="0"/>
+                                <a:cs typeface="Calibri" panose="020F0502020204030204" pitchFamily="34" charset="0"/>
+                              </a:rPr>
+                              <m:t>1</m:t>
+                            </m:r>
+                          </m:sub>
+                        </m:sSub>
+                        <m:r>
+                          <a:rPr lang="en-US" sz="1700" b="0" i="1" smtClean="0">
+                            <a:latin typeface="Cambria Math" panose="02040503050406030204" pitchFamily="18" charset="0"/>
+                            <a:cs typeface="Calibri" panose="020F0502020204030204" pitchFamily="34" charset="0"/>
+                          </a:rPr>
+                          <m:t>,…,</m:t>
+                        </m:r>
+                        <m:sSub>
+                          <m:sSubPr>
+                            <m:ctrlPr>
+                              <a:rPr lang="en-US" sz="1700" b="0" i="1" smtClean="0">
+                                <a:latin typeface="Cambria Math" panose="02040503050406030204" pitchFamily="18" charset="0"/>
+                                <a:cs typeface="Calibri" panose="020F0502020204030204" pitchFamily="34" charset="0"/>
+                              </a:rPr>
+                            </m:ctrlPr>
+                          </m:sSubPr>
+                          <m:e>
+                            <m:r>
+                              <a:rPr lang="en-US" sz="1700" b="0" i="1" smtClean="0">
+                                <a:latin typeface="Cambria Math" panose="02040503050406030204" pitchFamily="18" charset="0"/>
+                                <a:cs typeface="Calibri" panose="020F0502020204030204" pitchFamily="34" charset="0"/>
+                              </a:rPr>
+                              <m:t>𝑐</m:t>
+                            </m:r>
+                          </m:e>
+                          <m:sub>
+                            <m:r>
+                              <a:rPr lang="en-US" sz="1700" b="0" i="1" smtClean="0">
+                                <a:latin typeface="Cambria Math" panose="02040503050406030204" pitchFamily="18" charset="0"/>
+                                <a:cs typeface="Calibri" panose="020F0502020204030204" pitchFamily="34" charset="0"/>
+                              </a:rPr>
+                              <m:t>𝑛</m:t>
+                            </m:r>
+                          </m:sub>
+                        </m:sSub>
+                      </m:e>
+                    </m:d>
+                  </m:oMath>
+                </a14:m>
+                <a:r>
+                  <a:rPr lang="en-VN" sz="1700" dirty="0">
+                    <a:latin typeface="Calibri" panose="020F0502020204030204" pitchFamily="34" charset="0"/>
+                    <a:cs typeface="Calibri" panose="020F0502020204030204" pitchFamily="34" charset="0"/>
+                  </a:rPr>
+                  <a:t> với </a:t>
+                </a:r>
+                <a14:m>
+                  <m:oMath xmlns:m="http://schemas.openxmlformats.org/officeDocument/2006/math">
+                    <m:sSub>
+                      <m:sSubPr>
+                        <m:ctrlPr>
+                          <a:rPr lang="en-VN" sz="1700" i="1" dirty="0" smtClean="0">
+                            <a:latin typeface="Cambria Math" panose="02040503050406030204" pitchFamily="18" charset="0"/>
+                            <a:cs typeface="Calibri" panose="020F0502020204030204" pitchFamily="34" charset="0"/>
+                          </a:rPr>
+                        </m:ctrlPr>
+                      </m:sSubPr>
+                      <m:e>
+                        <m:r>
+                          <a:rPr lang="en-VN" sz="1700" i="1" dirty="0" smtClean="0">
+                            <a:latin typeface="Cambria Math" panose="02040503050406030204" pitchFamily="18" charset="0"/>
+                            <a:cs typeface="Calibri" panose="020F0502020204030204" pitchFamily="34" charset="0"/>
+                          </a:rPr>
+                          <m:t>𝑐</m:t>
+                        </m:r>
+                      </m:e>
+                      <m:sub>
+                        <m:r>
+                          <a:rPr lang="en-VN" sz="1700" i="1" dirty="0" smtClean="0">
+                            <a:latin typeface="Cambria Math" panose="02040503050406030204" pitchFamily="18" charset="0"/>
+                            <a:cs typeface="Calibri" panose="020F0502020204030204" pitchFamily="34" charset="0"/>
+                          </a:rPr>
+                          <m:t>𝑖</m:t>
+                        </m:r>
+                      </m:sub>
+                    </m:sSub>
+                  </m:oMath>
+                </a14:m>
+                <a:r>
+                  <a:rPr lang="en-VN" sz="1700" dirty="0">
+                    <a:latin typeface="Calibri" panose="020F0502020204030204" pitchFamily="34" charset="0"/>
+                    <a:cs typeface="Calibri" panose="020F0502020204030204" pitchFamily="34" charset="0"/>
+                  </a:rPr>
+                  <a:t> là vector xác suất thể hiện sự ảnh hưởng của các frame khác đến frame thứ </a:t>
+                </a:r>
+                <a14:m>
+                  <m:oMath xmlns:m="http://schemas.openxmlformats.org/officeDocument/2006/math">
+                    <m:r>
+                      <a:rPr lang="en-VN" sz="1700" i="1" dirty="0" smtClean="0">
+                        <a:latin typeface="Cambria Math" panose="02040503050406030204" pitchFamily="18" charset="0"/>
+                        <a:cs typeface="Calibri" panose="020F0502020204030204" pitchFamily="34" charset="0"/>
+                      </a:rPr>
+                      <m:t>𝑖</m:t>
+                    </m:r>
+                  </m:oMath>
+                </a14:m>
+                <a:endParaRPr lang="en-VN" sz="1700" dirty="0">
+                  <a:latin typeface="Calibri" panose="020F0502020204030204" pitchFamily="34" charset="0"/>
+                  <a:cs typeface="Calibri" panose="020F0502020204030204" pitchFamily="34" charset="0"/>
+                </a:endParaRPr>
+              </a:p>
+            </p:txBody>
+          </p:sp>
+        </mc:Choice>
+        <mc:Fallback>
+          <p:sp>
+            <p:nvSpPr>
+              <p:cNvPr id="3" name="Content Placeholder 2">
+                <a:extLst>
+                  <a:ext uri="{FF2B5EF4-FFF2-40B4-BE49-F238E27FC236}">
+                    <a16:creationId xmlns:a16="http://schemas.microsoft.com/office/drawing/2014/main" id="{1F707462-72B9-E94F-AE0F-C78BC243524C}"/>
+                  </a:ext>
+                </a:extLst>
+              </p:cNvPr>
+              <p:cNvSpPr>
+                <a:spLocks noGrp="1" noRot="1" noChangeAspect="1" noMove="1" noResize="1" noEditPoints="1" noAdjustHandles="1" noChangeArrowheads="1" noChangeShapeType="1" noTextEdit="1"/>
+              </p:cNvSpPr>
+              <p:nvPr>
+                <p:ph idx="1"/>
+              </p:nvPr>
+            </p:nvSpPr>
+            <p:spPr>
+              <a:xfrm>
+                <a:off x="345567" y="2252870"/>
+                <a:ext cx="4343392" cy="3962367"/>
+              </a:xfrm>
+              <a:blipFill>
+                <a:blip r:embed="rId3"/>
+                <a:stretch>
+                  <a:fillRect t="-319" r="-292"/>
+                </a:stretch>
+              </a:blipFill>
+            </p:spPr>
+            <p:txBody>
+              <a:bodyPr/>
+              <a:lstStyle/>
+              <a:p>
+                <a:r>
+                  <a:rPr lang="en-VN">
+                    <a:noFill/>
+                  </a:rPr>
+                  <a:t> </a:t>
+                </a:r>
+              </a:p>
+            </p:txBody>
+          </p:sp>
+        </mc:Fallback>
+      </mc:AlternateContent>
+      <p:pic>
+        <p:nvPicPr>
+          <p:cNvPr id="5" name="Picture 4">
+            <a:extLst>
+              <a:ext uri="{FF2B5EF4-FFF2-40B4-BE49-F238E27FC236}">
+                <a16:creationId xmlns:a16="http://schemas.microsoft.com/office/drawing/2014/main" id="{BF76CFDE-57D4-CB48-9F4E-891CB9537B0F}"/>
+              </a:ext>
+            </a:extLst>
+          </p:cNvPr>
+          <p:cNvPicPr>
+            <a:picLocks noChangeAspect="1"/>
+          </p:cNvPicPr>
+          <p:nvPr/>
+        </p:nvPicPr>
+        <p:blipFill>
+          <a:blip r:embed="rId4"/>
+          <a:srcRect/>
+          <a:stretch/>
+        </p:blipFill>
+        <p:spPr>
+          <a:xfrm>
+            <a:off x="5880538" y="838669"/>
+            <a:ext cx="5715344" cy="5080077"/>
+          </a:xfrm>
+          <a:prstGeom prst="rect">
+            <a:avLst/>
+          </a:prstGeom>
+        </p:spPr>
+      </p:pic>
     </p:spTree>
     <p:extLst>
       <p:ext uri="{BB962C8B-B14F-4D97-AF65-F5344CB8AC3E}">
@@ -13688,6 +14806,147 @@
     <p:extLst>
       <p:ext uri="{BB962C8B-B14F-4D97-AF65-F5344CB8AC3E}">
         <p14:creationId xmlns:p14="http://schemas.microsoft.com/office/powerpoint/2010/main" val="541688671"/>
+      </p:ext>
+    </p:extLst>
+  </p:cSld>
+  <p:clrMapOvr>
+    <a:masterClrMapping/>
+  </p:clrMapOvr>
+</p:sld>
+</file>
+
+<file path=ppt/slides/slide20.xml><?xml version="1.0" encoding="utf-8"?>
+<p:sld xmlns:a="http://schemas.openxmlformats.org/drawingml/2006/main" xmlns:r="http://schemas.openxmlformats.org/officeDocument/2006/relationships" xmlns:p="http://schemas.openxmlformats.org/presentationml/2006/main">
+  <p:cSld>
+    <p:spTree>
+      <p:nvGrpSpPr>
+        <p:cNvPr id="1" name=""/>
+        <p:cNvGrpSpPr/>
+        <p:nvPr/>
+      </p:nvGrpSpPr>
+      <p:grpSpPr>
+        <a:xfrm>
+          <a:off x="0" y="0"/>
+          <a:ext cx="0" cy="0"/>
+          <a:chOff x="0" y="0"/>
+          <a:chExt cx="0" cy="0"/>
+        </a:xfrm>
+      </p:grpSpPr>
+      <p:sp>
+        <p:nvSpPr>
+          <p:cNvPr id="2" name="Title 1">
+            <a:extLst>
+              <a:ext uri="{FF2B5EF4-FFF2-40B4-BE49-F238E27FC236}">
+                <a16:creationId xmlns:a16="http://schemas.microsoft.com/office/drawing/2014/main" id="{37AE4411-9454-7945-AA17-0D5F274B1E1C}"/>
+              </a:ext>
+            </a:extLst>
+          </p:cNvPr>
+          <p:cNvSpPr>
+            <a:spLocks noGrp="1"/>
+          </p:cNvSpPr>
+          <p:nvPr>
+            <p:ph type="title"/>
+          </p:nvPr>
+        </p:nvSpPr>
+        <p:spPr/>
+        <p:txBody>
+          <a:bodyPr>
+            <a:normAutofit/>
+          </a:bodyPr>
+          <a:lstStyle/>
+          <a:p>
+            <a:r>
+              <a:rPr lang="en-US" sz="4500" dirty="0">
+                <a:latin typeface="Calibri" panose="020F0502020204030204" pitchFamily="34" charset="0"/>
+                <a:cs typeface="Calibri" panose="020F0502020204030204" pitchFamily="34" charset="0"/>
+              </a:rPr>
+              <a:t>Chi </a:t>
+            </a:r>
+            <a:r>
+              <a:rPr lang="en-US" sz="4500" dirty="0" err="1">
+                <a:latin typeface="Calibri" panose="020F0502020204030204" pitchFamily="34" charset="0"/>
+                <a:cs typeface="Calibri" panose="020F0502020204030204" pitchFamily="34" charset="0"/>
+              </a:rPr>
+              <a:t>tiết</a:t>
+            </a:r>
+            <a:r>
+              <a:rPr lang="en-US" sz="4500" dirty="0">
+                <a:latin typeface="Calibri" panose="020F0502020204030204" pitchFamily="34" charset="0"/>
+                <a:cs typeface="Calibri" panose="020F0502020204030204" pitchFamily="34" charset="0"/>
+              </a:rPr>
+              <a:t> SV2TTS – Synthesizer (5)</a:t>
+            </a:r>
+            <a:endParaRPr lang="en-VN" sz="4500" dirty="0">
+              <a:latin typeface="Calibri" panose="020F0502020204030204" pitchFamily="34" charset="0"/>
+              <a:cs typeface="Calibri" panose="020F0502020204030204" pitchFamily="34" charset="0"/>
+            </a:endParaRPr>
+          </a:p>
+        </p:txBody>
+      </p:sp>
+      <p:sp>
+        <p:nvSpPr>
+          <p:cNvPr id="3" name="Content Placeholder 2">
+            <a:extLst>
+              <a:ext uri="{FF2B5EF4-FFF2-40B4-BE49-F238E27FC236}">
+                <a16:creationId xmlns:a16="http://schemas.microsoft.com/office/drawing/2014/main" id="{1F707462-72B9-E94F-AE0F-C78BC243524C}"/>
+              </a:ext>
+            </a:extLst>
+          </p:cNvPr>
+          <p:cNvSpPr>
+            <a:spLocks noGrp="1"/>
+          </p:cNvSpPr>
+          <p:nvPr>
+            <p:ph idx="1"/>
+          </p:nvPr>
+        </p:nvSpPr>
+        <p:spPr>
+          <a:xfrm>
+            <a:off x="1115568" y="2478024"/>
+            <a:ext cx="10602300" cy="3694176"/>
+          </a:xfrm>
+        </p:spPr>
+        <p:txBody>
+          <a:bodyPr/>
+          <a:lstStyle/>
+          <a:p>
+            <a:pPr>
+              <a:buFont typeface="Wingdings" pitchFamily="2" charset="2"/>
+              <a:buChar char="§"/>
+            </a:pPr>
+            <a:r>
+              <a:rPr lang="en-VN" dirty="0">
+                <a:latin typeface="Calibri" panose="020F0502020204030204" pitchFamily="34" charset="0"/>
+                <a:cs typeface="Calibri" panose="020F0502020204030204" pitchFamily="34" charset="0"/>
+              </a:rPr>
+              <a:t>Decoder</a:t>
+            </a:r>
+          </a:p>
+          <a:p>
+            <a:pPr lvl="1">
+              <a:buFont typeface="Wingdings" pitchFamily="2" charset="2"/>
+              <a:buChar char="§"/>
+            </a:pPr>
+            <a:endParaRPr lang="en-VN" dirty="0">
+              <a:latin typeface="Calibri" panose="020F0502020204030204" pitchFamily="34" charset="0"/>
+              <a:cs typeface="Calibri" panose="020F0502020204030204" pitchFamily="34" charset="0"/>
+            </a:endParaRPr>
+          </a:p>
+          <a:p>
+            <a:pPr lvl="1">
+              <a:buFont typeface="Wingdings" pitchFamily="2" charset="2"/>
+              <a:buChar char="§"/>
+            </a:pPr>
+            <a:endParaRPr lang="en-VN" dirty="0">
+              <a:latin typeface="Calibri" panose="020F0502020204030204" pitchFamily="34" charset="0"/>
+              <a:cs typeface="Calibri" panose="020F0502020204030204" pitchFamily="34" charset="0"/>
+            </a:endParaRPr>
+          </a:p>
+        </p:txBody>
+      </p:sp>
+    </p:spTree>
+    <p:extLst>
+      <p:ext uri="{BB962C8B-B14F-4D97-AF65-F5344CB8AC3E}">
+        <p14:creationId xmlns:p14="http://schemas.microsoft.com/office/powerpoint/2010/main" val="4256298490"/>
       </p:ext>
     </p:extLst>
   </p:cSld>

</xml_diff>

<commit_message>
Voice Clone: Upload slide (Synthesizer) and README
</commit_message>
<xml_diff>
--- a/Voice_Cloning/Slide.pptx
+++ b/Voice_Cloning/Slide.pptx
@@ -1573,7 +1573,7 @@
           <a:p>
             <a:fld id="{27B9B13B-C1A0-FC4E-9BC2-CBAAD45B1A60}" type="datetimeFigureOut">
               <a:rPr lang="en-VN" smtClean="0"/>
-              <a:t>7/2/21</a:t>
+              <a:t>07/02/2021</a:t>
             </a:fld>
             <a:endParaRPr lang="en-VN"/>
           </a:p>
@@ -3349,7 +3349,15 @@
             </a:pPr>
             <a:r>
               <a:rPr lang="en-VN" dirty="0"/>
-              <a:t>Mặt khác, giá trị frame output được đưa qua 5 layer Conv để làm mượt đoạn nỗi giữa frame trước đó với frame vừa tạo thành</a:t>
+              <a:t>Mặt khác, giá trị frame output được đưa qua 5 layer Conv để làm mượt đoạn n</a:t>
+            </a:r>
+            <a:r>
+              <a:rPr lang="en-US" dirty="0"/>
+              <a:t>ố</a:t>
+            </a:r>
+            <a:r>
+              <a:rPr lang="en-VN" dirty="0"/>
+              <a:t>i giữa frame trước đó với frame vừa tạo thành</a:t>
             </a:r>
           </a:p>
           <a:p>
@@ -4505,7 +4513,7 @@
           <a:p>
             <a:fld id="{02AC24A9-CCB6-4F8D-B8DB-C2F3692CFA5A}" type="datetimeFigureOut">
               <a:rPr lang="en-US" smtClean="0"/>
-              <a:t>7/2/21</a:t>
+              <a:t>7/2/2021</a:t>
             </a:fld>
             <a:endParaRPr lang="en-US" dirty="0"/>
           </a:p>
@@ -4875,7 +4883,7 @@
           <a:p>
             <a:fld id="{02AC24A9-CCB6-4F8D-B8DB-C2F3692CFA5A}" type="datetimeFigureOut">
               <a:rPr lang="en-US" smtClean="0"/>
-              <a:t>7/2/21</a:t>
+              <a:t>7/2/2021</a:t>
             </a:fld>
             <a:endParaRPr lang="en-US"/>
           </a:p>
@@ -5084,7 +5092,7 @@
           <a:p>
             <a:fld id="{02AC24A9-CCB6-4F8D-B8DB-C2F3692CFA5A}" type="datetimeFigureOut">
               <a:rPr lang="en-US" smtClean="0"/>
-              <a:t>7/2/21</a:t>
+              <a:t>7/2/2021</a:t>
             </a:fld>
             <a:endParaRPr lang="en-US"/>
           </a:p>
@@ -5554,7 +5562,7 @@
           <a:p>
             <a:fld id="{02AC24A9-CCB6-4F8D-B8DB-C2F3692CFA5A}" type="datetimeFigureOut">
               <a:rPr lang="en-US" smtClean="0"/>
-              <a:t>7/2/21</a:t>
+              <a:t>7/2/2021</a:t>
             </a:fld>
             <a:endParaRPr lang="en-US"/>
           </a:p>
@@ -6008,7 +6016,7 @@
           <a:p>
             <a:fld id="{02AC24A9-CCB6-4F8D-B8DB-C2F3692CFA5A}" type="datetimeFigureOut">
               <a:rPr lang="en-US" smtClean="0"/>
-              <a:t>7/2/21</a:t>
+              <a:t>7/2/2021</a:t>
             </a:fld>
             <a:endParaRPr lang="en-US"/>
           </a:p>
@@ -6540,7 +6548,7 @@
           <a:p>
             <a:fld id="{02AC24A9-CCB6-4F8D-B8DB-C2F3692CFA5A}" type="datetimeFigureOut">
               <a:rPr lang="en-US" smtClean="0"/>
-              <a:t>7/2/21</a:t>
+              <a:t>7/2/2021</a:t>
             </a:fld>
             <a:endParaRPr lang="en-US"/>
           </a:p>
@@ -7239,7 +7247,7 @@
           <a:p>
             <a:fld id="{02AC24A9-CCB6-4F8D-B8DB-C2F3692CFA5A}" type="datetimeFigureOut">
               <a:rPr lang="en-US" smtClean="0"/>
-              <a:t>7/2/21</a:t>
+              <a:t>7/2/2021</a:t>
             </a:fld>
             <a:endParaRPr lang="en-US"/>
           </a:p>
@@ -7568,7 +7576,7 @@
           <a:p>
             <a:fld id="{02AC24A9-CCB6-4F8D-B8DB-C2F3692CFA5A}" type="datetimeFigureOut">
               <a:rPr lang="en-US" smtClean="0"/>
-              <a:t>7/2/21</a:t>
+              <a:t>7/2/2021</a:t>
             </a:fld>
             <a:endParaRPr lang="en-US"/>
           </a:p>
@@ -7681,7 +7689,7 @@
           <a:p>
             <a:fld id="{02AC24A9-CCB6-4F8D-B8DB-C2F3692CFA5A}" type="datetimeFigureOut">
               <a:rPr lang="en-US" smtClean="0"/>
-              <a:t>7/2/21</a:t>
+              <a:t>7/2/2021</a:t>
             </a:fld>
             <a:endParaRPr lang="en-US"/>
           </a:p>
@@ -8176,7 +8184,7 @@
           <a:p>
             <a:fld id="{02AC24A9-CCB6-4F8D-B8DB-C2F3692CFA5A}" type="datetimeFigureOut">
               <a:rPr lang="en-US" smtClean="0"/>
-              <a:t>7/2/21</a:t>
+              <a:t>7/2/2021</a:t>
             </a:fld>
             <a:endParaRPr lang="en-US" dirty="0"/>
           </a:p>
@@ -8653,7 +8661,7 @@
           <a:p>
             <a:fld id="{02AC24A9-CCB6-4F8D-B8DB-C2F3692CFA5A}" type="datetimeFigureOut">
               <a:rPr lang="en-US" smtClean="0"/>
-              <a:t>7/2/21</a:t>
+              <a:t>7/2/2021</a:t>
             </a:fld>
             <a:endParaRPr lang="en-US"/>
           </a:p>
@@ -8896,7 +8904,7 @@
           <a:p>
             <a:fld id="{02AC24A9-CCB6-4F8D-B8DB-C2F3692CFA5A}" type="datetimeFigureOut">
               <a:rPr lang="en-US" smtClean="0"/>
-              <a:t>7/2/21</a:t>
+              <a:t>7/2/2021</a:t>
             </a:fld>
             <a:endParaRPr lang="en-US"/>
           </a:p>
@@ -13560,7 +13568,7 @@
         </p:blipFill>
         <p:spPr>
           <a:xfrm>
-            <a:off x="908304" y="2478024"/>
+            <a:off x="626850" y="2478024"/>
             <a:ext cx="6009855" cy="3694176"/>
           </a:xfrm>
           <a:prstGeom prst="rect">
@@ -13586,8 +13594,8 @@
         </p:nvSpPr>
         <p:spPr>
           <a:xfrm>
-            <a:off x="7051729" y="2478024"/>
-            <a:ext cx="4670879" cy="3694176"/>
+            <a:off x="6738908" y="2478024"/>
+            <a:ext cx="4983700" cy="3694176"/>
           </a:xfrm>
         </p:spPr>
         <p:txBody>
@@ -13605,14 +13613,167 @@
                 <a:latin typeface="Calibri" panose="020F0502020204030204" pitchFamily="34" charset="0"/>
                 <a:cs typeface="Calibri" panose="020F0502020204030204" pitchFamily="34" charset="0"/>
               </a:rPr>
-              <a:t>Tacotron</a:t>
+              <a:t>Là</a:t>
             </a:r>
             <a:r>
               <a:rPr lang="en-US" dirty="0">
                 <a:latin typeface="Calibri" panose="020F0502020204030204" pitchFamily="34" charset="0"/>
                 <a:cs typeface="Calibri" panose="020F0502020204030204" pitchFamily="34" charset="0"/>
               </a:rPr>
-              <a:t> 2 bao </a:t>
+              <a:t> </a:t>
+            </a:r>
+            <a:r>
+              <a:rPr lang="en-US" dirty="0" err="1">
+                <a:latin typeface="Calibri" panose="020F0502020204030204" pitchFamily="34" charset="0"/>
+                <a:cs typeface="Calibri" panose="020F0502020204030204" pitchFamily="34" charset="0"/>
+              </a:rPr>
+              <a:t>một</a:t>
+            </a:r>
+            <a:r>
+              <a:rPr lang="en-US" dirty="0">
+                <a:latin typeface="Calibri" panose="020F0502020204030204" pitchFamily="34" charset="0"/>
+                <a:cs typeface="Calibri" panose="020F0502020204030204" pitchFamily="34" charset="0"/>
+              </a:rPr>
+              <a:t> </a:t>
+            </a:r>
+            <a:r>
+              <a:rPr lang="en-US" dirty="0" err="1">
+                <a:latin typeface="Calibri" panose="020F0502020204030204" pitchFamily="34" charset="0"/>
+                <a:cs typeface="Calibri" panose="020F0502020204030204" pitchFamily="34" charset="0"/>
+              </a:rPr>
+              <a:t>mô</a:t>
+            </a:r>
+            <a:r>
+              <a:rPr lang="en-US" dirty="0">
+                <a:latin typeface="Calibri" panose="020F0502020204030204" pitchFamily="34" charset="0"/>
+                <a:cs typeface="Calibri" panose="020F0502020204030204" pitchFamily="34" charset="0"/>
+              </a:rPr>
+              <a:t> </a:t>
+            </a:r>
+            <a:r>
+              <a:rPr lang="en-US" dirty="0" err="1">
+                <a:latin typeface="Calibri" panose="020F0502020204030204" pitchFamily="34" charset="0"/>
+                <a:cs typeface="Calibri" panose="020F0502020204030204" pitchFamily="34" charset="0"/>
+              </a:rPr>
+              <a:t>hình</a:t>
+            </a:r>
+            <a:r>
+              <a:rPr lang="en-US" dirty="0">
+                <a:latin typeface="Calibri" panose="020F0502020204030204" pitchFamily="34" charset="0"/>
+                <a:cs typeface="Calibri" panose="020F0502020204030204" pitchFamily="34" charset="0"/>
+              </a:rPr>
+              <a:t> </a:t>
+            </a:r>
+            <a:r>
+              <a:rPr lang="en-US" i="1" dirty="0">
+                <a:latin typeface="Calibri" panose="020F0502020204030204" pitchFamily="34" charset="0"/>
+                <a:cs typeface="Calibri" panose="020F0502020204030204" pitchFamily="34" charset="0"/>
+              </a:rPr>
+              <a:t>Seq2Seq</a:t>
+            </a:r>
+            <a:r>
+              <a:rPr lang="en-US" dirty="0">
+                <a:latin typeface="Calibri" panose="020F0502020204030204" pitchFamily="34" charset="0"/>
+                <a:cs typeface="Calibri" panose="020F0502020204030204" pitchFamily="34" charset="0"/>
+              </a:rPr>
+              <a:t> </a:t>
+            </a:r>
+            <a:r>
+              <a:rPr lang="en-US" dirty="0" err="1">
+                <a:latin typeface="Calibri" panose="020F0502020204030204" pitchFamily="34" charset="0"/>
+                <a:cs typeface="Calibri" panose="020F0502020204030204" pitchFamily="34" charset="0"/>
+              </a:rPr>
+              <a:t>và</a:t>
+            </a:r>
+            <a:r>
+              <a:rPr lang="en-US" dirty="0">
+                <a:latin typeface="Calibri" panose="020F0502020204030204" pitchFamily="34" charset="0"/>
+                <a:cs typeface="Calibri" panose="020F0502020204030204" pitchFamily="34" charset="0"/>
+              </a:rPr>
+              <a:t> </a:t>
+            </a:r>
+            <a:r>
+              <a:rPr lang="en-US" dirty="0" err="1">
+                <a:latin typeface="Calibri" panose="020F0502020204030204" pitchFamily="34" charset="0"/>
+                <a:cs typeface="Calibri" panose="020F0502020204030204" pitchFamily="34" charset="0"/>
+              </a:rPr>
+              <a:t>cấu</a:t>
+            </a:r>
+            <a:r>
+              <a:rPr lang="en-US" dirty="0">
+                <a:latin typeface="Calibri" panose="020F0502020204030204" pitchFamily="34" charset="0"/>
+                <a:cs typeface="Calibri" panose="020F0502020204030204" pitchFamily="34" charset="0"/>
+              </a:rPr>
+              <a:t> </a:t>
+            </a:r>
+            <a:r>
+              <a:rPr lang="en-US" dirty="0" err="1">
+                <a:latin typeface="Calibri" panose="020F0502020204030204" pitchFamily="34" charset="0"/>
+                <a:cs typeface="Calibri" panose="020F0502020204030204" pitchFamily="34" charset="0"/>
+              </a:rPr>
+              <a:t>trúc</a:t>
+            </a:r>
+            <a:r>
+              <a:rPr lang="en-US" dirty="0">
+                <a:latin typeface="Calibri" panose="020F0502020204030204" pitchFamily="34" charset="0"/>
+                <a:cs typeface="Calibri" panose="020F0502020204030204" pitchFamily="34" charset="0"/>
+              </a:rPr>
+              <a:t> </a:t>
+            </a:r>
+            <a:r>
+              <a:rPr lang="en-US" dirty="0" err="1">
+                <a:latin typeface="Calibri" panose="020F0502020204030204" pitchFamily="34" charset="0"/>
+                <a:cs typeface="Calibri" panose="020F0502020204030204" pitchFamily="34" charset="0"/>
+              </a:rPr>
+              <a:t>theo</a:t>
+            </a:r>
+            <a:r>
+              <a:rPr lang="en-US" dirty="0">
+                <a:latin typeface="Calibri" panose="020F0502020204030204" pitchFamily="34" charset="0"/>
+                <a:cs typeface="Calibri" panose="020F0502020204030204" pitchFamily="34" charset="0"/>
+              </a:rPr>
+              <a:t> </a:t>
+            </a:r>
+            <a:r>
+              <a:rPr lang="en-US" dirty="0" err="1">
+                <a:latin typeface="Calibri" panose="020F0502020204030204" pitchFamily="34" charset="0"/>
+                <a:cs typeface="Calibri" panose="020F0502020204030204" pitchFamily="34" charset="0"/>
+              </a:rPr>
+              <a:t>kiểu</a:t>
+            </a:r>
+            <a:r>
+              <a:rPr lang="en-US" dirty="0">
+                <a:latin typeface="Calibri" panose="020F0502020204030204" pitchFamily="34" charset="0"/>
+                <a:cs typeface="Calibri" panose="020F0502020204030204" pitchFamily="34" charset="0"/>
+              </a:rPr>
+              <a:t> </a:t>
+            </a:r>
+            <a:r>
+              <a:rPr lang="en-US" i="1" dirty="0">
+                <a:latin typeface="Calibri" panose="020F0502020204030204" pitchFamily="34" charset="0"/>
+                <a:cs typeface="Calibri" panose="020F0502020204030204" pitchFamily="34" charset="0"/>
+              </a:rPr>
+              <a:t>Encoder-Decoder</a:t>
+            </a:r>
+            <a:r>
+              <a:rPr lang="en-US" dirty="0">
+                <a:latin typeface="Calibri" panose="020F0502020204030204" pitchFamily="34" charset="0"/>
+                <a:cs typeface="Calibri" panose="020F0502020204030204" pitchFamily="34" charset="0"/>
+              </a:rPr>
+              <a:t>.</a:t>
+            </a:r>
+          </a:p>
+          <a:p>
+            <a:pPr>
+              <a:buFont typeface="Wingdings" pitchFamily="2" charset="2"/>
+              <a:buChar char="§"/>
+            </a:pPr>
+            <a:r>
+              <a:rPr lang="en-US" dirty="0">
+                <a:latin typeface="Calibri" panose="020F0502020204030204" pitchFamily="34" charset="0"/>
+                <a:cs typeface="Calibri" panose="020F0502020204030204" pitchFamily="34" charset="0"/>
+              </a:rPr>
+              <a:t>Synthesizer bao </a:t>
             </a:r>
             <a:r>
               <a:rPr lang="en-US" dirty="0" err="1">
@@ -13661,6 +13822,9 @@
             </a:pPr>
             <a:r>
               <a:rPr lang="en-US" dirty="0">
+                <a:solidFill>
+                  <a:srgbClr val="66A2D8"/>
+                </a:solidFill>
                 <a:latin typeface="Calibri" panose="020F0502020204030204" pitchFamily="34" charset="0"/>
                 <a:cs typeface="Calibri" panose="020F0502020204030204" pitchFamily="34" charset="0"/>
               </a:rPr>
@@ -13674,10 +13838,62 @@
             </a:pPr>
             <a:r>
               <a:rPr lang="en-US" dirty="0">
-                <a:latin typeface="Calibri" panose="020F0502020204030204" pitchFamily="34" charset="0"/>
-                <a:cs typeface="Calibri" panose="020F0502020204030204" pitchFamily="34" charset="0"/>
-              </a:rPr>
-              <a:t>Location-sensitive attention</a:t>
+                <a:solidFill>
+                  <a:srgbClr val="979797"/>
+                </a:solidFill>
+                <a:latin typeface="Calibri" panose="020F0502020204030204" pitchFamily="34" charset="0"/>
+                <a:cs typeface="Calibri" panose="020F0502020204030204" pitchFamily="34" charset="0"/>
+              </a:rPr>
+              <a:t>Location-Sensitive Attention </a:t>
+            </a:r>
+            <a:r>
+              <a:rPr lang="en-US" dirty="0">
+                <a:latin typeface="Calibri" panose="020F0502020204030204" pitchFamily="34" charset="0"/>
+                <a:cs typeface="Calibri" panose="020F0502020204030204" pitchFamily="34" charset="0"/>
+              </a:rPr>
+              <a:t>(</a:t>
+            </a:r>
+            <a:r>
+              <a:rPr lang="en-US" dirty="0" err="1">
+                <a:latin typeface="Calibri" panose="020F0502020204030204" pitchFamily="34" charset="0"/>
+                <a:cs typeface="Calibri" panose="020F0502020204030204" pitchFamily="34" charset="0"/>
+              </a:rPr>
+              <a:t>mở</a:t>
+            </a:r>
+            <a:r>
+              <a:rPr lang="en-US" dirty="0">
+                <a:latin typeface="Calibri" panose="020F0502020204030204" pitchFamily="34" charset="0"/>
+                <a:cs typeface="Calibri" panose="020F0502020204030204" pitchFamily="34" charset="0"/>
+              </a:rPr>
+              <a:t> </a:t>
+            </a:r>
+            <a:r>
+              <a:rPr lang="en-US" dirty="0" err="1">
+                <a:latin typeface="Calibri" panose="020F0502020204030204" pitchFamily="34" charset="0"/>
+                <a:cs typeface="Calibri" panose="020F0502020204030204" pitchFamily="34" charset="0"/>
+              </a:rPr>
+              <a:t>rộng</a:t>
+            </a:r>
+            <a:r>
+              <a:rPr lang="en-US" dirty="0">
+                <a:latin typeface="Calibri" panose="020F0502020204030204" pitchFamily="34" charset="0"/>
+                <a:cs typeface="Calibri" panose="020F0502020204030204" pitchFamily="34" charset="0"/>
+              </a:rPr>
+              <a:t> </a:t>
+            </a:r>
+            <a:r>
+              <a:rPr lang="en-US" dirty="0" err="1">
+                <a:latin typeface="Calibri" panose="020F0502020204030204" pitchFamily="34" charset="0"/>
+                <a:cs typeface="Calibri" panose="020F0502020204030204" pitchFamily="34" charset="0"/>
+              </a:rPr>
+              <a:t>của</a:t>
+            </a:r>
+            <a:r>
+              <a:rPr lang="en-US" dirty="0">
+                <a:latin typeface="Calibri" panose="020F0502020204030204" pitchFamily="34" charset="0"/>
+                <a:cs typeface="Calibri" panose="020F0502020204030204" pitchFamily="34" charset="0"/>
+              </a:rPr>
+              <a:t> Additive Attention)</a:t>
             </a:r>
           </a:p>
           <a:p>
@@ -13687,6 +13903,9 @@
             </a:pPr>
             <a:r>
               <a:rPr lang="en-US" dirty="0">
+                <a:solidFill>
+                  <a:srgbClr val="F8BC80"/>
+                </a:solidFill>
                 <a:latin typeface="Calibri" panose="020F0502020204030204" pitchFamily="34" charset="0"/>
                 <a:cs typeface="Calibri" panose="020F0502020204030204" pitchFamily="34" charset="0"/>
               </a:rPr>
@@ -13851,11 +14070,18 @@
                   <a:buChar char="§"/>
                 </a:pPr>
                 <a:r>
+                  <a:rPr lang="en-VN" i="1" dirty="0">
+                    <a:latin typeface="Calibri" panose="020F0502020204030204" pitchFamily="34" charset="0"/>
+                    <a:cs typeface="Calibri" panose="020F0502020204030204" pitchFamily="34" charset="0"/>
+                  </a:rPr>
+                  <a:t>Encoder</a:t>
+                </a:r>
+                <a:r>
                   <a:rPr lang="en-VN" dirty="0">
                     <a:latin typeface="Calibri" panose="020F0502020204030204" pitchFamily="34" charset="0"/>
                     <a:cs typeface="Calibri" panose="020F0502020204030204" pitchFamily="34" charset="0"/>
                   </a:rPr>
-                  <a:t>Encoder nhận vào một đoạn text và trả ra thông tin mã hóa của đoạn text đó</a:t>
+                  <a:t> nhận vào một đoạn text và trả ra thông tin mã hóa của đoạn text đó</a:t>
                 </a:r>
               </a:p>
               <a:p>
@@ -14127,7 +14353,7 @@
               <a:blipFill>
                 <a:blip r:embed="rId3"/>
                 <a:stretch>
-                  <a:fillRect l="-718" t="-685"/>
+                  <a:fillRect l="-748" t="-825"/>
                 </a:stretch>
               </a:blipFill>
             </p:spPr>
@@ -14136,7 +14362,7 @@
               <a:lstStyle/>
               <a:p>
                 <a:r>
-                  <a:rPr lang="en-VN">
+                  <a:rPr lang="en-US">
                     <a:noFill/>
                   </a:rPr>
                   <a:t> </a:t>
@@ -14289,11 +14515,235 @@
               <a:buChar char="§"/>
             </a:pPr>
             <a:r>
+              <a:rPr lang="en-VN" i="1" dirty="0">
+                <a:latin typeface="Calibri" panose="020F0502020204030204" pitchFamily="34" charset="0"/>
+                <a:cs typeface="Calibri" panose="020F0502020204030204" pitchFamily="34" charset="0"/>
+              </a:rPr>
+              <a:t>Location </a:t>
+            </a:r>
+            <a:r>
+              <a:rPr lang="en-US" i="1" dirty="0">
+                <a:latin typeface="Calibri" panose="020F0502020204030204" pitchFamily="34" charset="0"/>
+                <a:cs typeface="Calibri" panose="020F0502020204030204" pitchFamily="34" charset="0"/>
+              </a:rPr>
+              <a:t>S</a:t>
+            </a:r>
+            <a:r>
+              <a:rPr lang="en-VN" i="1" dirty="0">
+                <a:latin typeface="Calibri" panose="020F0502020204030204" pitchFamily="34" charset="0"/>
+                <a:cs typeface="Calibri" panose="020F0502020204030204" pitchFamily="34" charset="0"/>
+              </a:rPr>
+              <a:t>ensitive </a:t>
+            </a:r>
+            <a:r>
+              <a:rPr lang="en-US" i="1" dirty="0">
+                <a:latin typeface="Calibri" panose="020F0502020204030204" pitchFamily="34" charset="0"/>
+                <a:cs typeface="Calibri" panose="020F0502020204030204" pitchFamily="34" charset="0"/>
+              </a:rPr>
+              <a:t>A</a:t>
+            </a:r>
+            <a:r>
+              <a:rPr lang="en-VN" i="1" dirty="0">
+                <a:latin typeface="Calibri" panose="020F0502020204030204" pitchFamily="34" charset="0"/>
+                <a:cs typeface="Calibri" panose="020F0502020204030204" pitchFamily="34" charset="0"/>
+              </a:rPr>
+              <a:t>ttention </a:t>
+            </a:r>
+            <a:r>
               <a:rPr lang="en-VN" dirty="0">
                 <a:latin typeface="Calibri" panose="020F0502020204030204" pitchFamily="34" charset="0"/>
                 <a:cs typeface="Calibri" panose="020F0502020204030204" pitchFamily="34" charset="0"/>
               </a:rPr>
-              <a:t>Location sensitive attention nhận vào các frame output của LSTM và speaker embedding của người nói. Nó biến đổi 2 thông tin này thành đầu vào của bộ decoder</a:t>
+              <a:t>nhận vào</a:t>
+            </a:r>
+            <a:r>
+              <a:rPr lang="en-US" dirty="0">
+                <a:latin typeface="Calibri" panose="020F0502020204030204" pitchFamily="34" charset="0"/>
+                <a:cs typeface="Calibri" panose="020F0502020204030204" pitchFamily="34" charset="0"/>
+              </a:rPr>
+              <a:t> input </a:t>
+            </a:r>
+            <a:r>
+              <a:rPr lang="en-US" dirty="0" err="1">
+                <a:latin typeface="Calibri" panose="020F0502020204030204" pitchFamily="34" charset="0"/>
+                <a:cs typeface="Calibri" panose="020F0502020204030204" pitchFamily="34" charset="0"/>
+              </a:rPr>
+              <a:t>là</a:t>
+            </a:r>
+            <a:r>
+              <a:rPr lang="en-VN" dirty="0">
+                <a:latin typeface="Calibri" panose="020F0502020204030204" pitchFamily="34" charset="0"/>
+                <a:cs typeface="Calibri" panose="020F0502020204030204" pitchFamily="34" charset="0"/>
+              </a:rPr>
+              <a:t> </a:t>
+            </a:r>
+            <a:r>
+              <a:rPr lang="en-US" dirty="0" err="1">
+                <a:latin typeface="Calibri" panose="020F0502020204030204" pitchFamily="34" charset="0"/>
+                <a:cs typeface="Calibri" panose="020F0502020204030204" pitchFamily="34" charset="0"/>
+              </a:rPr>
+              <a:t>từng</a:t>
+            </a:r>
+            <a:r>
+              <a:rPr lang="en-VN" dirty="0">
+                <a:latin typeface="Calibri" panose="020F0502020204030204" pitchFamily="34" charset="0"/>
+                <a:cs typeface="Calibri" panose="020F0502020204030204" pitchFamily="34" charset="0"/>
+              </a:rPr>
+              <a:t> frame output của </a:t>
+            </a:r>
+            <a:r>
+              <a:rPr lang="en-US" dirty="0">
+                <a:latin typeface="Calibri" panose="020F0502020204030204" pitchFamily="34" charset="0"/>
+                <a:cs typeface="Calibri" panose="020F0502020204030204" pitchFamily="34" charset="0"/>
+              </a:rPr>
+              <a:t>Bidirectional </a:t>
+            </a:r>
+            <a:r>
+              <a:rPr lang="en-VN" dirty="0">
+                <a:latin typeface="Calibri" panose="020F0502020204030204" pitchFamily="34" charset="0"/>
+                <a:cs typeface="Calibri" panose="020F0502020204030204" pitchFamily="34" charset="0"/>
+              </a:rPr>
+              <a:t>LSTM </a:t>
+            </a:r>
+            <a:r>
+              <a:rPr lang="en-US" dirty="0" err="1">
+                <a:latin typeface="Calibri" panose="020F0502020204030204" pitchFamily="34" charset="0"/>
+                <a:cs typeface="Calibri" panose="020F0502020204030204" pitchFamily="34" charset="0"/>
+              </a:rPr>
+              <a:t>và</a:t>
+            </a:r>
+            <a:r>
+              <a:rPr lang="en-VN" dirty="0">
+                <a:latin typeface="Calibri" panose="020F0502020204030204" pitchFamily="34" charset="0"/>
+                <a:cs typeface="Calibri" panose="020F0502020204030204" pitchFamily="34" charset="0"/>
+              </a:rPr>
+              <a:t> </a:t>
+            </a:r>
+            <a:r>
+              <a:rPr lang="en-US" i="1" dirty="0">
+                <a:latin typeface="Calibri" panose="020F0502020204030204" pitchFamily="34" charset="0"/>
+                <a:cs typeface="Calibri" panose="020F0502020204030204" pitchFamily="34" charset="0"/>
+              </a:rPr>
+              <a:t>S</a:t>
+            </a:r>
+            <a:r>
+              <a:rPr lang="en-VN" i="1" dirty="0">
+                <a:latin typeface="Calibri" panose="020F0502020204030204" pitchFamily="34" charset="0"/>
+                <a:cs typeface="Calibri" panose="020F0502020204030204" pitchFamily="34" charset="0"/>
+              </a:rPr>
+              <a:t>peaker </a:t>
+            </a:r>
+            <a:r>
+              <a:rPr lang="en-US" i="1" dirty="0">
+                <a:latin typeface="Calibri" panose="020F0502020204030204" pitchFamily="34" charset="0"/>
+                <a:cs typeface="Calibri" panose="020F0502020204030204" pitchFamily="34" charset="0"/>
+              </a:rPr>
+              <a:t>E</a:t>
+            </a:r>
+            <a:r>
+              <a:rPr lang="en-VN" i="1" dirty="0">
+                <a:latin typeface="Calibri" panose="020F0502020204030204" pitchFamily="34" charset="0"/>
+                <a:cs typeface="Calibri" panose="020F0502020204030204" pitchFamily="34" charset="0"/>
+              </a:rPr>
+              <a:t>mbedding</a:t>
+            </a:r>
+            <a:r>
+              <a:rPr lang="en-VN" dirty="0">
+                <a:latin typeface="Calibri" panose="020F0502020204030204" pitchFamily="34" charset="0"/>
+                <a:cs typeface="Calibri" panose="020F0502020204030204" pitchFamily="34" charset="0"/>
+              </a:rPr>
+              <a:t> của người nói</a:t>
+            </a:r>
+            <a:r>
+              <a:rPr lang="en-US" dirty="0">
+                <a:latin typeface="Calibri" panose="020F0502020204030204" pitchFamily="34" charset="0"/>
+                <a:cs typeface="Calibri" panose="020F0502020204030204" pitchFamily="34" charset="0"/>
+              </a:rPr>
+              <a:t> </a:t>
+            </a:r>
+            <a:r>
+              <a:rPr lang="en-US" dirty="0" err="1">
+                <a:latin typeface="Calibri" panose="020F0502020204030204" pitchFamily="34" charset="0"/>
+                <a:cs typeface="Calibri" panose="020F0502020204030204" pitchFamily="34" charset="0"/>
+              </a:rPr>
+              <a:t>đã</a:t>
+            </a:r>
+            <a:r>
+              <a:rPr lang="en-US" dirty="0">
+                <a:latin typeface="Calibri" panose="020F0502020204030204" pitchFamily="34" charset="0"/>
+                <a:cs typeface="Calibri" panose="020F0502020204030204" pitchFamily="34" charset="0"/>
+              </a:rPr>
+              <a:t> </a:t>
+            </a:r>
+            <a:r>
+              <a:rPr lang="en-US" dirty="0" err="1">
+                <a:latin typeface="Calibri" panose="020F0502020204030204" pitchFamily="34" charset="0"/>
+                <a:cs typeface="Calibri" panose="020F0502020204030204" pitchFamily="34" charset="0"/>
+              </a:rPr>
+              <a:t>được</a:t>
+            </a:r>
+            <a:r>
+              <a:rPr lang="en-US" dirty="0">
+                <a:latin typeface="Calibri" panose="020F0502020204030204" pitchFamily="34" charset="0"/>
+                <a:cs typeface="Calibri" panose="020F0502020204030204" pitchFamily="34" charset="0"/>
+              </a:rPr>
+              <a:t> </a:t>
+            </a:r>
+            <a:r>
+              <a:rPr lang="en-US" dirty="0" err="1">
+                <a:latin typeface="Calibri" panose="020F0502020204030204" pitchFamily="34" charset="0"/>
+                <a:cs typeface="Calibri" panose="020F0502020204030204" pitchFamily="34" charset="0"/>
+              </a:rPr>
+              <a:t>tổng</a:t>
+            </a:r>
+            <a:r>
+              <a:rPr lang="en-US" dirty="0">
+                <a:latin typeface="Calibri" panose="020F0502020204030204" pitchFamily="34" charset="0"/>
+                <a:cs typeface="Calibri" panose="020F0502020204030204" pitchFamily="34" charset="0"/>
+              </a:rPr>
+              <a:t> </a:t>
+            </a:r>
+            <a:r>
+              <a:rPr lang="en-US" dirty="0" err="1">
+                <a:latin typeface="Calibri" panose="020F0502020204030204" pitchFamily="34" charset="0"/>
+                <a:cs typeface="Calibri" panose="020F0502020204030204" pitchFamily="34" charset="0"/>
+              </a:rPr>
+              <a:t>hợp</a:t>
+            </a:r>
+            <a:r>
+              <a:rPr lang="en-US" dirty="0">
+                <a:latin typeface="Calibri" panose="020F0502020204030204" pitchFamily="34" charset="0"/>
+                <a:cs typeface="Calibri" panose="020F0502020204030204" pitchFamily="34" charset="0"/>
+              </a:rPr>
+              <a:t> </a:t>
+            </a:r>
+            <a:r>
+              <a:rPr lang="en-US" dirty="0" err="1">
+                <a:latin typeface="Calibri" panose="020F0502020204030204" pitchFamily="34" charset="0"/>
+                <a:cs typeface="Calibri" panose="020F0502020204030204" pitchFamily="34" charset="0"/>
+              </a:rPr>
+              <a:t>từ</a:t>
+            </a:r>
+            <a:r>
+              <a:rPr lang="en-US" dirty="0">
+                <a:latin typeface="Calibri" panose="020F0502020204030204" pitchFamily="34" charset="0"/>
+                <a:cs typeface="Calibri" panose="020F0502020204030204" pitchFamily="34" charset="0"/>
+              </a:rPr>
+              <a:t> model </a:t>
+            </a:r>
+            <a:r>
+              <a:rPr lang="en-US" i="1" dirty="0">
+                <a:latin typeface="Calibri" panose="020F0502020204030204" pitchFamily="34" charset="0"/>
+                <a:cs typeface="Calibri" panose="020F0502020204030204" pitchFamily="34" charset="0"/>
+              </a:rPr>
+              <a:t>Speaker Encoder</a:t>
+            </a:r>
+            <a:r>
+              <a:rPr lang="en-VN" dirty="0">
+                <a:latin typeface="Calibri" panose="020F0502020204030204" pitchFamily="34" charset="0"/>
+                <a:cs typeface="Calibri" panose="020F0502020204030204" pitchFamily="34" charset="0"/>
+              </a:rPr>
+              <a:t>. Nó biến đổi 2 thông tin này thành đầu vào của bộ decoder</a:t>
             </a:r>
           </a:p>
           <a:p>
@@ -14775,8 +15225,8 @@
           </a:p>
         </p:txBody>
       </p:sp>
-      <mc:AlternateContent xmlns:mc="http://schemas.openxmlformats.org/markup-compatibility/2006">
-        <mc:Choice xmlns:a14="http://schemas.microsoft.com/office/drawing/2010/main" Requires="a14">
+      <mc:AlternateContent xmlns:mc="http://schemas.openxmlformats.org/markup-compatibility/2006" xmlns:a14="http://schemas.microsoft.com/office/drawing/2010/main">
+        <mc:Choice Requires="a14">
           <p:sp>
             <p:nvSpPr>
               <p:cNvPr id="3" name="Content Placeholder 2">
@@ -15049,7 +15499,7 @@
             </p:txBody>
           </p:sp>
         </mc:Choice>
-        <mc:Fallback>
+        <mc:Fallback xmlns="">
           <p:sp>
             <p:nvSpPr>
               <p:cNvPr id="3" name="Content Placeholder 2">
@@ -15690,8 +16140,8 @@
           </a:p>
         </p:txBody>
       </p:sp>
-      <mc:AlternateContent xmlns:mc="http://schemas.openxmlformats.org/markup-compatibility/2006">
-        <mc:Choice xmlns:a14="http://schemas.microsoft.com/office/drawing/2010/main" Requires="a14">
+      <mc:AlternateContent xmlns:mc="http://schemas.openxmlformats.org/markup-compatibility/2006" xmlns:a14="http://schemas.microsoft.com/office/drawing/2010/main">
+        <mc:Choice Requires="a14">
           <p:sp>
             <p:nvSpPr>
               <p:cNvPr id="3" name="Content Placeholder 2">
@@ -15810,7 +16260,7 @@
             </p:txBody>
           </p:sp>
         </mc:Choice>
-        <mc:Fallback>
+        <mc:Fallback xmlns="">
           <p:sp>
             <p:nvSpPr>
               <p:cNvPr id="3" name="Content Placeholder 2">

</xml_diff>

<commit_message>
Voice Clone: Update Slide Vocoder
</commit_message>
<xml_diff>
--- a/Voice_Cloning/Slide.pptx
+++ b/Voice_Cloning/Slide.pptx
@@ -2010,7 +2010,7 @@
           <a:p>
             <a:fld id="{27B9B13B-C1A0-FC4E-9BC2-CBAAD45B1A60}" type="datetimeFigureOut">
               <a:rPr lang="en-VN" smtClean="0"/>
-              <a:t>7/6/21</a:t>
+              <a:t>07/07/2021</a:t>
             </a:fld>
             <a:endParaRPr lang="en-VN"/>
           </a:p>
@@ -5818,7 +5818,7 @@
           <a:p>
             <a:fld id="{02AC24A9-CCB6-4F8D-B8DB-C2F3692CFA5A}" type="datetimeFigureOut">
               <a:rPr lang="en-US" smtClean="0"/>
-              <a:t>7/6/21</a:t>
+              <a:t>07/07/2021</a:t>
             </a:fld>
             <a:endParaRPr lang="en-US" dirty="0"/>
           </a:p>
@@ -6188,7 +6188,7 @@
           <a:p>
             <a:fld id="{02AC24A9-CCB6-4F8D-B8DB-C2F3692CFA5A}" type="datetimeFigureOut">
               <a:rPr lang="en-US" smtClean="0"/>
-              <a:t>7/6/21</a:t>
+              <a:t>07/07/2021</a:t>
             </a:fld>
             <a:endParaRPr lang="en-US"/>
           </a:p>
@@ -6397,7 +6397,7 @@
           <a:p>
             <a:fld id="{02AC24A9-CCB6-4F8D-B8DB-C2F3692CFA5A}" type="datetimeFigureOut">
               <a:rPr lang="en-US" smtClean="0"/>
-              <a:t>7/6/21</a:t>
+              <a:t>07/07/2021</a:t>
             </a:fld>
             <a:endParaRPr lang="en-US"/>
           </a:p>
@@ -6867,7 +6867,7 @@
           <a:p>
             <a:fld id="{02AC24A9-CCB6-4F8D-B8DB-C2F3692CFA5A}" type="datetimeFigureOut">
               <a:rPr lang="en-US" smtClean="0"/>
-              <a:t>7/6/21</a:t>
+              <a:t>07/07/2021</a:t>
             </a:fld>
             <a:endParaRPr lang="en-US"/>
           </a:p>
@@ -7321,7 +7321,7 @@
           <a:p>
             <a:fld id="{02AC24A9-CCB6-4F8D-B8DB-C2F3692CFA5A}" type="datetimeFigureOut">
               <a:rPr lang="en-US" smtClean="0"/>
-              <a:t>7/6/21</a:t>
+              <a:t>07/07/2021</a:t>
             </a:fld>
             <a:endParaRPr lang="en-US"/>
           </a:p>
@@ -7853,7 +7853,7 @@
           <a:p>
             <a:fld id="{02AC24A9-CCB6-4F8D-B8DB-C2F3692CFA5A}" type="datetimeFigureOut">
               <a:rPr lang="en-US" smtClean="0"/>
-              <a:t>7/6/21</a:t>
+              <a:t>07/07/2021</a:t>
             </a:fld>
             <a:endParaRPr lang="en-US"/>
           </a:p>
@@ -8552,7 +8552,7 @@
           <a:p>
             <a:fld id="{02AC24A9-CCB6-4F8D-B8DB-C2F3692CFA5A}" type="datetimeFigureOut">
               <a:rPr lang="en-US" smtClean="0"/>
-              <a:t>7/6/21</a:t>
+              <a:t>07/07/2021</a:t>
             </a:fld>
             <a:endParaRPr lang="en-US"/>
           </a:p>
@@ -8881,7 +8881,7 @@
           <a:p>
             <a:fld id="{02AC24A9-CCB6-4F8D-B8DB-C2F3692CFA5A}" type="datetimeFigureOut">
               <a:rPr lang="en-US" smtClean="0"/>
-              <a:t>7/6/21</a:t>
+              <a:t>07/07/2021</a:t>
             </a:fld>
             <a:endParaRPr lang="en-US"/>
           </a:p>
@@ -8994,7 +8994,7 @@
           <a:p>
             <a:fld id="{02AC24A9-CCB6-4F8D-B8DB-C2F3692CFA5A}" type="datetimeFigureOut">
               <a:rPr lang="en-US" smtClean="0"/>
-              <a:t>7/6/21</a:t>
+              <a:t>07/07/2021</a:t>
             </a:fld>
             <a:endParaRPr lang="en-US"/>
           </a:p>
@@ -9489,7 +9489,7 @@
           <a:p>
             <a:fld id="{02AC24A9-CCB6-4F8D-B8DB-C2F3692CFA5A}" type="datetimeFigureOut">
               <a:rPr lang="en-US" smtClean="0"/>
-              <a:t>7/6/21</a:t>
+              <a:t>07/07/2021</a:t>
             </a:fld>
             <a:endParaRPr lang="en-US" dirty="0"/>
           </a:p>
@@ -9966,7 +9966,7 @@
           <a:p>
             <a:fld id="{02AC24A9-CCB6-4F8D-B8DB-C2F3692CFA5A}" type="datetimeFigureOut">
               <a:rPr lang="en-US" smtClean="0"/>
-              <a:t>7/6/21</a:t>
+              <a:t>07/07/2021</a:t>
             </a:fld>
             <a:endParaRPr lang="en-US"/>
           </a:p>
@@ -10209,7 +10209,7 @@
           <a:p>
             <a:fld id="{02AC24A9-CCB6-4F8D-B8DB-C2F3692CFA5A}" type="datetimeFigureOut">
               <a:rPr lang="en-US" smtClean="0"/>
-              <a:t>7/6/21</a:t>
+              <a:t>07/07/2021</a:t>
             </a:fld>
             <a:endParaRPr lang="en-US"/>
           </a:p>
@@ -17473,8 +17473,8 @@
           </a:p>
         </p:txBody>
       </p:sp>
-      <mc:AlternateContent xmlns:mc="http://schemas.openxmlformats.org/markup-compatibility/2006">
-        <mc:Choice xmlns:a14="http://schemas.microsoft.com/office/drawing/2010/main" Requires="a14">
+      <mc:AlternateContent xmlns:mc="http://schemas.openxmlformats.org/markup-compatibility/2006" xmlns:a14="http://schemas.microsoft.com/office/drawing/2010/main">
+        <mc:Choice Requires="a14">
           <p:sp>
             <p:nvSpPr>
               <p:cNvPr id="3" name="Content Placeholder 2">
@@ -17662,7 +17662,7 @@
             </p:txBody>
           </p:sp>
         </mc:Choice>
-        <mc:Fallback>
+        <mc:Fallback xmlns="">
           <p:sp>
             <p:nvSpPr>
               <p:cNvPr id="3" name="Content Placeholder 2">
@@ -17984,8 +17984,8 @@
             </p:nvSpPr>
             <p:spPr>
               <a:xfrm>
-                <a:off x="1115568" y="2478024"/>
-                <a:ext cx="10168128" cy="4379976"/>
+                <a:off x="1115567" y="2478024"/>
+                <a:ext cx="10322453" cy="4379976"/>
               </a:xfrm>
             </p:spPr>
             <p:txBody>
@@ -18499,6 +18499,13 @@
                     </m:r>
                   </m:oMath>
                 </a14:m>
+                <a:r>
+                  <a:rPr lang="en-US" dirty="0">
+                    <a:latin typeface="Calibri" panose="020F0502020204030204" pitchFamily="34" charset="0"/>
+                    <a:cs typeface="Calibri" panose="020F0502020204030204" pitchFamily="34" charset="0"/>
+                  </a:rPr>
+                  <a:t>.</a:t>
+                </a:r>
                 <a:endParaRPr lang="en-VN" dirty="0">
                   <a:latin typeface="Calibri" panose="020F0502020204030204" pitchFamily="34" charset="0"/>
                   <a:cs typeface="Calibri" panose="020F0502020204030204" pitchFamily="34" charset="0"/>
@@ -18696,6 +18703,13 @@
                         <a:cs typeface="Calibri" panose="020F0502020204030204" pitchFamily="34" charset="0"/>
                       </a:rPr>
                       <m:t>𝑖</m:t>
+                    </m:r>
+                    <m:r>
+                      <a:rPr lang="en-US" b="0" i="1" dirty="0" smtClean="0">
+                        <a:latin typeface="Cambria Math" panose="02040503050406030204" pitchFamily="18" charset="0"/>
+                        <a:cs typeface="Calibri" panose="020F0502020204030204" pitchFamily="34" charset="0"/>
+                      </a:rPr>
+                      <m:t>.</m:t>
                     </m:r>
                   </m:oMath>
                 </a14:m>
@@ -18795,7 +18809,7 @@
                     <a:latin typeface="Calibri" panose="020F0502020204030204" pitchFamily="34" charset="0"/>
                     <a:cs typeface="Calibri" panose="020F0502020204030204" pitchFamily="34" charset="0"/>
                   </a:rPr>
-                  <a:t>tổng</a:t>
+                  <a:t>thời</a:t>
                 </a:r>
                 <a:r>
                   <a:rPr lang="en-US" dirty="0">
@@ -18809,7 +18823,7 @@
                     <a:latin typeface="Calibri" panose="020F0502020204030204" pitchFamily="34" charset="0"/>
                     <a:cs typeface="Calibri" panose="020F0502020204030204" pitchFamily="34" charset="0"/>
                   </a:rPr>
-                  <a:t>thời</a:t>
+                  <a:t>gian</a:t>
                 </a:r>
                 <a:r>
                   <a:rPr lang="en-US" dirty="0">
@@ -18823,21 +18837,21 @@
                     <a:latin typeface="Calibri" panose="020F0502020204030204" pitchFamily="34" charset="0"/>
                     <a:cs typeface="Calibri" panose="020F0502020204030204" pitchFamily="34" charset="0"/>
                   </a:rPr>
-                  <a:t>gian</a:t>
+                  <a:t>máy</a:t>
                 </a:r>
                 <a:r>
                   <a:rPr lang="en-US" dirty="0">
                     <a:latin typeface="Calibri" panose="020F0502020204030204" pitchFamily="34" charset="0"/>
                     <a:cs typeface="Calibri" panose="020F0502020204030204" pitchFamily="34" charset="0"/>
                   </a:rPr>
-                  <a:t> CPU </a:t>
+                  <a:t> </a:t>
                 </a:r>
                 <a:r>
                   <a:rPr lang="en-US" dirty="0" err="1">
                     <a:latin typeface="Calibri" panose="020F0502020204030204" pitchFamily="34" charset="0"/>
                     <a:cs typeface="Calibri" panose="020F0502020204030204" pitchFamily="34" charset="0"/>
                   </a:rPr>
-                  <a:t>xác</a:t>
+                  <a:t>tính</a:t>
                 </a:r>
                 <a:r>
                   <a:rPr lang="en-US" dirty="0">
@@ -18851,7 +18865,7 @@
                     <a:latin typeface="Calibri" panose="020F0502020204030204" pitchFamily="34" charset="0"/>
                     <a:cs typeface="Calibri" panose="020F0502020204030204" pitchFamily="34" charset="0"/>
                   </a:rPr>
-                  <a:t>định</a:t>
+                  <a:t>thực</a:t>
                 </a:r>
                 <a:r>
                   <a:rPr lang="en-US" dirty="0">
@@ -18865,7 +18879,7 @@
                     <a:latin typeface="Calibri" panose="020F0502020204030204" pitchFamily="34" charset="0"/>
                     <a:cs typeface="Calibri" panose="020F0502020204030204" pitchFamily="34" charset="0"/>
                   </a:rPr>
-                  <a:t>công</a:t>
+                  <a:t>hiện</a:t>
                 </a:r>
                 <a:r>
                   <a:rPr lang="en-US" dirty="0">
@@ -18879,7 +18893,7 @@
                     <a:latin typeface="Calibri" panose="020F0502020204030204" pitchFamily="34" charset="0"/>
                     <a:cs typeface="Calibri" panose="020F0502020204030204" pitchFamily="34" charset="0"/>
                   </a:rPr>
-                  <a:t>việc</a:t>
+                  <a:t>các</a:t>
                 </a:r>
                 <a:r>
                   <a:rPr lang="en-US" dirty="0">
@@ -18893,7 +18907,7 @@
                     <a:latin typeface="Calibri" panose="020F0502020204030204" pitchFamily="34" charset="0"/>
                     <a:cs typeface="Calibri" panose="020F0502020204030204" pitchFamily="34" charset="0"/>
                   </a:rPr>
-                  <a:t>cần</a:t>
+                  <a:t>tác</a:t>
                 </a:r>
                 <a:r>
                   <a:rPr lang="en-US" dirty="0">
@@ -18907,7 +18921,7 @@
                     <a:latin typeface="Calibri" panose="020F0502020204030204" pitchFamily="34" charset="0"/>
                     <a:cs typeface="Calibri" panose="020F0502020204030204" pitchFamily="34" charset="0"/>
                   </a:rPr>
-                  <a:t>làm</a:t>
+                  <a:t>vụ</a:t>
                 </a:r>
                 <a:r>
                   <a:rPr lang="en-US" dirty="0">
@@ -18921,7 +18935,7 @@
                     <a:latin typeface="Calibri" panose="020F0502020204030204" pitchFamily="34" charset="0"/>
                     <a:cs typeface="Calibri" panose="020F0502020204030204" pitchFamily="34" charset="0"/>
                   </a:rPr>
-                  <a:t>của</a:t>
+                  <a:t>còn</a:t>
                 </a:r>
                 <a:r>
                   <a:rPr lang="en-US" dirty="0">
@@ -18935,13 +18949,27 @@
                     <a:latin typeface="Calibri" panose="020F0502020204030204" pitchFamily="34" charset="0"/>
                     <a:cs typeface="Calibri" panose="020F0502020204030204" pitchFamily="34" charset="0"/>
                   </a:rPr>
-                  <a:t>nó</a:t>
+                  <a:t>lại</a:t>
                 </a:r>
                 <a:r>
                   <a:rPr lang="en-US" dirty="0">
                     <a:latin typeface="Calibri" panose="020F0502020204030204" pitchFamily="34" charset="0"/>
                     <a:cs typeface="Calibri" panose="020F0502020204030204" pitchFamily="34" charset="0"/>
                   </a:rPr>
+                  <a:t> (</a:t>
+                </a:r>
+                <a:r>
+                  <a:rPr lang="en-US" dirty="0" err="1">
+                    <a:latin typeface="Calibri" panose="020F0502020204030204" pitchFamily="34" charset="0"/>
+                    <a:cs typeface="Calibri" panose="020F0502020204030204" pitchFamily="34" charset="0"/>
+                  </a:rPr>
+                  <a:t>thông</a:t>
+                </a:r>
+                <a:r>
+                  <a:rPr lang="en-US" dirty="0">
+                    <a:latin typeface="Calibri" panose="020F0502020204030204" pitchFamily="34" charset="0"/>
+                    <a:cs typeface="Calibri" panose="020F0502020204030204" pitchFamily="34" charset="0"/>
+                  </a:rPr>
                   <a:t> </a:t>
                 </a:r>
                 <a:r>
@@ -18949,6 +18977,20 @@
                     <a:latin typeface="Calibri" panose="020F0502020204030204" pitchFamily="34" charset="0"/>
                     <a:cs typeface="Calibri" panose="020F0502020204030204" pitchFamily="34" charset="0"/>
                   </a:rPr>
+                  <a:t>thường</a:t>
+                </a:r>
+                <a:r>
+                  <a:rPr lang="en-US" dirty="0">
+                    <a:latin typeface="Calibri" panose="020F0502020204030204" pitchFamily="34" charset="0"/>
+                    <a:cs typeface="Calibri" panose="020F0502020204030204" pitchFamily="34" charset="0"/>
+                  </a:rPr>
+                  <a:t> </a:t>
+                </a:r>
+                <a:r>
+                  <a:rPr lang="en-US" dirty="0" err="1">
+                    <a:latin typeface="Calibri" panose="020F0502020204030204" pitchFamily="34" charset="0"/>
+                    <a:cs typeface="Calibri" panose="020F0502020204030204" pitchFamily="34" charset="0"/>
+                  </a:rPr>
                   <a:t>là</a:t>
                 </a:r>
                 <a:r>
@@ -18956,6 +18998,20 @@
                     <a:latin typeface="Calibri" panose="020F0502020204030204" pitchFamily="34" charset="0"/>
                     <a:cs typeface="Calibri" panose="020F0502020204030204" pitchFamily="34" charset="0"/>
                   </a:rPr>
+                  <a:t> I/O) </a:t>
+                </a:r>
+                <a:r>
+                  <a:rPr lang="en-US" dirty="0" err="1">
+                    <a:latin typeface="Calibri" panose="020F0502020204030204" pitchFamily="34" charset="0"/>
+                    <a:cs typeface="Calibri" panose="020F0502020204030204" pitchFamily="34" charset="0"/>
+                  </a:rPr>
+                  <a:t>tại</a:t>
+                </a:r>
+                <a:r>
+                  <a:rPr lang="en-US" dirty="0">
+                    <a:latin typeface="Calibri" panose="020F0502020204030204" pitchFamily="34" charset="0"/>
+                    <a:cs typeface="Calibri" panose="020F0502020204030204" pitchFamily="34" charset="0"/>
+                  </a:rPr>
                   <a:t> </a:t>
                 </a:r>
                 <a:r>
@@ -18963,7 +19019,7 @@
                     <a:latin typeface="Calibri" panose="020F0502020204030204" pitchFamily="34" charset="0"/>
                     <a:cs typeface="Calibri" panose="020F0502020204030204" pitchFamily="34" charset="0"/>
                   </a:rPr>
-                  <a:t>gì</a:t>
+                  <a:t>lớp</a:t>
                 </a:r>
                 <a:r>
                   <a:rPr lang="en-US" dirty="0">
@@ -18977,7 +19033,7 @@
                     <a:latin typeface="Calibri" panose="020F0502020204030204" pitchFamily="34" charset="0"/>
                     <a:cs typeface="Calibri" panose="020F0502020204030204" pitchFamily="34" charset="0"/>
                   </a:rPr>
-                  <a:t>tại</a:t>
+                  <a:t>thứ</a:t>
                 </a:r>
                 <a:r>
                   <a:rPr lang="en-US" dirty="0">
@@ -18991,40 +19047,15 @@
                     <a:latin typeface="Calibri" panose="020F0502020204030204" pitchFamily="34" charset="0"/>
                     <a:cs typeface="Calibri" panose="020F0502020204030204" pitchFamily="34" charset="0"/>
                   </a:rPr>
-                  <a:t>lớp</a:t>
+                  <a:t>i</a:t>
                 </a:r>
                 <a:r>
                   <a:rPr lang="en-US" dirty="0">
                     <a:latin typeface="Calibri" panose="020F0502020204030204" pitchFamily="34" charset="0"/>
                     <a:cs typeface="Calibri" panose="020F0502020204030204" pitchFamily="34" charset="0"/>
                   </a:rPr>
-                  <a:t> </a:t>
-                </a:r>
-                <a:r>
-                  <a:rPr lang="en-US" dirty="0" err="1">
-                    <a:latin typeface="Calibri" panose="020F0502020204030204" pitchFamily="34" charset="0"/>
-                    <a:cs typeface="Calibri" panose="020F0502020204030204" pitchFamily="34" charset="0"/>
-                  </a:rPr>
-                  <a:t>thứ</a:t>
-                </a:r>
-                <a:r>
-                  <a:rPr lang="en-US" dirty="0">
-                    <a:latin typeface="Calibri" panose="020F0502020204030204" pitchFamily="34" charset="0"/>
-                    <a:cs typeface="Calibri" panose="020F0502020204030204" pitchFamily="34" charset="0"/>
-                  </a:rPr>
-                  <a:t> </a:t>
-                </a:r>
-                <a14:m>
-                  <m:oMath xmlns:m="http://schemas.openxmlformats.org/officeDocument/2006/math">
-                    <m:r>
-                      <a:rPr lang="en-US" i="1" dirty="0" smtClean="0">
-                        <a:latin typeface="Cambria Math" panose="02040503050406030204" pitchFamily="18" charset="0"/>
-                        <a:cs typeface="Calibri" panose="020F0502020204030204" pitchFamily="34" charset="0"/>
-                      </a:rPr>
-                      <m:t>𝑖</m:t>
-                    </m:r>
-                  </m:oMath>
-                </a14:m>
+                  <a:t>.</a:t>
+                </a:r>
                 <a:endParaRPr lang="en-VN" dirty="0">
                   <a:latin typeface="Calibri" panose="020F0502020204030204" pitchFamily="34" charset="0"/>
                   <a:cs typeface="Calibri" panose="020F0502020204030204" pitchFamily="34" charset="0"/>
@@ -19052,13 +19083,13 @@
             </p:nvSpPr>
             <p:spPr>
               <a:xfrm>
-                <a:off x="1115568" y="2478024"/>
-                <a:ext cx="10168128" cy="4379976"/>
+                <a:off x="1115567" y="2478024"/>
+                <a:ext cx="10322453" cy="4379976"/>
               </a:xfrm>
               <a:blipFill>
                 <a:blip r:embed="rId3"/>
                 <a:stretch>
-                  <a:fillRect l="-748" t="-15072"/>
+                  <a:fillRect l="-768" t="-696"/>
                 </a:stretch>
               </a:blipFill>
             </p:spPr>
@@ -19067,7 +19098,7 @@
               <a:lstStyle/>
               <a:p>
                 <a:r>
-                  <a:rPr lang="en-VN">
+                  <a:rPr lang="en-US">
                     <a:noFill/>
                   </a:rPr>
                   <a:t> </a:t>
@@ -19809,7 +19840,7 @@
                     <a:latin typeface="Calibri" panose="020F0502020204030204" pitchFamily="34" charset="0"/>
                     <a:cs typeface="Calibri" panose="020F0502020204030204" pitchFamily="34" charset="0"/>
                   </a:rPr>
-                  <a:t>batch sampling</a:t>
+                  <a:t>batched sampling</a:t>
                 </a:r>
                 <a:r>
                   <a:rPr lang="en-US" sz="1700" dirty="0">
@@ -20172,7 +20203,7 @@
               <a:blipFill>
                 <a:blip r:embed="rId3"/>
                 <a:stretch>
-                  <a:fillRect l="-888" t="-326" r="-2367"/>
+                  <a:fillRect l="-570" t="-314"/>
                 </a:stretch>
               </a:blipFill>
             </p:spPr>
@@ -20181,7 +20212,7 @@
               <a:lstStyle/>
               <a:p>
                 <a:r>
-                  <a:rPr lang="en-VN">
+                  <a:rPr lang="en-US">
                     <a:noFill/>
                   </a:rPr>
                   <a:t> </a:t>
@@ -20929,39 +20960,14 @@
                     <a:latin typeface="Calibri" panose="020F0502020204030204" pitchFamily="34" charset="0"/>
                     <a:cs typeface="Calibri" panose="020F0502020204030204" pitchFamily="34" charset="0"/>
                   </a:rPr>
-                  <a:t>), tác giả sử dụng 2 lớp GRU và 3 lớp Dense xếp xen kẽ nhau (</a:t>
-                </a:r>
-                <a14:m>
-                  <m:oMath xmlns:m="http://schemas.openxmlformats.org/officeDocument/2006/math">
-                    <m:r>
-                      <a:rPr lang="en-VN" sz="1800" i="1">
-                        <a:latin typeface="Cambria Math" panose="02040503050406030204" pitchFamily="18" charset="0"/>
-                        <a:cs typeface="Calibri" panose="020F0502020204030204" pitchFamily="34" charset="0"/>
-                      </a:rPr>
-                      <m:t>𝑁</m:t>
-                    </m:r>
-                    <m:r>
-                      <a:rPr lang="en-US" sz="1800" i="1">
-                        <a:latin typeface="Cambria Math" panose="02040503050406030204" pitchFamily="18" charset="0"/>
-                        <a:cs typeface="Calibri" panose="020F0502020204030204" pitchFamily="34" charset="0"/>
-                      </a:rPr>
-                      <m:t>=</m:t>
-                    </m:r>
-                    <m:r>
-                      <a:rPr lang="en-US" sz="1800" b="0" i="1">
-                        <a:latin typeface="Cambria Math" panose="02040503050406030204" pitchFamily="18" charset="0"/>
-                        <a:cs typeface="Calibri" panose="020F0502020204030204" pitchFamily="34" charset="0"/>
-                      </a:rPr>
-                      <m:t>5</m:t>
-                    </m:r>
-                  </m:oMath>
-                </a14:m>
-                <a:r>
-                  <a:rPr lang="en-VN" sz="1800" dirty="0">
-                    <a:latin typeface="Calibri" panose="020F0502020204030204" pitchFamily="34" charset="0"/>
-                    <a:cs typeface="Calibri" panose="020F0502020204030204" pitchFamily="34" charset="0"/>
-                  </a:rPr>
-                  <a:t>)</a:t>
+                  <a:t>), tác giả sử dụng 2 lớp GRU</a:t>
+                </a:r>
+                <a:r>
+                  <a:rPr lang="en-US" sz="1800" dirty="0">
+                    <a:latin typeface="Calibri" panose="020F0502020204030204" pitchFamily="34" charset="0"/>
+                    <a:cs typeface="Calibri" panose="020F0502020204030204" pitchFamily="34" charset="0"/>
+                  </a:rPr>
+                  <a:t>.</a:t>
                 </a:r>
               </a:p>
               <a:p>
@@ -21005,7 +21011,7 @@
               <a:blipFill>
                 <a:blip r:embed="rId3"/>
                 <a:stretch>
-                  <a:fillRect l="-596" b="-1351"/>
+                  <a:fillRect l="-670"/>
                 </a:stretch>
               </a:blipFill>
             </p:spPr>
@@ -21014,7 +21020,7 @@
               <a:lstStyle/>
               <a:p>
                 <a:r>
-                  <a:rPr lang="en-VN">
+                  <a:rPr lang="en-US">
                     <a:noFill/>
                   </a:rPr>
                   <a:t> </a:t>
@@ -21482,7 +21488,7 @@
                     <a:latin typeface="Calibri" panose="020F0502020204030204" pitchFamily="34" charset="0"/>
                     <a:cs typeface="Calibri" panose="020F0502020204030204" pitchFamily="34" charset="0"/>
                   </a:rPr>
-                  <a:t>phần</a:t>
+                  <a:t>tham</a:t>
                 </a:r>
                 <a:r>
                   <a:rPr lang="en-US" dirty="0">
@@ -21496,7 +21502,7 @@
                     <a:latin typeface="Calibri" panose="020F0502020204030204" pitchFamily="34" charset="0"/>
                     <a:cs typeface="Calibri" panose="020F0502020204030204" pitchFamily="34" charset="0"/>
                   </a:rPr>
-                  <a:t>tử</a:t>
+                  <a:t>số</a:t>
                 </a:r>
                 <a:r>
                   <a:rPr lang="en-US" dirty="0">
@@ -21959,6 +21965,251 @@
                     </m:r>
                   </m:oMath>
                 </a14:m>
+                <a:r>
+                  <a:rPr lang="en-US" b="1" dirty="0">
+                    <a:latin typeface="Calibri" panose="020F0502020204030204" pitchFamily="34" charset="0"/>
+                    <a:cs typeface="Calibri" panose="020F0502020204030204" pitchFamily="34" charset="0"/>
+                  </a:rPr>
+                  <a:t>. </a:t>
+                </a:r>
+                <a:r>
+                  <a:rPr lang="en-US" dirty="0" err="1">
+                    <a:latin typeface="Calibri" panose="020F0502020204030204" pitchFamily="34" charset="0"/>
+                    <a:cs typeface="Calibri" panose="020F0502020204030204" pitchFamily="34" charset="0"/>
+                  </a:rPr>
+                  <a:t>Tỉ</a:t>
+                </a:r>
+                <a:r>
+                  <a:rPr lang="en-US" dirty="0">
+                    <a:latin typeface="Calibri" panose="020F0502020204030204" pitchFamily="34" charset="0"/>
+                    <a:cs typeface="Calibri" panose="020F0502020204030204" pitchFamily="34" charset="0"/>
+                  </a:rPr>
+                  <a:t> </a:t>
+                </a:r>
+                <a:r>
+                  <a:rPr lang="en-US" dirty="0" err="1">
+                    <a:latin typeface="Calibri" panose="020F0502020204030204" pitchFamily="34" charset="0"/>
+                    <a:cs typeface="Calibri" panose="020F0502020204030204" pitchFamily="34" charset="0"/>
+                  </a:rPr>
+                  <a:t>lệ</a:t>
+                </a:r>
+                <a:r>
+                  <a:rPr lang="en-US" dirty="0">
+                    <a:latin typeface="Calibri" panose="020F0502020204030204" pitchFamily="34" charset="0"/>
+                    <a:cs typeface="Calibri" panose="020F0502020204030204" pitchFamily="34" charset="0"/>
+                  </a:rPr>
+                  <a:t> </a:t>
+                </a:r>
+                <a:r>
+                  <a:rPr lang="en-US" dirty="0" err="1">
+                    <a:latin typeface="Calibri" panose="020F0502020204030204" pitchFamily="34" charset="0"/>
+                    <a:cs typeface="Calibri" panose="020F0502020204030204" pitchFamily="34" charset="0"/>
+                  </a:rPr>
+                  <a:t>các</a:t>
+                </a:r>
+                <a:r>
+                  <a:rPr lang="en-US" dirty="0">
+                    <a:latin typeface="Calibri" panose="020F0502020204030204" pitchFamily="34" charset="0"/>
+                    <a:cs typeface="Calibri" panose="020F0502020204030204" pitchFamily="34" charset="0"/>
+                  </a:rPr>
+                  <a:t> </a:t>
+                </a:r>
+                <a:r>
+                  <a:rPr lang="en-US" dirty="0" err="1">
+                    <a:latin typeface="Calibri" panose="020F0502020204030204" pitchFamily="34" charset="0"/>
+                    <a:cs typeface="Calibri" panose="020F0502020204030204" pitchFamily="34" charset="0"/>
+                  </a:rPr>
+                  <a:t>tham</a:t>
+                </a:r>
+                <a:r>
+                  <a:rPr lang="en-US" dirty="0">
+                    <a:latin typeface="Calibri" panose="020F0502020204030204" pitchFamily="34" charset="0"/>
+                    <a:cs typeface="Calibri" panose="020F0502020204030204" pitchFamily="34" charset="0"/>
+                  </a:rPr>
+                  <a:t> </a:t>
+                </a:r>
+                <a:r>
+                  <a:rPr lang="en-US" dirty="0" err="1">
+                    <a:latin typeface="Calibri" panose="020F0502020204030204" pitchFamily="34" charset="0"/>
+                    <a:cs typeface="Calibri" panose="020F0502020204030204" pitchFamily="34" charset="0"/>
+                  </a:rPr>
+                  <a:t>số</a:t>
+                </a:r>
+                <a:r>
+                  <a:rPr lang="en-US" dirty="0">
+                    <a:latin typeface="Calibri" panose="020F0502020204030204" pitchFamily="34" charset="0"/>
+                    <a:cs typeface="Calibri" panose="020F0502020204030204" pitchFamily="34" charset="0"/>
+                  </a:rPr>
+                  <a:t> </a:t>
+                </a:r>
+                <a:r>
+                  <a:rPr lang="en-US" dirty="0" err="1">
+                    <a:latin typeface="Calibri" panose="020F0502020204030204" pitchFamily="34" charset="0"/>
+                    <a:cs typeface="Calibri" panose="020F0502020204030204" pitchFamily="34" charset="0"/>
+                  </a:rPr>
+                  <a:t>có</a:t>
+                </a:r>
+                <a:r>
+                  <a:rPr lang="en-US" dirty="0">
+                    <a:latin typeface="Calibri" panose="020F0502020204030204" pitchFamily="34" charset="0"/>
+                    <a:cs typeface="Calibri" panose="020F0502020204030204" pitchFamily="34" charset="0"/>
+                  </a:rPr>
+                  <a:t> </a:t>
+                </a:r>
+                <a:r>
+                  <a:rPr lang="en-US" dirty="0" err="1">
+                    <a:latin typeface="Calibri" panose="020F0502020204030204" pitchFamily="34" charset="0"/>
+                    <a:cs typeface="Calibri" panose="020F0502020204030204" pitchFamily="34" charset="0"/>
+                  </a:rPr>
+                  <a:t>giá</a:t>
+                </a:r>
+                <a:r>
+                  <a:rPr lang="en-US" dirty="0">
+                    <a:latin typeface="Calibri" panose="020F0502020204030204" pitchFamily="34" charset="0"/>
+                    <a:cs typeface="Calibri" panose="020F0502020204030204" pitchFamily="34" charset="0"/>
+                  </a:rPr>
+                  <a:t> </a:t>
+                </a:r>
+                <a:r>
+                  <a:rPr lang="en-US" dirty="0" err="1">
+                    <a:latin typeface="Calibri" panose="020F0502020204030204" pitchFamily="34" charset="0"/>
+                    <a:cs typeface="Calibri" panose="020F0502020204030204" pitchFamily="34" charset="0"/>
+                  </a:rPr>
+                  <a:t>trị</a:t>
+                </a:r>
+                <a:r>
+                  <a:rPr lang="en-US" dirty="0">
+                    <a:latin typeface="Calibri" panose="020F0502020204030204" pitchFamily="34" charset="0"/>
+                    <a:cs typeface="Calibri" panose="020F0502020204030204" pitchFamily="34" charset="0"/>
+                  </a:rPr>
+                  <a:t> = 0 so </a:t>
+                </a:r>
+                <a:r>
+                  <a:rPr lang="en-US" dirty="0" err="1">
+                    <a:latin typeface="Calibri" panose="020F0502020204030204" pitchFamily="34" charset="0"/>
+                    <a:cs typeface="Calibri" panose="020F0502020204030204" pitchFamily="34" charset="0"/>
+                  </a:rPr>
+                  <a:t>với</a:t>
+                </a:r>
+                <a:r>
+                  <a:rPr lang="en-US" dirty="0">
+                    <a:latin typeface="Calibri" panose="020F0502020204030204" pitchFamily="34" charset="0"/>
+                    <a:cs typeface="Calibri" panose="020F0502020204030204" pitchFamily="34" charset="0"/>
+                  </a:rPr>
+                  <a:t> </a:t>
+                </a:r>
+                <a:r>
+                  <a:rPr lang="en-US" dirty="0" err="1">
+                    <a:latin typeface="Calibri" panose="020F0502020204030204" pitchFamily="34" charset="0"/>
+                    <a:cs typeface="Calibri" panose="020F0502020204030204" pitchFamily="34" charset="0"/>
+                  </a:rPr>
+                  <a:t>tổng</a:t>
+                </a:r>
+                <a:r>
+                  <a:rPr lang="en-US" dirty="0">
+                    <a:latin typeface="Calibri" panose="020F0502020204030204" pitchFamily="34" charset="0"/>
+                    <a:cs typeface="Calibri" panose="020F0502020204030204" pitchFamily="34" charset="0"/>
+                  </a:rPr>
+                  <a:t> </a:t>
+                </a:r>
+                <a:r>
+                  <a:rPr lang="en-US" dirty="0" err="1">
+                    <a:latin typeface="Calibri" panose="020F0502020204030204" pitchFamily="34" charset="0"/>
+                    <a:cs typeface="Calibri" panose="020F0502020204030204" pitchFamily="34" charset="0"/>
+                  </a:rPr>
+                  <a:t>các</a:t>
+                </a:r>
+                <a:r>
+                  <a:rPr lang="en-US" dirty="0">
+                    <a:latin typeface="Calibri" panose="020F0502020204030204" pitchFamily="34" charset="0"/>
+                    <a:cs typeface="Calibri" panose="020F0502020204030204" pitchFamily="34" charset="0"/>
+                  </a:rPr>
+                  <a:t> </a:t>
+                </a:r>
+                <a:r>
+                  <a:rPr lang="en-US" dirty="0" err="1">
+                    <a:latin typeface="Calibri" panose="020F0502020204030204" pitchFamily="34" charset="0"/>
+                    <a:cs typeface="Calibri" panose="020F0502020204030204" pitchFamily="34" charset="0"/>
+                  </a:rPr>
+                  <a:t>tham</a:t>
+                </a:r>
+                <a:r>
+                  <a:rPr lang="en-US" dirty="0">
+                    <a:latin typeface="Calibri" panose="020F0502020204030204" pitchFamily="34" charset="0"/>
+                    <a:cs typeface="Calibri" panose="020F0502020204030204" pitchFamily="34" charset="0"/>
+                  </a:rPr>
+                  <a:t> </a:t>
+                </a:r>
+                <a:r>
+                  <a:rPr lang="en-US" dirty="0" err="1">
+                    <a:latin typeface="Calibri" panose="020F0502020204030204" pitchFamily="34" charset="0"/>
+                    <a:cs typeface="Calibri" panose="020F0502020204030204" pitchFamily="34" charset="0"/>
+                  </a:rPr>
+                  <a:t>số</a:t>
+                </a:r>
+                <a:r>
+                  <a:rPr lang="en-US" dirty="0">
+                    <a:latin typeface="Calibri" panose="020F0502020204030204" pitchFamily="34" charset="0"/>
+                    <a:cs typeface="Calibri" panose="020F0502020204030204" pitchFamily="34" charset="0"/>
+                  </a:rPr>
+                  <a:t> </a:t>
+                </a:r>
+                <a:r>
+                  <a:rPr lang="en-US" dirty="0" err="1">
+                    <a:latin typeface="Calibri" panose="020F0502020204030204" pitchFamily="34" charset="0"/>
+                    <a:cs typeface="Calibri" panose="020F0502020204030204" pitchFamily="34" charset="0"/>
+                  </a:rPr>
+                  <a:t>được</a:t>
+                </a:r>
+                <a:r>
+                  <a:rPr lang="en-US" dirty="0">
+                    <a:latin typeface="Calibri" panose="020F0502020204030204" pitchFamily="34" charset="0"/>
+                    <a:cs typeface="Calibri" panose="020F0502020204030204" pitchFamily="34" charset="0"/>
+                  </a:rPr>
+                  <a:t> </a:t>
+                </a:r>
+                <a:r>
+                  <a:rPr lang="en-US" dirty="0" err="1">
+                    <a:latin typeface="Calibri" panose="020F0502020204030204" pitchFamily="34" charset="0"/>
+                    <a:cs typeface="Calibri" panose="020F0502020204030204" pitchFamily="34" charset="0"/>
+                  </a:rPr>
+                  <a:t>gọi</a:t>
+                </a:r>
+                <a:r>
+                  <a:rPr lang="en-US" dirty="0">
+                    <a:latin typeface="Calibri" panose="020F0502020204030204" pitchFamily="34" charset="0"/>
+                    <a:cs typeface="Calibri" panose="020F0502020204030204" pitchFamily="34" charset="0"/>
+                  </a:rPr>
+                  <a:t> </a:t>
+                </a:r>
+                <a:r>
+                  <a:rPr lang="en-US" dirty="0" err="1">
+                    <a:latin typeface="Calibri" panose="020F0502020204030204" pitchFamily="34" charset="0"/>
+                    <a:cs typeface="Calibri" panose="020F0502020204030204" pitchFamily="34" charset="0"/>
+                  </a:rPr>
+                  <a:t>là</a:t>
+                </a:r>
+                <a:r>
+                  <a:rPr lang="en-US" dirty="0">
+                    <a:latin typeface="Calibri" panose="020F0502020204030204" pitchFamily="34" charset="0"/>
+                    <a:cs typeface="Calibri" panose="020F0502020204030204" pitchFamily="34" charset="0"/>
+                  </a:rPr>
+                  <a:t> </a:t>
+                </a:r>
+                <a:r>
+                  <a:rPr lang="en-US" b="1" u="sng" dirty="0">
+                    <a:latin typeface="Calibri" panose="020F0502020204030204" pitchFamily="34" charset="0"/>
+                    <a:cs typeface="Calibri" panose="020F0502020204030204" pitchFamily="34" charset="0"/>
+                  </a:rPr>
+                  <a:t>sparsity level</a:t>
+                </a:r>
+                <a:r>
+                  <a:rPr lang="en-US" dirty="0">
+                    <a:latin typeface="Calibri" panose="020F0502020204030204" pitchFamily="34" charset="0"/>
+                    <a:cs typeface="Calibri" panose="020F0502020204030204" pitchFamily="34" charset="0"/>
+                  </a:rPr>
+                  <a:t>.</a:t>
+                </a:r>
                 <a:endParaRPr lang="en-US" b="1" dirty="0">
                   <a:latin typeface="Calibri" panose="020F0502020204030204" pitchFamily="34" charset="0"/>
                   <a:cs typeface="Calibri" panose="020F0502020204030204" pitchFamily="34" charset="0"/>
@@ -22030,7 +22281,7 @@
                     <a:latin typeface="Calibri" panose="020F0502020204030204" pitchFamily="34" charset="0"/>
                     <a:cs typeface="Calibri" panose="020F0502020204030204" pitchFamily="34" charset="0"/>
                   </a:rPr>
-                  <a:t>bộ</a:t>
+                  <a:t>mô</a:t>
                 </a:r>
                 <a:r>
                   <a:rPr lang="en-US" dirty="0">
@@ -22044,6 +22295,244 @@
                     <a:latin typeface="Calibri" panose="020F0502020204030204" pitchFamily="34" charset="0"/>
                     <a:cs typeface="Calibri" panose="020F0502020204030204" pitchFamily="34" charset="0"/>
                   </a:rPr>
+                  <a:t>hình</a:t>
+                </a:r>
+                <a:r>
+                  <a:rPr lang="en-US" dirty="0">
+                    <a:latin typeface="Calibri" panose="020F0502020204030204" pitchFamily="34" charset="0"/>
+                    <a:cs typeface="Calibri" panose="020F0502020204030204" pitchFamily="34" charset="0"/>
+                  </a:rPr>
+                  <a:t> </a:t>
+                </a:r>
+                <a:r>
+                  <a:rPr lang="en-US" dirty="0" err="1">
+                    <a:latin typeface="Calibri" panose="020F0502020204030204" pitchFamily="34" charset="0"/>
+                    <a:cs typeface="Calibri" panose="020F0502020204030204" pitchFamily="34" charset="0"/>
+                  </a:rPr>
+                  <a:t>lớn</a:t>
+                </a:r>
+                <a:r>
+                  <a:rPr lang="en-US" dirty="0">
+                    <a:latin typeface="Calibri" panose="020F0502020204030204" pitchFamily="34" charset="0"/>
+                    <a:cs typeface="Calibri" panose="020F0502020204030204" pitchFamily="34" charset="0"/>
+                  </a:rPr>
+                  <a:t> </a:t>
+                </a:r>
+                <a:r>
+                  <a:rPr lang="en-US" dirty="0" err="1">
+                    <a:latin typeface="Calibri" panose="020F0502020204030204" pitchFamily="34" charset="0"/>
+                    <a:cs typeface="Calibri" panose="020F0502020204030204" pitchFamily="34" charset="0"/>
+                  </a:rPr>
+                  <a:t>với</a:t>
+                </a:r>
+                <a:r>
+                  <a:rPr lang="en-US" dirty="0">
+                    <a:latin typeface="Calibri" panose="020F0502020204030204" pitchFamily="34" charset="0"/>
+                    <a:cs typeface="Calibri" panose="020F0502020204030204" pitchFamily="34" charset="0"/>
+                  </a:rPr>
+                  <a:t> sparsity level </a:t>
+                </a:r>
+                <a:r>
+                  <a:rPr lang="en-US" dirty="0" err="1">
+                    <a:latin typeface="Calibri" panose="020F0502020204030204" pitchFamily="34" charset="0"/>
+                    <a:cs typeface="Calibri" panose="020F0502020204030204" pitchFamily="34" charset="0"/>
+                  </a:rPr>
+                  <a:t>từ</a:t>
+                </a:r>
+                <a:r>
+                  <a:rPr lang="en-US" dirty="0">
+                    <a:latin typeface="Calibri" panose="020F0502020204030204" pitchFamily="34" charset="0"/>
+                    <a:cs typeface="Calibri" panose="020F0502020204030204" pitchFamily="34" charset="0"/>
+                  </a:rPr>
+                  <a:t> 90% </a:t>
+                </a:r>
+                <a:r>
+                  <a:rPr lang="en-US" dirty="0" err="1">
+                    <a:latin typeface="Calibri" panose="020F0502020204030204" pitchFamily="34" charset="0"/>
+                    <a:cs typeface="Calibri" panose="020F0502020204030204" pitchFamily="34" charset="0"/>
+                  </a:rPr>
+                  <a:t>đến</a:t>
+                </a:r>
+                <a:r>
+                  <a:rPr lang="en-US" dirty="0">
+                    <a:latin typeface="Calibri" panose="020F0502020204030204" pitchFamily="34" charset="0"/>
+                    <a:cs typeface="Calibri" panose="020F0502020204030204" pitchFamily="34" charset="0"/>
+                  </a:rPr>
+                  <a:t> 95% </a:t>
+                </a:r>
+                <a:r>
+                  <a:rPr lang="en-US" dirty="0" err="1">
+                    <a:latin typeface="Calibri" panose="020F0502020204030204" pitchFamily="34" charset="0"/>
+                    <a:cs typeface="Calibri" panose="020F0502020204030204" pitchFamily="34" charset="0"/>
+                  </a:rPr>
+                  <a:t>cho</a:t>
+                </a:r>
+                <a:r>
+                  <a:rPr lang="en-US" dirty="0">
+                    <a:latin typeface="Calibri" panose="020F0502020204030204" pitchFamily="34" charset="0"/>
+                    <a:cs typeface="Calibri" panose="020F0502020204030204" pitchFamily="34" charset="0"/>
+                  </a:rPr>
+                  <a:t> ra </a:t>
+                </a:r>
+                <a:r>
+                  <a:rPr lang="en-US" dirty="0" err="1">
+                    <a:latin typeface="Calibri" panose="020F0502020204030204" pitchFamily="34" charset="0"/>
+                    <a:cs typeface="Calibri" panose="020F0502020204030204" pitchFamily="34" charset="0"/>
+                  </a:rPr>
+                  <a:t>kết</a:t>
+                </a:r>
+                <a:r>
+                  <a:rPr lang="en-US" dirty="0">
+                    <a:latin typeface="Calibri" panose="020F0502020204030204" pitchFamily="34" charset="0"/>
+                    <a:cs typeface="Calibri" panose="020F0502020204030204" pitchFamily="34" charset="0"/>
+                  </a:rPr>
+                  <a:t> </a:t>
+                </a:r>
+                <a:r>
+                  <a:rPr lang="en-US" dirty="0" err="1">
+                    <a:latin typeface="Calibri" panose="020F0502020204030204" pitchFamily="34" charset="0"/>
+                    <a:cs typeface="Calibri" panose="020F0502020204030204" pitchFamily="34" charset="0"/>
+                  </a:rPr>
+                  <a:t>quả</a:t>
+                </a:r>
+                <a:r>
+                  <a:rPr lang="en-US" dirty="0">
+                    <a:latin typeface="Calibri" panose="020F0502020204030204" pitchFamily="34" charset="0"/>
+                    <a:cs typeface="Calibri" panose="020F0502020204030204" pitchFamily="34" charset="0"/>
+                  </a:rPr>
+                  <a:t> </a:t>
+                </a:r>
+                <a:r>
+                  <a:rPr lang="en-US" dirty="0" err="1">
+                    <a:latin typeface="Calibri" panose="020F0502020204030204" pitchFamily="34" charset="0"/>
+                    <a:cs typeface="Calibri" panose="020F0502020204030204" pitchFamily="34" charset="0"/>
+                  </a:rPr>
+                  <a:t>tốt</a:t>
+                </a:r>
+                <a:r>
+                  <a:rPr lang="en-US" dirty="0">
+                    <a:latin typeface="Calibri" panose="020F0502020204030204" pitchFamily="34" charset="0"/>
+                    <a:cs typeface="Calibri" panose="020F0502020204030204" pitchFamily="34" charset="0"/>
+                  </a:rPr>
+                  <a:t> </a:t>
+                </a:r>
+                <a:r>
+                  <a:rPr lang="en-US" dirty="0" err="1">
+                    <a:latin typeface="Calibri" panose="020F0502020204030204" pitchFamily="34" charset="0"/>
+                    <a:cs typeface="Calibri" panose="020F0502020204030204" pitchFamily="34" charset="0"/>
+                  </a:rPr>
+                  <a:t>hơn</a:t>
+                </a:r>
+                <a:r>
+                  <a:rPr lang="en-US" dirty="0">
+                    <a:latin typeface="Calibri" panose="020F0502020204030204" pitchFamily="34" charset="0"/>
+                    <a:cs typeface="Calibri" panose="020F0502020204030204" pitchFamily="34" charset="0"/>
+                  </a:rPr>
+                  <a:t> </a:t>
+                </a:r>
+                <a:r>
+                  <a:rPr lang="en-US" dirty="0" err="1">
+                    <a:latin typeface="Calibri" panose="020F0502020204030204" pitchFamily="34" charset="0"/>
+                    <a:cs typeface="Calibri" panose="020F0502020204030204" pitchFamily="34" charset="0"/>
+                  </a:rPr>
+                  <a:t>nhiều</a:t>
+                </a:r>
+                <a:r>
+                  <a:rPr lang="en-US" dirty="0">
+                    <a:latin typeface="Calibri" panose="020F0502020204030204" pitchFamily="34" charset="0"/>
+                    <a:cs typeface="Calibri" panose="020F0502020204030204" pitchFamily="34" charset="0"/>
+                  </a:rPr>
+                  <a:t> so </a:t>
+                </a:r>
+                <a:r>
+                  <a:rPr lang="en-US" dirty="0" err="1">
+                    <a:latin typeface="Calibri" panose="020F0502020204030204" pitchFamily="34" charset="0"/>
+                    <a:cs typeface="Calibri" panose="020F0502020204030204" pitchFamily="34" charset="0"/>
+                  </a:rPr>
+                  <a:t>với</a:t>
+                </a:r>
+                <a:r>
+                  <a:rPr lang="en-US" dirty="0">
+                    <a:latin typeface="Calibri" panose="020F0502020204030204" pitchFamily="34" charset="0"/>
+                    <a:cs typeface="Calibri" panose="020F0502020204030204" pitchFamily="34" charset="0"/>
+                  </a:rPr>
+                  <a:t> </a:t>
+                </a:r>
+                <a:r>
+                  <a:rPr lang="en-US" dirty="0" err="1">
+                    <a:latin typeface="Calibri" panose="020F0502020204030204" pitchFamily="34" charset="0"/>
+                    <a:cs typeface="Calibri" panose="020F0502020204030204" pitchFamily="34" charset="0"/>
+                  </a:rPr>
+                  <a:t>mô</a:t>
+                </a:r>
+                <a:r>
+                  <a:rPr lang="en-US" dirty="0">
+                    <a:latin typeface="Calibri" panose="020F0502020204030204" pitchFamily="34" charset="0"/>
+                    <a:cs typeface="Calibri" panose="020F0502020204030204" pitchFamily="34" charset="0"/>
+                  </a:rPr>
+                  <a:t> </a:t>
+                </a:r>
+                <a:r>
+                  <a:rPr lang="en-US" dirty="0" err="1">
+                    <a:latin typeface="Calibri" panose="020F0502020204030204" pitchFamily="34" charset="0"/>
+                    <a:cs typeface="Calibri" panose="020F0502020204030204" pitchFamily="34" charset="0"/>
+                  </a:rPr>
+                  <a:t>hình</a:t>
+                </a:r>
+                <a:r>
+                  <a:rPr lang="en-US" dirty="0">
+                    <a:latin typeface="Calibri" panose="020F0502020204030204" pitchFamily="34" charset="0"/>
+                    <a:cs typeface="Calibri" panose="020F0502020204030204" pitchFamily="34" charset="0"/>
+                  </a:rPr>
+                  <a:t> </a:t>
+                </a:r>
+                <a:r>
+                  <a:rPr lang="en-US" dirty="0" err="1">
+                    <a:latin typeface="Calibri" panose="020F0502020204030204" pitchFamily="34" charset="0"/>
+                    <a:cs typeface="Calibri" panose="020F0502020204030204" pitchFamily="34" charset="0"/>
+                  </a:rPr>
+                  <a:t>nhỏ</a:t>
+                </a:r>
+                <a:r>
+                  <a:rPr lang="en-US" dirty="0">
+                    <a:latin typeface="Calibri" panose="020F0502020204030204" pitchFamily="34" charset="0"/>
+                    <a:cs typeface="Calibri" panose="020F0502020204030204" pitchFamily="34" charset="0"/>
+                  </a:rPr>
+                  <a:t> </a:t>
+                </a:r>
+                <a:r>
+                  <a:rPr lang="en-US" dirty="0" err="1">
+                    <a:latin typeface="Calibri" panose="020F0502020204030204" pitchFamily="34" charset="0"/>
+                    <a:cs typeface="Calibri" panose="020F0502020204030204" pitchFamily="34" charset="0"/>
+                  </a:rPr>
+                  <a:t>với</a:t>
+                </a:r>
+                <a:r>
+                  <a:rPr lang="en-US" dirty="0">
+                    <a:latin typeface="Calibri" panose="020F0502020204030204" pitchFamily="34" charset="0"/>
+                    <a:cs typeface="Calibri" panose="020F0502020204030204" pitchFamily="34" charset="0"/>
+                  </a:rPr>
+                  <a:t> </a:t>
+                </a:r>
+                <a:r>
+                  <a:rPr lang="en-US" dirty="0" err="1">
+                    <a:latin typeface="Calibri" panose="020F0502020204030204" pitchFamily="34" charset="0"/>
+                    <a:cs typeface="Calibri" panose="020F0502020204030204" pitchFamily="34" charset="0"/>
+                  </a:rPr>
+                  <a:t>các</a:t>
+                </a:r>
+                <a:r>
+                  <a:rPr lang="en-US" dirty="0">
+                    <a:latin typeface="Calibri" panose="020F0502020204030204" pitchFamily="34" charset="0"/>
+                    <a:cs typeface="Calibri" panose="020F0502020204030204" pitchFamily="34" charset="0"/>
+                  </a:rPr>
+                  <a:t> </a:t>
+                </a:r>
+                <a:r>
+                  <a:rPr lang="en-US" dirty="0" err="1">
+                    <a:latin typeface="Calibri" panose="020F0502020204030204" pitchFamily="34" charset="0"/>
+                    <a:cs typeface="Calibri" panose="020F0502020204030204" pitchFamily="34" charset="0"/>
+                  </a:rPr>
                   <a:t>tham</a:t>
                 </a:r>
                 <a:r>
@@ -22065,6 +22554,20 @@
                     <a:latin typeface="Calibri" panose="020F0502020204030204" pitchFamily="34" charset="0"/>
                     <a:cs typeface="Calibri" panose="020F0502020204030204" pitchFamily="34" charset="0"/>
                   </a:rPr>
+                  <a:t> “</a:t>
+                </a:r>
+                <a:r>
+                  <a:rPr lang="en-US" dirty="0" err="1">
+                    <a:latin typeface="Calibri" panose="020F0502020204030204" pitchFamily="34" charset="0"/>
+                    <a:cs typeface="Calibri" panose="020F0502020204030204" pitchFamily="34" charset="0"/>
+                  </a:rPr>
+                  <a:t>dày</a:t>
+                </a:r>
+                <a:r>
+                  <a:rPr lang="en-US" dirty="0">
+                    <a:latin typeface="Calibri" panose="020F0502020204030204" pitchFamily="34" charset="0"/>
+                    <a:cs typeface="Calibri" panose="020F0502020204030204" pitchFamily="34" charset="0"/>
+                  </a:rPr>
                   <a:t> </a:t>
                 </a:r>
                 <a:r>
@@ -22072,425 +22575,14 @@
                     <a:latin typeface="Calibri" panose="020F0502020204030204" pitchFamily="34" charset="0"/>
                     <a:cs typeface="Calibri" panose="020F0502020204030204" pitchFamily="34" charset="0"/>
                   </a:rPr>
-                  <a:t>chứa</a:t>
+                  <a:t>đặc</a:t>
                 </a:r>
                 <a:r>
                   <a:rPr lang="en-US" dirty="0">
                     <a:latin typeface="Calibri" panose="020F0502020204030204" pitchFamily="34" charset="0"/>
                     <a:cs typeface="Calibri" panose="020F0502020204030204" pitchFamily="34" charset="0"/>
                   </a:rPr>
-                  <a:t> </a:t>
-                </a:r>
-                <a14:m>
-                  <m:oMath xmlns:m="http://schemas.openxmlformats.org/officeDocument/2006/math">
-                    <m:sSup>
-                      <m:sSupPr>
-                        <m:ctrlPr>
-                          <a:rPr lang="en-US" i="1" dirty="0" smtClean="0">
-                            <a:latin typeface="Cambria Math" panose="02040503050406030204" pitchFamily="18" charset="0"/>
-                            <a:cs typeface="Calibri" panose="020F0502020204030204" pitchFamily="34" charset="0"/>
-                          </a:rPr>
-                        </m:ctrlPr>
-                      </m:sSupPr>
-                      <m:e>
-                        <m:r>
-                          <a:rPr lang="en-US" i="1" dirty="0" smtClean="0">
-                            <a:latin typeface="Cambria Math" panose="02040503050406030204" pitchFamily="18" charset="0"/>
-                            <a:cs typeface="Calibri" panose="020F0502020204030204" pitchFamily="34" charset="0"/>
-                          </a:rPr>
-                          <m:t>10</m:t>
-                        </m:r>
-                      </m:e>
-                      <m:sup>
-                        <m:r>
-                          <a:rPr lang="en-US" i="1" dirty="0" smtClean="0">
-                            <a:latin typeface="Cambria Math" panose="02040503050406030204" pitchFamily="18" charset="0"/>
-                            <a:cs typeface="Calibri" panose="020F0502020204030204" pitchFamily="34" charset="0"/>
-                          </a:rPr>
-                          <m:t>6</m:t>
-                        </m:r>
-                      </m:sup>
-                    </m:sSup>
-                  </m:oMath>
-                </a14:m>
-                <a:r>
-                  <a:rPr lang="en-US" dirty="0">
-                    <a:latin typeface="Calibri" panose="020F0502020204030204" pitchFamily="34" charset="0"/>
-                    <a:cs typeface="Calibri" panose="020F0502020204030204" pitchFamily="34" charset="0"/>
-                  </a:rPr>
-                  <a:t> </a:t>
-                </a:r>
-                <a:r>
-                  <a:rPr lang="en-US" dirty="0" err="1">
-                    <a:latin typeface="Calibri" panose="020F0502020204030204" pitchFamily="34" charset="0"/>
-                    <a:cs typeface="Calibri" panose="020F0502020204030204" pitchFamily="34" charset="0"/>
-                  </a:rPr>
-                  <a:t>phần</a:t>
-                </a:r>
-                <a:r>
-                  <a:rPr lang="en-US" dirty="0">
-                    <a:latin typeface="Calibri" panose="020F0502020204030204" pitchFamily="34" charset="0"/>
-                    <a:cs typeface="Calibri" panose="020F0502020204030204" pitchFamily="34" charset="0"/>
-                  </a:rPr>
-                  <a:t> </a:t>
-                </a:r>
-                <a:r>
-                  <a:rPr lang="en-US" dirty="0" err="1">
-                    <a:latin typeface="Calibri" panose="020F0502020204030204" pitchFamily="34" charset="0"/>
-                    <a:cs typeface="Calibri" panose="020F0502020204030204" pitchFamily="34" charset="0"/>
-                  </a:rPr>
-                  <a:t>tử</a:t>
-                </a:r>
-                <a:r>
-                  <a:rPr lang="en-US" dirty="0">
-                    <a:latin typeface="Calibri" panose="020F0502020204030204" pitchFamily="34" charset="0"/>
-                    <a:cs typeface="Calibri" panose="020F0502020204030204" pitchFamily="34" charset="0"/>
-                  </a:rPr>
-                  <a:t>, </a:t>
-                </a:r>
-                <a:r>
-                  <a:rPr lang="en-US" dirty="0" err="1">
-                    <a:latin typeface="Calibri" panose="020F0502020204030204" pitchFamily="34" charset="0"/>
-                    <a:cs typeface="Calibri" panose="020F0502020204030204" pitchFamily="34" charset="0"/>
-                  </a:rPr>
-                  <a:t>sau</a:t>
-                </a:r>
-                <a:r>
-                  <a:rPr lang="en-US" dirty="0">
-                    <a:latin typeface="Calibri" panose="020F0502020204030204" pitchFamily="34" charset="0"/>
-                    <a:cs typeface="Calibri" panose="020F0502020204030204" pitchFamily="34" charset="0"/>
-                  </a:rPr>
-                  <a:t> </a:t>
-                </a:r>
-                <a:r>
-                  <a:rPr lang="en-US" dirty="0" err="1">
-                    <a:latin typeface="Calibri" panose="020F0502020204030204" pitchFamily="34" charset="0"/>
-                    <a:cs typeface="Calibri" panose="020F0502020204030204" pitchFamily="34" charset="0"/>
-                  </a:rPr>
-                  <a:t>khi</a:t>
-                </a:r>
-                <a:r>
-                  <a:rPr lang="en-US" dirty="0">
-                    <a:latin typeface="Calibri" panose="020F0502020204030204" pitchFamily="34" charset="0"/>
-                    <a:cs typeface="Calibri" panose="020F0502020204030204" pitchFamily="34" charset="0"/>
-                  </a:rPr>
-                  <a:t> pruning </a:t>
-                </a:r>
-                <a:r>
-                  <a:rPr lang="en-US" dirty="0" err="1">
-                    <a:latin typeface="Calibri" panose="020F0502020204030204" pitchFamily="34" charset="0"/>
-                    <a:cs typeface="Calibri" panose="020F0502020204030204" pitchFamily="34" charset="0"/>
-                  </a:rPr>
-                  <a:t>còn</a:t>
-                </a:r>
-                <a:r>
-                  <a:rPr lang="en-US" dirty="0">
-                    <a:latin typeface="Calibri" panose="020F0502020204030204" pitchFamily="34" charset="0"/>
-                    <a:cs typeface="Calibri" panose="020F0502020204030204" pitchFamily="34" charset="0"/>
-                  </a:rPr>
-                  <a:t> </a:t>
-                </a:r>
-                <a14:m>
-                  <m:oMath xmlns:m="http://schemas.openxmlformats.org/officeDocument/2006/math">
-                    <m:sSup>
-                      <m:sSupPr>
-                        <m:ctrlPr>
-                          <a:rPr lang="en-US" i="1" dirty="0">
-                            <a:latin typeface="Cambria Math" panose="02040503050406030204" pitchFamily="18" charset="0"/>
-                            <a:cs typeface="Calibri" panose="020F0502020204030204" pitchFamily="34" charset="0"/>
-                          </a:rPr>
-                        </m:ctrlPr>
-                      </m:sSupPr>
-                      <m:e>
-                        <m:r>
-                          <a:rPr lang="en-US" i="1" dirty="0">
-                            <a:latin typeface="Cambria Math" panose="02040503050406030204" pitchFamily="18" charset="0"/>
-                            <a:cs typeface="Calibri" panose="020F0502020204030204" pitchFamily="34" charset="0"/>
-                          </a:rPr>
-                          <m:t>10</m:t>
-                        </m:r>
-                      </m:e>
-                      <m:sup>
-                        <m:r>
-                          <a:rPr lang="en-US" b="0" i="1" dirty="0" smtClean="0">
-                            <a:latin typeface="Cambria Math" panose="02040503050406030204" pitchFamily="18" charset="0"/>
-                            <a:cs typeface="Calibri" panose="020F0502020204030204" pitchFamily="34" charset="0"/>
-                          </a:rPr>
-                          <m:t>3</m:t>
-                        </m:r>
-                      </m:sup>
-                    </m:sSup>
-                  </m:oMath>
-                </a14:m>
-                <a:r>
-                  <a:rPr lang="en-US" dirty="0">
-                    <a:latin typeface="Calibri" panose="020F0502020204030204" pitchFamily="34" charset="0"/>
-                    <a:cs typeface="Calibri" panose="020F0502020204030204" pitchFamily="34" charset="0"/>
-                  </a:rPr>
-                  <a:t> </a:t>
-                </a:r>
-                <a:r>
-                  <a:rPr lang="en-US" dirty="0" err="1">
-                    <a:latin typeface="Calibri" panose="020F0502020204030204" pitchFamily="34" charset="0"/>
-                    <a:cs typeface="Calibri" panose="020F0502020204030204" pitchFamily="34" charset="0"/>
-                  </a:rPr>
-                  <a:t>phần</a:t>
-                </a:r>
-                <a:r>
-                  <a:rPr lang="en-US" dirty="0">
-                    <a:latin typeface="Calibri" panose="020F0502020204030204" pitchFamily="34" charset="0"/>
-                    <a:cs typeface="Calibri" panose="020F0502020204030204" pitchFamily="34" charset="0"/>
-                  </a:rPr>
-                  <a:t> </a:t>
-                </a:r>
-                <a:r>
-                  <a:rPr lang="en-US" dirty="0" err="1">
-                    <a:latin typeface="Calibri" panose="020F0502020204030204" pitchFamily="34" charset="0"/>
-                    <a:cs typeface="Calibri" panose="020F0502020204030204" pitchFamily="34" charset="0"/>
-                  </a:rPr>
-                  <a:t>tử</a:t>
-                </a:r>
-                <a:r>
-                  <a:rPr lang="en-US" dirty="0">
-                    <a:latin typeface="Calibri" panose="020F0502020204030204" pitchFamily="34" charset="0"/>
-                    <a:cs typeface="Calibri" panose="020F0502020204030204" pitchFamily="34" charset="0"/>
-                  </a:rPr>
-                  <a:t> </a:t>
-                </a:r>
-                <a:r>
-                  <a:rPr lang="en-US" dirty="0" err="1">
-                    <a:latin typeface="Calibri" panose="020F0502020204030204" pitchFamily="34" charset="0"/>
-                    <a:cs typeface="Calibri" panose="020F0502020204030204" pitchFamily="34" charset="0"/>
-                  </a:rPr>
-                  <a:t>hoạt</a:t>
-                </a:r>
-                <a:r>
-                  <a:rPr lang="en-US" dirty="0">
-                    <a:latin typeface="Calibri" panose="020F0502020204030204" pitchFamily="34" charset="0"/>
-                    <a:cs typeface="Calibri" panose="020F0502020204030204" pitchFamily="34" charset="0"/>
-                  </a:rPr>
-                  <a:t> </a:t>
-                </a:r>
-                <a:r>
-                  <a:rPr lang="en-US" dirty="0" err="1">
-                    <a:latin typeface="Calibri" panose="020F0502020204030204" pitchFamily="34" charset="0"/>
-                    <a:cs typeface="Calibri" panose="020F0502020204030204" pitchFamily="34" charset="0"/>
-                  </a:rPr>
-                  <a:t>động</a:t>
-                </a:r>
-                <a:r>
-                  <a:rPr lang="en-US" dirty="0">
-                    <a:latin typeface="Calibri" panose="020F0502020204030204" pitchFamily="34" charset="0"/>
-                    <a:cs typeface="Calibri" panose="020F0502020204030204" pitchFamily="34" charset="0"/>
-                  </a:rPr>
-                  <a:t> </a:t>
-                </a:r>
-                <a:r>
-                  <a:rPr lang="en-US" dirty="0" err="1">
-                    <a:latin typeface="Calibri" panose="020F0502020204030204" pitchFamily="34" charset="0"/>
-                    <a:cs typeface="Calibri" panose="020F0502020204030204" pitchFamily="34" charset="0"/>
-                  </a:rPr>
-                  <a:t>tốt</a:t>
-                </a:r>
-                <a:r>
-                  <a:rPr lang="en-US" dirty="0">
-                    <a:latin typeface="Calibri" panose="020F0502020204030204" pitchFamily="34" charset="0"/>
-                    <a:cs typeface="Calibri" panose="020F0502020204030204" pitchFamily="34" charset="0"/>
-                  </a:rPr>
-                  <a:t> </a:t>
-                </a:r>
-                <a:r>
-                  <a:rPr lang="en-US" dirty="0" err="1">
-                    <a:latin typeface="Calibri" panose="020F0502020204030204" pitchFamily="34" charset="0"/>
-                    <a:cs typeface="Calibri" panose="020F0502020204030204" pitchFamily="34" charset="0"/>
-                  </a:rPr>
-                  <a:t>hơn</a:t>
-                </a:r>
-                <a:r>
-                  <a:rPr lang="en-US" dirty="0">
-                    <a:latin typeface="Calibri" panose="020F0502020204030204" pitchFamily="34" charset="0"/>
-                    <a:cs typeface="Calibri" panose="020F0502020204030204" pitchFamily="34" charset="0"/>
-                  </a:rPr>
-                  <a:t> </a:t>
-                </a:r>
-                <a:r>
-                  <a:rPr lang="en-US" dirty="0" err="1">
-                    <a:latin typeface="Calibri" panose="020F0502020204030204" pitchFamily="34" charset="0"/>
-                    <a:cs typeface="Calibri" panose="020F0502020204030204" pitchFamily="34" charset="0"/>
-                  </a:rPr>
-                  <a:t>bộ</a:t>
-                </a:r>
-                <a:r>
-                  <a:rPr lang="en-US" dirty="0">
-                    <a:latin typeface="Calibri" panose="020F0502020204030204" pitchFamily="34" charset="0"/>
-                    <a:cs typeface="Calibri" panose="020F0502020204030204" pitchFamily="34" charset="0"/>
-                  </a:rPr>
-                  <a:t> </a:t>
-                </a:r>
-                <a:r>
-                  <a:rPr lang="en-US" dirty="0" err="1">
-                    <a:latin typeface="Calibri" panose="020F0502020204030204" pitchFamily="34" charset="0"/>
-                    <a:cs typeface="Calibri" panose="020F0502020204030204" pitchFamily="34" charset="0"/>
-                  </a:rPr>
-                  <a:t>tham</a:t>
-                </a:r>
-                <a:r>
-                  <a:rPr lang="en-US" dirty="0">
-                    <a:latin typeface="Calibri" panose="020F0502020204030204" pitchFamily="34" charset="0"/>
-                    <a:cs typeface="Calibri" panose="020F0502020204030204" pitchFamily="34" charset="0"/>
-                  </a:rPr>
-                  <a:t> </a:t>
-                </a:r>
-                <a:r>
-                  <a:rPr lang="en-US" dirty="0" err="1">
-                    <a:latin typeface="Calibri" panose="020F0502020204030204" pitchFamily="34" charset="0"/>
-                    <a:cs typeface="Calibri" panose="020F0502020204030204" pitchFamily="34" charset="0"/>
-                  </a:rPr>
-                  <a:t>số</a:t>
-                </a:r>
-                <a:r>
-                  <a:rPr lang="en-US" dirty="0">
-                    <a:latin typeface="Calibri" panose="020F0502020204030204" pitchFamily="34" charset="0"/>
-                    <a:cs typeface="Calibri" panose="020F0502020204030204" pitchFamily="34" charset="0"/>
-                  </a:rPr>
-                  <a:t> </a:t>
-                </a:r>
-                <a:r>
-                  <a:rPr lang="en-US" dirty="0" err="1">
-                    <a:latin typeface="Calibri" panose="020F0502020204030204" pitchFamily="34" charset="0"/>
-                    <a:cs typeface="Calibri" panose="020F0502020204030204" pitchFamily="34" charset="0"/>
-                  </a:rPr>
-                  <a:t>có</a:t>
-                </a:r>
-                <a:r>
-                  <a:rPr lang="en-US" dirty="0">
-                    <a:latin typeface="Calibri" panose="020F0502020204030204" pitchFamily="34" charset="0"/>
-                    <a:cs typeface="Calibri" panose="020F0502020204030204" pitchFamily="34" charset="0"/>
-                  </a:rPr>
-                  <a:t> </a:t>
-                </a:r>
-                <a14:m>
-                  <m:oMath xmlns:m="http://schemas.openxmlformats.org/officeDocument/2006/math">
-                    <m:sSup>
-                      <m:sSupPr>
-                        <m:ctrlPr>
-                          <a:rPr lang="en-US" i="1" dirty="0">
-                            <a:latin typeface="Cambria Math" panose="02040503050406030204" pitchFamily="18" charset="0"/>
-                            <a:cs typeface="Calibri" panose="020F0502020204030204" pitchFamily="34" charset="0"/>
-                          </a:rPr>
-                        </m:ctrlPr>
-                      </m:sSupPr>
-                      <m:e>
-                        <m:r>
-                          <a:rPr lang="en-US" i="1" dirty="0">
-                            <a:latin typeface="Cambria Math" panose="02040503050406030204" pitchFamily="18" charset="0"/>
-                            <a:cs typeface="Calibri" panose="020F0502020204030204" pitchFamily="34" charset="0"/>
-                          </a:rPr>
-                          <m:t>10</m:t>
-                        </m:r>
-                      </m:e>
-                      <m:sup>
-                        <m:r>
-                          <a:rPr lang="en-US" b="0" i="1" dirty="0" smtClean="0">
-                            <a:latin typeface="Cambria Math" panose="02040503050406030204" pitchFamily="18" charset="0"/>
-                            <a:cs typeface="Calibri" panose="020F0502020204030204" pitchFamily="34" charset="0"/>
-                          </a:rPr>
-                          <m:t>3</m:t>
-                        </m:r>
-                      </m:sup>
-                    </m:sSup>
-                  </m:oMath>
-                </a14:m>
-                <a:r>
-                  <a:rPr lang="en-US" dirty="0">
-                    <a:latin typeface="Calibri" panose="020F0502020204030204" pitchFamily="34" charset="0"/>
-                    <a:cs typeface="Calibri" panose="020F0502020204030204" pitchFamily="34" charset="0"/>
-                  </a:rPr>
-                  <a:t> </a:t>
-                </a:r>
-                <a:r>
-                  <a:rPr lang="en-US" dirty="0" err="1">
-                    <a:latin typeface="Calibri" panose="020F0502020204030204" pitchFamily="34" charset="0"/>
-                    <a:cs typeface="Calibri" panose="020F0502020204030204" pitchFamily="34" charset="0"/>
-                  </a:rPr>
-                  <a:t>phần</a:t>
-                </a:r>
-                <a:r>
-                  <a:rPr lang="en-US" dirty="0">
-                    <a:latin typeface="Calibri" panose="020F0502020204030204" pitchFamily="34" charset="0"/>
-                    <a:cs typeface="Calibri" panose="020F0502020204030204" pitchFamily="34" charset="0"/>
-                  </a:rPr>
-                  <a:t> </a:t>
-                </a:r>
-                <a:r>
-                  <a:rPr lang="en-US" dirty="0" err="1">
-                    <a:latin typeface="Calibri" panose="020F0502020204030204" pitchFamily="34" charset="0"/>
-                    <a:cs typeface="Calibri" panose="020F0502020204030204" pitchFamily="34" charset="0"/>
-                  </a:rPr>
-                  <a:t>tử</a:t>
-                </a:r>
-                <a:r>
-                  <a:rPr lang="en-US" dirty="0">
-                    <a:latin typeface="Calibri" panose="020F0502020204030204" pitchFamily="34" charset="0"/>
-                    <a:cs typeface="Calibri" panose="020F0502020204030204" pitchFamily="34" charset="0"/>
-                  </a:rPr>
-                  <a:t> </a:t>
-                </a:r>
-                <a:r>
-                  <a:rPr lang="en-US" dirty="0" err="1">
-                    <a:latin typeface="Calibri" panose="020F0502020204030204" pitchFamily="34" charset="0"/>
-                    <a:cs typeface="Calibri" panose="020F0502020204030204" pitchFamily="34" charset="0"/>
-                  </a:rPr>
-                  <a:t>và</a:t>
-                </a:r>
-                <a:r>
-                  <a:rPr lang="en-US" dirty="0">
-                    <a:latin typeface="Calibri" panose="020F0502020204030204" pitchFamily="34" charset="0"/>
-                    <a:cs typeface="Calibri" panose="020F0502020204030204" pitchFamily="34" charset="0"/>
-                  </a:rPr>
-                  <a:t> </a:t>
-                </a:r>
-                <a:r>
-                  <a:rPr lang="en-US" dirty="0" err="1">
-                    <a:latin typeface="Calibri" panose="020F0502020204030204" pitchFamily="34" charset="0"/>
-                    <a:cs typeface="Calibri" panose="020F0502020204030204" pitchFamily="34" charset="0"/>
-                  </a:rPr>
-                  <a:t>không</a:t>
-                </a:r>
-                <a:r>
-                  <a:rPr lang="en-US" dirty="0">
-                    <a:latin typeface="Calibri" panose="020F0502020204030204" pitchFamily="34" charset="0"/>
-                    <a:cs typeface="Calibri" panose="020F0502020204030204" pitchFamily="34" charset="0"/>
-                  </a:rPr>
-                  <a:t> </a:t>
-                </a:r>
-                <a:r>
-                  <a:rPr lang="en-US" dirty="0" err="1">
-                    <a:latin typeface="Calibri" panose="020F0502020204030204" pitchFamily="34" charset="0"/>
-                    <a:cs typeface="Calibri" panose="020F0502020204030204" pitchFamily="34" charset="0"/>
-                  </a:rPr>
-                  <a:t>thực</a:t>
-                </a:r>
-                <a:r>
-                  <a:rPr lang="en-US" dirty="0">
-                    <a:latin typeface="Calibri" panose="020F0502020204030204" pitchFamily="34" charset="0"/>
-                    <a:cs typeface="Calibri" panose="020F0502020204030204" pitchFamily="34" charset="0"/>
-                  </a:rPr>
-                  <a:t> </a:t>
-                </a:r>
-                <a:r>
-                  <a:rPr lang="en-US" dirty="0" err="1">
-                    <a:latin typeface="Calibri" panose="020F0502020204030204" pitchFamily="34" charset="0"/>
-                    <a:cs typeface="Calibri" panose="020F0502020204030204" pitchFamily="34" charset="0"/>
-                  </a:rPr>
-                  <a:t>hiện</a:t>
-                </a:r>
-                <a:r>
-                  <a:rPr lang="en-US" dirty="0">
-                    <a:latin typeface="Calibri" panose="020F0502020204030204" pitchFamily="34" charset="0"/>
-                    <a:cs typeface="Calibri" panose="020F0502020204030204" pitchFamily="34" charset="0"/>
-                  </a:rPr>
-                  <a:t> pruning</a:t>
+                  <a:t>”.</a:t>
                 </a:r>
               </a:p>
               <a:p>
@@ -22837,7 +22929,7 @@
               <a:blipFill>
                 <a:blip r:embed="rId3"/>
                 <a:stretch>
-                  <a:fillRect l="-748" t="-604" r="-374"/>
+                  <a:fillRect l="-779" t="-728" r="-420"/>
                 </a:stretch>
               </a:blipFill>
             </p:spPr>
@@ -22846,7 +22938,7 @@
               <a:lstStyle/>
               <a:p>
                 <a:r>
-                  <a:rPr lang="en-VN">
+                  <a:rPr lang="en-US">
                     <a:noFill/>
                   </a:rPr>
                   <a:t> </a:t>

</xml_diff>